<commit_message>
Update the ladder logic and PLC report function.
</commit_message>
<xml_diff>
--- a/doc/designDoc.pptx
+++ b/doc/designDoc.pptx
@@ -6,6 +6,7 @@
   </p:sldMasterIdLst>
   <p:sldIdLst>
     <p:sldId id="256" r:id="rId2"/>
+    <p:sldId id="257" r:id="rId3"/>
   </p:sldIdLst>
   <p:sldSz cx="12192000" cy="6858000"/>
   <p:notesSz cx="6858000" cy="9144000"/>
@@ -104,6 +105,11 @@
       </a:defRPr>
     </a:lvl9pPr>
   </p:defaultTextStyle>
+  <p:extLst>
+    <p:ext uri="{EFAFB233-063F-42B5-8137-9DF3F51BA10A}">
+      <p15:sldGuideLst xmlns:p15="http://schemas.microsoft.com/office/powerpoint/2012/main"/>
+    </p:ext>
+  </p:extLst>
 </p:presentation>
 </file>
 
@@ -256,7 +262,7 @@
           <a:p>
             <a:fld id="{E7602038-B3F0-4825-ABDA-D66CE1C4CFDA}" type="datetimeFigureOut">
               <a:rPr lang="en-SG" smtClean="0"/>
-              <a:t>24/10/2024</a:t>
+              <a:t>7/11/2024</a:t>
             </a:fld>
             <a:endParaRPr lang="en-SG"/>
           </a:p>
@@ -456,7 +462,7 @@
           <a:p>
             <a:fld id="{E7602038-B3F0-4825-ABDA-D66CE1C4CFDA}" type="datetimeFigureOut">
               <a:rPr lang="en-SG" smtClean="0"/>
-              <a:t>24/10/2024</a:t>
+              <a:t>7/11/2024</a:t>
             </a:fld>
             <a:endParaRPr lang="en-SG"/>
           </a:p>
@@ -666,7 +672,7 @@
           <a:p>
             <a:fld id="{E7602038-B3F0-4825-ABDA-D66CE1C4CFDA}" type="datetimeFigureOut">
               <a:rPr lang="en-SG" smtClean="0"/>
-              <a:t>24/10/2024</a:t>
+              <a:t>7/11/2024</a:t>
             </a:fld>
             <a:endParaRPr lang="en-SG"/>
           </a:p>
@@ -866,7 +872,7 @@
           <a:p>
             <a:fld id="{E7602038-B3F0-4825-ABDA-D66CE1C4CFDA}" type="datetimeFigureOut">
               <a:rPr lang="en-SG" smtClean="0"/>
-              <a:t>24/10/2024</a:t>
+              <a:t>7/11/2024</a:t>
             </a:fld>
             <a:endParaRPr lang="en-SG"/>
           </a:p>
@@ -1142,7 +1148,7 @@
           <a:p>
             <a:fld id="{E7602038-B3F0-4825-ABDA-D66CE1C4CFDA}" type="datetimeFigureOut">
               <a:rPr lang="en-SG" smtClean="0"/>
-              <a:t>24/10/2024</a:t>
+              <a:t>7/11/2024</a:t>
             </a:fld>
             <a:endParaRPr lang="en-SG"/>
           </a:p>
@@ -1410,7 +1416,7 @@
           <a:p>
             <a:fld id="{E7602038-B3F0-4825-ABDA-D66CE1C4CFDA}" type="datetimeFigureOut">
               <a:rPr lang="en-SG" smtClean="0"/>
-              <a:t>24/10/2024</a:t>
+              <a:t>7/11/2024</a:t>
             </a:fld>
             <a:endParaRPr lang="en-SG"/>
           </a:p>
@@ -1825,7 +1831,7 @@
           <a:p>
             <a:fld id="{E7602038-B3F0-4825-ABDA-D66CE1C4CFDA}" type="datetimeFigureOut">
               <a:rPr lang="en-SG" smtClean="0"/>
-              <a:t>24/10/2024</a:t>
+              <a:t>7/11/2024</a:t>
             </a:fld>
             <a:endParaRPr lang="en-SG"/>
           </a:p>
@@ -1967,7 +1973,7 @@
           <a:p>
             <a:fld id="{E7602038-B3F0-4825-ABDA-D66CE1C4CFDA}" type="datetimeFigureOut">
               <a:rPr lang="en-SG" smtClean="0"/>
-              <a:t>24/10/2024</a:t>
+              <a:t>7/11/2024</a:t>
             </a:fld>
             <a:endParaRPr lang="en-SG"/>
           </a:p>
@@ -2080,7 +2086,7 @@
           <a:p>
             <a:fld id="{E7602038-B3F0-4825-ABDA-D66CE1C4CFDA}" type="datetimeFigureOut">
               <a:rPr lang="en-SG" smtClean="0"/>
-              <a:t>24/10/2024</a:t>
+              <a:t>7/11/2024</a:t>
             </a:fld>
             <a:endParaRPr lang="en-SG"/>
           </a:p>
@@ -2393,7 +2399,7 @@
           <a:p>
             <a:fld id="{E7602038-B3F0-4825-ABDA-D66CE1C4CFDA}" type="datetimeFigureOut">
               <a:rPr lang="en-SG" smtClean="0"/>
-              <a:t>24/10/2024</a:t>
+              <a:t>7/11/2024</a:t>
             </a:fld>
             <a:endParaRPr lang="en-SG"/>
           </a:p>
@@ -2682,7 +2688,7 @@
           <a:p>
             <a:fld id="{E7602038-B3F0-4825-ABDA-D66CE1C4CFDA}" type="datetimeFigureOut">
               <a:rPr lang="en-SG" smtClean="0"/>
-              <a:t>24/10/2024</a:t>
+              <a:t>7/11/2024</a:t>
             </a:fld>
             <a:endParaRPr lang="en-SG"/>
           </a:p>
@@ -2925,7 +2931,7 @@
           <a:p>
             <a:fld id="{E7602038-B3F0-4825-ABDA-D66CE1C4CFDA}" type="datetimeFigureOut">
               <a:rPr lang="en-SG" smtClean="0"/>
-              <a:t>24/10/2024</a:t>
+              <a:t>7/11/2024</a:t>
             </a:fld>
             <a:endParaRPr lang="en-SG"/>
           </a:p>
@@ -3457,6 +3463,3271 @@
     <p:extLst>
       <p:ext uri="{BB962C8B-B14F-4D97-AF65-F5344CB8AC3E}">
         <p14:creationId xmlns:p14="http://schemas.microsoft.com/office/powerpoint/2010/main" val="826880150"/>
+      </p:ext>
+    </p:extLst>
+  </p:cSld>
+  <p:clrMapOvr>
+    <a:masterClrMapping/>
+  </p:clrMapOvr>
+</p:sld>
+</file>
+
+<file path=ppt/slides/slide2.xml><?xml version="1.0" encoding="utf-8"?>
+<p:sld xmlns:a="http://schemas.openxmlformats.org/drawingml/2006/main" xmlns:r="http://schemas.openxmlformats.org/officeDocument/2006/relationships" xmlns:p="http://schemas.openxmlformats.org/presentationml/2006/main">
+  <p:cSld>
+    <p:spTree>
+      <p:nvGrpSpPr>
+        <p:cNvPr id="1" name=""/>
+        <p:cNvGrpSpPr/>
+        <p:nvPr/>
+      </p:nvGrpSpPr>
+      <p:grpSpPr>
+        <a:xfrm>
+          <a:off x="0" y="0"/>
+          <a:ext cx="0" cy="0"/>
+          <a:chOff x="0" y="0"/>
+          <a:chExt cx="0" cy="0"/>
+        </a:xfrm>
+      </p:grpSpPr>
+      <p:pic>
+        <p:nvPicPr>
+          <p:cNvPr id="4" name="Picture 3">
+            <a:extLst>
+              <a:ext uri="{FF2B5EF4-FFF2-40B4-BE49-F238E27FC236}">
+                <a16:creationId xmlns:a16="http://schemas.microsoft.com/office/drawing/2014/main" id="{D8DB1189-D179-78C0-71E2-AF77D30BD84C}"/>
+              </a:ext>
+            </a:extLst>
+          </p:cNvPr>
+          <p:cNvPicPr>
+            <a:picLocks noChangeAspect="1"/>
+          </p:cNvPicPr>
+          <p:nvPr/>
+        </p:nvPicPr>
+        <p:blipFill>
+          <a:blip r:embed="rId2">
+            <a:extLst>
+              <a:ext uri="{28A0092B-C50C-407E-A947-70E740481C1C}">
+                <a14:useLocalDpi xmlns:a14="http://schemas.microsoft.com/office/drawing/2010/main" val="0"/>
+              </a:ext>
+            </a:extLst>
+          </a:blip>
+          <a:stretch>
+            <a:fillRect/>
+          </a:stretch>
+        </p:blipFill>
+        <p:spPr>
+          <a:xfrm>
+            <a:off x="2195520" y="558327"/>
+            <a:ext cx="409524" cy="323810"/>
+          </a:xfrm>
+          <a:prstGeom prst="rect">
+            <a:avLst/>
+          </a:prstGeom>
+        </p:spPr>
+      </p:pic>
+      <p:cxnSp>
+        <p:nvCxnSpPr>
+          <p:cNvPr id="5" name="Straight Connector 4">
+            <a:extLst>
+              <a:ext uri="{FF2B5EF4-FFF2-40B4-BE49-F238E27FC236}">
+                <a16:creationId xmlns:a16="http://schemas.microsoft.com/office/drawing/2014/main" id="{2E1CFD8C-6A10-2BB9-CD68-62EA15F53103}"/>
+              </a:ext>
+            </a:extLst>
+          </p:cNvPr>
+          <p:cNvCxnSpPr>
+            <a:cxnSpLocks/>
+          </p:cNvCxnSpPr>
+          <p:nvPr/>
+        </p:nvCxnSpPr>
+        <p:spPr>
+          <a:xfrm flipV="1">
+            <a:off x="2594770" y="709957"/>
+            <a:ext cx="5460169" cy="1"/>
+          </a:xfrm>
+          <a:prstGeom prst="line">
+            <a:avLst/>
+          </a:prstGeom>
+        </p:spPr>
+        <p:style>
+          <a:lnRef idx="2">
+            <a:schemeClr val="dk1"/>
+          </a:lnRef>
+          <a:fillRef idx="0">
+            <a:schemeClr val="dk1"/>
+          </a:fillRef>
+          <a:effectRef idx="1">
+            <a:schemeClr val="dk1"/>
+          </a:effectRef>
+          <a:fontRef idx="minor">
+            <a:schemeClr val="tx1"/>
+          </a:fontRef>
+        </p:style>
+      </p:cxnSp>
+      <p:pic>
+        <p:nvPicPr>
+          <p:cNvPr id="6" name="Picture 5">
+            <a:extLst>
+              <a:ext uri="{FF2B5EF4-FFF2-40B4-BE49-F238E27FC236}">
+                <a16:creationId xmlns:a16="http://schemas.microsoft.com/office/drawing/2014/main" id="{B5BFBE8F-417C-7DEC-5D38-9B33F159D76B}"/>
+              </a:ext>
+            </a:extLst>
+          </p:cNvPr>
+          <p:cNvPicPr>
+            <a:picLocks noChangeAspect="1"/>
+          </p:cNvPicPr>
+          <p:nvPr/>
+        </p:nvPicPr>
+        <p:blipFill>
+          <a:blip r:embed="rId3">
+            <a:extLst>
+              <a:ext uri="{28A0092B-C50C-407E-A947-70E740481C1C}">
+                <a14:useLocalDpi xmlns:a14="http://schemas.microsoft.com/office/drawing/2010/main" val="0"/>
+              </a:ext>
+            </a:extLst>
+          </a:blip>
+          <a:stretch>
+            <a:fillRect/>
+          </a:stretch>
+        </p:blipFill>
+        <p:spPr>
+          <a:xfrm>
+            <a:off x="8054602" y="548802"/>
+            <a:ext cx="438095" cy="342857"/>
+          </a:xfrm>
+          <a:prstGeom prst="rect">
+            <a:avLst/>
+          </a:prstGeom>
+        </p:spPr>
+      </p:pic>
+      <p:pic>
+        <p:nvPicPr>
+          <p:cNvPr id="9" name="Picture 8">
+            <a:extLst>
+              <a:ext uri="{FF2B5EF4-FFF2-40B4-BE49-F238E27FC236}">
+                <a16:creationId xmlns:a16="http://schemas.microsoft.com/office/drawing/2014/main" id="{A4D576EC-ED9A-646A-21BC-7CF303346F83}"/>
+              </a:ext>
+            </a:extLst>
+          </p:cNvPr>
+          <p:cNvPicPr>
+            <a:picLocks noChangeAspect="1"/>
+          </p:cNvPicPr>
+          <p:nvPr/>
+        </p:nvPicPr>
+        <p:blipFill>
+          <a:blip r:embed="rId2">
+            <a:extLst>
+              <a:ext uri="{28A0092B-C50C-407E-A947-70E740481C1C}">
+                <a14:useLocalDpi xmlns:a14="http://schemas.microsoft.com/office/drawing/2010/main" val="0"/>
+              </a:ext>
+            </a:extLst>
+          </a:blip>
+          <a:stretch>
+            <a:fillRect/>
+          </a:stretch>
+        </p:blipFill>
+        <p:spPr>
+          <a:xfrm>
+            <a:off x="3213708" y="558327"/>
+            <a:ext cx="409524" cy="323810"/>
+          </a:xfrm>
+          <a:prstGeom prst="rect">
+            <a:avLst/>
+          </a:prstGeom>
+        </p:spPr>
+      </p:pic>
+      <p:sp>
+        <p:nvSpPr>
+          <p:cNvPr id="12" name="TextBox 11">
+            <a:extLst>
+              <a:ext uri="{FF2B5EF4-FFF2-40B4-BE49-F238E27FC236}">
+                <a16:creationId xmlns:a16="http://schemas.microsoft.com/office/drawing/2014/main" id="{E9B4FDF6-64A4-EDBA-E86C-ADA3EDD92C65}"/>
+              </a:ext>
+            </a:extLst>
+          </p:cNvPr>
+          <p:cNvSpPr txBox="1"/>
+          <p:nvPr/>
+        </p:nvSpPr>
+        <p:spPr>
+          <a:xfrm>
+            <a:off x="2170455" y="327817"/>
+            <a:ext cx="646455" cy="261610"/>
+          </a:xfrm>
+          <a:prstGeom prst="rect">
+            <a:avLst/>
+          </a:prstGeom>
+          <a:noFill/>
+        </p:spPr>
+        <p:txBody>
+          <a:bodyPr wrap="square" rtlCol="0">
+            <a:spAutoFit/>
+          </a:bodyPr>
+          <a:lstStyle/>
+          <a:p>
+            <a:r>
+              <a:rPr lang="en-US" sz="1100" b="1" dirty="0"/>
+              <a:t>HR0.0</a:t>
+            </a:r>
+            <a:endParaRPr lang="en-SG" sz="1100" b="1" dirty="0"/>
+          </a:p>
+        </p:txBody>
+      </p:sp>
+      <p:sp>
+        <p:nvSpPr>
+          <p:cNvPr id="13" name="TextBox 12">
+            <a:extLst>
+              <a:ext uri="{FF2B5EF4-FFF2-40B4-BE49-F238E27FC236}">
+                <a16:creationId xmlns:a16="http://schemas.microsoft.com/office/drawing/2014/main" id="{A362ABF2-8839-6091-0B5A-9CCBEFFA0CCB}"/>
+              </a:ext>
+            </a:extLst>
+          </p:cNvPr>
+          <p:cNvSpPr txBox="1"/>
+          <p:nvPr/>
+        </p:nvSpPr>
+        <p:spPr>
+          <a:xfrm>
+            <a:off x="3193160" y="322956"/>
+            <a:ext cx="646455" cy="261610"/>
+          </a:xfrm>
+          <a:prstGeom prst="rect">
+            <a:avLst/>
+          </a:prstGeom>
+          <a:noFill/>
+        </p:spPr>
+        <p:txBody>
+          <a:bodyPr wrap="square" rtlCol="0">
+            <a:spAutoFit/>
+          </a:bodyPr>
+          <a:lstStyle/>
+          <a:p>
+            <a:r>
+              <a:rPr lang="en-US" sz="1100" b="1" dirty="0"/>
+              <a:t>HR0.7</a:t>
+            </a:r>
+            <a:endParaRPr lang="en-SG" sz="1100" b="1" dirty="0"/>
+          </a:p>
+        </p:txBody>
+      </p:sp>
+      <p:sp>
+        <p:nvSpPr>
+          <p:cNvPr id="14" name="TextBox 13">
+            <a:extLst>
+              <a:ext uri="{FF2B5EF4-FFF2-40B4-BE49-F238E27FC236}">
+                <a16:creationId xmlns:a16="http://schemas.microsoft.com/office/drawing/2014/main" id="{F5E8A41E-ABF9-06DB-2BB0-7F6A94228580}"/>
+              </a:ext>
+            </a:extLst>
+          </p:cNvPr>
+          <p:cNvSpPr txBox="1"/>
+          <p:nvPr/>
+        </p:nvSpPr>
+        <p:spPr>
+          <a:xfrm>
+            <a:off x="8054602" y="322956"/>
+            <a:ext cx="646455" cy="261610"/>
+          </a:xfrm>
+          <a:prstGeom prst="rect">
+            <a:avLst/>
+          </a:prstGeom>
+          <a:noFill/>
+        </p:spPr>
+        <p:txBody>
+          <a:bodyPr wrap="square" rtlCol="0">
+            <a:spAutoFit/>
+          </a:bodyPr>
+          <a:lstStyle/>
+          <a:p>
+            <a:r>
+              <a:rPr lang="en-US" sz="1100" b="1" dirty="0"/>
+              <a:t>C0.0</a:t>
+            </a:r>
+            <a:endParaRPr lang="en-SG" sz="1100" b="1" dirty="0"/>
+          </a:p>
+        </p:txBody>
+      </p:sp>
+      <p:cxnSp>
+        <p:nvCxnSpPr>
+          <p:cNvPr id="16" name="Straight Connector 15">
+            <a:extLst>
+              <a:ext uri="{FF2B5EF4-FFF2-40B4-BE49-F238E27FC236}">
+                <a16:creationId xmlns:a16="http://schemas.microsoft.com/office/drawing/2014/main" id="{91374AB1-CB06-5FAD-F458-FA19E71F08B8}"/>
+              </a:ext>
+            </a:extLst>
+          </p:cNvPr>
+          <p:cNvCxnSpPr>
+            <a:cxnSpLocks/>
+          </p:cNvCxnSpPr>
+          <p:nvPr/>
+        </p:nvCxnSpPr>
+        <p:spPr>
+          <a:xfrm flipV="1">
+            <a:off x="2609561" y="1297766"/>
+            <a:ext cx="5460169" cy="1"/>
+          </a:xfrm>
+          <a:prstGeom prst="line">
+            <a:avLst/>
+          </a:prstGeom>
+        </p:spPr>
+        <p:style>
+          <a:lnRef idx="2">
+            <a:schemeClr val="dk1"/>
+          </a:lnRef>
+          <a:fillRef idx="0">
+            <a:schemeClr val="dk1"/>
+          </a:fillRef>
+          <a:effectRef idx="1">
+            <a:schemeClr val="dk1"/>
+          </a:effectRef>
+          <a:fontRef idx="minor">
+            <a:schemeClr val="tx1"/>
+          </a:fontRef>
+        </p:style>
+      </p:cxnSp>
+      <p:pic>
+        <p:nvPicPr>
+          <p:cNvPr id="17" name="Picture 16">
+            <a:extLst>
+              <a:ext uri="{FF2B5EF4-FFF2-40B4-BE49-F238E27FC236}">
+                <a16:creationId xmlns:a16="http://schemas.microsoft.com/office/drawing/2014/main" id="{16DA9926-3E2F-F874-AF08-876923FD17A9}"/>
+              </a:ext>
+            </a:extLst>
+          </p:cNvPr>
+          <p:cNvPicPr>
+            <a:picLocks noChangeAspect="1"/>
+          </p:cNvPicPr>
+          <p:nvPr/>
+        </p:nvPicPr>
+        <p:blipFill>
+          <a:blip r:embed="rId3">
+            <a:extLst>
+              <a:ext uri="{28A0092B-C50C-407E-A947-70E740481C1C}">
+                <a14:useLocalDpi xmlns:a14="http://schemas.microsoft.com/office/drawing/2010/main" val="0"/>
+              </a:ext>
+            </a:extLst>
+          </a:blip>
+          <a:stretch>
+            <a:fillRect/>
+          </a:stretch>
+        </p:blipFill>
+        <p:spPr>
+          <a:xfrm>
+            <a:off x="8079667" y="1126337"/>
+            <a:ext cx="438095" cy="342857"/>
+          </a:xfrm>
+          <a:prstGeom prst="rect">
+            <a:avLst/>
+          </a:prstGeom>
+        </p:spPr>
+      </p:pic>
+      <p:sp>
+        <p:nvSpPr>
+          <p:cNvPr id="19" name="TextBox 18">
+            <a:extLst>
+              <a:ext uri="{FF2B5EF4-FFF2-40B4-BE49-F238E27FC236}">
+                <a16:creationId xmlns:a16="http://schemas.microsoft.com/office/drawing/2014/main" id="{7EA9A03C-C05E-AF32-9842-0897BFFC2F07}"/>
+              </a:ext>
+            </a:extLst>
+          </p:cNvPr>
+          <p:cNvSpPr txBox="1"/>
+          <p:nvPr/>
+        </p:nvSpPr>
+        <p:spPr>
+          <a:xfrm>
+            <a:off x="2195520" y="895078"/>
+            <a:ext cx="646455" cy="261610"/>
+          </a:xfrm>
+          <a:prstGeom prst="rect">
+            <a:avLst/>
+          </a:prstGeom>
+          <a:noFill/>
+        </p:spPr>
+        <p:txBody>
+          <a:bodyPr wrap="square" rtlCol="0">
+            <a:spAutoFit/>
+          </a:bodyPr>
+          <a:lstStyle/>
+          <a:p>
+            <a:r>
+              <a:rPr lang="en-US" sz="1100" b="1" dirty="0"/>
+              <a:t>HR0.1</a:t>
+            </a:r>
+            <a:endParaRPr lang="en-SG" sz="1100" b="1" dirty="0"/>
+          </a:p>
+        </p:txBody>
+      </p:sp>
+      <p:sp>
+        <p:nvSpPr>
+          <p:cNvPr id="21" name="TextBox 20">
+            <a:extLst>
+              <a:ext uri="{FF2B5EF4-FFF2-40B4-BE49-F238E27FC236}">
+                <a16:creationId xmlns:a16="http://schemas.microsoft.com/office/drawing/2014/main" id="{67B69EDC-62BC-4686-503F-A94F4D5D5EE1}"/>
+              </a:ext>
+            </a:extLst>
+          </p:cNvPr>
+          <p:cNvSpPr txBox="1"/>
+          <p:nvPr/>
+        </p:nvSpPr>
+        <p:spPr>
+          <a:xfrm>
+            <a:off x="8079667" y="890217"/>
+            <a:ext cx="646455" cy="261610"/>
+          </a:xfrm>
+          <a:prstGeom prst="rect">
+            <a:avLst/>
+          </a:prstGeom>
+          <a:noFill/>
+        </p:spPr>
+        <p:txBody>
+          <a:bodyPr wrap="square" rtlCol="0">
+            <a:spAutoFit/>
+          </a:bodyPr>
+          <a:lstStyle/>
+          <a:p>
+            <a:r>
+              <a:rPr lang="en-US" sz="1100" b="1" dirty="0"/>
+              <a:t>C0.1</a:t>
+            </a:r>
+            <a:endParaRPr lang="en-SG" sz="1100" b="1" dirty="0"/>
+          </a:p>
+        </p:txBody>
+      </p:sp>
+      <p:pic>
+        <p:nvPicPr>
+          <p:cNvPr id="22" name="Picture 21">
+            <a:extLst>
+              <a:ext uri="{FF2B5EF4-FFF2-40B4-BE49-F238E27FC236}">
+                <a16:creationId xmlns:a16="http://schemas.microsoft.com/office/drawing/2014/main" id="{C3B21278-7FDC-FB34-D63F-50136795E5FF}"/>
+              </a:ext>
+            </a:extLst>
+          </p:cNvPr>
+          <p:cNvPicPr>
+            <a:picLocks noChangeAspect="1"/>
+          </p:cNvPicPr>
+          <p:nvPr/>
+        </p:nvPicPr>
+        <p:blipFill>
+          <a:blip r:embed="rId4">
+            <a:extLst>
+              <a:ext uri="{28A0092B-C50C-407E-A947-70E740481C1C}">
+                <a14:useLocalDpi xmlns:a14="http://schemas.microsoft.com/office/drawing/2010/main" val="0"/>
+              </a:ext>
+            </a:extLst>
+          </a:blip>
+          <a:stretch>
+            <a:fillRect/>
+          </a:stretch>
+        </p:blipFill>
+        <p:spPr>
+          <a:xfrm>
+            <a:off x="3213708" y="1110696"/>
+            <a:ext cx="409524" cy="323810"/>
+          </a:xfrm>
+          <a:prstGeom prst="rect">
+            <a:avLst/>
+          </a:prstGeom>
+        </p:spPr>
+      </p:pic>
+      <p:pic>
+        <p:nvPicPr>
+          <p:cNvPr id="23" name="Picture 22">
+            <a:extLst>
+              <a:ext uri="{FF2B5EF4-FFF2-40B4-BE49-F238E27FC236}">
+                <a16:creationId xmlns:a16="http://schemas.microsoft.com/office/drawing/2014/main" id="{F9288E58-5C67-4139-40C8-86854FF71165}"/>
+              </a:ext>
+            </a:extLst>
+          </p:cNvPr>
+          <p:cNvPicPr>
+            <a:picLocks noChangeAspect="1"/>
+          </p:cNvPicPr>
+          <p:nvPr/>
+        </p:nvPicPr>
+        <p:blipFill>
+          <a:blip r:embed="rId2">
+            <a:extLst>
+              <a:ext uri="{28A0092B-C50C-407E-A947-70E740481C1C}">
+                <a14:useLocalDpi xmlns:a14="http://schemas.microsoft.com/office/drawing/2010/main" val="0"/>
+              </a:ext>
+            </a:extLst>
+          </a:blip>
+          <a:stretch>
+            <a:fillRect/>
+          </a:stretch>
+        </p:blipFill>
+        <p:spPr>
+          <a:xfrm>
+            <a:off x="2215994" y="1128675"/>
+            <a:ext cx="409524" cy="323810"/>
+          </a:xfrm>
+          <a:prstGeom prst="rect">
+            <a:avLst/>
+          </a:prstGeom>
+        </p:spPr>
+      </p:pic>
+      <p:cxnSp>
+        <p:nvCxnSpPr>
+          <p:cNvPr id="24" name="Straight Connector 23">
+            <a:extLst>
+              <a:ext uri="{FF2B5EF4-FFF2-40B4-BE49-F238E27FC236}">
+                <a16:creationId xmlns:a16="http://schemas.microsoft.com/office/drawing/2014/main" id="{7D641BF7-7125-D3DF-D513-F57AEF034C3F}"/>
+              </a:ext>
+            </a:extLst>
+          </p:cNvPr>
+          <p:cNvCxnSpPr>
+            <a:cxnSpLocks/>
+          </p:cNvCxnSpPr>
+          <p:nvPr/>
+        </p:nvCxnSpPr>
+        <p:spPr>
+          <a:xfrm flipV="1">
+            <a:off x="2630035" y="1817629"/>
+            <a:ext cx="5460169" cy="1"/>
+          </a:xfrm>
+          <a:prstGeom prst="line">
+            <a:avLst/>
+          </a:prstGeom>
+        </p:spPr>
+        <p:style>
+          <a:lnRef idx="2">
+            <a:schemeClr val="dk1"/>
+          </a:lnRef>
+          <a:fillRef idx="0">
+            <a:schemeClr val="dk1"/>
+          </a:fillRef>
+          <a:effectRef idx="1">
+            <a:schemeClr val="dk1"/>
+          </a:effectRef>
+          <a:fontRef idx="minor">
+            <a:schemeClr val="tx1"/>
+          </a:fontRef>
+        </p:style>
+      </p:cxnSp>
+      <p:pic>
+        <p:nvPicPr>
+          <p:cNvPr id="25" name="Picture 24">
+            <a:extLst>
+              <a:ext uri="{FF2B5EF4-FFF2-40B4-BE49-F238E27FC236}">
+                <a16:creationId xmlns:a16="http://schemas.microsoft.com/office/drawing/2014/main" id="{3E8CC5E2-B4CC-8889-84A5-DE1B8B990217}"/>
+              </a:ext>
+            </a:extLst>
+          </p:cNvPr>
+          <p:cNvPicPr>
+            <a:picLocks noChangeAspect="1"/>
+          </p:cNvPicPr>
+          <p:nvPr/>
+        </p:nvPicPr>
+        <p:blipFill>
+          <a:blip r:embed="rId3">
+            <a:extLst>
+              <a:ext uri="{28A0092B-C50C-407E-A947-70E740481C1C}">
+                <a14:useLocalDpi xmlns:a14="http://schemas.microsoft.com/office/drawing/2010/main" val="0"/>
+              </a:ext>
+            </a:extLst>
+          </a:blip>
+          <a:stretch>
+            <a:fillRect/>
+          </a:stretch>
+        </p:blipFill>
+        <p:spPr>
+          <a:xfrm>
+            <a:off x="8089867" y="1656474"/>
+            <a:ext cx="438095" cy="342857"/>
+          </a:xfrm>
+          <a:prstGeom prst="rect">
+            <a:avLst/>
+          </a:prstGeom>
+        </p:spPr>
+      </p:pic>
+      <p:sp>
+        <p:nvSpPr>
+          <p:cNvPr id="26" name="TextBox 25">
+            <a:extLst>
+              <a:ext uri="{FF2B5EF4-FFF2-40B4-BE49-F238E27FC236}">
+                <a16:creationId xmlns:a16="http://schemas.microsoft.com/office/drawing/2014/main" id="{7C0EAD9F-3FB3-1970-56B7-B9B3EFAC1459}"/>
+              </a:ext>
+            </a:extLst>
+          </p:cNvPr>
+          <p:cNvSpPr txBox="1"/>
+          <p:nvPr/>
+        </p:nvSpPr>
+        <p:spPr>
+          <a:xfrm>
+            <a:off x="2205720" y="1435489"/>
+            <a:ext cx="646455" cy="261610"/>
+          </a:xfrm>
+          <a:prstGeom prst="rect">
+            <a:avLst/>
+          </a:prstGeom>
+          <a:noFill/>
+        </p:spPr>
+        <p:txBody>
+          <a:bodyPr wrap="square" rtlCol="0">
+            <a:spAutoFit/>
+          </a:bodyPr>
+          <a:lstStyle/>
+          <a:p>
+            <a:r>
+              <a:rPr lang="en-US" sz="1100" b="1" dirty="0"/>
+              <a:t>HR0.2</a:t>
+            </a:r>
+            <a:endParaRPr lang="en-SG" sz="1100" b="1" dirty="0"/>
+          </a:p>
+        </p:txBody>
+      </p:sp>
+      <p:sp>
+        <p:nvSpPr>
+          <p:cNvPr id="27" name="TextBox 26">
+            <a:extLst>
+              <a:ext uri="{FF2B5EF4-FFF2-40B4-BE49-F238E27FC236}">
+                <a16:creationId xmlns:a16="http://schemas.microsoft.com/office/drawing/2014/main" id="{0847455A-5907-5928-C74E-77ABB4E21351}"/>
+              </a:ext>
+            </a:extLst>
+          </p:cNvPr>
+          <p:cNvSpPr txBox="1"/>
+          <p:nvPr/>
+        </p:nvSpPr>
+        <p:spPr>
+          <a:xfrm>
+            <a:off x="8089867" y="1430628"/>
+            <a:ext cx="646455" cy="261610"/>
+          </a:xfrm>
+          <a:prstGeom prst="rect">
+            <a:avLst/>
+          </a:prstGeom>
+          <a:noFill/>
+        </p:spPr>
+        <p:txBody>
+          <a:bodyPr wrap="square" rtlCol="0">
+            <a:spAutoFit/>
+          </a:bodyPr>
+          <a:lstStyle/>
+          <a:p>
+            <a:r>
+              <a:rPr lang="en-US" sz="1100" b="1" dirty="0"/>
+              <a:t>C0.2</a:t>
+            </a:r>
+            <a:endParaRPr lang="en-SG" sz="1100" b="1" dirty="0"/>
+          </a:p>
+        </p:txBody>
+      </p:sp>
+      <p:pic>
+        <p:nvPicPr>
+          <p:cNvPr id="29" name="Picture 28">
+            <a:extLst>
+              <a:ext uri="{FF2B5EF4-FFF2-40B4-BE49-F238E27FC236}">
+                <a16:creationId xmlns:a16="http://schemas.microsoft.com/office/drawing/2014/main" id="{753E07E0-8E10-890A-9BF4-19C5E6E81038}"/>
+              </a:ext>
+            </a:extLst>
+          </p:cNvPr>
+          <p:cNvPicPr>
+            <a:picLocks noChangeAspect="1"/>
+          </p:cNvPicPr>
+          <p:nvPr/>
+        </p:nvPicPr>
+        <p:blipFill>
+          <a:blip r:embed="rId2">
+            <a:extLst>
+              <a:ext uri="{28A0092B-C50C-407E-A947-70E740481C1C}">
+                <a14:useLocalDpi xmlns:a14="http://schemas.microsoft.com/office/drawing/2010/main" val="0"/>
+              </a:ext>
+            </a:extLst>
+          </a:blip>
+          <a:stretch>
+            <a:fillRect/>
+          </a:stretch>
+        </p:blipFill>
+        <p:spPr>
+          <a:xfrm>
+            <a:off x="2226194" y="1658812"/>
+            <a:ext cx="409524" cy="323810"/>
+          </a:xfrm>
+          <a:prstGeom prst="rect">
+            <a:avLst/>
+          </a:prstGeom>
+        </p:spPr>
+      </p:pic>
+      <p:pic>
+        <p:nvPicPr>
+          <p:cNvPr id="30" name="Picture 29">
+            <a:extLst>
+              <a:ext uri="{FF2B5EF4-FFF2-40B4-BE49-F238E27FC236}">
+                <a16:creationId xmlns:a16="http://schemas.microsoft.com/office/drawing/2014/main" id="{01BDB0AE-9C1C-B742-ED95-05ABC47B3ED6}"/>
+              </a:ext>
+            </a:extLst>
+          </p:cNvPr>
+          <p:cNvPicPr>
+            <a:picLocks noChangeAspect="1"/>
+          </p:cNvPicPr>
+          <p:nvPr/>
+        </p:nvPicPr>
+        <p:blipFill>
+          <a:blip r:embed="rId2">
+            <a:extLst>
+              <a:ext uri="{28A0092B-C50C-407E-A947-70E740481C1C}">
+                <a14:useLocalDpi xmlns:a14="http://schemas.microsoft.com/office/drawing/2010/main" val="0"/>
+              </a:ext>
+            </a:extLst>
+          </a:blip>
+          <a:stretch>
+            <a:fillRect/>
+          </a:stretch>
+        </p:blipFill>
+        <p:spPr>
+          <a:xfrm>
+            <a:off x="3182886" y="1665247"/>
+            <a:ext cx="409524" cy="323810"/>
+          </a:xfrm>
+          <a:prstGeom prst="rect">
+            <a:avLst/>
+          </a:prstGeom>
+        </p:spPr>
+      </p:pic>
+      <p:pic>
+        <p:nvPicPr>
+          <p:cNvPr id="31" name="Picture 30">
+            <a:extLst>
+              <a:ext uri="{FF2B5EF4-FFF2-40B4-BE49-F238E27FC236}">
+                <a16:creationId xmlns:a16="http://schemas.microsoft.com/office/drawing/2014/main" id="{E41B07D9-48C9-9D4C-BEA4-821AC9B3517E}"/>
+              </a:ext>
+            </a:extLst>
+          </p:cNvPr>
+          <p:cNvPicPr>
+            <a:picLocks noChangeAspect="1"/>
+          </p:cNvPicPr>
+          <p:nvPr/>
+        </p:nvPicPr>
+        <p:blipFill>
+          <a:blip r:embed="rId2">
+            <a:extLst>
+              <a:ext uri="{28A0092B-C50C-407E-A947-70E740481C1C}">
+                <a14:useLocalDpi xmlns:a14="http://schemas.microsoft.com/office/drawing/2010/main" val="0"/>
+              </a:ext>
+            </a:extLst>
+          </a:blip>
+          <a:stretch>
+            <a:fillRect/>
+          </a:stretch>
+        </p:blipFill>
+        <p:spPr>
+          <a:xfrm>
+            <a:off x="4103576" y="1665247"/>
+            <a:ext cx="409524" cy="323810"/>
+          </a:xfrm>
+          <a:prstGeom prst="rect">
+            <a:avLst/>
+          </a:prstGeom>
+        </p:spPr>
+      </p:pic>
+      <p:sp>
+        <p:nvSpPr>
+          <p:cNvPr id="32" name="TextBox 31">
+            <a:extLst>
+              <a:ext uri="{FF2B5EF4-FFF2-40B4-BE49-F238E27FC236}">
+                <a16:creationId xmlns:a16="http://schemas.microsoft.com/office/drawing/2014/main" id="{C4A10D51-4DFB-5715-1695-16069DB7D549}"/>
+              </a:ext>
+            </a:extLst>
+          </p:cNvPr>
+          <p:cNvSpPr txBox="1"/>
+          <p:nvPr/>
+        </p:nvSpPr>
+        <p:spPr>
+          <a:xfrm>
+            <a:off x="3158222" y="1433895"/>
+            <a:ext cx="646455" cy="261610"/>
+          </a:xfrm>
+          <a:prstGeom prst="rect">
+            <a:avLst/>
+          </a:prstGeom>
+          <a:noFill/>
+        </p:spPr>
+        <p:txBody>
+          <a:bodyPr wrap="square" rtlCol="0">
+            <a:spAutoFit/>
+          </a:bodyPr>
+          <a:lstStyle/>
+          <a:p>
+            <a:r>
+              <a:rPr lang="en-US" sz="1100" b="1" dirty="0"/>
+              <a:t>HR0.3</a:t>
+            </a:r>
+            <a:endParaRPr lang="en-SG" sz="1100" b="1" dirty="0"/>
+          </a:p>
+        </p:txBody>
+      </p:sp>
+      <p:sp>
+        <p:nvSpPr>
+          <p:cNvPr id="33" name="TextBox 32">
+            <a:extLst>
+              <a:ext uri="{FF2B5EF4-FFF2-40B4-BE49-F238E27FC236}">
+                <a16:creationId xmlns:a16="http://schemas.microsoft.com/office/drawing/2014/main" id="{DC0727E2-8FC3-E955-378F-DB1F696AAD51}"/>
+              </a:ext>
+            </a:extLst>
+          </p:cNvPr>
+          <p:cNvSpPr txBox="1"/>
+          <p:nvPr/>
+        </p:nvSpPr>
+        <p:spPr>
+          <a:xfrm>
+            <a:off x="4099461" y="1421716"/>
+            <a:ext cx="646455" cy="261610"/>
+          </a:xfrm>
+          <a:prstGeom prst="rect">
+            <a:avLst/>
+          </a:prstGeom>
+          <a:noFill/>
+        </p:spPr>
+        <p:txBody>
+          <a:bodyPr wrap="square" rtlCol="0">
+            <a:spAutoFit/>
+          </a:bodyPr>
+          <a:lstStyle/>
+          <a:p>
+            <a:r>
+              <a:rPr lang="en-US" sz="1100" b="1" dirty="0"/>
+              <a:t>HR0.4</a:t>
+            </a:r>
+            <a:endParaRPr lang="en-SG" sz="1100" b="1" dirty="0"/>
+          </a:p>
+        </p:txBody>
+      </p:sp>
+      <p:cxnSp>
+        <p:nvCxnSpPr>
+          <p:cNvPr id="44" name="Straight Connector 43">
+            <a:extLst>
+              <a:ext uri="{FF2B5EF4-FFF2-40B4-BE49-F238E27FC236}">
+                <a16:creationId xmlns:a16="http://schemas.microsoft.com/office/drawing/2014/main" id="{CF8F2605-64A8-6143-9476-A9E0AFBBF53D}"/>
+              </a:ext>
+            </a:extLst>
+          </p:cNvPr>
+          <p:cNvCxnSpPr>
+            <a:cxnSpLocks/>
+          </p:cNvCxnSpPr>
+          <p:nvPr/>
+        </p:nvCxnSpPr>
+        <p:spPr>
+          <a:xfrm flipV="1">
+            <a:off x="2635718" y="2468783"/>
+            <a:ext cx="5460169" cy="1"/>
+          </a:xfrm>
+          <a:prstGeom prst="line">
+            <a:avLst/>
+          </a:prstGeom>
+        </p:spPr>
+        <p:style>
+          <a:lnRef idx="2">
+            <a:schemeClr val="dk1"/>
+          </a:lnRef>
+          <a:fillRef idx="0">
+            <a:schemeClr val="dk1"/>
+          </a:fillRef>
+          <a:effectRef idx="1">
+            <a:schemeClr val="dk1"/>
+          </a:effectRef>
+          <a:fontRef idx="minor">
+            <a:schemeClr val="tx1"/>
+          </a:fontRef>
+        </p:style>
+      </p:cxnSp>
+      <p:pic>
+        <p:nvPicPr>
+          <p:cNvPr id="45" name="Picture 44">
+            <a:extLst>
+              <a:ext uri="{FF2B5EF4-FFF2-40B4-BE49-F238E27FC236}">
+                <a16:creationId xmlns:a16="http://schemas.microsoft.com/office/drawing/2014/main" id="{EECED77F-560D-F201-B28E-BACF13B94868}"/>
+              </a:ext>
+            </a:extLst>
+          </p:cNvPr>
+          <p:cNvPicPr>
+            <a:picLocks noChangeAspect="1"/>
+          </p:cNvPicPr>
+          <p:nvPr/>
+        </p:nvPicPr>
+        <p:blipFill>
+          <a:blip r:embed="rId3">
+            <a:extLst>
+              <a:ext uri="{28A0092B-C50C-407E-A947-70E740481C1C}">
+                <a14:useLocalDpi xmlns:a14="http://schemas.microsoft.com/office/drawing/2010/main" val="0"/>
+              </a:ext>
+            </a:extLst>
+          </a:blip>
+          <a:stretch>
+            <a:fillRect/>
+          </a:stretch>
+        </p:blipFill>
+        <p:spPr>
+          <a:xfrm>
+            <a:off x="8095550" y="2307628"/>
+            <a:ext cx="438095" cy="342857"/>
+          </a:xfrm>
+          <a:prstGeom prst="rect">
+            <a:avLst/>
+          </a:prstGeom>
+        </p:spPr>
+      </p:pic>
+      <p:sp>
+        <p:nvSpPr>
+          <p:cNvPr id="46" name="TextBox 45">
+            <a:extLst>
+              <a:ext uri="{FF2B5EF4-FFF2-40B4-BE49-F238E27FC236}">
+                <a16:creationId xmlns:a16="http://schemas.microsoft.com/office/drawing/2014/main" id="{EAC17F6D-0E7A-2CCC-3C0B-316AFC7CB33E}"/>
+              </a:ext>
+            </a:extLst>
+          </p:cNvPr>
+          <p:cNvSpPr txBox="1"/>
+          <p:nvPr/>
+        </p:nvSpPr>
+        <p:spPr>
+          <a:xfrm>
+            <a:off x="2211403" y="2086643"/>
+            <a:ext cx="646455" cy="261610"/>
+          </a:xfrm>
+          <a:prstGeom prst="rect">
+            <a:avLst/>
+          </a:prstGeom>
+          <a:noFill/>
+        </p:spPr>
+        <p:txBody>
+          <a:bodyPr wrap="square" rtlCol="0">
+            <a:spAutoFit/>
+          </a:bodyPr>
+          <a:lstStyle/>
+          <a:p>
+            <a:r>
+              <a:rPr lang="en-US" sz="1100" b="1" dirty="0"/>
+              <a:t>HR0.0</a:t>
+            </a:r>
+            <a:endParaRPr lang="en-SG" sz="1100" b="1" dirty="0"/>
+          </a:p>
+        </p:txBody>
+      </p:sp>
+      <p:sp>
+        <p:nvSpPr>
+          <p:cNvPr id="47" name="TextBox 46">
+            <a:extLst>
+              <a:ext uri="{FF2B5EF4-FFF2-40B4-BE49-F238E27FC236}">
+                <a16:creationId xmlns:a16="http://schemas.microsoft.com/office/drawing/2014/main" id="{A1D12ED7-0B86-150C-F1AA-094F187C9BE3}"/>
+              </a:ext>
+            </a:extLst>
+          </p:cNvPr>
+          <p:cNvSpPr txBox="1"/>
+          <p:nvPr/>
+        </p:nvSpPr>
+        <p:spPr>
+          <a:xfrm>
+            <a:off x="8095550" y="2081782"/>
+            <a:ext cx="646455" cy="261610"/>
+          </a:xfrm>
+          <a:prstGeom prst="rect">
+            <a:avLst/>
+          </a:prstGeom>
+          <a:noFill/>
+        </p:spPr>
+        <p:txBody>
+          <a:bodyPr wrap="square" rtlCol="0">
+            <a:spAutoFit/>
+          </a:bodyPr>
+          <a:lstStyle/>
+          <a:p>
+            <a:r>
+              <a:rPr lang="en-US" sz="1100" b="1" dirty="0"/>
+              <a:t>C0.3</a:t>
+            </a:r>
+            <a:endParaRPr lang="en-SG" sz="1100" b="1" dirty="0"/>
+          </a:p>
+        </p:txBody>
+      </p:sp>
+      <p:pic>
+        <p:nvPicPr>
+          <p:cNvPr id="48" name="Picture 47">
+            <a:extLst>
+              <a:ext uri="{FF2B5EF4-FFF2-40B4-BE49-F238E27FC236}">
+                <a16:creationId xmlns:a16="http://schemas.microsoft.com/office/drawing/2014/main" id="{F0541607-EC1E-7645-3A7F-236B4C358C89}"/>
+              </a:ext>
+            </a:extLst>
+          </p:cNvPr>
+          <p:cNvPicPr>
+            <a:picLocks noChangeAspect="1"/>
+          </p:cNvPicPr>
+          <p:nvPr/>
+        </p:nvPicPr>
+        <p:blipFill>
+          <a:blip r:embed="rId2">
+            <a:extLst>
+              <a:ext uri="{28A0092B-C50C-407E-A947-70E740481C1C}">
+                <a14:useLocalDpi xmlns:a14="http://schemas.microsoft.com/office/drawing/2010/main" val="0"/>
+              </a:ext>
+            </a:extLst>
+          </a:blip>
+          <a:stretch>
+            <a:fillRect/>
+          </a:stretch>
+        </p:blipFill>
+        <p:spPr>
+          <a:xfrm>
+            <a:off x="2231877" y="2309966"/>
+            <a:ext cx="409524" cy="323810"/>
+          </a:xfrm>
+          <a:prstGeom prst="rect">
+            <a:avLst/>
+          </a:prstGeom>
+        </p:spPr>
+      </p:pic>
+      <p:pic>
+        <p:nvPicPr>
+          <p:cNvPr id="49" name="Picture 48">
+            <a:extLst>
+              <a:ext uri="{FF2B5EF4-FFF2-40B4-BE49-F238E27FC236}">
+                <a16:creationId xmlns:a16="http://schemas.microsoft.com/office/drawing/2014/main" id="{B14BDFBB-8B33-6DF7-9540-C32FED119416}"/>
+              </a:ext>
+            </a:extLst>
+          </p:cNvPr>
+          <p:cNvPicPr>
+            <a:picLocks noChangeAspect="1"/>
+          </p:cNvPicPr>
+          <p:nvPr/>
+        </p:nvPicPr>
+        <p:blipFill>
+          <a:blip r:embed="rId2">
+            <a:extLst>
+              <a:ext uri="{28A0092B-C50C-407E-A947-70E740481C1C}">
+                <a14:useLocalDpi xmlns:a14="http://schemas.microsoft.com/office/drawing/2010/main" val="0"/>
+              </a:ext>
+            </a:extLst>
+          </a:blip>
+          <a:stretch>
+            <a:fillRect/>
+          </a:stretch>
+        </p:blipFill>
+        <p:spPr>
+          <a:xfrm>
+            <a:off x="2221940" y="2807068"/>
+            <a:ext cx="409524" cy="323810"/>
+          </a:xfrm>
+          <a:prstGeom prst="rect">
+            <a:avLst/>
+          </a:prstGeom>
+        </p:spPr>
+      </p:pic>
+      <p:sp>
+        <p:nvSpPr>
+          <p:cNvPr id="53" name="TextBox 52">
+            <a:extLst>
+              <a:ext uri="{FF2B5EF4-FFF2-40B4-BE49-F238E27FC236}">
+                <a16:creationId xmlns:a16="http://schemas.microsoft.com/office/drawing/2014/main" id="{2ECD3735-AC13-11B3-3F35-88023483DFCE}"/>
+              </a:ext>
+            </a:extLst>
+          </p:cNvPr>
+          <p:cNvSpPr txBox="1"/>
+          <p:nvPr/>
+        </p:nvSpPr>
+        <p:spPr>
+          <a:xfrm>
+            <a:off x="2186477" y="2611365"/>
+            <a:ext cx="646455" cy="261610"/>
+          </a:xfrm>
+          <a:prstGeom prst="rect">
+            <a:avLst/>
+          </a:prstGeom>
+          <a:noFill/>
+        </p:spPr>
+        <p:txBody>
+          <a:bodyPr wrap="square" rtlCol="0">
+            <a:spAutoFit/>
+          </a:bodyPr>
+          <a:lstStyle/>
+          <a:p>
+            <a:r>
+              <a:rPr lang="en-US" sz="1100" b="1" dirty="0"/>
+              <a:t>HR0.6</a:t>
+            </a:r>
+            <a:endParaRPr lang="en-SG" sz="1100" b="1" dirty="0"/>
+          </a:p>
+        </p:txBody>
+      </p:sp>
+      <p:pic>
+        <p:nvPicPr>
+          <p:cNvPr id="54" name="Picture 53">
+            <a:extLst>
+              <a:ext uri="{FF2B5EF4-FFF2-40B4-BE49-F238E27FC236}">
+                <a16:creationId xmlns:a16="http://schemas.microsoft.com/office/drawing/2014/main" id="{126E59F2-C28C-9B8C-62EC-9413C9083165}"/>
+              </a:ext>
+            </a:extLst>
+          </p:cNvPr>
+          <p:cNvPicPr>
+            <a:picLocks noChangeAspect="1"/>
+          </p:cNvPicPr>
+          <p:nvPr/>
+        </p:nvPicPr>
+        <p:blipFill>
+          <a:blip r:embed="rId4">
+            <a:extLst>
+              <a:ext uri="{28A0092B-C50C-407E-A947-70E740481C1C}">
+                <a14:useLocalDpi xmlns:a14="http://schemas.microsoft.com/office/drawing/2010/main" val="0"/>
+              </a:ext>
+            </a:extLst>
+          </a:blip>
+          <a:stretch>
+            <a:fillRect/>
+          </a:stretch>
+        </p:blipFill>
+        <p:spPr>
+          <a:xfrm>
+            <a:off x="3236657" y="2291072"/>
+            <a:ext cx="409524" cy="323810"/>
+          </a:xfrm>
+          <a:prstGeom prst="rect">
+            <a:avLst/>
+          </a:prstGeom>
+        </p:spPr>
+      </p:pic>
+      <p:cxnSp>
+        <p:nvCxnSpPr>
+          <p:cNvPr id="56" name="Connector: Elbow 55">
+            <a:extLst>
+              <a:ext uri="{FF2B5EF4-FFF2-40B4-BE49-F238E27FC236}">
+                <a16:creationId xmlns:a16="http://schemas.microsoft.com/office/drawing/2014/main" id="{081E5E5F-0466-D9C3-C447-A80B09BE173A}"/>
+              </a:ext>
+            </a:extLst>
+          </p:cNvPr>
+          <p:cNvCxnSpPr>
+            <a:cxnSpLocks/>
+            <a:stCxn id="49" idx="3"/>
+          </p:cNvCxnSpPr>
+          <p:nvPr/>
+        </p:nvCxnSpPr>
+        <p:spPr>
+          <a:xfrm flipV="1">
+            <a:off x="2631464" y="2479056"/>
+            <a:ext cx="1807444" cy="489917"/>
+          </a:xfrm>
+          <a:prstGeom prst="bentConnector3">
+            <a:avLst>
+              <a:gd name="adj1" fmla="val 98885"/>
+            </a:avLst>
+          </a:prstGeom>
+        </p:spPr>
+        <p:style>
+          <a:lnRef idx="2">
+            <a:schemeClr val="dk1"/>
+          </a:lnRef>
+          <a:fillRef idx="0">
+            <a:schemeClr val="dk1"/>
+          </a:fillRef>
+          <a:effectRef idx="1">
+            <a:schemeClr val="dk1"/>
+          </a:effectRef>
+          <a:fontRef idx="minor">
+            <a:schemeClr val="tx1"/>
+          </a:fontRef>
+        </p:style>
+      </p:cxnSp>
+      <p:cxnSp>
+        <p:nvCxnSpPr>
+          <p:cNvPr id="59" name="Straight Connector 58">
+            <a:extLst>
+              <a:ext uri="{FF2B5EF4-FFF2-40B4-BE49-F238E27FC236}">
+                <a16:creationId xmlns:a16="http://schemas.microsoft.com/office/drawing/2014/main" id="{8354FBA8-A7D3-6C5D-E0C2-7001C7A52115}"/>
+              </a:ext>
+            </a:extLst>
+          </p:cNvPr>
+          <p:cNvCxnSpPr>
+            <a:cxnSpLocks/>
+          </p:cNvCxnSpPr>
+          <p:nvPr/>
+        </p:nvCxnSpPr>
+        <p:spPr>
+          <a:xfrm flipV="1">
+            <a:off x="2635718" y="3537506"/>
+            <a:ext cx="5460169" cy="1"/>
+          </a:xfrm>
+          <a:prstGeom prst="line">
+            <a:avLst/>
+          </a:prstGeom>
+        </p:spPr>
+        <p:style>
+          <a:lnRef idx="2">
+            <a:schemeClr val="dk1"/>
+          </a:lnRef>
+          <a:fillRef idx="0">
+            <a:schemeClr val="dk1"/>
+          </a:fillRef>
+          <a:effectRef idx="1">
+            <a:schemeClr val="dk1"/>
+          </a:effectRef>
+          <a:fontRef idx="minor">
+            <a:schemeClr val="tx1"/>
+          </a:fontRef>
+        </p:style>
+      </p:cxnSp>
+      <p:pic>
+        <p:nvPicPr>
+          <p:cNvPr id="60" name="Picture 59">
+            <a:extLst>
+              <a:ext uri="{FF2B5EF4-FFF2-40B4-BE49-F238E27FC236}">
+                <a16:creationId xmlns:a16="http://schemas.microsoft.com/office/drawing/2014/main" id="{78CDE7BF-BB0A-FA0B-B20E-93F756DE5AFE}"/>
+              </a:ext>
+            </a:extLst>
+          </p:cNvPr>
+          <p:cNvPicPr>
+            <a:picLocks noChangeAspect="1"/>
+          </p:cNvPicPr>
+          <p:nvPr/>
+        </p:nvPicPr>
+        <p:blipFill>
+          <a:blip r:embed="rId3">
+            <a:extLst>
+              <a:ext uri="{28A0092B-C50C-407E-A947-70E740481C1C}">
+                <a14:useLocalDpi xmlns:a14="http://schemas.microsoft.com/office/drawing/2010/main" val="0"/>
+              </a:ext>
+            </a:extLst>
+          </a:blip>
+          <a:stretch>
+            <a:fillRect/>
+          </a:stretch>
+        </p:blipFill>
+        <p:spPr>
+          <a:xfrm>
+            <a:off x="8095550" y="3366077"/>
+            <a:ext cx="438095" cy="342857"/>
+          </a:xfrm>
+          <a:prstGeom prst="rect">
+            <a:avLst/>
+          </a:prstGeom>
+        </p:spPr>
+      </p:pic>
+      <p:sp>
+        <p:nvSpPr>
+          <p:cNvPr id="61" name="TextBox 60">
+            <a:extLst>
+              <a:ext uri="{FF2B5EF4-FFF2-40B4-BE49-F238E27FC236}">
+                <a16:creationId xmlns:a16="http://schemas.microsoft.com/office/drawing/2014/main" id="{F63120C1-96CA-7C60-E55C-322028963BE4}"/>
+              </a:ext>
+            </a:extLst>
+          </p:cNvPr>
+          <p:cNvSpPr txBox="1"/>
+          <p:nvPr/>
+        </p:nvSpPr>
+        <p:spPr>
+          <a:xfrm>
+            <a:off x="2211403" y="3155366"/>
+            <a:ext cx="646455" cy="261610"/>
+          </a:xfrm>
+          <a:prstGeom prst="rect">
+            <a:avLst/>
+          </a:prstGeom>
+          <a:noFill/>
+        </p:spPr>
+        <p:txBody>
+          <a:bodyPr wrap="square" rtlCol="0">
+            <a:spAutoFit/>
+          </a:bodyPr>
+          <a:lstStyle/>
+          <a:p>
+            <a:r>
+              <a:rPr lang="en-US" sz="1100" b="1" dirty="0"/>
+              <a:t>HR0.4</a:t>
+            </a:r>
+            <a:endParaRPr lang="en-SG" sz="1100" b="1" dirty="0"/>
+          </a:p>
+        </p:txBody>
+      </p:sp>
+      <p:sp>
+        <p:nvSpPr>
+          <p:cNvPr id="62" name="TextBox 61">
+            <a:extLst>
+              <a:ext uri="{FF2B5EF4-FFF2-40B4-BE49-F238E27FC236}">
+                <a16:creationId xmlns:a16="http://schemas.microsoft.com/office/drawing/2014/main" id="{2B505649-9726-5616-3F0B-D80DC1A70F41}"/>
+              </a:ext>
+            </a:extLst>
+          </p:cNvPr>
+          <p:cNvSpPr txBox="1"/>
+          <p:nvPr/>
+        </p:nvSpPr>
+        <p:spPr>
+          <a:xfrm>
+            <a:off x="8095550" y="3150505"/>
+            <a:ext cx="646455" cy="261610"/>
+          </a:xfrm>
+          <a:prstGeom prst="rect">
+            <a:avLst/>
+          </a:prstGeom>
+          <a:noFill/>
+        </p:spPr>
+        <p:txBody>
+          <a:bodyPr wrap="square" rtlCol="0">
+            <a:spAutoFit/>
+          </a:bodyPr>
+          <a:lstStyle/>
+          <a:p>
+            <a:r>
+              <a:rPr lang="en-US" sz="1100" b="1" dirty="0"/>
+              <a:t>C0.4</a:t>
+            </a:r>
+            <a:endParaRPr lang="en-SG" sz="1100" b="1" dirty="0"/>
+          </a:p>
+        </p:txBody>
+      </p:sp>
+      <p:pic>
+        <p:nvPicPr>
+          <p:cNvPr id="63" name="Picture 62">
+            <a:extLst>
+              <a:ext uri="{FF2B5EF4-FFF2-40B4-BE49-F238E27FC236}">
+                <a16:creationId xmlns:a16="http://schemas.microsoft.com/office/drawing/2014/main" id="{28DA31A7-865B-04A1-04B8-972F85171E32}"/>
+              </a:ext>
+            </a:extLst>
+          </p:cNvPr>
+          <p:cNvPicPr>
+            <a:picLocks noChangeAspect="1"/>
+          </p:cNvPicPr>
+          <p:nvPr/>
+        </p:nvPicPr>
+        <p:blipFill>
+          <a:blip r:embed="rId2">
+            <a:extLst>
+              <a:ext uri="{28A0092B-C50C-407E-A947-70E740481C1C}">
+                <a14:useLocalDpi xmlns:a14="http://schemas.microsoft.com/office/drawing/2010/main" val="0"/>
+              </a:ext>
+            </a:extLst>
+          </a:blip>
+          <a:stretch>
+            <a:fillRect/>
+          </a:stretch>
+        </p:blipFill>
+        <p:spPr>
+          <a:xfrm>
+            <a:off x="2231877" y="3378689"/>
+            <a:ext cx="409524" cy="323810"/>
+          </a:xfrm>
+          <a:prstGeom prst="rect">
+            <a:avLst/>
+          </a:prstGeom>
+        </p:spPr>
+      </p:pic>
+      <p:pic>
+        <p:nvPicPr>
+          <p:cNvPr id="64" name="Picture 63">
+            <a:extLst>
+              <a:ext uri="{FF2B5EF4-FFF2-40B4-BE49-F238E27FC236}">
+                <a16:creationId xmlns:a16="http://schemas.microsoft.com/office/drawing/2014/main" id="{21FE3B7C-D332-2190-B0CF-EC82C4DBEAE1}"/>
+              </a:ext>
+            </a:extLst>
+          </p:cNvPr>
+          <p:cNvPicPr>
+            <a:picLocks noChangeAspect="1"/>
+          </p:cNvPicPr>
+          <p:nvPr/>
+        </p:nvPicPr>
+        <p:blipFill>
+          <a:blip r:embed="rId2">
+            <a:extLst>
+              <a:ext uri="{28A0092B-C50C-407E-A947-70E740481C1C}">
+                <a14:useLocalDpi xmlns:a14="http://schemas.microsoft.com/office/drawing/2010/main" val="0"/>
+              </a:ext>
+            </a:extLst>
+          </a:blip>
+          <a:stretch>
+            <a:fillRect/>
+          </a:stretch>
+        </p:blipFill>
+        <p:spPr>
+          <a:xfrm>
+            <a:off x="2221940" y="3875791"/>
+            <a:ext cx="409524" cy="323810"/>
+          </a:xfrm>
+          <a:prstGeom prst="rect">
+            <a:avLst/>
+          </a:prstGeom>
+        </p:spPr>
+      </p:pic>
+      <p:sp>
+        <p:nvSpPr>
+          <p:cNvPr id="65" name="TextBox 64">
+            <a:extLst>
+              <a:ext uri="{FF2B5EF4-FFF2-40B4-BE49-F238E27FC236}">
+                <a16:creationId xmlns:a16="http://schemas.microsoft.com/office/drawing/2014/main" id="{C94C2C39-351F-17FB-6CF6-48D86D7CD2FC}"/>
+              </a:ext>
+            </a:extLst>
+          </p:cNvPr>
+          <p:cNvSpPr txBox="1"/>
+          <p:nvPr/>
+        </p:nvSpPr>
+        <p:spPr>
+          <a:xfrm>
+            <a:off x="2186477" y="3680088"/>
+            <a:ext cx="646455" cy="261610"/>
+          </a:xfrm>
+          <a:prstGeom prst="rect">
+            <a:avLst/>
+          </a:prstGeom>
+          <a:noFill/>
+        </p:spPr>
+        <p:txBody>
+          <a:bodyPr wrap="square" rtlCol="0">
+            <a:spAutoFit/>
+          </a:bodyPr>
+          <a:lstStyle/>
+          <a:p>
+            <a:r>
+              <a:rPr lang="en-US" sz="1100" b="1" dirty="0"/>
+              <a:t>HR0.5</a:t>
+            </a:r>
+            <a:endParaRPr lang="en-SG" sz="1100" b="1" dirty="0"/>
+          </a:p>
+        </p:txBody>
+      </p:sp>
+      <p:pic>
+        <p:nvPicPr>
+          <p:cNvPr id="66" name="Picture 65">
+            <a:extLst>
+              <a:ext uri="{FF2B5EF4-FFF2-40B4-BE49-F238E27FC236}">
+                <a16:creationId xmlns:a16="http://schemas.microsoft.com/office/drawing/2014/main" id="{E8BD0504-41C3-D062-2515-04E47EBFF1AC}"/>
+              </a:ext>
+            </a:extLst>
+          </p:cNvPr>
+          <p:cNvPicPr>
+            <a:picLocks noChangeAspect="1"/>
+          </p:cNvPicPr>
+          <p:nvPr/>
+        </p:nvPicPr>
+        <p:blipFill>
+          <a:blip r:embed="rId4">
+            <a:extLst>
+              <a:ext uri="{28A0092B-C50C-407E-A947-70E740481C1C}">
+                <a14:useLocalDpi xmlns:a14="http://schemas.microsoft.com/office/drawing/2010/main" val="0"/>
+              </a:ext>
+            </a:extLst>
+          </a:blip>
+          <a:stretch>
+            <a:fillRect/>
+          </a:stretch>
+        </p:blipFill>
+        <p:spPr>
+          <a:xfrm>
+            <a:off x="7279344" y="3357699"/>
+            <a:ext cx="409524" cy="323810"/>
+          </a:xfrm>
+          <a:prstGeom prst="rect">
+            <a:avLst/>
+          </a:prstGeom>
+        </p:spPr>
+      </p:pic>
+      <p:cxnSp>
+        <p:nvCxnSpPr>
+          <p:cNvPr id="67" name="Connector: Elbow 66">
+            <a:extLst>
+              <a:ext uri="{FF2B5EF4-FFF2-40B4-BE49-F238E27FC236}">
+                <a16:creationId xmlns:a16="http://schemas.microsoft.com/office/drawing/2014/main" id="{1E4238B8-13E5-62A0-15D6-335C61AEC2AA}"/>
+              </a:ext>
+            </a:extLst>
+          </p:cNvPr>
+          <p:cNvCxnSpPr>
+            <a:cxnSpLocks/>
+            <a:stCxn id="64" idx="3"/>
+          </p:cNvCxnSpPr>
+          <p:nvPr/>
+        </p:nvCxnSpPr>
+        <p:spPr>
+          <a:xfrm flipV="1">
+            <a:off x="2631464" y="3547779"/>
+            <a:ext cx="1807444" cy="489917"/>
+          </a:xfrm>
+          <a:prstGeom prst="bentConnector3">
+            <a:avLst>
+              <a:gd name="adj1" fmla="val 98885"/>
+            </a:avLst>
+          </a:prstGeom>
+        </p:spPr>
+        <p:style>
+          <a:lnRef idx="2">
+            <a:schemeClr val="dk1"/>
+          </a:lnRef>
+          <a:fillRef idx="0">
+            <a:schemeClr val="dk1"/>
+          </a:fillRef>
+          <a:effectRef idx="1">
+            <a:schemeClr val="dk1"/>
+          </a:effectRef>
+          <a:fontRef idx="minor">
+            <a:schemeClr val="tx1"/>
+          </a:fontRef>
+        </p:style>
+      </p:cxnSp>
+      <p:cxnSp>
+        <p:nvCxnSpPr>
+          <p:cNvPr id="72" name="Straight Connector 71">
+            <a:extLst>
+              <a:ext uri="{FF2B5EF4-FFF2-40B4-BE49-F238E27FC236}">
+                <a16:creationId xmlns:a16="http://schemas.microsoft.com/office/drawing/2014/main" id="{AE936A74-FBD2-F3B1-F7D8-E49CDF8CB688}"/>
+              </a:ext>
+            </a:extLst>
+          </p:cNvPr>
+          <p:cNvCxnSpPr>
+            <a:cxnSpLocks/>
+          </p:cNvCxnSpPr>
+          <p:nvPr/>
+        </p:nvCxnSpPr>
+        <p:spPr>
+          <a:xfrm flipV="1">
+            <a:off x="2640235" y="4636819"/>
+            <a:ext cx="5460169" cy="1"/>
+          </a:xfrm>
+          <a:prstGeom prst="line">
+            <a:avLst/>
+          </a:prstGeom>
+        </p:spPr>
+        <p:style>
+          <a:lnRef idx="2">
+            <a:schemeClr val="dk1"/>
+          </a:lnRef>
+          <a:fillRef idx="0">
+            <a:schemeClr val="dk1"/>
+          </a:fillRef>
+          <a:effectRef idx="1">
+            <a:schemeClr val="dk1"/>
+          </a:effectRef>
+          <a:fontRef idx="minor">
+            <a:schemeClr val="tx1"/>
+          </a:fontRef>
+        </p:style>
+      </p:cxnSp>
+      <p:pic>
+        <p:nvPicPr>
+          <p:cNvPr id="73" name="Picture 72">
+            <a:extLst>
+              <a:ext uri="{FF2B5EF4-FFF2-40B4-BE49-F238E27FC236}">
+                <a16:creationId xmlns:a16="http://schemas.microsoft.com/office/drawing/2014/main" id="{147E8098-F170-5A1A-2384-EEECA323A0FE}"/>
+              </a:ext>
+            </a:extLst>
+          </p:cNvPr>
+          <p:cNvPicPr>
+            <a:picLocks noChangeAspect="1"/>
+          </p:cNvPicPr>
+          <p:nvPr/>
+        </p:nvPicPr>
+        <p:blipFill>
+          <a:blip r:embed="rId3">
+            <a:extLst>
+              <a:ext uri="{28A0092B-C50C-407E-A947-70E740481C1C}">
+                <a14:useLocalDpi xmlns:a14="http://schemas.microsoft.com/office/drawing/2010/main" val="0"/>
+              </a:ext>
+            </a:extLst>
+          </a:blip>
+          <a:stretch>
+            <a:fillRect/>
+          </a:stretch>
+        </p:blipFill>
+        <p:spPr>
+          <a:xfrm>
+            <a:off x="8110341" y="4465390"/>
+            <a:ext cx="438095" cy="342857"/>
+          </a:xfrm>
+          <a:prstGeom prst="rect">
+            <a:avLst/>
+          </a:prstGeom>
+        </p:spPr>
+      </p:pic>
+      <p:sp>
+        <p:nvSpPr>
+          <p:cNvPr id="74" name="TextBox 73">
+            <a:extLst>
+              <a:ext uri="{FF2B5EF4-FFF2-40B4-BE49-F238E27FC236}">
+                <a16:creationId xmlns:a16="http://schemas.microsoft.com/office/drawing/2014/main" id="{321A9DB0-9F5E-7CBF-4241-414106193B49}"/>
+              </a:ext>
+            </a:extLst>
+          </p:cNvPr>
+          <p:cNvSpPr txBox="1"/>
+          <p:nvPr/>
+        </p:nvSpPr>
+        <p:spPr>
+          <a:xfrm>
+            <a:off x="2226194" y="4234131"/>
+            <a:ext cx="646455" cy="261610"/>
+          </a:xfrm>
+          <a:prstGeom prst="rect">
+            <a:avLst/>
+          </a:prstGeom>
+          <a:noFill/>
+        </p:spPr>
+        <p:txBody>
+          <a:bodyPr wrap="square" rtlCol="0">
+            <a:spAutoFit/>
+          </a:bodyPr>
+          <a:lstStyle/>
+          <a:p>
+            <a:r>
+              <a:rPr lang="en-US" sz="1100" b="1" dirty="0"/>
+              <a:t>HR0.2</a:t>
+            </a:r>
+            <a:endParaRPr lang="en-SG" sz="1100" b="1" dirty="0"/>
+          </a:p>
+        </p:txBody>
+      </p:sp>
+      <p:sp>
+        <p:nvSpPr>
+          <p:cNvPr id="75" name="TextBox 74">
+            <a:extLst>
+              <a:ext uri="{FF2B5EF4-FFF2-40B4-BE49-F238E27FC236}">
+                <a16:creationId xmlns:a16="http://schemas.microsoft.com/office/drawing/2014/main" id="{C13EDB13-E0F2-B2F5-9AEF-B154CA21F9EF}"/>
+              </a:ext>
+            </a:extLst>
+          </p:cNvPr>
+          <p:cNvSpPr txBox="1"/>
+          <p:nvPr/>
+        </p:nvSpPr>
+        <p:spPr>
+          <a:xfrm>
+            <a:off x="8110341" y="4229270"/>
+            <a:ext cx="646455" cy="261610"/>
+          </a:xfrm>
+          <a:prstGeom prst="rect">
+            <a:avLst/>
+          </a:prstGeom>
+          <a:noFill/>
+        </p:spPr>
+        <p:txBody>
+          <a:bodyPr wrap="square" rtlCol="0">
+            <a:spAutoFit/>
+          </a:bodyPr>
+          <a:lstStyle/>
+          <a:p>
+            <a:r>
+              <a:rPr lang="en-US" sz="1100" b="1" dirty="0"/>
+              <a:t>C0.5</a:t>
+            </a:r>
+            <a:endParaRPr lang="en-SG" sz="1100" b="1" dirty="0"/>
+          </a:p>
+        </p:txBody>
+      </p:sp>
+      <p:pic>
+        <p:nvPicPr>
+          <p:cNvPr id="76" name="Picture 75">
+            <a:extLst>
+              <a:ext uri="{FF2B5EF4-FFF2-40B4-BE49-F238E27FC236}">
+                <a16:creationId xmlns:a16="http://schemas.microsoft.com/office/drawing/2014/main" id="{47E05B35-BCC3-D981-3422-805C230C919A}"/>
+              </a:ext>
+            </a:extLst>
+          </p:cNvPr>
+          <p:cNvPicPr>
+            <a:picLocks noChangeAspect="1"/>
+          </p:cNvPicPr>
+          <p:nvPr/>
+        </p:nvPicPr>
+        <p:blipFill>
+          <a:blip r:embed="rId4">
+            <a:extLst>
+              <a:ext uri="{28A0092B-C50C-407E-A947-70E740481C1C}">
+                <a14:useLocalDpi xmlns:a14="http://schemas.microsoft.com/office/drawing/2010/main" val="0"/>
+              </a:ext>
+            </a:extLst>
+          </a:blip>
+          <a:stretch>
+            <a:fillRect/>
+          </a:stretch>
+        </p:blipFill>
+        <p:spPr>
+          <a:xfrm>
+            <a:off x="3244382" y="4449749"/>
+            <a:ext cx="409524" cy="323810"/>
+          </a:xfrm>
+          <a:prstGeom prst="rect">
+            <a:avLst/>
+          </a:prstGeom>
+        </p:spPr>
+      </p:pic>
+      <p:pic>
+        <p:nvPicPr>
+          <p:cNvPr id="77" name="Picture 76">
+            <a:extLst>
+              <a:ext uri="{FF2B5EF4-FFF2-40B4-BE49-F238E27FC236}">
+                <a16:creationId xmlns:a16="http://schemas.microsoft.com/office/drawing/2014/main" id="{BF9FEF88-6F91-7958-D48D-F1F27C84BEBE}"/>
+              </a:ext>
+            </a:extLst>
+          </p:cNvPr>
+          <p:cNvPicPr>
+            <a:picLocks noChangeAspect="1"/>
+          </p:cNvPicPr>
+          <p:nvPr/>
+        </p:nvPicPr>
+        <p:blipFill>
+          <a:blip r:embed="rId2">
+            <a:extLst>
+              <a:ext uri="{28A0092B-C50C-407E-A947-70E740481C1C}">
+                <a14:useLocalDpi xmlns:a14="http://schemas.microsoft.com/office/drawing/2010/main" val="0"/>
+              </a:ext>
+            </a:extLst>
+          </a:blip>
+          <a:stretch>
+            <a:fillRect/>
+          </a:stretch>
+        </p:blipFill>
+        <p:spPr>
+          <a:xfrm>
+            <a:off x="2246668" y="4467728"/>
+            <a:ext cx="409524" cy="323810"/>
+          </a:xfrm>
+          <a:prstGeom prst="rect">
+            <a:avLst/>
+          </a:prstGeom>
+        </p:spPr>
+      </p:pic>
+      <p:pic>
+        <p:nvPicPr>
+          <p:cNvPr id="78" name="Picture 77">
+            <a:extLst>
+              <a:ext uri="{FF2B5EF4-FFF2-40B4-BE49-F238E27FC236}">
+                <a16:creationId xmlns:a16="http://schemas.microsoft.com/office/drawing/2014/main" id="{7E220B16-91B3-7352-43BA-E091B8868824}"/>
+              </a:ext>
+            </a:extLst>
+          </p:cNvPr>
+          <p:cNvPicPr>
+            <a:picLocks noChangeAspect="1"/>
+          </p:cNvPicPr>
+          <p:nvPr/>
+        </p:nvPicPr>
+        <p:blipFill>
+          <a:blip r:embed="rId2">
+            <a:extLst>
+              <a:ext uri="{28A0092B-C50C-407E-A947-70E740481C1C}">
+                <a14:useLocalDpi xmlns:a14="http://schemas.microsoft.com/office/drawing/2010/main" val="0"/>
+              </a:ext>
+            </a:extLst>
+          </a:blip>
+          <a:stretch>
+            <a:fillRect/>
+          </a:stretch>
+        </p:blipFill>
+        <p:spPr>
+          <a:xfrm>
+            <a:off x="4336392" y="4474913"/>
+            <a:ext cx="409524" cy="323810"/>
+          </a:xfrm>
+          <a:prstGeom prst="rect">
+            <a:avLst/>
+          </a:prstGeom>
+        </p:spPr>
+      </p:pic>
+      <p:sp>
+        <p:nvSpPr>
+          <p:cNvPr id="79" name="TextBox 78">
+            <a:extLst>
+              <a:ext uri="{FF2B5EF4-FFF2-40B4-BE49-F238E27FC236}">
+                <a16:creationId xmlns:a16="http://schemas.microsoft.com/office/drawing/2014/main" id="{15E7B6D3-99F7-0697-7E92-3537D500DC9F}"/>
+              </a:ext>
+            </a:extLst>
+          </p:cNvPr>
+          <p:cNvSpPr txBox="1"/>
+          <p:nvPr/>
+        </p:nvSpPr>
+        <p:spPr>
+          <a:xfrm>
+            <a:off x="4308338" y="4220491"/>
+            <a:ext cx="646455" cy="261610"/>
+          </a:xfrm>
+          <a:prstGeom prst="rect">
+            <a:avLst/>
+          </a:prstGeom>
+          <a:noFill/>
+        </p:spPr>
+        <p:txBody>
+          <a:bodyPr wrap="square" rtlCol="0">
+            <a:spAutoFit/>
+          </a:bodyPr>
+          <a:lstStyle/>
+          <a:p>
+            <a:r>
+              <a:rPr lang="en-US" sz="1100" b="1" dirty="0"/>
+              <a:t>HR0.6</a:t>
+            </a:r>
+            <a:endParaRPr lang="en-SG" sz="1100" b="1" dirty="0"/>
+          </a:p>
+        </p:txBody>
+      </p:sp>
+      <p:cxnSp>
+        <p:nvCxnSpPr>
+          <p:cNvPr id="80" name="Straight Connector 79">
+            <a:extLst>
+              <a:ext uri="{FF2B5EF4-FFF2-40B4-BE49-F238E27FC236}">
+                <a16:creationId xmlns:a16="http://schemas.microsoft.com/office/drawing/2014/main" id="{9518BC95-4BFD-F785-3709-85EB9C7BF65E}"/>
+              </a:ext>
+            </a:extLst>
+          </p:cNvPr>
+          <p:cNvCxnSpPr>
+            <a:cxnSpLocks/>
+          </p:cNvCxnSpPr>
+          <p:nvPr/>
+        </p:nvCxnSpPr>
+        <p:spPr>
+          <a:xfrm flipV="1">
+            <a:off x="2695909" y="5238819"/>
+            <a:ext cx="5460169" cy="1"/>
+          </a:xfrm>
+          <a:prstGeom prst="line">
+            <a:avLst/>
+          </a:prstGeom>
+        </p:spPr>
+        <p:style>
+          <a:lnRef idx="2">
+            <a:schemeClr val="dk1"/>
+          </a:lnRef>
+          <a:fillRef idx="0">
+            <a:schemeClr val="dk1"/>
+          </a:fillRef>
+          <a:effectRef idx="1">
+            <a:schemeClr val="dk1"/>
+          </a:effectRef>
+          <a:fontRef idx="minor">
+            <a:schemeClr val="tx1"/>
+          </a:fontRef>
+        </p:style>
+      </p:cxnSp>
+      <p:pic>
+        <p:nvPicPr>
+          <p:cNvPr id="81" name="Picture 80">
+            <a:extLst>
+              <a:ext uri="{FF2B5EF4-FFF2-40B4-BE49-F238E27FC236}">
+                <a16:creationId xmlns:a16="http://schemas.microsoft.com/office/drawing/2014/main" id="{79EDA7F7-214D-F540-8942-A02029E95C61}"/>
+              </a:ext>
+            </a:extLst>
+          </p:cNvPr>
+          <p:cNvPicPr>
+            <a:picLocks noChangeAspect="1"/>
+          </p:cNvPicPr>
+          <p:nvPr/>
+        </p:nvPicPr>
+        <p:blipFill>
+          <a:blip r:embed="rId3">
+            <a:extLst>
+              <a:ext uri="{28A0092B-C50C-407E-A947-70E740481C1C}">
+                <a14:useLocalDpi xmlns:a14="http://schemas.microsoft.com/office/drawing/2010/main" val="0"/>
+              </a:ext>
+            </a:extLst>
+          </a:blip>
+          <a:stretch>
+            <a:fillRect/>
+          </a:stretch>
+        </p:blipFill>
+        <p:spPr>
+          <a:xfrm>
+            <a:off x="8155741" y="5077664"/>
+            <a:ext cx="438095" cy="342857"/>
+          </a:xfrm>
+          <a:prstGeom prst="rect">
+            <a:avLst/>
+          </a:prstGeom>
+        </p:spPr>
+      </p:pic>
+      <p:sp>
+        <p:nvSpPr>
+          <p:cNvPr id="82" name="TextBox 81">
+            <a:extLst>
+              <a:ext uri="{FF2B5EF4-FFF2-40B4-BE49-F238E27FC236}">
+                <a16:creationId xmlns:a16="http://schemas.microsoft.com/office/drawing/2014/main" id="{B7B6C43D-DDE3-D4C0-729F-51C7B0E1AFBA}"/>
+              </a:ext>
+            </a:extLst>
+          </p:cNvPr>
+          <p:cNvSpPr txBox="1"/>
+          <p:nvPr/>
+        </p:nvSpPr>
+        <p:spPr>
+          <a:xfrm>
+            <a:off x="2271594" y="4856679"/>
+            <a:ext cx="646455" cy="261610"/>
+          </a:xfrm>
+          <a:prstGeom prst="rect">
+            <a:avLst/>
+          </a:prstGeom>
+          <a:noFill/>
+        </p:spPr>
+        <p:txBody>
+          <a:bodyPr wrap="square" rtlCol="0">
+            <a:spAutoFit/>
+          </a:bodyPr>
+          <a:lstStyle/>
+          <a:p>
+            <a:r>
+              <a:rPr lang="en-US" sz="1100" b="1" dirty="0"/>
+              <a:t>HR0.3</a:t>
+            </a:r>
+            <a:endParaRPr lang="en-SG" sz="1100" b="1" dirty="0"/>
+          </a:p>
+        </p:txBody>
+      </p:sp>
+      <p:sp>
+        <p:nvSpPr>
+          <p:cNvPr id="83" name="TextBox 82">
+            <a:extLst>
+              <a:ext uri="{FF2B5EF4-FFF2-40B4-BE49-F238E27FC236}">
+                <a16:creationId xmlns:a16="http://schemas.microsoft.com/office/drawing/2014/main" id="{79F8B0E2-4E48-B748-703D-552881CDF771}"/>
+              </a:ext>
+            </a:extLst>
+          </p:cNvPr>
+          <p:cNvSpPr txBox="1"/>
+          <p:nvPr/>
+        </p:nvSpPr>
+        <p:spPr>
+          <a:xfrm>
+            <a:off x="8155741" y="4851818"/>
+            <a:ext cx="646455" cy="261610"/>
+          </a:xfrm>
+          <a:prstGeom prst="rect">
+            <a:avLst/>
+          </a:prstGeom>
+          <a:noFill/>
+        </p:spPr>
+        <p:txBody>
+          <a:bodyPr wrap="square" rtlCol="0">
+            <a:spAutoFit/>
+          </a:bodyPr>
+          <a:lstStyle/>
+          <a:p>
+            <a:r>
+              <a:rPr lang="en-US" sz="1100" b="1" dirty="0"/>
+              <a:t>C0.6</a:t>
+            </a:r>
+            <a:endParaRPr lang="en-SG" sz="1100" b="1" dirty="0"/>
+          </a:p>
+        </p:txBody>
+      </p:sp>
+      <p:pic>
+        <p:nvPicPr>
+          <p:cNvPr id="84" name="Picture 83">
+            <a:extLst>
+              <a:ext uri="{FF2B5EF4-FFF2-40B4-BE49-F238E27FC236}">
+                <a16:creationId xmlns:a16="http://schemas.microsoft.com/office/drawing/2014/main" id="{B34A569C-C459-1438-FFFE-842B66F79755}"/>
+              </a:ext>
+            </a:extLst>
+          </p:cNvPr>
+          <p:cNvPicPr>
+            <a:picLocks noChangeAspect="1"/>
+          </p:cNvPicPr>
+          <p:nvPr/>
+        </p:nvPicPr>
+        <p:blipFill>
+          <a:blip r:embed="rId2">
+            <a:extLst>
+              <a:ext uri="{28A0092B-C50C-407E-A947-70E740481C1C}">
+                <a14:useLocalDpi xmlns:a14="http://schemas.microsoft.com/office/drawing/2010/main" val="0"/>
+              </a:ext>
+            </a:extLst>
+          </a:blip>
+          <a:stretch>
+            <a:fillRect/>
+          </a:stretch>
+        </p:blipFill>
+        <p:spPr>
+          <a:xfrm>
+            <a:off x="2292068" y="5080002"/>
+            <a:ext cx="409524" cy="323810"/>
+          </a:xfrm>
+          <a:prstGeom prst="rect">
+            <a:avLst/>
+          </a:prstGeom>
+        </p:spPr>
+      </p:pic>
+      <p:pic>
+        <p:nvPicPr>
+          <p:cNvPr id="85" name="Picture 84">
+            <a:extLst>
+              <a:ext uri="{FF2B5EF4-FFF2-40B4-BE49-F238E27FC236}">
+                <a16:creationId xmlns:a16="http://schemas.microsoft.com/office/drawing/2014/main" id="{4A0370C9-CF5B-E58E-4993-8B49EC374C37}"/>
+              </a:ext>
+            </a:extLst>
+          </p:cNvPr>
+          <p:cNvPicPr>
+            <a:picLocks noChangeAspect="1"/>
+          </p:cNvPicPr>
+          <p:nvPr/>
+        </p:nvPicPr>
+        <p:blipFill>
+          <a:blip r:embed="rId2">
+            <a:extLst>
+              <a:ext uri="{28A0092B-C50C-407E-A947-70E740481C1C}">
+                <a14:useLocalDpi xmlns:a14="http://schemas.microsoft.com/office/drawing/2010/main" val="0"/>
+              </a:ext>
+            </a:extLst>
+          </a:blip>
+          <a:stretch>
+            <a:fillRect/>
+          </a:stretch>
+        </p:blipFill>
+        <p:spPr>
+          <a:xfrm>
+            <a:off x="2282131" y="5577104"/>
+            <a:ext cx="409524" cy="323810"/>
+          </a:xfrm>
+          <a:prstGeom prst="rect">
+            <a:avLst/>
+          </a:prstGeom>
+        </p:spPr>
+      </p:pic>
+      <p:sp>
+        <p:nvSpPr>
+          <p:cNvPr id="86" name="TextBox 85">
+            <a:extLst>
+              <a:ext uri="{FF2B5EF4-FFF2-40B4-BE49-F238E27FC236}">
+                <a16:creationId xmlns:a16="http://schemas.microsoft.com/office/drawing/2014/main" id="{2E803D53-C3A4-4DA3-7CC4-BE52301B1356}"/>
+              </a:ext>
+            </a:extLst>
+          </p:cNvPr>
+          <p:cNvSpPr txBox="1"/>
+          <p:nvPr/>
+        </p:nvSpPr>
+        <p:spPr>
+          <a:xfrm>
+            <a:off x="2246668" y="5381401"/>
+            <a:ext cx="646455" cy="261610"/>
+          </a:xfrm>
+          <a:prstGeom prst="rect">
+            <a:avLst/>
+          </a:prstGeom>
+          <a:noFill/>
+        </p:spPr>
+        <p:txBody>
+          <a:bodyPr wrap="square" rtlCol="0">
+            <a:spAutoFit/>
+          </a:bodyPr>
+          <a:lstStyle/>
+          <a:p>
+            <a:r>
+              <a:rPr lang="en-US" sz="1100" b="1" dirty="0"/>
+              <a:t>HR0.7</a:t>
+            </a:r>
+            <a:endParaRPr lang="en-SG" sz="1100" b="1" dirty="0"/>
+          </a:p>
+        </p:txBody>
+      </p:sp>
+      <p:pic>
+        <p:nvPicPr>
+          <p:cNvPr id="87" name="Picture 86">
+            <a:extLst>
+              <a:ext uri="{FF2B5EF4-FFF2-40B4-BE49-F238E27FC236}">
+                <a16:creationId xmlns:a16="http://schemas.microsoft.com/office/drawing/2014/main" id="{AE52F10E-5C7E-3D6F-1FB2-2BD7B43BF9E2}"/>
+              </a:ext>
+            </a:extLst>
+          </p:cNvPr>
+          <p:cNvPicPr>
+            <a:picLocks noChangeAspect="1"/>
+          </p:cNvPicPr>
+          <p:nvPr/>
+        </p:nvPicPr>
+        <p:blipFill>
+          <a:blip r:embed="rId4">
+            <a:extLst>
+              <a:ext uri="{28A0092B-C50C-407E-A947-70E740481C1C}">
+                <a14:useLocalDpi xmlns:a14="http://schemas.microsoft.com/office/drawing/2010/main" val="0"/>
+              </a:ext>
+            </a:extLst>
+          </a:blip>
+          <a:stretch>
+            <a:fillRect/>
+          </a:stretch>
+        </p:blipFill>
+        <p:spPr>
+          <a:xfrm>
+            <a:off x="7339535" y="5059012"/>
+            <a:ext cx="409524" cy="323810"/>
+          </a:xfrm>
+          <a:prstGeom prst="rect">
+            <a:avLst/>
+          </a:prstGeom>
+        </p:spPr>
+      </p:pic>
+      <p:cxnSp>
+        <p:nvCxnSpPr>
+          <p:cNvPr id="88" name="Connector: Elbow 87">
+            <a:extLst>
+              <a:ext uri="{FF2B5EF4-FFF2-40B4-BE49-F238E27FC236}">
+                <a16:creationId xmlns:a16="http://schemas.microsoft.com/office/drawing/2014/main" id="{F4356CC1-4057-839B-1ED3-474126444DA2}"/>
+              </a:ext>
+            </a:extLst>
+          </p:cNvPr>
+          <p:cNvCxnSpPr>
+            <a:cxnSpLocks/>
+            <a:stCxn id="85" idx="3"/>
+          </p:cNvCxnSpPr>
+          <p:nvPr/>
+        </p:nvCxnSpPr>
+        <p:spPr>
+          <a:xfrm flipV="1">
+            <a:off x="2691655" y="5249092"/>
+            <a:ext cx="1807444" cy="489917"/>
+          </a:xfrm>
+          <a:prstGeom prst="bentConnector3">
+            <a:avLst>
+              <a:gd name="adj1" fmla="val 98885"/>
+            </a:avLst>
+          </a:prstGeom>
+        </p:spPr>
+        <p:style>
+          <a:lnRef idx="2">
+            <a:schemeClr val="dk1"/>
+          </a:lnRef>
+          <a:fillRef idx="0">
+            <a:schemeClr val="dk1"/>
+          </a:fillRef>
+          <a:effectRef idx="1">
+            <a:schemeClr val="dk1"/>
+          </a:effectRef>
+          <a:fontRef idx="minor">
+            <a:schemeClr val="tx1"/>
+          </a:fontRef>
+        </p:style>
+      </p:cxnSp>
+      <p:pic>
+        <p:nvPicPr>
+          <p:cNvPr id="89" name="Picture 88">
+            <a:extLst>
+              <a:ext uri="{FF2B5EF4-FFF2-40B4-BE49-F238E27FC236}">
+                <a16:creationId xmlns:a16="http://schemas.microsoft.com/office/drawing/2014/main" id="{6527A6DB-DF79-F737-E300-AF189C2AAAB8}"/>
+              </a:ext>
+            </a:extLst>
+          </p:cNvPr>
+          <p:cNvPicPr>
+            <a:picLocks noChangeAspect="1"/>
+          </p:cNvPicPr>
+          <p:nvPr/>
+        </p:nvPicPr>
+        <p:blipFill>
+          <a:blip r:embed="rId4">
+            <a:extLst>
+              <a:ext uri="{28A0092B-C50C-407E-A947-70E740481C1C}">
+                <a14:useLocalDpi xmlns:a14="http://schemas.microsoft.com/office/drawing/2010/main" val="0"/>
+              </a:ext>
+            </a:extLst>
+          </a:blip>
+          <a:stretch>
+            <a:fillRect/>
+          </a:stretch>
+        </p:blipFill>
+        <p:spPr>
+          <a:xfrm>
+            <a:off x="3338110" y="5554431"/>
+            <a:ext cx="409524" cy="323810"/>
+          </a:xfrm>
+          <a:prstGeom prst="rect">
+            <a:avLst/>
+          </a:prstGeom>
+        </p:spPr>
+      </p:pic>
+      <p:pic>
+        <p:nvPicPr>
+          <p:cNvPr id="90" name="Picture 89">
+            <a:extLst>
+              <a:ext uri="{FF2B5EF4-FFF2-40B4-BE49-F238E27FC236}">
+                <a16:creationId xmlns:a16="http://schemas.microsoft.com/office/drawing/2014/main" id="{53CF3916-1102-A835-31AA-E6CD32B0806D}"/>
+              </a:ext>
+            </a:extLst>
+          </p:cNvPr>
+          <p:cNvPicPr>
+            <a:picLocks noChangeAspect="1"/>
+          </p:cNvPicPr>
+          <p:nvPr/>
+        </p:nvPicPr>
+        <p:blipFill>
+          <a:blip r:embed="rId2">
+            <a:extLst>
+              <a:ext uri="{28A0092B-C50C-407E-A947-70E740481C1C}">
+                <a14:useLocalDpi xmlns:a14="http://schemas.microsoft.com/office/drawing/2010/main" val="0"/>
+              </a:ext>
+            </a:extLst>
+          </a:blip>
+          <a:stretch>
+            <a:fillRect/>
+          </a:stretch>
+        </p:blipFill>
+        <p:spPr>
+          <a:xfrm>
+            <a:off x="2271733" y="6084736"/>
+            <a:ext cx="409524" cy="323810"/>
+          </a:xfrm>
+          <a:prstGeom prst="rect">
+            <a:avLst/>
+          </a:prstGeom>
+        </p:spPr>
+      </p:pic>
+      <p:cxnSp>
+        <p:nvCxnSpPr>
+          <p:cNvPr id="91" name="Straight Connector 90">
+            <a:extLst>
+              <a:ext uri="{FF2B5EF4-FFF2-40B4-BE49-F238E27FC236}">
+                <a16:creationId xmlns:a16="http://schemas.microsoft.com/office/drawing/2014/main" id="{3AC9E2E0-827D-9511-9508-514E6D272FE6}"/>
+              </a:ext>
+            </a:extLst>
+          </p:cNvPr>
+          <p:cNvCxnSpPr>
+            <a:cxnSpLocks/>
+          </p:cNvCxnSpPr>
+          <p:nvPr/>
+        </p:nvCxnSpPr>
+        <p:spPr>
+          <a:xfrm flipV="1">
+            <a:off x="2670983" y="6236366"/>
+            <a:ext cx="5460169" cy="1"/>
+          </a:xfrm>
+          <a:prstGeom prst="line">
+            <a:avLst/>
+          </a:prstGeom>
+        </p:spPr>
+        <p:style>
+          <a:lnRef idx="2">
+            <a:schemeClr val="dk1"/>
+          </a:lnRef>
+          <a:fillRef idx="0">
+            <a:schemeClr val="dk1"/>
+          </a:fillRef>
+          <a:effectRef idx="1">
+            <a:schemeClr val="dk1"/>
+          </a:effectRef>
+          <a:fontRef idx="minor">
+            <a:schemeClr val="tx1"/>
+          </a:fontRef>
+        </p:style>
+      </p:cxnSp>
+      <p:pic>
+        <p:nvPicPr>
+          <p:cNvPr id="92" name="Picture 91">
+            <a:extLst>
+              <a:ext uri="{FF2B5EF4-FFF2-40B4-BE49-F238E27FC236}">
+                <a16:creationId xmlns:a16="http://schemas.microsoft.com/office/drawing/2014/main" id="{12E30A79-DCF2-86B2-6741-32C65A20FADA}"/>
+              </a:ext>
+            </a:extLst>
+          </p:cNvPr>
+          <p:cNvPicPr>
+            <a:picLocks noChangeAspect="1"/>
+          </p:cNvPicPr>
+          <p:nvPr/>
+        </p:nvPicPr>
+        <p:blipFill>
+          <a:blip r:embed="rId3">
+            <a:extLst>
+              <a:ext uri="{28A0092B-C50C-407E-A947-70E740481C1C}">
+                <a14:useLocalDpi xmlns:a14="http://schemas.microsoft.com/office/drawing/2010/main" val="0"/>
+              </a:ext>
+            </a:extLst>
+          </a:blip>
+          <a:stretch>
+            <a:fillRect/>
+          </a:stretch>
+        </p:blipFill>
+        <p:spPr>
+          <a:xfrm>
+            <a:off x="8130815" y="6075211"/>
+            <a:ext cx="438095" cy="342857"/>
+          </a:xfrm>
+          <a:prstGeom prst="rect">
+            <a:avLst/>
+          </a:prstGeom>
+        </p:spPr>
+      </p:pic>
+      <p:sp>
+        <p:nvSpPr>
+          <p:cNvPr id="94" name="TextBox 93">
+            <a:extLst>
+              <a:ext uri="{FF2B5EF4-FFF2-40B4-BE49-F238E27FC236}">
+                <a16:creationId xmlns:a16="http://schemas.microsoft.com/office/drawing/2014/main" id="{255DB9FB-34CF-9B71-4CBB-5830B311B59D}"/>
+              </a:ext>
+            </a:extLst>
+          </p:cNvPr>
+          <p:cNvSpPr txBox="1"/>
+          <p:nvPr/>
+        </p:nvSpPr>
+        <p:spPr>
+          <a:xfrm>
+            <a:off x="2246668" y="5854226"/>
+            <a:ext cx="646455" cy="261610"/>
+          </a:xfrm>
+          <a:prstGeom prst="rect">
+            <a:avLst/>
+          </a:prstGeom>
+          <a:noFill/>
+        </p:spPr>
+        <p:txBody>
+          <a:bodyPr wrap="square" rtlCol="0">
+            <a:spAutoFit/>
+          </a:bodyPr>
+          <a:lstStyle/>
+          <a:p>
+            <a:r>
+              <a:rPr lang="en-US" sz="1100" b="1" dirty="0"/>
+              <a:t>HR0.5</a:t>
+            </a:r>
+            <a:endParaRPr lang="en-SG" sz="1100" b="1" dirty="0"/>
+          </a:p>
+        </p:txBody>
+      </p:sp>
+      <p:sp>
+        <p:nvSpPr>
+          <p:cNvPr id="96" name="TextBox 95">
+            <a:extLst>
+              <a:ext uri="{FF2B5EF4-FFF2-40B4-BE49-F238E27FC236}">
+                <a16:creationId xmlns:a16="http://schemas.microsoft.com/office/drawing/2014/main" id="{200426B9-EB56-CECB-534B-80D8C0D30BE9}"/>
+              </a:ext>
+            </a:extLst>
+          </p:cNvPr>
+          <p:cNvSpPr txBox="1"/>
+          <p:nvPr/>
+        </p:nvSpPr>
+        <p:spPr>
+          <a:xfrm>
+            <a:off x="8130815" y="5849365"/>
+            <a:ext cx="646455" cy="261610"/>
+          </a:xfrm>
+          <a:prstGeom prst="rect">
+            <a:avLst/>
+          </a:prstGeom>
+          <a:noFill/>
+        </p:spPr>
+        <p:txBody>
+          <a:bodyPr wrap="square" rtlCol="0">
+            <a:spAutoFit/>
+          </a:bodyPr>
+          <a:lstStyle/>
+          <a:p>
+            <a:r>
+              <a:rPr lang="en-US" sz="1100" b="1" dirty="0"/>
+              <a:t>C0.7</a:t>
+            </a:r>
+            <a:endParaRPr lang="en-SG" sz="1100" b="1" dirty="0"/>
+          </a:p>
+        </p:txBody>
+      </p:sp>
+      <p:cxnSp>
+        <p:nvCxnSpPr>
+          <p:cNvPr id="97" name="Straight Connector 96">
+            <a:extLst>
+              <a:ext uri="{FF2B5EF4-FFF2-40B4-BE49-F238E27FC236}">
+                <a16:creationId xmlns:a16="http://schemas.microsoft.com/office/drawing/2014/main" id="{61BA9701-C852-8A91-AAB7-7B6F266DCB05}"/>
+              </a:ext>
+            </a:extLst>
+          </p:cNvPr>
+          <p:cNvCxnSpPr>
+            <a:cxnSpLocks/>
+          </p:cNvCxnSpPr>
+          <p:nvPr/>
+        </p:nvCxnSpPr>
+        <p:spPr>
+          <a:xfrm>
+            <a:off x="1538866" y="241545"/>
+            <a:ext cx="7266088" cy="0"/>
+          </a:xfrm>
+          <a:prstGeom prst="line">
+            <a:avLst/>
+          </a:prstGeom>
+          <a:ln>
+            <a:solidFill>
+              <a:schemeClr val="bg1">
+                <a:lumMod val="75000"/>
+              </a:schemeClr>
+            </a:solidFill>
+            <a:prstDash val="sysDash"/>
+          </a:ln>
+        </p:spPr>
+        <p:style>
+          <a:lnRef idx="2">
+            <a:schemeClr val="accent1"/>
+          </a:lnRef>
+          <a:fillRef idx="0">
+            <a:schemeClr val="accent1"/>
+          </a:fillRef>
+          <a:effectRef idx="1">
+            <a:schemeClr val="accent1"/>
+          </a:effectRef>
+          <a:fontRef idx="minor">
+            <a:schemeClr val="tx1"/>
+          </a:fontRef>
+        </p:style>
+      </p:cxnSp>
+      <p:cxnSp>
+        <p:nvCxnSpPr>
+          <p:cNvPr id="99" name="Straight Connector 98">
+            <a:extLst>
+              <a:ext uri="{FF2B5EF4-FFF2-40B4-BE49-F238E27FC236}">
+                <a16:creationId xmlns:a16="http://schemas.microsoft.com/office/drawing/2014/main" id="{04CC73EC-49F6-CB84-78A9-8CE8BDF12DE5}"/>
+              </a:ext>
+            </a:extLst>
+          </p:cNvPr>
+          <p:cNvCxnSpPr>
+            <a:cxnSpLocks/>
+          </p:cNvCxnSpPr>
+          <p:nvPr/>
+        </p:nvCxnSpPr>
+        <p:spPr>
+          <a:xfrm>
+            <a:off x="1538866" y="890217"/>
+            <a:ext cx="7266088" cy="0"/>
+          </a:xfrm>
+          <a:prstGeom prst="line">
+            <a:avLst/>
+          </a:prstGeom>
+          <a:ln>
+            <a:solidFill>
+              <a:schemeClr val="bg1">
+                <a:lumMod val="75000"/>
+              </a:schemeClr>
+            </a:solidFill>
+            <a:prstDash val="sysDash"/>
+          </a:ln>
+        </p:spPr>
+        <p:style>
+          <a:lnRef idx="2">
+            <a:schemeClr val="accent1"/>
+          </a:lnRef>
+          <a:fillRef idx="0">
+            <a:schemeClr val="accent1"/>
+          </a:fillRef>
+          <a:effectRef idx="1">
+            <a:schemeClr val="accent1"/>
+          </a:effectRef>
+          <a:fontRef idx="minor">
+            <a:schemeClr val="tx1"/>
+          </a:fontRef>
+        </p:style>
+      </p:cxnSp>
+      <p:cxnSp>
+        <p:nvCxnSpPr>
+          <p:cNvPr id="100" name="Straight Connector 99">
+            <a:extLst>
+              <a:ext uri="{FF2B5EF4-FFF2-40B4-BE49-F238E27FC236}">
+                <a16:creationId xmlns:a16="http://schemas.microsoft.com/office/drawing/2014/main" id="{DEF1D2A0-7770-56BD-EEE9-73B76A7B7E16}"/>
+              </a:ext>
+            </a:extLst>
+          </p:cNvPr>
+          <p:cNvCxnSpPr>
+            <a:cxnSpLocks/>
+          </p:cNvCxnSpPr>
+          <p:nvPr/>
+        </p:nvCxnSpPr>
+        <p:spPr>
+          <a:xfrm>
+            <a:off x="1500982" y="1472721"/>
+            <a:ext cx="7266088" cy="0"/>
+          </a:xfrm>
+          <a:prstGeom prst="line">
+            <a:avLst/>
+          </a:prstGeom>
+          <a:ln>
+            <a:solidFill>
+              <a:schemeClr val="bg1">
+                <a:lumMod val="75000"/>
+              </a:schemeClr>
+            </a:solidFill>
+            <a:prstDash val="sysDash"/>
+          </a:ln>
+        </p:spPr>
+        <p:style>
+          <a:lnRef idx="2">
+            <a:schemeClr val="accent1"/>
+          </a:lnRef>
+          <a:fillRef idx="0">
+            <a:schemeClr val="accent1"/>
+          </a:fillRef>
+          <a:effectRef idx="1">
+            <a:schemeClr val="accent1"/>
+          </a:effectRef>
+          <a:fontRef idx="minor">
+            <a:schemeClr val="tx1"/>
+          </a:fontRef>
+        </p:style>
+      </p:cxnSp>
+      <p:cxnSp>
+        <p:nvCxnSpPr>
+          <p:cNvPr id="101" name="Straight Connector 100">
+            <a:extLst>
+              <a:ext uri="{FF2B5EF4-FFF2-40B4-BE49-F238E27FC236}">
+                <a16:creationId xmlns:a16="http://schemas.microsoft.com/office/drawing/2014/main" id="{B63535E8-A21C-372B-CA3D-0CF2AE38D803}"/>
+              </a:ext>
+            </a:extLst>
+          </p:cNvPr>
+          <p:cNvCxnSpPr>
+            <a:cxnSpLocks/>
+          </p:cNvCxnSpPr>
+          <p:nvPr/>
+        </p:nvCxnSpPr>
+        <p:spPr>
+          <a:xfrm>
+            <a:off x="1490708" y="2064761"/>
+            <a:ext cx="7266088" cy="0"/>
+          </a:xfrm>
+          <a:prstGeom prst="line">
+            <a:avLst/>
+          </a:prstGeom>
+          <a:ln>
+            <a:solidFill>
+              <a:schemeClr val="bg1">
+                <a:lumMod val="75000"/>
+              </a:schemeClr>
+            </a:solidFill>
+            <a:prstDash val="sysDash"/>
+          </a:ln>
+        </p:spPr>
+        <p:style>
+          <a:lnRef idx="2">
+            <a:schemeClr val="accent1"/>
+          </a:lnRef>
+          <a:fillRef idx="0">
+            <a:schemeClr val="accent1"/>
+          </a:fillRef>
+          <a:effectRef idx="1">
+            <a:schemeClr val="accent1"/>
+          </a:effectRef>
+          <a:fontRef idx="minor">
+            <a:schemeClr val="tx1"/>
+          </a:fontRef>
+        </p:style>
+      </p:cxnSp>
+      <p:cxnSp>
+        <p:nvCxnSpPr>
+          <p:cNvPr id="102" name="Straight Connector 101">
+            <a:extLst>
+              <a:ext uri="{FF2B5EF4-FFF2-40B4-BE49-F238E27FC236}">
+                <a16:creationId xmlns:a16="http://schemas.microsoft.com/office/drawing/2014/main" id="{52661506-63DD-7670-4196-D59A168C33E6}"/>
+              </a:ext>
+            </a:extLst>
+          </p:cNvPr>
+          <p:cNvCxnSpPr>
+            <a:cxnSpLocks/>
+          </p:cNvCxnSpPr>
+          <p:nvPr/>
+        </p:nvCxnSpPr>
+        <p:spPr>
+          <a:xfrm>
+            <a:off x="1511182" y="3154032"/>
+            <a:ext cx="7266088" cy="0"/>
+          </a:xfrm>
+          <a:prstGeom prst="line">
+            <a:avLst/>
+          </a:prstGeom>
+          <a:ln>
+            <a:solidFill>
+              <a:schemeClr val="bg1">
+                <a:lumMod val="75000"/>
+              </a:schemeClr>
+            </a:solidFill>
+            <a:prstDash val="sysDash"/>
+          </a:ln>
+        </p:spPr>
+        <p:style>
+          <a:lnRef idx="2">
+            <a:schemeClr val="accent1"/>
+          </a:lnRef>
+          <a:fillRef idx="0">
+            <a:schemeClr val="accent1"/>
+          </a:fillRef>
+          <a:effectRef idx="1">
+            <a:schemeClr val="accent1"/>
+          </a:effectRef>
+          <a:fontRef idx="minor">
+            <a:schemeClr val="tx1"/>
+          </a:fontRef>
+        </p:style>
+      </p:cxnSp>
+      <p:cxnSp>
+        <p:nvCxnSpPr>
+          <p:cNvPr id="103" name="Straight Connector 102">
+            <a:extLst>
+              <a:ext uri="{FF2B5EF4-FFF2-40B4-BE49-F238E27FC236}">
+                <a16:creationId xmlns:a16="http://schemas.microsoft.com/office/drawing/2014/main" id="{DCE2BD88-E42B-760E-289C-D7F6E21BFC4B}"/>
+              </a:ext>
+            </a:extLst>
+          </p:cNvPr>
+          <p:cNvCxnSpPr>
+            <a:cxnSpLocks/>
+          </p:cNvCxnSpPr>
+          <p:nvPr/>
+        </p:nvCxnSpPr>
+        <p:spPr>
+          <a:xfrm>
+            <a:off x="1538866" y="4191700"/>
+            <a:ext cx="7266088" cy="0"/>
+          </a:xfrm>
+          <a:prstGeom prst="line">
+            <a:avLst/>
+          </a:prstGeom>
+          <a:ln>
+            <a:solidFill>
+              <a:schemeClr val="bg1">
+                <a:lumMod val="75000"/>
+              </a:schemeClr>
+            </a:solidFill>
+            <a:prstDash val="sysDash"/>
+          </a:ln>
+        </p:spPr>
+        <p:style>
+          <a:lnRef idx="2">
+            <a:schemeClr val="accent1"/>
+          </a:lnRef>
+          <a:fillRef idx="0">
+            <a:schemeClr val="accent1"/>
+          </a:fillRef>
+          <a:effectRef idx="1">
+            <a:schemeClr val="accent1"/>
+          </a:effectRef>
+          <a:fontRef idx="minor">
+            <a:schemeClr val="tx1"/>
+          </a:fontRef>
+        </p:style>
+      </p:cxnSp>
+      <p:cxnSp>
+        <p:nvCxnSpPr>
+          <p:cNvPr id="104" name="Straight Connector 103">
+            <a:extLst>
+              <a:ext uri="{FF2B5EF4-FFF2-40B4-BE49-F238E27FC236}">
+                <a16:creationId xmlns:a16="http://schemas.microsoft.com/office/drawing/2014/main" id="{E3F93813-F968-A102-9DB1-8C9FE99E4F8C}"/>
+              </a:ext>
+            </a:extLst>
+          </p:cNvPr>
+          <p:cNvCxnSpPr>
+            <a:cxnSpLocks/>
+          </p:cNvCxnSpPr>
+          <p:nvPr/>
+        </p:nvCxnSpPr>
+        <p:spPr>
+          <a:xfrm>
+            <a:off x="1538866" y="4851818"/>
+            <a:ext cx="7266088" cy="0"/>
+          </a:xfrm>
+          <a:prstGeom prst="line">
+            <a:avLst/>
+          </a:prstGeom>
+          <a:ln>
+            <a:solidFill>
+              <a:schemeClr val="bg1">
+                <a:lumMod val="75000"/>
+              </a:schemeClr>
+            </a:solidFill>
+            <a:prstDash val="sysDash"/>
+          </a:ln>
+        </p:spPr>
+        <p:style>
+          <a:lnRef idx="2">
+            <a:schemeClr val="accent1"/>
+          </a:lnRef>
+          <a:fillRef idx="0">
+            <a:schemeClr val="accent1"/>
+          </a:fillRef>
+          <a:effectRef idx="1">
+            <a:schemeClr val="accent1"/>
+          </a:effectRef>
+          <a:fontRef idx="minor">
+            <a:schemeClr val="tx1"/>
+          </a:fontRef>
+        </p:style>
+      </p:cxnSp>
+      <p:cxnSp>
+        <p:nvCxnSpPr>
+          <p:cNvPr id="105" name="Straight Connector 104">
+            <a:extLst>
+              <a:ext uri="{FF2B5EF4-FFF2-40B4-BE49-F238E27FC236}">
+                <a16:creationId xmlns:a16="http://schemas.microsoft.com/office/drawing/2014/main" id="{31F86C39-7C02-7C02-9025-A421E5E3BE58}"/>
+              </a:ext>
+            </a:extLst>
+          </p:cNvPr>
+          <p:cNvCxnSpPr>
+            <a:cxnSpLocks/>
+          </p:cNvCxnSpPr>
+          <p:nvPr/>
+        </p:nvCxnSpPr>
+        <p:spPr>
+          <a:xfrm>
+            <a:off x="1543238" y="5900914"/>
+            <a:ext cx="7266088" cy="0"/>
+          </a:xfrm>
+          <a:prstGeom prst="line">
+            <a:avLst/>
+          </a:prstGeom>
+          <a:ln>
+            <a:solidFill>
+              <a:schemeClr val="bg1">
+                <a:lumMod val="75000"/>
+              </a:schemeClr>
+            </a:solidFill>
+            <a:prstDash val="sysDash"/>
+          </a:ln>
+        </p:spPr>
+        <p:style>
+          <a:lnRef idx="2">
+            <a:schemeClr val="accent1"/>
+          </a:lnRef>
+          <a:fillRef idx="0">
+            <a:schemeClr val="accent1"/>
+          </a:fillRef>
+          <a:effectRef idx="1">
+            <a:schemeClr val="accent1"/>
+          </a:effectRef>
+          <a:fontRef idx="minor">
+            <a:schemeClr val="tx1"/>
+          </a:fontRef>
+        </p:style>
+      </p:cxnSp>
+      <p:cxnSp>
+        <p:nvCxnSpPr>
+          <p:cNvPr id="106" name="Straight Connector 105">
+            <a:extLst>
+              <a:ext uri="{FF2B5EF4-FFF2-40B4-BE49-F238E27FC236}">
+                <a16:creationId xmlns:a16="http://schemas.microsoft.com/office/drawing/2014/main" id="{F927E0BD-F8E1-B683-2953-94918D4D9873}"/>
+              </a:ext>
+            </a:extLst>
+          </p:cNvPr>
+          <p:cNvCxnSpPr>
+            <a:cxnSpLocks/>
+          </p:cNvCxnSpPr>
+          <p:nvPr/>
+        </p:nvCxnSpPr>
+        <p:spPr>
+          <a:xfrm>
+            <a:off x="1536108" y="6537891"/>
+            <a:ext cx="7266088" cy="0"/>
+          </a:xfrm>
+          <a:prstGeom prst="line">
+            <a:avLst/>
+          </a:prstGeom>
+          <a:ln>
+            <a:solidFill>
+              <a:schemeClr val="bg1">
+                <a:lumMod val="75000"/>
+              </a:schemeClr>
+            </a:solidFill>
+            <a:prstDash val="sysDash"/>
+          </a:ln>
+        </p:spPr>
+        <p:style>
+          <a:lnRef idx="2">
+            <a:schemeClr val="accent1"/>
+          </a:lnRef>
+          <a:fillRef idx="0">
+            <a:schemeClr val="accent1"/>
+          </a:fillRef>
+          <a:effectRef idx="1">
+            <a:schemeClr val="accent1"/>
+          </a:effectRef>
+          <a:fontRef idx="minor">
+            <a:schemeClr val="tx1"/>
+          </a:fontRef>
+        </p:style>
+      </p:cxnSp>
+      <p:cxnSp>
+        <p:nvCxnSpPr>
+          <p:cNvPr id="107" name="Straight Connector 106">
+            <a:extLst>
+              <a:ext uri="{FF2B5EF4-FFF2-40B4-BE49-F238E27FC236}">
+                <a16:creationId xmlns:a16="http://schemas.microsoft.com/office/drawing/2014/main" id="{8AC72FA9-D071-04A4-136F-B37CCFBFD992}"/>
+              </a:ext>
+            </a:extLst>
+          </p:cNvPr>
+          <p:cNvCxnSpPr>
+            <a:cxnSpLocks/>
+          </p:cNvCxnSpPr>
+          <p:nvPr/>
+        </p:nvCxnSpPr>
+        <p:spPr>
+          <a:xfrm>
+            <a:off x="8802196" y="241545"/>
+            <a:ext cx="0" cy="6296346"/>
+          </a:xfrm>
+          <a:prstGeom prst="line">
+            <a:avLst/>
+          </a:prstGeom>
+          <a:ln>
+            <a:solidFill>
+              <a:schemeClr val="bg1">
+                <a:lumMod val="75000"/>
+              </a:schemeClr>
+            </a:solidFill>
+            <a:prstDash val="sysDash"/>
+          </a:ln>
+        </p:spPr>
+        <p:style>
+          <a:lnRef idx="2">
+            <a:schemeClr val="accent1"/>
+          </a:lnRef>
+          <a:fillRef idx="0">
+            <a:schemeClr val="accent1"/>
+          </a:fillRef>
+          <a:effectRef idx="1">
+            <a:schemeClr val="accent1"/>
+          </a:effectRef>
+          <a:fontRef idx="minor">
+            <a:schemeClr val="tx1"/>
+          </a:fontRef>
+        </p:style>
+      </p:cxnSp>
+      <p:cxnSp>
+        <p:nvCxnSpPr>
+          <p:cNvPr id="110" name="Straight Connector 109">
+            <a:extLst>
+              <a:ext uri="{FF2B5EF4-FFF2-40B4-BE49-F238E27FC236}">
+                <a16:creationId xmlns:a16="http://schemas.microsoft.com/office/drawing/2014/main" id="{400099F4-B637-3765-1D60-7C471C896189}"/>
+              </a:ext>
+            </a:extLst>
+          </p:cNvPr>
+          <p:cNvCxnSpPr>
+            <a:cxnSpLocks/>
+          </p:cNvCxnSpPr>
+          <p:nvPr/>
+        </p:nvCxnSpPr>
+        <p:spPr>
+          <a:xfrm>
+            <a:off x="2135163" y="229548"/>
+            <a:ext cx="0" cy="6296346"/>
+          </a:xfrm>
+          <a:prstGeom prst="line">
+            <a:avLst/>
+          </a:prstGeom>
+          <a:ln>
+            <a:solidFill>
+              <a:schemeClr val="bg1">
+                <a:lumMod val="75000"/>
+              </a:schemeClr>
+            </a:solidFill>
+            <a:prstDash val="sysDash"/>
+          </a:ln>
+        </p:spPr>
+        <p:style>
+          <a:lnRef idx="2">
+            <a:schemeClr val="accent1"/>
+          </a:lnRef>
+          <a:fillRef idx="0">
+            <a:schemeClr val="accent1"/>
+          </a:fillRef>
+          <a:effectRef idx="1">
+            <a:schemeClr val="accent1"/>
+          </a:effectRef>
+          <a:fontRef idx="minor">
+            <a:schemeClr val="tx1"/>
+          </a:fontRef>
+        </p:style>
+      </p:cxnSp>
+      <p:cxnSp>
+        <p:nvCxnSpPr>
+          <p:cNvPr id="111" name="Straight Connector 110">
+            <a:extLst>
+              <a:ext uri="{FF2B5EF4-FFF2-40B4-BE49-F238E27FC236}">
+                <a16:creationId xmlns:a16="http://schemas.microsoft.com/office/drawing/2014/main" id="{7AD4F75F-EFA1-8DC5-74F1-34CD31646628}"/>
+              </a:ext>
+            </a:extLst>
+          </p:cNvPr>
+          <p:cNvCxnSpPr>
+            <a:cxnSpLocks/>
+          </p:cNvCxnSpPr>
+          <p:nvPr/>
+        </p:nvCxnSpPr>
+        <p:spPr>
+          <a:xfrm>
+            <a:off x="1511182" y="241545"/>
+            <a:ext cx="0" cy="6296346"/>
+          </a:xfrm>
+          <a:prstGeom prst="line">
+            <a:avLst/>
+          </a:prstGeom>
+          <a:ln>
+            <a:solidFill>
+              <a:schemeClr val="bg1">
+                <a:lumMod val="75000"/>
+              </a:schemeClr>
+            </a:solidFill>
+            <a:prstDash val="sysDash"/>
+          </a:ln>
+        </p:spPr>
+        <p:style>
+          <a:lnRef idx="2">
+            <a:schemeClr val="accent1"/>
+          </a:lnRef>
+          <a:fillRef idx="0">
+            <a:schemeClr val="accent1"/>
+          </a:fillRef>
+          <a:effectRef idx="1">
+            <a:schemeClr val="accent1"/>
+          </a:effectRef>
+          <a:fontRef idx="minor">
+            <a:schemeClr val="tx1"/>
+          </a:fontRef>
+        </p:style>
+      </p:cxnSp>
+      <p:sp>
+        <p:nvSpPr>
+          <p:cNvPr id="112" name="TextBox 111">
+            <a:extLst>
+              <a:ext uri="{FF2B5EF4-FFF2-40B4-BE49-F238E27FC236}">
+                <a16:creationId xmlns:a16="http://schemas.microsoft.com/office/drawing/2014/main" id="{75C727F9-3638-88C6-15A9-2FC37E9D2C4E}"/>
+              </a:ext>
+            </a:extLst>
+          </p:cNvPr>
+          <p:cNvSpPr txBox="1"/>
+          <p:nvPr/>
+        </p:nvSpPr>
+        <p:spPr>
+          <a:xfrm>
+            <a:off x="1490708" y="434439"/>
+            <a:ext cx="728433" cy="307777"/>
+          </a:xfrm>
+          <a:prstGeom prst="rect">
+            <a:avLst/>
+          </a:prstGeom>
+          <a:noFill/>
+        </p:spPr>
+        <p:txBody>
+          <a:bodyPr wrap="square" rtlCol="0">
+            <a:spAutoFit/>
+          </a:bodyPr>
+          <a:lstStyle/>
+          <a:p>
+            <a:r>
+              <a:rPr lang="en-US" sz="1400" b="1" dirty="0">
+                <a:solidFill>
+                  <a:schemeClr val="accent6">
+                    <a:lumMod val="50000"/>
+                  </a:schemeClr>
+                </a:solidFill>
+              </a:rPr>
+              <a:t>Rung0</a:t>
+            </a:r>
+            <a:endParaRPr lang="en-SG" sz="1400" b="1" dirty="0">
+              <a:solidFill>
+                <a:schemeClr val="accent6">
+                  <a:lumMod val="50000"/>
+                </a:schemeClr>
+              </a:solidFill>
+            </a:endParaRPr>
+          </a:p>
+        </p:txBody>
+      </p:sp>
+      <p:sp>
+        <p:nvSpPr>
+          <p:cNvPr id="114" name="TextBox 113">
+            <a:extLst>
+              <a:ext uri="{FF2B5EF4-FFF2-40B4-BE49-F238E27FC236}">
+                <a16:creationId xmlns:a16="http://schemas.microsoft.com/office/drawing/2014/main" id="{9B624322-C71C-8CCA-9D9D-196307A1D14B}"/>
+              </a:ext>
+            </a:extLst>
+          </p:cNvPr>
+          <p:cNvSpPr txBox="1"/>
+          <p:nvPr/>
+        </p:nvSpPr>
+        <p:spPr>
+          <a:xfrm>
+            <a:off x="1509856" y="1049215"/>
+            <a:ext cx="728433" cy="307777"/>
+          </a:xfrm>
+          <a:prstGeom prst="rect">
+            <a:avLst/>
+          </a:prstGeom>
+          <a:noFill/>
+        </p:spPr>
+        <p:txBody>
+          <a:bodyPr wrap="square" rtlCol="0">
+            <a:spAutoFit/>
+          </a:bodyPr>
+          <a:lstStyle/>
+          <a:p>
+            <a:r>
+              <a:rPr lang="en-US" sz="1400" b="1" dirty="0">
+                <a:solidFill>
+                  <a:schemeClr val="accent6">
+                    <a:lumMod val="50000"/>
+                  </a:schemeClr>
+                </a:solidFill>
+              </a:rPr>
+              <a:t>Rung1</a:t>
+            </a:r>
+            <a:endParaRPr lang="en-SG" sz="1400" b="1" dirty="0">
+              <a:solidFill>
+                <a:schemeClr val="accent6">
+                  <a:lumMod val="50000"/>
+                </a:schemeClr>
+              </a:solidFill>
+            </a:endParaRPr>
+          </a:p>
+        </p:txBody>
+      </p:sp>
+      <p:sp>
+        <p:nvSpPr>
+          <p:cNvPr id="115" name="TextBox 114">
+            <a:extLst>
+              <a:ext uri="{FF2B5EF4-FFF2-40B4-BE49-F238E27FC236}">
+                <a16:creationId xmlns:a16="http://schemas.microsoft.com/office/drawing/2014/main" id="{2E902922-CB2E-7D2A-5FE4-AA0B144A1969}"/>
+              </a:ext>
+            </a:extLst>
+          </p:cNvPr>
+          <p:cNvSpPr txBox="1"/>
+          <p:nvPr/>
+        </p:nvSpPr>
+        <p:spPr>
+          <a:xfrm>
+            <a:off x="1498766" y="1614674"/>
+            <a:ext cx="728433" cy="307777"/>
+          </a:xfrm>
+          <a:prstGeom prst="rect">
+            <a:avLst/>
+          </a:prstGeom>
+          <a:noFill/>
+        </p:spPr>
+        <p:txBody>
+          <a:bodyPr wrap="square" rtlCol="0">
+            <a:spAutoFit/>
+          </a:bodyPr>
+          <a:lstStyle/>
+          <a:p>
+            <a:r>
+              <a:rPr lang="en-US" sz="1400" b="1" dirty="0">
+                <a:solidFill>
+                  <a:schemeClr val="accent6">
+                    <a:lumMod val="50000"/>
+                  </a:schemeClr>
+                </a:solidFill>
+              </a:rPr>
+              <a:t>Rung2</a:t>
+            </a:r>
+            <a:endParaRPr lang="en-SG" sz="1400" b="1" dirty="0">
+              <a:solidFill>
+                <a:schemeClr val="accent6">
+                  <a:lumMod val="50000"/>
+                </a:schemeClr>
+              </a:solidFill>
+            </a:endParaRPr>
+          </a:p>
+        </p:txBody>
+      </p:sp>
+      <p:sp>
+        <p:nvSpPr>
+          <p:cNvPr id="116" name="TextBox 115">
+            <a:extLst>
+              <a:ext uri="{FF2B5EF4-FFF2-40B4-BE49-F238E27FC236}">
+                <a16:creationId xmlns:a16="http://schemas.microsoft.com/office/drawing/2014/main" id="{5CA7EBF7-455F-0BCB-5791-55C731783D2F}"/>
+              </a:ext>
+            </a:extLst>
+          </p:cNvPr>
+          <p:cNvSpPr txBox="1"/>
+          <p:nvPr/>
+        </p:nvSpPr>
+        <p:spPr>
+          <a:xfrm>
+            <a:off x="1487561" y="2415046"/>
+            <a:ext cx="728433" cy="307777"/>
+          </a:xfrm>
+          <a:prstGeom prst="rect">
+            <a:avLst/>
+          </a:prstGeom>
+          <a:noFill/>
+        </p:spPr>
+        <p:txBody>
+          <a:bodyPr wrap="square" rtlCol="0">
+            <a:spAutoFit/>
+          </a:bodyPr>
+          <a:lstStyle/>
+          <a:p>
+            <a:r>
+              <a:rPr lang="en-US" sz="1400" b="1" dirty="0">
+                <a:solidFill>
+                  <a:schemeClr val="accent6">
+                    <a:lumMod val="50000"/>
+                  </a:schemeClr>
+                </a:solidFill>
+              </a:rPr>
+              <a:t>Rung3</a:t>
+            </a:r>
+            <a:endParaRPr lang="en-SG" sz="1400" b="1" dirty="0">
+              <a:solidFill>
+                <a:schemeClr val="accent6">
+                  <a:lumMod val="50000"/>
+                </a:schemeClr>
+              </a:solidFill>
+            </a:endParaRPr>
+          </a:p>
+        </p:txBody>
+      </p:sp>
+      <p:sp>
+        <p:nvSpPr>
+          <p:cNvPr id="117" name="TextBox 116">
+            <a:extLst>
+              <a:ext uri="{FF2B5EF4-FFF2-40B4-BE49-F238E27FC236}">
+                <a16:creationId xmlns:a16="http://schemas.microsoft.com/office/drawing/2014/main" id="{4E8785CE-5D89-102F-3DAA-C73420DF4D14}"/>
+              </a:ext>
+            </a:extLst>
+          </p:cNvPr>
+          <p:cNvSpPr txBox="1"/>
+          <p:nvPr/>
+        </p:nvSpPr>
+        <p:spPr>
+          <a:xfrm>
+            <a:off x="1470507" y="3514202"/>
+            <a:ext cx="728433" cy="307777"/>
+          </a:xfrm>
+          <a:prstGeom prst="rect">
+            <a:avLst/>
+          </a:prstGeom>
+          <a:noFill/>
+        </p:spPr>
+        <p:txBody>
+          <a:bodyPr wrap="square" rtlCol="0">
+            <a:spAutoFit/>
+          </a:bodyPr>
+          <a:lstStyle/>
+          <a:p>
+            <a:r>
+              <a:rPr lang="en-US" sz="1400" b="1" dirty="0">
+                <a:solidFill>
+                  <a:schemeClr val="accent6">
+                    <a:lumMod val="50000"/>
+                  </a:schemeClr>
+                </a:solidFill>
+              </a:rPr>
+              <a:t>Rung4</a:t>
+            </a:r>
+            <a:endParaRPr lang="en-SG" sz="1400" b="1" dirty="0">
+              <a:solidFill>
+                <a:schemeClr val="accent6">
+                  <a:lumMod val="50000"/>
+                </a:schemeClr>
+              </a:solidFill>
+            </a:endParaRPr>
+          </a:p>
+        </p:txBody>
+      </p:sp>
+      <p:sp>
+        <p:nvSpPr>
+          <p:cNvPr id="118" name="TextBox 117">
+            <a:extLst>
+              <a:ext uri="{FF2B5EF4-FFF2-40B4-BE49-F238E27FC236}">
+                <a16:creationId xmlns:a16="http://schemas.microsoft.com/office/drawing/2014/main" id="{5FE6ED61-4390-C166-B226-68552B915792}"/>
+              </a:ext>
+            </a:extLst>
+          </p:cNvPr>
+          <p:cNvSpPr txBox="1"/>
+          <p:nvPr/>
+        </p:nvSpPr>
+        <p:spPr>
+          <a:xfrm>
+            <a:off x="1490244" y="4347236"/>
+            <a:ext cx="728433" cy="307777"/>
+          </a:xfrm>
+          <a:prstGeom prst="rect">
+            <a:avLst/>
+          </a:prstGeom>
+          <a:noFill/>
+        </p:spPr>
+        <p:txBody>
+          <a:bodyPr wrap="square" rtlCol="0">
+            <a:spAutoFit/>
+          </a:bodyPr>
+          <a:lstStyle/>
+          <a:p>
+            <a:r>
+              <a:rPr lang="en-US" sz="1400" b="1" dirty="0">
+                <a:solidFill>
+                  <a:schemeClr val="accent6">
+                    <a:lumMod val="50000"/>
+                  </a:schemeClr>
+                </a:solidFill>
+              </a:rPr>
+              <a:t>Rung5</a:t>
+            </a:r>
+            <a:endParaRPr lang="en-SG" sz="1400" b="1" dirty="0">
+              <a:solidFill>
+                <a:schemeClr val="accent6">
+                  <a:lumMod val="50000"/>
+                </a:schemeClr>
+              </a:solidFill>
+            </a:endParaRPr>
+          </a:p>
+        </p:txBody>
+      </p:sp>
+      <p:sp>
+        <p:nvSpPr>
+          <p:cNvPr id="119" name="TextBox 118">
+            <a:extLst>
+              <a:ext uri="{FF2B5EF4-FFF2-40B4-BE49-F238E27FC236}">
+                <a16:creationId xmlns:a16="http://schemas.microsoft.com/office/drawing/2014/main" id="{E389F72F-D904-FA53-198E-6CBBD2DC8420}"/>
+              </a:ext>
+            </a:extLst>
+          </p:cNvPr>
+          <p:cNvSpPr txBox="1"/>
+          <p:nvPr/>
+        </p:nvSpPr>
+        <p:spPr>
+          <a:xfrm>
+            <a:off x="1467665" y="5200071"/>
+            <a:ext cx="728433" cy="307777"/>
+          </a:xfrm>
+          <a:prstGeom prst="rect">
+            <a:avLst/>
+          </a:prstGeom>
+          <a:noFill/>
+        </p:spPr>
+        <p:txBody>
+          <a:bodyPr wrap="square" rtlCol="0">
+            <a:spAutoFit/>
+          </a:bodyPr>
+          <a:lstStyle/>
+          <a:p>
+            <a:r>
+              <a:rPr lang="en-US" sz="1400" b="1" dirty="0">
+                <a:solidFill>
+                  <a:schemeClr val="accent6">
+                    <a:lumMod val="50000"/>
+                  </a:schemeClr>
+                </a:solidFill>
+              </a:rPr>
+              <a:t>Rung6</a:t>
+            </a:r>
+            <a:endParaRPr lang="en-SG" sz="1400" b="1" dirty="0">
+              <a:solidFill>
+                <a:schemeClr val="accent6">
+                  <a:lumMod val="50000"/>
+                </a:schemeClr>
+              </a:solidFill>
+            </a:endParaRPr>
+          </a:p>
+        </p:txBody>
+      </p:sp>
+      <p:sp>
+        <p:nvSpPr>
+          <p:cNvPr id="120" name="TextBox 119">
+            <a:extLst>
+              <a:ext uri="{FF2B5EF4-FFF2-40B4-BE49-F238E27FC236}">
+                <a16:creationId xmlns:a16="http://schemas.microsoft.com/office/drawing/2014/main" id="{A90EA0AF-8B19-93F5-9022-782C51057847}"/>
+              </a:ext>
+            </a:extLst>
+          </p:cNvPr>
+          <p:cNvSpPr txBox="1"/>
+          <p:nvPr/>
+        </p:nvSpPr>
+        <p:spPr>
+          <a:xfrm>
+            <a:off x="1469758" y="6048550"/>
+            <a:ext cx="728433" cy="307777"/>
+          </a:xfrm>
+          <a:prstGeom prst="rect">
+            <a:avLst/>
+          </a:prstGeom>
+          <a:noFill/>
+        </p:spPr>
+        <p:txBody>
+          <a:bodyPr wrap="square" rtlCol="0">
+            <a:spAutoFit/>
+          </a:bodyPr>
+          <a:lstStyle/>
+          <a:p>
+            <a:r>
+              <a:rPr lang="en-US" sz="1400" b="1" dirty="0">
+                <a:solidFill>
+                  <a:schemeClr val="accent6">
+                    <a:lumMod val="50000"/>
+                  </a:schemeClr>
+                </a:solidFill>
+              </a:rPr>
+              <a:t>Rung7</a:t>
+            </a:r>
+            <a:endParaRPr lang="en-SG" sz="1400" b="1" dirty="0">
+              <a:solidFill>
+                <a:schemeClr val="accent6">
+                  <a:lumMod val="50000"/>
+                </a:schemeClr>
+              </a:solidFill>
+            </a:endParaRPr>
+          </a:p>
+        </p:txBody>
+      </p:sp>
+    </p:spTree>
+    <p:extLst>
+      <p:ext uri="{BB962C8B-B14F-4D97-AF65-F5344CB8AC3E}">
+        <p14:creationId xmlns:p14="http://schemas.microsoft.com/office/powerpoint/2010/main" val="233896769"/>
       </p:ext>
     </p:extLst>
   </p:cSld>

</xml_diff>

<commit_message>
update the readme file and the design document.
</commit_message>
<xml_diff>
--- a/doc/designDoc.pptx
+++ b/doc/designDoc.pptx
@@ -263,7 +263,7 @@
           <a:p>
             <a:fld id="{E7602038-B3F0-4825-ABDA-D66CE1C4CFDA}" type="datetimeFigureOut">
               <a:rPr lang="en-SG" smtClean="0"/>
-              <a:t>14/11/2024</a:t>
+              <a:t>15/11/2024</a:t>
             </a:fld>
             <a:endParaRPr lang="en-SG"/>
           </a:p>
@@ -463,7 +463,7 @@
           <a:p>
             <a:fld id="{E7602038-B3F0-4825-ABDA-D66CE1C4CFDA}" type="datetimeFigureOut">
               <a:rPr lang="en-SG" smtClean="0"/>
-              <a:t>14/11/2024</a:t>
+              <a:t>15/11/2024</a:t>
             </a:fld>
             <a:endParaRPr lang="en-SG"/>
           </a:p>
@@ -673,7 +673,7 @@
           <a:p>
             <a:fld id="{E7602038-B3F0-4825-ABDA-D66CE1C4CFDA}" type="datetimeFigureOut">
               <a:rPr lang="en-SG" smtClean="0"/>
-              <a:t>14/11/2024</a:t>
+              <a:t>15/11/2024</a:t>
             </a:fld>
             <a:endParaRPr lang="en-SG"/>
           </a:p>
@@ -873,7 +873,7 @@
           <a:p>
             <a:fld id="{E7602038-B3F0-4825-ABDA-D66CE1C4CFDA}" type="datetimeFigureOut">
               <a:rPr lang="en-SG" smtClean="0"/>
-              <a:t>14/11/2024</a:t>
+              <a:t>15/11/2024</a:t>
             </a:fld>
             <a:endParaRPr lang="en-SG"/>
           </a:p>
@@ -1149,7 +1149,7 @@
           <a:p>
             <a:fld id="{E7602038-B3F0-4825-ABDA-D66CE1C4CFDA}" type="datetimeFigureOut">
               <a:rPr lang="en-SG" smtClean="0"/>
-              <a:t>14/11/2024</a:t>
+              <a:t>15/11/2024</a:t>
             </a:fld>
             <a:endParaRPr lang="en-SG"/>
           </a:p>
@@ -1417,7 +1417,7 @@
           <a:p>
             <a:fld id="{E7602038-B3F0-4825-ABDA-D66CE1C4CFDA}" type="datetimeFigureOut">
               <a:rPr lang="en-SG" smtClean="0"/>
-              <a:t>14/11/2024</a:t>
+              <a:t>15/11/2024</a:t>
             </a:fld>
             <a:endParaRPr lang="en-SG"/>
           </a:p>
@@ -1832,7 +1832,7 @@
           <a:p>
             <a:fld id="{E7602038-B3F0-4825-ABDA-D66CE1C4CFDA}" type="datetimeFigureOut">
               <a:rPr lang="en-SG" smtClean="0"/>
-              <a:t>14/11/2024</a:t>
+              <a:t>15/11/2024</a:t>
             </a:fld>
             <a:endParaRPr lang="en-SG"/>
           </a:p>
@@ -1974,7 +1974,7 @@
           <a:p>
             <a:fld id="{E7602038-B3F0-4825-ABDA-D66CE1C4CFDA}" type="datetimeFigureOut">
               <a:rPr lang="en-SG" smtClean="0"/>
-              <a:t>14/11/2024</a:t>
+              <a:t>15/11/2024</a:t>
             </a:fld>
             <a:endParaRPr lang="en-SG"/>
           </a:p>
@@ -2087,7 +2087,7 @@
           <a:p>
             <a:fld id="{E7602038-B3F0-4825-ABDA-D66CE1C4CFDA}" type="datetimeFigureOut">
               <a:rPr lang="en-SG" smtClean="0"/>
-              <a:t>14/11/2024</a:t>
+              <a:t>15/11/2024</a:t>
             </a:fld>
             <a:endParaRPr lang="en-SG"/>
           </a:p>
@@ -2400,7 +2400,7 @@
           <a:p>
             <a:fld id="{E7602038-B3F0-4825-ABDA-D66CE1C4CFDA}" type="datetimeFigureOut">
               <a:rPr lang="en-SG" smtClean="0"/>
-              <a:t>14/11/2024</a:t>
+              <a:t>15/11/2024</a:t>
             </a:fld>
             <a:endParaRPr lang="en-SG"/>
           </a:p>
@@ -2689,7 +2689,7 @@
           <a:p>
             <a:fld id="{E7602038-B3F0-4825-ABDA-D66CE1C4CFDA}" type="datetimeFigureOut">
               <a:rPr lang="en-SG" smtClean="0"/>
-              <a:t>14/11/2024</a:t>
+              <a:t>15/11/2024</a:t>
             </a:fld>
             <a:endParaRPr lang="en-SG"/>
           </a:p>
@@ -2932,7 +2932,7 @@
           <a:p>
             <a:fld id="{E7602038-B3F0-4825-ABDA-D66CE1C4CFDA}" type="datetimeFigureOut">
               <a:rPr lang="en-SG" smtClean="0"/>
-              <a:t>14/11/2024</a:t>
+              <a:t>15/11/2024</a:t>
             </a:fld>
             <a:endParaRPr lang="en-SG"/>
           </a:p>
@@ -6769,8 +6769,8 @@
         </p:nvSpPr>
         <p:spPr>
           <a:xfrm>
-            <a:off x="2451500" y="1766386"/>
-            <a:ext cx="1324292" cy="3325227"/>
+            <a:off x="2341772" y="1912690"/>
+            <a:ext cx="1324292" cy="3427406"/>
           </a:xfrm>
           <a:prstGeom prst="roundRect">
             <a:avLst/>
@@ -6850,8 +6850,8 @@
         </p:nvSpPr>
         <p:spPr>
           <a:xfrm>
-            <a:off x="5609688" y="1766385"/>
-            <a:ext cx="1514845" cy="3325227"/>
+            <a:off x="5741167" y="1912690"/>
+            <a:ext cx="1453201" cy="3427406"/>
           </a:xfrm>
           <a:prstGeom prst="roundRect">
             <a:avLst/>
@@ -6860,7 +6860,9 @@
             <a:srgbClr val="D67A3B"/>
           </a:solidFill>
           <a:ln>
-            <a:noFill/>
+            <a:solidFill>
+              <a:schemeClr val="bg1"/>
+            </a:solidFill>
           </a:ln>
         </p:spPr>
         <p:style>
@@ -6931,7 +6933,7 @@
         </p:nvSpPr>
         <p:spPr>
           <a:xfrm>
-            <a:off x="2507969" y="1874554"/>
+            <a:off x="2398241" y="2020858"/>
             <a:ext cx="1324292" cy="738664"/>
           </a:xfrm>
           <a:prstGeom prst="rect">
@@ -6998,7 +7000,7 @@
               <a:defRPr/>
             </a:pPr>
             <a:r>
-              <a:rPr kumimoji="0" lang="en-US" sz="1400" b="0" i="0" u="none" strike="noStrike" kern="1200" cap="none" spc="0" normalizeH="0" baseline="0" noProof="0" dirty="0">
+              <a:rPr kumimoji="0" lang="en-US" sz="1400" b="1" i="0" u="none" strike="noStrike" kern="1200" cap="none" spc="0" normalizeH="0" baseline="0" noProof="0" dirty="0">
                 <a:ln>
                   <a:noFill/>
                 </a:ln>
@@ -7014,7 +7016,7 @@
               <a:t>OT </a:t>
             </a:r>
             <a:r>
-              <a:rPr lang="en-US" sz="1400" dirty="0">
+              <a:rPr lang="en-US" sz="1400" b="1" dirty="0">
                 <a:solidFill>
                   <a:prstClr val="black"/>
                 </a:solidFill>
@@ -7022,7 +7024,7 @@
               <a:t>Field </a:t>
             </a:r>
             <a:r>
-              <a:rPr kumimoji="0" lang="en-US" sz="1400" b="0" i="0" u="none" strike="noStrike" kern="1200" cap="none" spc="0" normalizeH="0" baseline="0" noProof="0" dirty="0">
+              <a:rPr kumimoji="0" lang="en-US" sz="1400" b="1" i="0" u="none" strike="noStrike" kern="1200" cap="none" spc="0" normalizeH="0" baseline="0" noProof="0" dirty="0">
                 <a:ln>
                   <a:noFill/>
                 </a:ln>
@@ -7037,7 +7039,7 @@
               </a:rPr>
               <a:t>PLCs Emulator LAN </a:t>
             </a:r>
-            <a:endParaRPr kumimoji="0" lang="en-SG" sz="1400" b="0" i="0" u="none" strike="noStrike" kern="1200" cap="none" spc="0" normalizeH="0" baseline="0" noProof="0" dirty="0">
+            <a:endParaRPr kumimoji="0" lang="en-SG" sz="1400" b="1" i="0" u="none" strike="noStrike" kern="1200" cap="none" spc="0" normalizeH="0" baseline="0" noProof="0" dirty="0">
               <a:ln>
                 <a:noFill/>
               </a:ln>
@@ -7067,7 +7069,7 @@
         </p:nvSpPr>
         <p:spPr>
           <a:xfrm>
-            <a:off x="5671334" y="1832688"/>
+            <a:off x="5797636" y="2020858"/>
             <a:ext cx="1391555" cy="738664"/>
           </a:xfrm>
           <a:prstGeom prst="rect">
@@ -7217,8 +7219,8 @@
         </p:blipFill>
         <p:spPr>
           <a:xfrm>
-            <a:off x="3295162" y="2721385"/>
-            <a:ext cx="670663" cy="680147"/>
+            <a:off x="3060387" y="2938674"/>
+            <a:ext cx="553020" cy="560840"/>
           </a:xfrm>
           <a:prstGeom prst="rect">
             <a:avLst/>
@@ -7244,7 +7246,7 @@
         </p:nvSpPr>
         <p:spPr>
           <a:xfrm>
-            <a:off x="2507969" y="2721385"/>
+            <a:off x="2313537" y="2928349"/>
             <a:ext cx="800310" cy="430887"/>
           </a:xfrm>
           <a:prstGeom prst="rect">
@@ -7315,6 +7317,1764 @@
           </a:p>
         </p:txBody>
       </p:sp>
+      <p:pic>
+        <p:nvPicPr>
+          <p:cNvPr id="12" name="Picture 11">
+            <a:extLst>
+              <a:ext uri="{FF2B5EF4-FFF2-40B4-BE49-F238E27FC236}">
+                <a16:creationId xmlns:a16="http://schemas.microsoft.com/office/drawing/2014/main" id="{6ACD4B32-A58C-5A9D-518A-D404A10D44F5}"/>
+              </a:ext>
+            </a:extLst>
+          </p:cNvPr>
+          <p:cNvPicPr>
+            <a:picLocks noChangeAspect="1"/>
+          </p:cNvPicPr>
+          <p:nvPr/>
+        </p:nvPicPr>
+        <p:blipFill>
+          <a:blip r:embed="rId3"/>
+          <a:stretch>
+            <a:fillRect/>
+          </a:stretch>
+        </p:blipFill>
+        <p:spPr>
+          <a:xfrm>
+            <a:off x="3064118" y="4527404"/>
+            <a:ext cx="568419" cy="560840"/>
+          </a:xfrm>
+          <a:prstGeom prst="rect">
+            <a:avLst/>
+          </a:prstGeom>
+          <a:ln w="9525">
+            <a:solidFill>
+              <a:schemeClr val="tx1"/>
+            </a:solidFill>
+          </a:ln>
+        </p:spPr>
+      </p:pic>
+      <p:pic>
+        <p:nvPicPr>
+          <p:cNvPr id="13" name="Picture 12">
+            <a:extLst>
+              <a:ext uri="{FF2B5EF4-FFF2-40B4-BE49-F238E27FC236}">
+                <a16:creationId xmlns:a16="http://schemas.microsoft.com/office/drawing/2014/main" id="{D7D13C69-CCD4-544B-29BD-EA530DB89A3A}"/>
+              </a:ext>
+            </a:extLst>
+          </p:cNvPr>
+          <p:cNvPicPr>
+            <a:picLocks noChangeAspect="1"/>
+          </p:cNvPicPr>
+          <p:nvPr/>
+        </p:nvPicPr>
+        <p:blipFill>
+          <a:blip r:embed="rId2"/>
+          <a:stretch>
+            <a:fillRect/>
+          </a:stretch>
+        </p:blipFill>
+        <p:spPr>
+          <a:xfrm>
+            <a:off x="3071818" y="3733039"/>
+            <a:ext cx="553020" cy="560840"/>
+          </a:xfrm>
+          <a:prstGeom prst="rect">
+            <a:avLst/>
+          </a:prstGeom>
+          <a:ln w="6350">
+            <a:solidFill>
+              <a:schemeClr val="tx1"/>
+            </a:solidFill>
+          </a:ln>
+        </p:spPr>
+      </p:pic>
+      <p:sp>
+        <p:nvSpPr>
+          <p:cNvPr id="14" name="TextBox 13">
+            <a:extLst>
+              <a:ext uri="{FF2B5EF4-FFF2-40B4-BE49-F238E27FC236}">
+                <a16:creationId xmlns:a16="http://schemas.microsoft.com/office/drawing/2014/main" id="{B666EFE6-10B5-7F2D-F341-8877ED55B8CB}"/>
+              </a:ext>
+            </a:extLst>
+          </p:cNvPr>
+          <p:cNvSpPr txBox="1"/>
+          <p:nvPr/>
+        </p:nvSpPr>
+        <p:spPr>
+          <a:xfrm>
+            <a:off x="2302288" y="3752092"/>
+            <a:ext cx="800310" cy="430887"/>
+          </a:xfrm>
+          <a:prstGeom prst="rect">
+            <a:avLst/>
+          </a:prstGeom>
+          <a:noFill/>
+        </p:spPr>
+        <p:txBody>
+          <a:bodyPr wrap="square" rtlCol="0">
+            <a:spAutoFit/>
+          </a:bodyPr>
+          <a:lstStyle/>
+          <a:p>
+            <a:pPr marL="0" marR="0" lvl="0" indent="0" algn="l" defTabSz="914400" rtl="0" eaLnBrk="1" fontAlgn="auto" latinLnBrk="0" hangingPunct="1">
+              <a:lnSpc>
+                <a:spcPct val="100000"/>
+              </a:lnSpc>
+              <a:spcBef>
+                <a:spcPts val="0"/>
+              </a:spcBef>
+              <a:spcAft>
+                <a:spcPts val="0"/>
+              </a:spcAft>
+              <a:buClrTx/>
+              <a:buSzTx/>
+              <a:buFontTx/>
+              <a:buNone/>
+              <a:tabLst/>
+              <a:defRPr/>
+            </a:pPr>
+            <a:r>
+              <a:rPr kumimoji="0" lang="en-US" sz="1100" b="1" i="0" u="none" strike="noStrike" kern="1200" cap="none" spc="0" normalizeH="0" baseline="0" noProof="0" dirty="0">
+                <a:ln>
+                  <a:noFill/>
+                </a:ln>
+                <a:solidFill>
+                  <a:schemeClr val="tx1">
+                    <a:lumMod val="65000"/>
+                    <a:lumOff val="35000"/>
+                  </a:schemeClr>
+                </a:solidFill>
+                <a:effectLst/>
+                <a:uLnTx/>
+                <a:uFillTx/>
+                <a:latin typeface="Calibri" panose="020F0502020204030204"/>
+                <a:ea typeface="+mn-ea"/>
+                <a:cs typeface="+mn-cs"/>
+              </a:rPr>
+              <a:t>M221 PLC Emulator</a:t>
+            </a:r>
+            <a:endParaRPr kumimoji="0" lang="en-SG" sz="1100" b="1" i="0" u="none" strike="noStrike" kern="1200" cap="none" spc="0" normalizeH="0" baseline="0" noProof="0" dirty="0">
+              <a:ln>
+                <a:noFill/>
+              </a:ln>
+              <a:solidFill>
+                <a:schemeClr val="tx1">
+                  <a:lumMod val="65000"/>
+                  <a:lumOff val="35000"/>
+                </a:schemeClr>
+              </a:solidFill>
+              <a:effectLst/>
+              <a:uLnTx/>
+              <a:uFillTx/>
+              <a:latin typeface="Calibri" panose="020F0502020204030204"/>
+              <a:ea typeface="+mn-ea"/>
+              <a:cs typeface="+mn-cs"/>
+            </a:endParaRPr>
+          </a:p>
+        </p:txBody>
+      </p:sp>
+      <p:sp>
+        <p:nvSpPr>
+          <p:cNvPr id="15" name="TextBox 14">
+            <a:extLst>
+              <a:ext uri="{FF2B5EF4-FFF2-40B4-BE49-F238E27FC236}">
+                <a16:creationId xmlns:a16="http://schemas.microsoft.com/office/drawing/2014/main" id="{54D08E66-7029-B739-6509-55F67ABFED5E}"/>
+              </a:ext>
+            </a:extLst>
+          </p:cNvPr>
+          <p:cNvSpPr txBox="1"/>
+          <p:nvPr/>
+        </p:nvSpPr>
+        <p:spPr>
+          <a:xfrm>
+            <a:off x="2285303" y="4546094"/>
+            <a:ext cx="856779" cy="430887"/>
+          </a:xfrm>
+          <a:prstGeom prst="rect">
+            <a:avLst/>
+          </a:prstGeom>
+          <a:noFill/>
+        </p:spPr>
+        <p:txBody>
+          <a:bodyPr wrap="square" rtlCol="0">
+            <a:spAutoFit/>
+          </a:bodyPr>
+          <a:lstStyle/>
+          <a:p>
+            <a:pPr marL="0" marR="0" lvl="0" indent="0" algn="l" defTabSz="914400" rtl="0" eaLnBrk="1" fontAlgn="auto" latinLnBrk="0" hangingPunct="1">
+              <a:lnSpc>
+                <a:spcPct val="100000"/>
+              </a:lnSpc>
+              <a:spcBef>
+                <a:spcPts val="0"/>
+              </a:spcBef>
+              <a:spcAft>
+                <a:spcPts val="0"/>
+              </a:spcAft>
+              <a:buClrTx/>
+              <a:buSzTx/>
+              <a:buFontTx/>
+              <a:buNone/>
+              <a:tabLst/>
+              <a:defRPr/>
+            </a:pPr>
+            <a:r>
+              <a:rPr kumimoji="0" lang="en-US" sz="1100" b="1" i="0" u="none" strike="noStrike" kern="1200" cap="none" spc="0" normalizeH="0" baseline="0" noProof="0" dirty="0">
+                <a:ln>
+                  <a:noFill/>
+                </a:ln>
+                <a:solidFill>
+                  <a:schemeClr val="tx1">
+                    <a:lumMod val="65000"/>
+                    <a:lumOff val="35000"/>
+                  </a:schemeClr>
+                </a:solidFill>
+                <a:effectLst/>
+                <a:uLnTx/>
+                <a:uFillTx/>
+                <a:latin typeface="Calibri" panose="020F0502020204030204"/>
+                <a:ea typeface="+mn-ea"/>
+                <a:cs typeface="+mn-cs"/>
+              </a:rPr>
+              <a:t>S71200 PLC Emulator</a:t>
+            </a:r>
+            <a:endParaRPr kumimoji="0" lang="en-SG" sz="1100" b="1" i="0" u="none" strike="noStrike" kern="1200" cap="none" spc="0" normalizeH="0" baseline="0" noProof="0" dirty="0">
+              <a:ln>
+                <a:noFill/>
+              </a:ln>
+              <a:solidFill>
+                <a:schemeClr val="tx1">
+                  <a:lumMod val="65000"/>
+                  <a:lumOff val="35000"/>
+                </a:schemeClr>
+              </a:solidFill>
+              <a:effectLst/>
+              <a:uLnTx/>
+              <a:uFillTx/>
+              <a:latin typeface="Calibri" panose="020F0502020204030204"/>
+              <a:ea typeface="+mn-ea"/>
+              <a:cs typeface="+mn-cs"/>
+            </a:endParaRPr>
+          </a:p>
+        </p:txBody>
+      </p:sp>
+      <p:pic>
+        <p:nvPicPr>
+          <p:cNvPr id="16" name="Graphic 15" descr="Ui Ux with solid fill">
+            <a:extLst>
+              <a:ext uri="{FF2B5EF4-FFF2-40B4-BE49-F238E27FC236}">
+                <a16:creationId xmlns:a16="http://schemas.microsoft.com/office/drawing/2014/main" id="{77C791AE-9574-533A-CBB5-D5A37BF67D0D}"/>
+              </a:ext>
+            </a:extLst>
+          </p:cNvPr>
+          <p:cNvPicPr>
+            <a:picLocks noChangeAspect="1"/>
+          </p:cNvPicPr>
+          <p:nvPr/>
+        </p:nvPicPr>
+        <p:blipFill>
+          <a:blip r:embed="rId4">
+            <a:extLst>
+              <a:ext uri="{28A0092B-C50C-407E-A947-70E740481C1C}">
+                <a14:useLocalDpi xmlns:a14="http://schemas.microsoft.com/office/drawing/2010/main" val="0"/>
+              </a:ext>
+              <a:ext uri="{96DAC541-7B7A-43D3-8B79-37D633B846F1}">
+                <asvg:svgBlip xmlns:asvg="http://schemas.microsoft.com/office/drawing/2016/SVG/main" r:embed="rId5"/>
+              </a:ext>
+            </a:extLst>
+          </a:blip>
+          <a:stretch>
+            <a:fillRect/>
+          </a:stretch>
+        </p:blipFill>
+        <p:spPr>
+          <a:xfrm>
+            <a:off x="5911315" y="2917461"/>
+            <a:ext cx="540829" cy="540829"/>
+          </a:xfrm>
+          <a:prstGeom prst="rect">
+            <a:avLst/>
+          </a:prstGeom>
+        </p:spPr>
+      </p:pic>
+      <p:sp>
+        <p:nvSpPr>
+          <p:cNvPr id="19" name="TextBox 18">
+            <a:extLst>
+              <a:ext uri="{FF2B5EF4-FFF2-40B4-BE49-F238E27FC236}">
+                <a16:creationId xmlns:a16="http://schemas.microsoft.com/office/drawing/2014/main" id="{29A39506-BD38-A691-CE23-68C04683BD3D}"/>
+              </a:ext>
+            </a:extLst>
+          </p:cNvPr>
+          <p:cNvSpPr txBox="1"/>
+          <p:nvPr/>
+        </p:nvSpPr>
+        <p:spPr>
+          <a:xfrm>
+            <a:off x="6406896" y="2858126"/>
+            <a:ext cx="908304" cy="600164"/>
+          </a:xfrm>
+          <a:prstGeom prst="rect">
+            <a:avLst/>
+          </a:prstGeom>
+          <a:noFill/>
+        </p:spPr>
+        <p:txBody>
+          <a:bodyPr wrap="square" rtlCol="0">
+            <a:spAutoFit/>
+          </a:bodyPr>
+          <a:lstStyle/>
+          <a:p>
+            <a:pPr marL="0" marR="0" lvl="0" indent="0" algn="l" defTabSz="914400" rtl="0" eaLnBrk="1" fontAlgn="auto" latinLnBrk="0" hangingPunct="1">
+              <a:lnSpc>
+                <a:spcPct val="100000"/>
+              </a:lnSpc>
+              <a:spcBef>
+                <a:spcPts val="0"/>
+              </a:spcBef>
+              <a:spcAft>
+                <a:spcPts val="0"/>
+              </a:spcAft>
+              <a:buClrTx/>
+              <a:buSzTx/>
+              <a:buFontTx/>
+              <a:buNone/>
+              <a:tabLst/>
+              <a:defRPr/>
+            </a:pPr>
+            <a:r>
+              <a:rPr lang="en-US" sz="1100" b="1" dirty="0">
+                <a:solidFill>
+                  <a:schemeClr val="bg1"/>
+                </a:solidFill>
+                <a:latin typeface="Calibri" panose="020F0502020204030204"/>
+              </a:rPr>
+              <a:t>1 to 1 PLC controller</a:t>
+            </a:r>
+          </a:p>
+          <a:p>
+            <a:pPr marL="0" marR="0" lvl="0" indent="0" algn="l" defTabSz="914400" rtl="0" eaLnBrk="1" fontAlgn="auto" latinLnBrk="0" hangingPunct="1">
+              <a:lnSpc>
+                <a:spcPct val="100000"/>
+              </a:lnSpc>
+              <a:spcBef>
+                <a:spcPts val="0"/>
+              </a:spcBef>
+              <a:spcAft>
+                <a:spcPts val="0"/>
+              </a:spcAft>
+              <a:buClrTx/>
+              <a:buSzTx/>
+              <a:buFontTx/>
+              <a:buNone/>
+              <a:tabLst/>
+              <a:defRPr/>
+            </a:pPr>
+            <a:r>
+              <a:rPr kumimoji="0" lang="en-US" sz="1100" b="1" i="0" u="none" strike="noStrike" kern="1200" cap="none" spc="0" normalizeH="0" baseline="0" noProof="0" dirty="0">
+                <a:ln>
+                  <a:noFill/>
+                </a:ln>
+                <a:solidFill>
+                  <a:schemeClr val="bg1"/>
+                </a:solidFill>
+                <a:effectLst/>
+                <a:uLnTx/>
+                <a:uFillTx/>
+                <a:latin typeface="Calibri" panose="020F0502020204030204"/>
+                <a:ea typeface="+mn-ea"/>
+                <a:cs typeface="+mn-cs"/>
+              </a:rPr>
+              <a:t>[Modbus]</a:t>
+            </a:r>
+            <a:endParaRPr kumimoji="0" lang="en-SG" sz="1100" b="1" i="0" u="none" strike="noStrike" kern="1200" cap="none" spc="0" normalizeH="0" baseline="0" noProof="0" dirty="0">
+              <a:ln>
+                <a:noFill/>
+              </a:ln>
+              <a:solidFill>
+                <a:schemeClr val="bg1"/>
+              </a:solidFill>
+              <a:effectLst/>
+              <a:uLnTx/>
+              <a:uFillTx/>
+              <a:latin typeface="Calibri" panose="020F0502020204030204"/>
+              <a:ea typeface="+mn-ea"/>
+              <a:cs typeface="+mn-cs"/>
+            </a:endParaRPr>
+          </a:p>
+        </p:txBody>
+      </p:sp>
+      <p:pic>
+        <p:nvPicPr>
+          <p:cNvPr id="20" name="Graphic 19" descr="Ui Ux with solid fill">
+            <a:extLst>
+              <a:ext uri="{FF2B5EF4-FFF2-40B4-BE49-F238E27FC236}">
+                <a16:creationId xmlns:a16="http://schemas.microsoft.com/office/drawing/2014/main" id="{220EB893-E3ED-F778-F6D2-F388618BD1FC}"/>
+              </a:ext>
+            </a:extLst>
+          </p:cNvPr>
+          <p:cNvPicPr>
+            <a:picLocks noChangeAspect="1"/>
+          </p:cNvPicPr>
+          <p:nvPr/>
+        </p:nvPicPr>
+        <p:blipFill>
+          <a:blip r:embed="rId4">
+            <a:extLst>
+              <a:ext uri="{28A0092B-C50C-407E-A947-70E740481C1C}">
+                <a14:useLocalDpi xmlns:a14="http://schemas.microsoft.com/office/drawing/2010/main" val="0"/>
+              </a:ext>
+              <a:ext uri="{96DAC541-7B7A-43D3-8B79-37D633B846F1}">
+                <asvg:svgBlip xmlns:asvg="http://schemas.microsoft.com/office/drawing/2016/SVG/main" r:embed="rId5"/>
+              </a:ext>
+            </a:extLst>
+          </a:blip>
+          <a:stretch>
+            <a:fillRect/>
+          </a:stretch>
+        </p:blipFill>
+        <p:spPr>
+          <a:xfrm>
+            <a:off x="5911314" y="3642150"/>
+            <a:ext cx="540829" cy="540829"/>
+          </a:xfrm>
+          <a:prstGeom prst="rect">
+            <a:avLst/>
+          </a:prstGeom>
+        </p:spPr>
+      </p:pic>
+      <p:sp>
+        <p:nvSpPr>
+          <p:cNvPr id="28" name="TextBox 27">
+            <a:extLst>
+              <a:ext uri="{FF2B5EF4-FFF2-40B4-BE49-F238E27FC236}">
+                <a16:creationId xmlns:a16="http://schemas.microsoft.com/office/drawing/2014/main" id="{725CE597-95F1-31AC-9DAA-CA89765C16C5}"/>
+              </a:ext>
+            </a:extLst>
+          </p:cNvPr>
+          <p:cNvSpPr txBox="1"/>
+          <p:nvPr/>
+        </p:nvSpPr>
+        <p:spPr>
+          <a:xfrm>
+            <a:off x="6430040" y="3582815"/>
+            <a:ext cx="908304" cy="600164"/>
+          </a:xfrm>
+          <a:prstGeom prst="rect">
+            <a:avLst/>
+          </a:prstGeom>
+          <a:noFill/>
+        </p:spPr>
+        <p:txBody>
+          <a:bodyPr wrap="square" rtlCol="0">
+            <a:spAutoFit/>
+          </a:bodyPr>
+          <a:lstStyle/>
+          <a:p>
+            <a:pPr marL="0" marR="0" lvl="0" indent="0" algn="l" defTabSz="914400" rtl="0" eaLnBrk="1" fontAlgn="auto" latinLnBrk="0" hangingPunct="1">
+              <a:lnSpc>
+                <a:spcPct val="100000"/>
+              </a:lnSpc>
+              <a:spcBef>
+                <a:spcPts val="0"/>
+              </a:spcBef>
+              <a:spcAft>
+                <a:spcPts val="0"/>
+              </a:spcAft>
+              <a:buClrTx/>
+              <a:buSzTx/>
+              <a:buFontTx/>
+              <a:buNone/>
+              <a:tabLst/>
+              <a:defRPr/>
+            </a:pPr>
+            <a:r>
+              <a:rPr lang="en-US" sz="1100" b="1" dirty="0">
+                <a:solidFill>
+                  <a:schemeClr val="bg1"/>
+                </a:solidFill>
+                <a:latin typeface="Calibri" panose="020F0502020204030204"/>
+              </a:rPr>
+              <a:t>1 to N PLC controller {</a:t>
+            </a:r>
+            <a:r>
+              <a:rPr kumimoji="0" lang="en-US" sz="1100" b="1" i="0" u="none" strike="noStrike" kern="1200" cap="none" spc="0" normalizeH="0" baseline="0" noProof="0" dirty="0">
+                <a:ln>
+                  <a:noFill/>
+                </a:ln>
+                <a:solidFill>
+                  <a:schemeClr val="bg1"/>
+                </a:solidFill>
+                <a:effectLst/>
+                <a:uLnTx/>
+                <a:uFillTx/>
+                <a:latin typeface="Calibri" panose="020F0502020204030204"/>
+                <a:ea typeface="+mn-ea"/>
+                <a:cs typeface="+mn-cs"/>
+              </a:rPr>
+              <a:t>Modbus]</a:t>
+            </a:r>
+            <a:r>
+              <a:rPr lang="en-US" sz="1100" b="1" dirty="0">
+                <a:solidFill>
+                  <a:schemeClr val="bg1"/>
+                </a:solidFill>
+                <a:latin typeface="Calibri" panose="020F0502020204030204"/>
+              </a:rPr>
+              <a:t> </a:t>
+            </a:r>
+            <a:endParaRPr kumimoji="0" lang="en-SG" sz="1100" b="1" i="0" u="none" strike="noStrike" kern="1200" cap="none" spc="0" normalizeH="0" baseline="0" noProof="0" dirty="0">
+              <a:ln>
+                <a:noFill/>
+              </a:ln>
+              <a:solidFill>
+                <a:schemeClr val="bg1"/>
+              </a:solidFill>
+              <a:effectLst/>
+              <a:uLnTx/>
+              <a:uFillTx/>
+              <a:latin typeface="Calibri" panose="020F0502020204030204"/>
+              <a:ea typeface="+mn-ea"/>
+              <a:cs typeface="+mn-cs"/>
+            </a:endParaRPr>
+          </a:p>
+        </p:txBody>
+      </p:sp>
+      <p:pic>
+        <p:nvPicPr>
+          <p:cNvPr id="29" name="Graphic 28" descr="Ui Ux with solid fill">
+            <a:extLst>
+              <a:ext uri="{FF2B5EF4-FFF2-40B4-BE49-F238E27FC236}">
+                <a16:creationId xmlns:a16="http://schemas.microsoft.com/office/drawing/2014/main" id="{FF9E2967-87A5-3AFC-3F59-09FFA28EBE38}"/>
+              </a:ext>
+            </a:extLst>
+          </p:cNvPr>
+          <p:cNvPicPr>
+            <a:picLocks noChangeAspect="1"/>
+          </p:cNvPicPr>
+          <p:nvPr/>
+        </p:nvPicPr>
+        <p:blipFill>
+          <a:blip r:embed="rId4">
+            <a:extLst>
+              <a:ext uri="{28A0092B-C50C-407E-A947-70E740481C1C}">
+                <a14:useLocalDpi xmlns:a14="http://schemas.microsoft.com/office/drawing/2010/main" val="0"/>
+              </a:ext>
+              <a:ext uri="{96DAC541-7B7A-43D3-8B79-37D633B846F1}">
+                <asvg:svgBlip xmlns:asvg="http://schemas.microsoft.com/office/drawing/2016/SVG/main" r:embed="rId5"/>
+              </a:ext>
+            </a:extLst>
+          </a:blip>
+          <a:stretch>
+            <a:fillRect/>
+          </a:stretch>
+        </p:blipFill>
+        <p:spPr>
+          <a:xfrm>
+            <a:off x="5900004" y="4403726"/>
+            <a:ext cx="540829" cy="540829"/>
+          </a:xfrm>
+          <a:prstGeom prst="rect">
+            <a:avLst/>
+          </a:prstGeom>
+        </p:spPr>
+      </p:pic>
+      <p:sp>
+        <p:nvSpPr>
+          <p:cNvPr id="30" name="TextBox 29">
+            <a:extLst>
+              <a:ext uri="{FF2B5EF4-FFF2-40B4-BE49-F238E27FC236}">
+                <a16:creationId xmlns:a16="http://schemas.microsoft.com/office/drawing/2014/main" id="{52290C4B-6895-6490-8FE1-FA489733BD0B}"/>
+              </a:ext>
+            </a:extLst>
+          </p:cNvPr>
+          <p:cNvSpPr txBox="1"/>
+          <p:nvPr/>
+        </p:nvSpPr>
+        <p:spPr>
+          <a:xfrm>
+            <a:off x="6363449" y="4366839"/>
+            <a:ext cx="989756" cy="769441"/>
+          </a:xfrm>
+          <a:prstGeom prst="rect">
+            <a:avLst/>
+          </a:prstGeom>
+          <a:noFill/>
+        </p:spPr>
+        <p:txBody>
+          <a:bodyPr wrap="square" rtlCol="0">
+            <a:spAutoFit/>
+          </a:bodyPr>
+          <a:lstStyle/>
+          <a:p>
+            <a:pPr marL="0" marR="0" lvl="0" indent="0" algn="l" defTabSz="914400" rtl="0" eaLnBrk="1" fontAlgn="auto" latinLnBrk="0" hangingPunct="1">
+              <a:lnSpc>
+                <a:spcPct val="100000"/>
+              </a:lnSpc>
+              <a:spcBef>
+                <a:spcPts val="0"/>
+              </a:spcBef>
+              <a:spcAft>
+                <a:spcPts val="0"/>
+              </a:spcAft>
+              <a:buClrTx/>
+              <a:buSzTx/>
+              <a:buFontTx/>
+              <a:buNone/>
+              <a:tabLst/>
+              <a:defRPr/>
+            </a:pPr>
+            <a:r>
+              <a:rPr lang="en-US" sz="1100" b="1" dirty="0">
+                <a:solidFill>
+                  <a:schemeClr val="bg1"/>
+                </a:solidFill>
+                <a:latin typeface="Calibri" panose="020F0502020204030204"/>
+              </a:rPr>
+              <a:t>Mixed PLC controller [</a:t>
+            </a:r>
+            <a:r>
+              <a:rPr kumimoji="0" lang="en-US" sz="1100" b="1" i="0" u="none" strike="noStrike" kern="1200" cap="none" spc="0" normalizeH="0" baseline="0" noProof="0" dirty="0">
+                <a:ln>
+                  <a:noFill/>
+                </a:ln>
+                <a:solidFill>
+                  <a:schemeClr val="bg1"/>
+                </a:solidFill>
+                <a:effectLst/>
+                <a:uLnTx/>
+                <a:uFillTx/>
+                <a:latin typeface="Calibri" panose="020F0502020204030204"/>
+                <a:ea typeface="+mn-ea"/>
+                <a:cs typeface="+mn-cs"/>
+              </a:rPr>
+              <a:t>Modbus &amp; S7comm]</a:t>
+            </a:r>
+            <a:r>
+              <a:rPr lang="en-US" sz="1100" b="1" dirty="0">
+                <a:solidFill>
+                  <a:schemeClr val="bg1"/>
+                </a:solidFill>
+                <a:latin typeface="Calibri" panose="020F0502020204030204"/>
+              </a:rPr>
+              <a:t> </a:t>
+            </a:r>
+            <a:endParaRPr kumimoji="0" lang="en-SG" sz="1100" b="1" i="0" u="none" strike="noStrike" kern="1200" cap="none" spc="0" normalizeH="0" baseline="0" noProof="0" dirty="0">
+              <a:ln>
+                <a:noFill/>
+              </a:ln>
+              <a:solidFill>
+                <a:schemeClr val="bg1"/>
+              </a:solidFill>
+              <a:effectLst/>
+              <a:uLnTx/>
+              <a:uFillTx/>
+              <a:latin typeface="Calibri" panose="020F0502020204030204"/>
+              <a:ea typeface="+mn-ea"/>
+              <a:cs typeface="+mn-cs"/>
+            </a:endParaRPr>
+          </a:p>
+        </p:txBody>
+      </p:sp>
+      <p:cxnSp>
+        <p:nvCxnSpPr>
+          <p:cNvPr id="34" name="Straight Connector 33">
+            <a:extLst>
+              <a:ext uri="{FF2B5EF4-FFF2-40B4-BE49-F238E27FC236}">
+                <a16:creationId xmlns:a16="http://schemas.microsoft.com/office/drawing/2014/main" id="{37DAB555-2DBD-E50D-1CD0-F9AB32C67E07}"/>
+              </a:ext>
+            </a:extLst>
+          </p:cNvPr>
+          <p:cNvCxnSpPr>
+            <a:cxnSpLocks/>
+          </p:cNvCxnSpPr>
+          <p:nvPr/>
+        </p:nvCxnSpPr>
+        <p:spPr>
+          <a:xfrm>
+            <a:off x="4352544" y="2390190"/>
+            <a:ext cx="0" cy="2831034"/>
+          </a:xfrm>
+          <a:prstGeom prst="line">
+            <a:avLst/>
+          </a:prstGeom>
+          <a:ln>
+            <a:solidFill>
+              <a:schemeClr val="accent6">
+                <a:lumMod val="75000"/>
+              </a:schemeClr>
+            </a:solidFill>
+          </a:ln>
+        </p:spPr>
+        <p:style>
+          <a:lnRef idx="2">
+            <a:schemeClr val="accent1"/>
+          </a:lnRef>
+          <a:fillRef idx="0">
+            <a:schemeClr val="accent1"/>
+          </a:fillRef>
+          <a:effectRef idx="1">
+            <a:schemeClr val="accent1"/>
+          </a:effectRef>
+          <a:fontRef idx="minor">
+            <a:schemeClr val="tx1"/>
+          </a:fontRef>
+        </p:style>
+      </p:cxnSp>
+      <p:cxnSp>
+        <p:nvCxnSpPr>
+          <p:cNvPr id="43" name="Straight Connector 42">
+            <a:extLst>
+              <a:ext uri="{FF2B5EF4-FFF2-40B4-BE49-F238E27FC236}">
+                <a16:creationId xmlns:a16="http://schemas.microsoft.com/office/drawing/2014/main" id="{9F1BBDBD-F5CE-B0A5-E13C-77FD9C487A90}"/>
+              </a:ext>
+            </a:extLst>
+          </p:cNvPr>
+          <p:cNvCxnSpPr>
+            <a:cxnSpLocks/>
+          </p:cNvCxnSpPr>
+          <p:nvPr/>
+        </p:nvCxnSpPr>
+        <p:spPr>
+          <a:xfrm>
+            <a:off x="5062728" y="2390190"/>
+            <a:ext cx="0" cy="2831034"/>
+          </a:xfrm>
+          <a:prstGeom prst="line">
+            <a:avLst/>
+          </a:prstGeom>
+          <a:ln>
+            <a:solidFill>
+              <a:srgbClr val="0070C0"/>
+            </a:solidFill>
+          </a:ln>
+        </p:spPr>
+        <p:style>
+          <a:lnRef idx="2">
+            <a:schemeClr val="accent1"/>
+          </a:lnRef>
+          <a:fillRef idx="0">
+            <a:schemeClr val="accent1"/>
+          </a:fillRef>
+          <a:effectRef idx="1">
+            <a:schemeClr val="accent1"/>
+          </a:effectRef>
+          <a:fontRef idx="minor">
+            <a:schemeClr val="tx1"/>
+          </a:fontRef>
+        </p:style>
+      </p:cxnSp>
+      <p:sp>
+        <p:nvSpPr>
+          <p:cNvPr id="44" name="TextBox 43">
+            <a:extLst>
+              <a:ext uri="{FF2B5EF4-FFF2-40B4-BE49-F238E27FC236}">
+                <a16:creationId xmlns:a16="http://schemas.microsoft.com/office/drawing/2014/main" id="{9EAD237E-13D7-119C-6D24-B105E55F93DE}"/>
+              </a:ext>
+            </a:extLst>
+          </p:cNvPr>
+          <p:cNvSpPr txBox="1"/>
+          <p:nvPr/>
+        </p:nvSpPr>
+        <p:spPr>
+          <a:xfrm>
+            <a:off x="3972740" y="5221699"/>
+            <a:ext cx="823100" cy="430887"/>
+          </a:xfrm>
+          <a:prstGeom prst="rect">
+            <a:avLst/>
+          </a:prstGeom>
+          <a:noFill/>
+        </p:spPr>
+        <p:txBody>
+          <a:bodyPr wrap="square" rtlCol="0">
+            <a:spAutoFit/>
+          </a:bodyPr>
+          <a:lstStyle/>
+          <a:p>
+            <a:pPr marL="0" marR="0" lvl="0" indent="0" algn="l" defTabSz="914400" rtl="0" eaLnBrk="1" fontAlgn="auto" latinLnBrk="0" hangingPunct="1">
+              <a:lnSpc>
+                <a:spcPct val="100000"/>
+              </a:lnSpc>
+              <a:spcBef>
+                <a:spcPts val="0"/>
+              </a:spcBef>
+              <a:spcAft>
+                <a:spcPts val="0"/>
+              </a:spcAft>
+              <a:buClrTx/>
+              <a:buSzTx/>
+              <a:buFontTx/>
+              <a:buNone/>
+              <a:tabLst/>
+              <a:defRPr/>
+            </a:pPr>
+            <a:r>
+              <a:rPr kumimoji="0" lang="en-US" sz="1100" b="1" i="0" u="none" strike="noStrike" kern="1200" cap="none" spc="0" normalizeH="0" baseline="0" noProof="0" dirty="0">
+                <a:ln>
+                  <a:noFill/>
+                </a:ln>
+                <a:solidFill>
+                  <a:schemeClr val="accent6">
+                    <a:lumMod val="75000"/>
+                  </a:schemeClr>
+                </a:solidFill>
+                <a:effectLst/>
+                <a:uLnTx/>
+                <a:uFillTx/>
+                <a:latin typeface="Calibri" panose="020F0502020204030204"/>
+                <a:ea typeface="+mn-ea"/>
+                <a:cs typeface="+mn-cs"/>
+              </a:rPr>
+              <a:t>Modbus-TCP bus</a:t>
+            </a:r>
+            <a:endParaRPr kumimoji="0" lang="en-SG" sz="1100" b="1" i="0" u="none" strike="noStrike" kern="1200" cap="none" spc="0" normalizeH="0" baseline="0" noProof="0" dirty="0">
+              <a:ln>
+                <a:noFill/>
+              </a:ln>
+              <a:solidFill>
+                <a:schemeClr val="accent6">
+                  <a:lumMod val="75000"/>
+                </a:schemeClr>
+              </a:solidFill>
+              <a:effectLst/>
+              <a:uLnTx/>
+              <a:uFillTx/>
+              <a:latin typeface="Calibri" panose="020F0502020204030204"/>
+              <a:ea typeface="+mn-ea"/>
+              <a:cs typeface="+mn-cs"/>
+            </a:endParaRPr>
+          </a:p>
+        </p:txBody>
+      </p:sp>
+      <p:sp>
+        <p:nvSpPr>
+          <p:cNvPr id="45" name="TextBox 44">
+            <a:extLst>
+              <a:ext uri="{FF2B5EF4-FFF2-40B4-BE49-F238E27FC236}">
+                <a16:creationId xmlns:a16="http://schemas.microsoft.com/office/drawing/2014/main" id="{00943587-63F0-9746-A293-766BE7F63C12}"/>
+              </a:ext>
+            </a:extLst>
+          </p:cNvPr>
+          <p:cNvSpPr txBox="1"/>
+          <p:nvPr/>
+        </p:nvSpPr>
+        <p:spPr>
+          <a:xfrm>
+            <a:off x="4797235" y="5221699"/>
+            <a:ext cx="823100" cy="430887"/>
+          </a:xfrm>
+          <a:prstGeom prst="rect">
+            <a:avLst/>
+          </a:prstGeom>
+          <a:noFill/>
+        </p:spPr>
+        <p:txBody>
+          <a:bodyPr wrap="square" rtlCol="0">
+            <a:spAutoFit/>
+          </a:bodyPr>
+          <a:lstStyle/>
+          <a:p>
+            <a:pPr marL="0" marR="0" lvl="0" indent="0" algn="l" defTabSz="914400" rtl="0" eaLnBrk="1" fontAlgn="auto" latinLnBrk="0" hangingPunct="1">
+              <a:lnSpc>
+                <a:spcPct val="100000"/>
+              </a:lnSpc>
+              <a:spcBef>
+                <a:spcPts val="0"/>
+              </a:spcBef>
+              <a:spcAft>
+                <a:spcPts val="0"/>
+              </a:spcAft>
+              <a:buClrTx/>
+              <a:buSzTx/>
+              <a:buFontTx/>
+              <a:buNone/>
+              <a:tabLst/>
+              <a:defRPr/>
+            </a:pPr>
+            <a:r>
+              <a:rPr kumimoji="0" lang="en-US" sz="1100" b="1" i="0" u="none" strike="noStrike" kern="1200" cap="none" spc="0" normalizeH="0" baseline="0" noProof="0" dirty="0">
+                <a:ln>
+                  <a:noFill/>
+                </a:ln>
+                <a:solidFill>
+                  <a:srgbClr val="0070C0"/>
+                </a:solidFill>
+                <a:effectLst/>
+                <a:uLnTx/>
+                <a:uFillTx/>
+                <a:latin typeface="Calibri" panose="020F0502020204030204"/>
+                <a:ea typeface="+mn-ea"/>
+                <a:cs typeface="+mn-cs"/>
+              </a:rPr>
+              <a:t>S7Comm bus</a:t>
+            </a:r>
+            <a:endParaRPr kumimoji="0" lang="en-SG" sz="1100" b="1" i="0" u="none" strike="noStrike" kern="1200" cap="none" spc="0" normalizeH="0" baseline="0" noProof="0" dirty="0">
+              <a:ln>
+                <a:noFill/>
+              </a:ln>
+              <a:solidFill>
+                <a:srgbClr val="0070C0"/>
+              </a:solidFill>
+              <a:effectLst/>
+              <a:uLnTx/>
+              <a:uFillTx/>
+              <a:latin typeface="Calibri" panose="020F0502020204030204"/>
+              <a:ea typeface="+mn-ea"/>
+              <a:cs typeface="+mn-cs"/>
+            </a:endParaRPr>
+          </a:p>
+        </p:txBody>
+      </p:sp>
+      <p:cxnSp>
+        <p:nvCxnSpPr>
+          <p:cNvPr id="46" name="Straight Connector 45">
+            <a:extLst>
+              <a:ext uri="{FF2B5EF4-FFF2-40B4-BE49-F238E27FC236}">
+                <a16:creationId xmlns:a16="http://schemas.microsoft.com/office/drawing/2014/main" id="{FB367AA7-1DD6-36E6-B128-6D4E439D7272}"/>
+              </a:ext>
+            </a:extLst>
+          </p:cNvPr>
+          <p:cNvCxnSpPr>
+            <a:cxnSpLocks/>
+          </p:cNvCxnSpPr>
+          <p:nvPr/>
+        </p:nvCxnSpPr>
+        <p:spPr>
+          <a:xfrm>
+            <a:off x="3632537" y="3219094"/>
+            <a:ext cx="727797" cy="0"/>
+          </a:xfrm>
+          <a:prstGeom prst="line">
+            <a:avLst/>
+          </a:prstGeom>
+          <a:ln>
+            <a:solidFill>
+              <a:schemeClr val="accent6">
+                <a:lumMod val="75000"/>
+              </a:schemeClr>
+            </a:solidFill>
+          </a:ln>
+        </p:spPr>
+        <p:style>
+          <a:lnRef idx="2">
+            <a:schemeClr val="accent1"/>
+          </a:lnRef>
+          <a:fillRef idx="0">
+            <a:schemeClr val="accent1"/>
+          </a:fillRef>
+          <a:effectRef idx="1">
+            <a:schemeClr val="accent1"/>
+          </a:effectRef>
+          <a:fontRef idx="minor">
+            <a:schemeClr val="tx1"/>
+          </a:fontRef>
+        </p:style>
+      </p:cxnSp>
+      <p:cxnSp>
+        <p:nvCxnSpPr>
+          <p:cNvPr id="49" name="Straight Connector 48">
+            <a:extLst>
+              <a:ext uri="{FF2B5EF4-FFF2-40B4-BE49-F238E27FC236}">
+                <a16:creationId xmlns:a16="http://schemas.microsoft.com/office/drawing/2014/main" id="{7ACA5F07-2BB4-A9CA-FC78-571883AB6DE7}"/>
+              </a:ext>
+            </a:extLst>
+          </p:cNvPr>
+          <p:cNvCxnSpPr>
+            <a:cxnSpLocks/>
+            <a:stCxn id="13" idx="3"/>
+          </p:cNvCxnSpPr>
+          <p:nvPr/>
+        </p:nvCxnSpPr>
+        <p:spPr>
+          <a:xfrm>
+            <a:off x="3624838" y="4013459"/>
+            <a:ext cx="735495" cy="0"/>
+          </a:xfrm>
+          <a:prstGeom prst="line">
+            <a:avLst/>
+          </a:prstGeom>
+          <a:ln>
+            <a:solidFill>
+              <a:schemeClr val="accent6">
+                <a:lumMod val="75000"/>
+              </a:schemeClr>
+            </a:solidFill>
+          </a:ln>
+        </p:spPr>
+        <p:style>
+          <a:lnRef idx="2">
+            <a:schemeClr val="accent1"/>
+          </a:lnRef>
+          <a:fillRef idx="0">
+            <a:schemeClr val="accent1"/>
+          </a:fillRef>
+          <a:effectRef idx="1">
+            <a:schemeClr val="accent1"/>
+          </a:effectRef>
+          <a:fontRef idx="minor">
+            <a:schemeClr val="tx1"/>
+          </a:fontRef>
+        </p:style>
+      </p:cxnSp>
+      <p:cxnSp>
+        <p:nvCxnSpPr>
+          <p:cNvPr id="51" name="Straight Connector 50">
+            <a:extLst>
+              <a:ext uri="{FF2B5EF4-FFF2-40B4-BE49-F238E27FC236}">
+                <a16:creationId xmlns:a16="http://schemas.microsoft.com/office/drawing/2014/main" id="{A58F98DB-3A4B-72A8-F6AA-395588DAF576}"/>
+              </a:ext>
+            </a:extLst>
+          </p:cNvPr>
+          <p:cNvCxnSpPr>
+            <a:cxnSpLocks/>
+          </p:cNvCxnSpPr>
+          <p:nvPr/>
+        </p:nvCxnSpPr>
+        <p:spPr>
+          <a:xfrm>
+            <a:off x="4341234" y="3187875"/>
+            <a:ext cx="1558770" cy="0"/>
+          </a:xfrm>
+          <a:prstGeom prst="line">
+            <a:avLst/>
+          </a:prstGeom>
+          <a:ln>
+            <a:solidFill>
+              <a:schemeClr val="accent6">
+                <a:lumMod val="75000"/>
+              </a:schemeClr>
+            </a:solidFill>
+          </a:ln>
+        </p:spPr>
+        <p:style>
+          <a:lnRef idx="2">
+            <a:schemeClr val="accent1"/>
+          </a:lnRef>
+          <a:fillRef idx="0">
+            <a:schemeClr val="accent1"/>
+          </a:fillRef>
+          <a:effectRef idx="1">
+            <a:schemeClr val="accent1"/>
+          </a:effectRef>
+          <a:fontRef idx="minor">
+            <a:schemeClr val="tx1"/>
+          </a:fontRef>
+        </p:style>
+      </p:cxnSp>
+      <p:cxnSp>
+        <p:nvCxnSpPr>
+          <p:cNvPr id="53" name="Straight Connector 52">
+            <a:extLst>
+              <a:ext uri="{FF2B5EF4-FFF2-40B4-BE49-F238E27FC236}">
+                <a16:creationId xmlns:a16="http://schemas.microsoft.com/office/drawing/2014/main" id="{35665F5F-3552-FACD-BEE4-FE9DC3825689}"/>
+              </a:ext>
+            </a:extLst>
+          </p:cNvPr>
+          <p:cNvCxnSpPr>
+            <a:cxnSpLocks/>
+          </p:cNvCxnSpPr>
+          <p:nvPr/>
+        </p:nvCxnSpPr>
+        <p:spPr>
+          <a:xfrm>
+            <a:off x="4360333" y="3876468"/>
+            <a:ext cx="1558770" cy="0"/>
+          </a:xfrm>
+          <a:prstGeom prst="line">
+            <a:avLst/>
+          </a:prstGeom>
+          <a:ln>
+            <a:solidFill>
+              <a:schemeClr val="accent6">
+                <a:lumMod val="75000"/>
+              </a:schemeClr>
+            </a:solidFill>
+          </a:ln>
+        </p:spPr>
+        <p:style>
+          <a:lnRef idx="2">
+            <a:schemeClr val="accent1"/>
+          </a:lnRef>
+          <a:fillRef idx="0">
+            <a:schemeClr val="accent1"/>
+          </a:fillRef>
+          <a:effectRef idx="1">
+            <a:schemeClr val="accent1"/>
+          </a:effectRef>
+          <a:fontRef idx="minor">
+            <a:schemeClr val="tx1"/>
+          </a:fontRef>
+        </p:style>
+      </p:cxnSp>
+      <p:cxnSp>
+        <p:nvCxnSpPr>
+          <p:cNvPr id="54" name="Straight Connector 53">
+            <a:extLst>
+              <a:ext uri="{FF2B5EF4-FFF2-40B4-BE49-F238E27FC236}">
+                <a16:creationId xmlns:a16="http://schemas.microsoft.com/office/drawing/2014/main" id="{62DFAFC3-6641-5ACD-5216-9674CBD81155}"/>
+              </a:ext>
+            </a:extLst>
+          </p:cNvPr>
+          <p:cNvCxnSpPr>
+            <a:cxnSpLocks/>
+          </p:cNvCxnSpPr>
+          <p:nvPr/>
+        </p:nvCxnSpPr>
+        <p:spPr>
+          <a:xfrm>
+            <a:off x="3662341" y="4807824"/>
+            <a:ext cx="1400387" cy="0"/>
+          </a:xfrm>
+          <a:prstGeom prst="line">
+            <a:avLst/>
+          </a:prstGeom>
+          <a:ln>
+            <a:solidFill>
+              <a:schemeClr val="tx2">
+                <a:lumMod val="50000"/>
+                <a:lumOff val="50000"/>
+              </a:schemeClr>
+            </a:solidFill>
+          </a:ln>
+        </p:spPr>
+        <p:style>
+          <a:lnRef idx="2">
+            <a:schemeClr val="accent1"/>
+          </a:lnRef>
+          <a:fillRef idx="0">
+            <a:schemeClr val="accent1"/>
+          </a:fillRef>
+          <a:effectRef idx="1">
+            <a:schemeClr val="accent1"/>
+          </a:effectRef>
+          <a:fontRef idx="minor">
+            <a:schemeClr val="tx1"/>
+          </a:fontRef>
+        </p:style>
+      </p:cxnSp>
+      <p:cxnSp>
+        <p:nvCxnSpPr>
+          <p:cNvPr id="56" name="Straight Connector 55">
+            <a:extLst>
+              <a:ext uri="{FF2B5EF4-FFF2-40B4-BE49-F238E27FC236}">
+                <a16:creationId xmlns:a16="http://schemas.microsoft.com/office/drawing/2014/main" id="{C3BF8C6A-1468-CF7B-7270-730298792166}"/>
+              </a:ext>
+            </a:extLst>
+          </p:cNvPr>
+          <p:cNvCxnSpPr>
+            <a:cxnSpLocks/>
+          </p:cNvCxnSpPr>
+          <p:nvPr/>
+        </p:nvCxnSpPr>
+        <p:spPr>
+          <a:xfrm>
+            <a:off x="5062728" y="4762259"/>
+            <a:ext cx="867347" cy="0"/>
+          </a:xfrm>
+          <a:prstGeom prst="line">
+            <a:avLst/>
+          </a:prstGeom>
+          <a:ln>
+            <a:solidFill>
+              <a:schemeClr val="tx2">
+                <a:lumMod val="50000"/>
+                <a:lumOff val="50000"/>
+              </a:schemeClr>
+            </a:solidFill>
+          </a:ln>
+        </p:spPr>
+        <p:style>
+          <a:lnRef idx="2">
+            <a:schemeClr val="accent1"/>
+          </a:lnRef>
+          <a:fillRef idx="0">
+            <a:schemeClr val="accent1"/>
+          </a:fillRef>
+          <a:effectRef idx="1">
+            <a:schemeClr val="accent1"/>
+          </a:effectRef>
+          <a:fontRef idx="minor">
+            <a:schemeClr val="tx1"/>
+          </a:fontRef>
+        </p:style>
+      </p:cxnSp>
+      <p:cxnSp>
+        <p:nvCxnSpPr>
+          <p:cNvPr id="58" name="Straight Connector 57">
+            <a:extLst>
+              <a:ext uri="{FF2B5EF4-FFF2-40B4-BE49-F238E27FC236}">
+                <a16:creationId xmlns:a16="http://schemas.microsoft.com/office/drawing/2014/main" id="{78F46388-C7C8-5CB0-E8AD-C494FE5415CF}"/>
+              </a:ext>
+            </a:extLst>
+          </p:cNvPr>
+          <p:cNvCxnSpPr>
+            <a:cxnSpLocks/>
+          </p:cNvCxnSpPr>
+          <p:nvPr/>
+        </p:nvCxnSpPr>
+        <p:spPr>
+          <a:xfrm>
+            <a:off x="4352544" y="4633928"/>
+            <a:ext cx="1558770" cy="0"/>
+          </a:xfrm>
+          <a:prstGeom prst="line">
+            <a:avLst/>
+          </a:prstGeom>
+          <a:ln>
+            <a:solidFill>
+              <a:schemeClr val="accent6">
+                <a:lumMod val="75000"/>
+              </a:schemeClr>
+            </a:solidFill>
+          </a:ln>
+        </p:spPr>
+        <p:style>
+          <a:lnRef idx="2">
+            <a:schemeClr val="accent1"/>
+          </a:lnRef>
+          <a:fillRef idx="0">
+            <a:schemeClr val="accent1"/>
+          </a:fillRef>
+          <a:effectRef idx="1">
+            <a:schemeClr val="accent1"/>
+          </a:effectRef>
+          <a:fontRef idx="minor">
+            <a:schemeClr val="tx1"/>
+          </a:fontRef>
+        </p:style>
+      </p:cxnSp>
+      <p:cxnSp>
+        <p:nvCxnSpPr>
+          <p:cNvPr id="60" name="Straight Arrow Connector 59">
+            <a:extLst>
+              <a:ext uri="{FF2B5EF4-FFF2-40B4-BE49-F238E27FC236}">
+                <a16:creationId xmlns:a16="http://schemas.microsoft.com/office/drawing/2014/main" id="{D3E10998-B886-BED4-FDEE-8934F21CD327}"/>
+              </a:ext>
+            </a:extLst>
+          </p:cNvPr>
+          <p:cNvCxnSpPr>
+            <a:cxnSpLocks/>
+          </p:cNvCxnSpPr>
+          <p:nvPr/>
+        </p:nvCxnSpPr>
+        <p:spPr>
+          <a:xfrm flipH="1">
+            <a:off x="4384290" y="3123760"/>
+            <a:ext cx="1447868" cy="0"/>
+          </a:xfrm>
+          <a:prstGeom prst="straightConnector1">
+            <a:avLst/>
+          </a:prstGeom>
+          <a:ln w="9525">
+            <a:solidFill>
+              <a:srgbClr val="00B050"/>
+            </a:solidFill>
+            <a:prstDash val="sysDash"/>
+            <a:tailEnd type="triangle"/>
+          </a:ln>
+        </p:spPr>
+        <p:style>
+          <a:lnRef idx="2">
+            <a:schemeClr val="accent1"/>
+          </a:lnRef>
+          <a:fillRef idx="0">
+            <a:schemeClr val="accent1"/>
+          </a:fillRef>
+          <a:effectRef idx="1">
+            <a:schemeClr val="accent1"/>
+          </a:effectRef>
+          <a:fontRef idx="minor">
+            <a:schemeClr val="tx1"/>
+          </a:fontRef>
+        </p:style>
+      </p:cxnSp>
+      <p:cxnSp>
+        <p:nvCxnSpPr>
+          <p:cNvPr id="62" name="Straight Arrow Connector 61">
+            <a:extLst>
+              <a:ext uri="{FF2B5EF4-FFF2-40B4-BE49-F238E27FC236}">
+                <a16:creationId xmlns:a16="http://schemas.microsoft.com/office/drawing/2014/main" id="{22C6B17A-A86F-0EDB-5113-FA66728F0F19}"/>
+              </a:ext>
+            </a:extLst>
+          </p:cNvPr>
+          <p:cNvCxnSpPr>
+            <a:cxnSpLocks/>
+          </p:cNvCxnSpPr>
+          <p:nvPr/>
+        </p:nvCxnSpPr>
+        <p:spPr>
+          <a:xfrm flipH="1">
+            <a:off x="3636399" y="3126475"/>
+            <a:ext cx="633849" cy="0"/>
+          </a:xfrm>
+          <a:prstGeom prst="straightConnector1">
+            <a:avLst/>
+          </a:prstGeom>
+          <a:ln w="9525">
+            <a:solidFill>
+              <a:schemeClr val="accent6">
+                <a:lumMod val="75000"/>
+              </a:schemeClr>
+            </a:solidFill>
+            <a:prstDash val="sysDash"/>
+            <a:tailEnd type="triangle"/>
+          </a:ln>
+        </p:spPr>
+        <p:style>
+          <a:lnRef idx="2">
+            <a:schemeClr val="accent1"/>
+          </a:lnRef>
+          <a:fillRef idx="0">
+            <a:schemeClr val="accent1"/>
+          </a:fillRef>
+          <a:effectRef idx="1">
+            <a:schemeClr val="accent1"/>
+          </a:effectRef>
+          <a:fontRef idx="minor">
+            <a:schemeClr val="tx1"/>
+          </a:fontRef>
+        </p:style>
+      </p:cxnSp>
+      <p:cxnSp>
+        <p:nvCxnSpPr>
+          <p:cNvPr id="64" name="Straight Arrow Connector 63">
+            <a:extLst>
+              <a:ext uri="{FF2B5EF4-FFF2-40B4-BE49-F238E27FC236}">
+                <a16:creationId xmlns:a16="http://schemas.microsoft.com/office/drawing/2014/main" id="{DF12E1C7-F180-2C87-AB89-5B131FFD4466}"/>
+              </a:ext>
+            </a:extLst>
+          </p:cNvPr>
+          <p:cNvCxnSpPr>
+            <a:cxnSpLocks/>
+          </p:cNvCxnSpPr>
+          <p:nvPr/>
+        </p:nvCxnSpPr>
+        <p:spPr>
+          <a:xfrm flipH="1">
+            <a:off x="4384290" y="3945763"/>
+            <a:ext cx="1515714" cy="0"/>
+          </a:xfrm>
+          <a:prstGeom prst="straightConnector1">
+            <a:avLst/>
+          </a:prstGeom>
+          <a:ln w="9525">
+            <a:solidFill>
+              <a:srgbClr val="00B050"/>
+            </a:solidFill>
+            <a:prstDash val="sysDash"/>
+            <a:tailEnd type="triangle"/>
+          </a:ln>
+        </p:spPr>
+        <p:style>
+          <a:lnRef idx="2">
+            <a:schemeClr val="accent1"/>
+          </a:lnRef>
+          <a:fillRef idx="0">
+            <a:schemeClr val="accent1"/>
+          </a:fillRef>
+          <a:effectRef idx="1">
+            <a:schemeClr val="accent1"/>
+          </a:effectRef>
+          <a:fontRef idx="minor">
+            <a:schemeClr val="tx1"/>
+          </a:fontRef>
+        </p:style>
+      </p:cxnSp>
+      <p:cxnSp>
+        <p:nvCxnSpPr>
+          <p:cNvPr id="65" name="Straight Arrow Connector 64">
+            <a:extLst>
+              <a:ext uri="{FF2B5EF4-FFF2-40B4-BE49-F238E27FC236}">
+                <a16:creationId xmlns:a16="http://schemas.microsoft.com/office/drawing/2014/main" id="{214D8593-287B-D844-4C63-71FB76C07FFA}"/>
+              </a:ext>
+            </a:extLst>
+          </p:cNvPr>
+          <p:cNvCxnSpPr>
+            <a:cxnSpLocks/>
+          </p:cNvCxnSpPr>
+          <p:nvPr/>
+        </p:nvCxnSpPr>
+        <p:spPr>
+          <a:xfrm flipH="1">
+            <a:off x="3658343" y="3929943"/>
+            <a:ext cx="668483" cy="0"/>
+          </a:xfrm>
+          <a:prstGeom prst="straightConnector1">
+            <a:avLst/>
+          </a:prstGeom>
+          <a:ln w="9525">
+            <a:solidFill>
+              <a:srgbClr val="00B050"/>
+            </a:solidFill>
+            <a:prstDash val="sysDash"/>
+            <a:tailEnd type="triangle"/>
+          </a:ln>
+        </p:spPr>
+        <p:style>
+          <a:lnRef idx="2">
+            <a:schemeClr val="accent1"/>
+          </a:lnRef>
+          <a:fillRef idx="0">
+            <a:schemeClr val="accent1"/>
+          </a:fillRef>
+          <a:effectRef idx="1">
+            <a:schemeClr val="accent1"/>
+          </a:effectRef>
+          <a:fontRef idx="minor">
+            <a:schemeClr val="tx1"/>
+          </a:fontRef>
+        </p:style>
+      </p:cxnSp>
+      <p:cxnSp>
+        <p:nvCxnSpPr>
+          <p:cNvPr id="67" name="Straight Arrow Connector 66">
+            <a:extLst>
+              <a:ext uri="{FF2B5EF4-FFF2-40B4-BE49-F238E27FC236}">
+                <a16:creationId xmlns:a16="http://schemas.microsoft.com/office/drawing/2014/main" id="{F1B191F2-4CC3-A343-51CD-81D05DD2421D}"/>
+              </a:ext>
+            </a:extLst>
+          </p:cNvPr>
+          <p:cNvCxnSpPr>
+            <a:cxnSpLocks/>
+          </p:cNvCxnSpPr>
+          <p:nvPr/>
+        </p:nvCxnSpPr>
+        <p:spPr>
+          <a:xfrm flipV="1">
+            <a:off x="4279392" y="3288922"/>
+            <a:ext cx="0" cy="641021"/>
+          </a:xfrm>
+          <a:prstGeom prst="straightConnector1">
+            <a:avLst/>
+          </a:prstGeom>
+          <a:ln w="9525">
+            <a:solidFill>
+              <a:srgbClr val="00B050"/>
+            </a:solidFill>
+            <a:prstDash val="sysDash"/>
+            <a:tailEnd type="triangle"/>
+          </a:ln>
+        </p:spPr>
+        <p:style>
+          <a:lnRef idx="2">
+            <a:schemeClr val="accent1"/>
+          </a:lnRef>
+          <a:fillRef idx="0">
+            <a:schemeClr val="accent1"/>
+          </a:fillRef>
+          <a:effectRef idx="1">
+            <a:schemeClr val="accent1"/>
+          </a:effectRef>
+          <a:fontRef idx="minor">
+            <a:schemeClr val="tx1"/>
+          </a:fontRef>
+        </p:style>
+      </p:cxnSp>
+      <p:cxnSp>
+        <p:nvCxnSpPr>
+          <p:cNvPr id="71" name="Straight Arrow Connector 70">
+            <a:extLst>
+              <a:ext uri="{FF2B5EF4-FFF2-40B4-BE49-F238E27FC236}">
+                <a16:creationId xmlns:a16="http://schemas.microsoft.com/office/drawing/2014/main" id="{332A0291-6FB8-E23D-36B3-22A00C79A572}"/>
+              </a:ext>
+            </a:extLst>
+          </p:cNvPr>
+          <p:cNvCxnSpPr>
+            <a:cxnSpLocks/>
+          </p:cNvCxnSpPr>
+          <p:nvPr/>
+        </p:nvCxnSpPr>
+        <p:spPr>
+          <a:xfrm flipH="1" flipV="1">
+            <a:off x="3657610" y="3317519"/>
+            <a:ext cx="580893" cy="0"/>
+          </a:xfrm>
+          <a:prstGeom prst="straightConnector1">
+            <a:avLst/>
+          </a:prstGeom>
+          <a:ln w="9525">
+            <a:solidFill>
+              <a:srgbClr val="00B050"/>
+            </a:solidFill>
+            <a:prstDash val="sysDash"/>
+            <a:tailEnd type="triangle"/>
+          </a:ln>
+        </p:spPr>
+        <p:style>
+          <a:lnRef idx="2">
+            <a:schemeClr val="accent1"/>
+          </a:lnRef>
+          <a:fillRef idx="0">
+            <a:schemeClr val="accent1"/>
+          </a:fillRef>
+          <a:effectRef idx="1">
+            <a:schemeClr val="accent1"/>
+          </a:effectRef>
+          <a:fontRef idx="minor">
+            <a:schemeClr val="tx1"/>
+          </a:fontRef>
+        </p:style>
+      </p:cxnSp>
+      <p:cxnSp>
+        <p:nvCxnSpPr>
+          <p:cNvPr id="77" name="Straight Arrow Connector 76">
+            <a:extLst>
+              <a:ext uri="{FF2B5EF4-FFF2-40B4-BE49-F238E27FC236}">
+                <a16:creationId xmlns:a16="http://schemas.microsoft.com/office/drawing/2014/main" id="{06CBBFD1-2A69-2BBD-2E79-D2944A95B29B}"/>
+              </a:ext>
+            </a:extLst>
+          </p:cNvPr>
+          <p:cNvCxnSpPr>
+            <a:cxnSpLocks/>
+          </p:cNvCxnSpPr>
+          <p:nvPr/>
+        </p:nvCxnSpPr>
+        <p:spPr>
+          <a:xfrm flipH="1">
+            <a:off x="5070923" y="4843273"/>
+            <a:ext cx="840864" cy="0"/>
+          </a:xfrm>
+          <a:prstGeom prst="straightConnector1">
+            <a:avLst/>
+          </a:prstGeom>
+          <a:ln w="9525">
+            <a:solidFill>
+              <a:srgbClr val="0070C0"/>
+            </a:solidFill>
+            <a:prstDash val="sysDash"/>
+            <a:tailEnd type="triangle"/>
+          </a:ln>
+        </p:spPr>
+        <p:style>
+          <a:lnRef idx="2">
+            <a:schemeClr val="accent1"/>
+          </a:lnRef>
+          <a:fillRef idx="0">
+            <a:schemeClr val="accent1"/>
+          </a:fillRef>
+          <a:effectRef idx="1">
+            <a:schemeClr val="accent1"/>
+          </a:effectRef>
+          <a:fontRef idx="minor">
+            <a:schemeClr val="tx1"/>
+          </a:fontRef>
+        </p:style>
+      </p:cxnSp>
+      <p:cxnSp>
+        <p:nvCxnSpPr>
+          <p:cNvPr id="80" name="Straight Arrow Connector 79">
+            <a:extLst>
+              <a:ext uri="{FF2B5EF4-FFF2-40B4-BE49-F238E27FC236}">
+                <a16:creationId xmlns:a16="http://schemas.microsoft.com/office/drawing/2014/main" id="{E72A199A-DF02-07C6-DF8D-F6C58493DC32}"/>
+              </a:ext>
+            </a:extLst>
+          </p:cNvPr>
+          <p:cNvCxnSpPr>
+            <a:cxnSpLocks/>
+          </p:cNvCxnSpPr>
+          <p:nvPr/>
+        </p:nvCxnSpPr>
+        <p:spPr>
+          <a:xfrm flipH="1">
+            <a:off x="3657610" y="4871405"/>
+            <a:ext cx="1289984" cy="0"/>
+          </a:xfrm>
+          <a:prstGeom prst="straightConnector1">
+            <a:avLst/>
+          </a:prstGeom>
+          <a:ln w="9525">
+            <a:solidFill>
+              <a:srgbClr val="0070C0"/>
+            </a:solidFill>
+            <a:prstDash val="sysDash"/>
+            <a:tailEnd type="triangle"/>
+          </a:ln>
+        </p:spPr>
+        <p:style>
+          <a:lnRef idx="2">
+            <a:schemeClr val="accent1"/>
+          </a:lnRef>
+          <a:fillRef idx="0">
+            <a:schemeClr val="accent1"/>
+          </a:fillRef>
+          <a:effectRef idx="1">
+            <a:schemeClr val="accent1"/>
+          </a:effectRef>
+          <a:fontRef idx="minor">
+            <a:schemeClr val="tx1"/>
+          </a:fontRef>
+        </p:style>
+      </p:cxnSp>
+      <p:cxnSp>
+        <p:nvCxnSpPr>
+          <p:cNvPr id="83" name="Straight Arrow Connector 82">
+            <a:extLst>
+              <a:ext uri="{FF2B5EF4-FFF2-40B4-BE49-F238E27FC236}">
+                <a16:creationId xmlns:a16="http://schemas.microsoft.com/office/drawing/2014/main" id="{F0E5A962-352A-0266-9ADC-50B764C28829}"/>
+              </a:ext>
+            </a:extLst>
+          </p:cNvPr>
+          <p:cNvCxnSpPr>
+            <a:cxnSpLocks/>
+          </p:cNvCxnSpPr>
+          <p:nvPr/>
+        </p:nvCxnSpPr>
+        <p:spPr>
+          <a:xfrm flipH="1">
+            <a:off x="4374072" y="4712367"/>
+            <a:ext cx="1515714" cy="0"/>
+          </a:xfrm>
+          <a:prstGeom prst="straightConnector1">
+            <a:avLst/>
+          </a:prstGeom>
+          <a:ln w="9525">
+            <a:solidFill>
+              <a:schemeClr val="tx1"/>
+            </a:solidFill>
+            <a:prstDash val="sysDash"/>
+            <a:tailEnd type="triangle"/>
+          </a:ln>
+        </p:spPr>
+        <p:style>
+          <a:lnRef idx="2">
+            <a:schemeClr val="accent1"/>
+          </a:lnRef>
+          <a:fillRef idx="0">
+            <a:schemeClr val="accent1"/>
+          </a:fillRef>
+          <a:effectRef idx="1">
+            <a:schemeClr val="accent1"/>
+          </a:effectRef>
+          <a:fontRef idx="minor">
+            <a:schemeClr val="tx1"/>
+          </a:fontRef>
+        </p:style>
+      </p:cxnSp>
+      <p:cxnSp>
+        <p:nvCxnSpPr>
+          <p:cNvPr id="84" name="Straight Arrow Connector 83">
+            <a:extLst>
+              <a:ext uri="{FF2B5EF4-FFF2-40B4-BE49-F238E27FC236}">
+                <a16:creationId xmlns:a16="http://schemas.microsoft.com/office/drawing/2014/main" id="{E39B0937-3557-E7AE-FB2D-2BC5AAB50FD7}"/>
+              </a:ext>
+            </a:extLst>
+          </p:cNvPr>
+          <p:cNvCxnSpPr>
+            <a:cxnSpLocks/>
+          </p:cNvCxnSpPr>
+          <p:nvPr/>
+        </p:nvCxnSpPr>
+        <p:spPr>
+          <a:xfrm flipV="1">
+            <a:off x="4276344" y="4083215"/>
+            <a:ext cx="0" cy="641021"/>
+          </a:xfrm>
+          <a:prstGeom prst="straightConnector1">
+            <a:avLst/>
+          </a:prstGeom>
+          <a:ln w="9525">
+            <a:solidFill>
+              <a:schemeClr val="tx1"/>
+            </a:solidFill>
+            <a:prstDash val="sysDash"/>
+            <a:tailEnd type="triangle"/>
+          </a:ln>
+        </p:spPr>
+        <p:style>
+          <a:lnRef idx="2">
+            <a:schemeClr val="accent1"/>
+          </a:lnRef>
+          <a:fillRef idx="0">
+            <a:schemeClr val="accent1"/>
+          </a:fillRef>
+          <a:effectRef idx="1">
+            <a:schemeClr val="accent1"/>
+          </a:effectRef>
+          <a:fontRef idx="minor">
+            <a:schemeClr val="tx1"/>
+          </a:fontRef>
+        </p:style>
+      </p:cxnSp>
+      <p:cxnSp>
+        <p:nvCxnSpPr>
+          <p:cNvPr id="85" name="Straight Arrow Connector 84">
+            <a:extLst>
+              <a:ext uri="{FF2B5EF4-FFF2-40B4-BE49-F238E27FC236}">
+                <a16:creationId xmlns:a16="http://schemas.microsoft.com/office/drawing/2014/main" id="{0542FAAB-109D-1BFA-672C-609374F2E666}"/>
+              </a:ext>
+            </a:extLst>
+          </p:cNvPr>
+          <p:cNvCxnSpPr>
+            <a:cxnSpLocks/>
+          </p:cNvCxnSpPr>
+          <p:nvPr/>
+        </p:nvCxnSpPr>
+        <p:spPr>
+          <a:xfrm flipH="1">
+            <a:off x="3638498" y="4083215"/>
+            <a:ext cx="668483" cy="0"/>
+          </a:xfrm>
+          <a:prstGeom prst="straightConnector1">
+            <a:avLst/>
+          </a:prstGeom>
+          <a:ln w="9525">
+            <a:solidFill>
+              <a:schemeClr val="tx1"/>
+            </a:solidFill>
+            <a:prstDash val="sysDash"/>
+            <a:tailEnd type="triangle"/>
+          </a:ln>
+        </p:spPr>
+        <p:style>
+          <a:lnRef idx="2">
+            <a:schemeClr val="accent1"/>
+          </a:lnRef>
+          <a:fillRef idx="0">
+            <a:schemeClr val="accent1"/>
+          </a:fillRef>
+          <a:effectRef idx="1">
+            <a:schemeClr val="accent1"/>
+          </a:effectRef>
+          <a:fontRef idx="minor">
+            <a:schemeClr val="tx1"/>
+          </a:fontRef>
+        </p:style>
+      </p:cxnSp>
+      <p:pic>
+        <p:nvPicPr>
+          <p:cNvPr id="88" name="Picture 87">
+            <a:extLst>
+              <a:ext uri="{FF2B5EF4-FFF2-40B4-BE49-F238E27FC236}">
+                <a16:creationId xmlns:a16="http://schemas.microsoft.com/office/drawing/2014/main" id="{9075882E-C20F-E264-DE0A-7B90DC45239F}"/>
+              </a:ext>
+            </a:extLst>
+          </p:cNvPr>
+          <p:cNvPicPr>
+            <a:picLocks noChangeAspect="1"/>
+          </p:cNvPicPr>
+          <p:nvPr/>
+        </p:nvPicPr>
+        <p:blipFill>
+          <a:blip r:embed="rId6"/>
+          <a:stretch>
+            <a:fillRect/>
+          </a:stretch>
+        </p:blipFill>
+        <p:spPr>
+          <a:xfrm>
+            <a:off x="5108224" y="745743"/>
+            <a:ext cx="485714" cy="538509"/>
+          </a:xfrm>
+          <a:prstGeom prst="rect">
+            <a:avLst/>
+          </a:prstGeom>
+          <a:ln w="9525">
+            <a:solidFill>
+              <a:schemeClr val="tx1"/>
+            </a:solidFill>
+          </a:ln>
+        </p:spPr>
+      </p:pic>
     </p:spTree>
     <p:extLst>
       <p:ext uri="{BB962C8B-B14F-4D97-AF65-F5344CB8AC3E}">

</xml_diff>

<commit_message>
Update the design document and the s7comm emulator module.
</commit_message>
<xml_diff>
--- a/doc/designDoc.pptx
+++ b/doc/designDoc.pptx
@@ -263,7 +263,7 @@
           <a:p>
             <a:fld id="{E7602038-B3F0-4825-ABDA-D66CE1C4CFDA}" type="datetimeFigureOut">
               <a:rPr lang="en-SG" smtClean="0"/>
-              <a:t>15/11/2024</a:t>
+              <a:t>18/11/2024</a:t>
             </a:fld>
             <a:endParaRPr lang="en-SG"/>
           </a:p>
@@ -463,7 +463,7 @@
           <a:p>
             <a:fld id="{E7602038-B3F0-4825-ABDA-D66CE1C4CFDA}" type="datetimeFigureOut">
               <a:rPr lang="en-SG" smtClean="0"/>
-              <a:t>15/11/2024</a:t>
+              <a:t>18/11/2024</a:t>
             </a:fld>
             <a:endParaRPr lang="en-SG"/>
           </a:p>
@@ -673,7 +673,7 @@
           <a:p>
             <a:fld id="{E7602038-B3F0-4825-ABDA-D66CE1C4CFDA}" type="datetimeFigureOut">
               <a:rPr lang="en-SG" smtClean="0"/>
-              <a:t>15/11/2024</a:t>
+              <a:t>18/11/2024</a:t>
             </a:fld>
             <a:endParaRPr lang="en-SG"/>
           </a:p>
@@ -873,7 +873,7 @@
           <a:p>
             <a:fld id="{E7602038-B3F0-4825-ABDA-D66CE1C4CFDA}" type="datetimeFigureOut">
               <a:rPr lang="en-SG" smtClean="0"/>
-              <a:t>15/11/2024</a:t>
+              <a:t>18/11/2024</a:t>
             </a:fld>
             <a:endParaRPr lang="en-SG"/>
           </a:p>
@@ -1149,7 +1149,7 @@
           <a:p>
             <a:fld id="{E7602038-B3F0-4825-ABDA-D66CE1C4CFDA}" type="datetimeFigureOut">
               <a:rPr lang="en-SG" smtClean="0"/>
-              <a:t>15/11/2024</a:t>
+              <a:t>18/11/2024</a:t>
             </a:fld>
             <a:endParaRPr lang="en-SG"/>
           </a:p>
@@ -1417,7 +1417,7 @@
           <a:p>
             <a:fld id="{E7602038-B3F0-4825-ABDA-D66CE1C4CFDA}" type="datetimeFigureOut">
               <a:rPr lang="en-SG" smtClean="0"/>
-              <a:t>15/11/2024</a:t>
+              <a:t>18/11/2024</a:t>
             </a:fld>
             <a:endParaRPr lang="en-SG"/>
           </a:p>
@@ -1832,7 +1832,7 @@
           <a:p>
             <a:fld id="{E7602038-B3F0-4825-ABDA-D66CE1C4CFDA}" type="datetimeFigureOut">
               <a:rPr lang="en-SG" smtClean="0"/>
-              <a:t>15/11/2024</a:t>
+              <a:t>18/11/2024</a:t>
             </a:fld>
             <a:endParaRPr lang="en-SG"/>
           </a:p>
@@ -1974,7 +1974,7 @@
           <a:p>
             <a:fld id="{E7602038-B3F0-4825-ABDA-D66CE1C4CFDA}" type="datetimeFigureOut">
               <a:rPr lang="en-SG" smtClean="0"/>
-              <a:t>15/11/2024</a:t>
+              <a:t>18/11/2024</a:t>
             </a:fld>
             <a:endParaRPr lang="en-SG"/>
           </a:p>
@@ -2087,7 +2087,7 @@
           <a:p>
             <a:fld id="{E7602038-B3F0-4825-ABDA-D66CE1C4CFDA}" type="datetimeFigureOut">
               <a:rPr lang="en-SG" smtClean="0"/>
-              <a:t>15/11/2024</a:t>
+              <a:t>18/11/2024</a:t>
             </a:fld>
             <a:endParaRPr lang="en-SG"/>
           </a:p>
@@ -2400,7 +2400,7 @@
           <a:p>
             <a:fld id="{E7602038-B3F0-4825-ABDA-D66CE1C4CFDA}" type="datetimeFigureOut">
               <a:rPr lang="en-SG" smtClean="0"/>
-              <a:t>15/11/2024</a:t>
+              <a:t>18/11/2024</a:t>
             </a:fld>
             <a:endParaRPr lang="en-SG"/>
           </a:p>
@@ -2689,7 +2689,7 @@
           <a:p>
             <a:fld id="{E7602038-B3F0-4825-ABDA-D66CE1C4CFDA}" type="datetimeFigureOut">
               <a:rPr lang="en-SG" smtClean="0"/>
-              <a:t>15/11/2024</a:t>
+              <a:t>18/11/2024</a:t>
             </a:fld>
             <a:endParaRPr lang="en-SG"/>
           </a:p>
@@ -2932,7 +2932,7 @@
           <a:p>
             <a:fld id="{E7602038-B3F0-4825-ABDA-D66CE1C4CFDA}" type="datetimeFigureOut">
               <a:rPr lang="en-SG" smtClean="0"/>
-              <a:t>15/11/2024</a:t>
+              <a:t>18/11/2024</a:t>
             </a:fld>
             <a:endParaRPr lang="en-SG"/>
           </a:p>

</xml_diff>

<commit_message>
update the controller to version v_0.1.3
</commit_message>
<xml_diff>
--- a/doc/designDoc.pptx
+++ b/doc/designDoc.pptx
@@ -6769,7 +6769,7 @@
         </p:nvSpPr>
         <p:spPr>
           <a:xfrm>
-            <a:off x="2341772" y="1912690"/>
+            <a:off x="2363038" y="1508653"/>
             <a:ext cx="1324292" cy="3427406"/>
           </a:xfrm>
           <a:prstGeom prst="roundRect">
@@ -6850,7 +6850,7 @@
         </p:nvSpPr>
         <p:spPr>
           <a:xfrm>
-            <a:off x="5741167" y="1912690"/>
+            <a:off x="5762433" y="1508653"/>
             <a:ext cx="1453201" cy="3427406"/>
           </a:xfrm>
           <a:prstGeom prst="roundRect">
@@ -6933,7 +6933,7 @@
         </p:nvSpPr>
         <p:spPr>
           <a:xfrm>
-            <a:off x="2398241" y="2020858"/>
+            <a:off x="2419507" y="1616821"/>
             <a:ext cx="1324292" cy="738664"/>
           </a:xfrm>
           <a:prstGeom prst="rect">
@@ -7069,7 +7069,7 @@
         </p:nvSpPr>
         <p:spPr>
           <a:xfrm>
-            <a:off x="5797636" y="2020858"/>
+            <a:off x="5818902" y="1616821"/>
             <a:ext cx="1391555" cy="738664"/>
           </a:xfrm>
           <a:prstGeom prst="rect">
@@ -7219,7 +7219,7 @@
         </p:blipFill>
         <p:spPr>
           <a:xfrm>
-            <a:off x="3060387" y="2938674"/>
+            <a:off x="3081653" y="2534637"/>
             <a:ext cx="553020" cy="560840"/>
           </a:xfrm>
           <a:prstGeom prst="rect">
@@ -7246,7 +7246,7 @@
         </p:nvSpPr>
         <p:spPr>
           <a:xfrm>
-            <a:off x="2313537" y="2928349"/>
+            <a:off x="2334803" y="2524312"/>
             <a:ext cx="800310" cy="430887"/>
           </a:xfrm>
           <a:prstGeom prst="rect">
@@ -7339,7 +7339,7 @@
         </p:blipFill>
         <p:spPr>
           <a:xfrm>
-            <a:off x="3064118" y="4527404"/>
+            <a:off x="3085384" y="4123367"/>
             <a:ext cx="568419" cy="560840"/>
           </a:xfrm>
           <a:prstGeom prst="rect">
@@ -7374,7 +7374,7 @@
         </p:blipFill>
         <p:spPr>
           <a:xfrm>
-            <a:off x="3071818" y="3733039"/>
+            <a:off x="3093084" y="3329002"/>
             <a:ext cx="553020" cy="560840"/>
           </a:xfrm>
           <a:prstGeom prst="rect">
@@ -7401,7 +7401,7 @@
         </p:nvSpPr>
         <p:spPr>
           <a:xfrm>
-            <a:off x="2302288" y="3752092"/>
+            <a:off x="2323554" y="3348055"/>
             <a:ext cx="800310" cy="430887"/>
           </a:xfrm>
           <a:prstGeom prst="rect">
@@ -7486,7 +7486,7 @@
         </p:nvSpPr>
         <p:spPr>
           <a:xfrm>
-            <a:off x="2285303" y="4546094"/>
+            <a:off x="2306569" y="4142057"/>
             <a:ext cx="856779" cy="430887"/>
           </a:xfrm>
           <a:prstGeom prst="rect">
@@ -7588,7 +7588,7 @@
         </p:blipFill>
         <p:spPr>
           <a:xfrm>
-            <a:off x="5911315" y="2917461"/>
+            <a:off x="5932581" y="2513424"/>
             <a:ext cx="540829" cy="540829"/>
           </a:xfrm>
           <a:prstGeom prst="rect">
@@ -7610,7 +7610,7 @@
         </p:nvSpPr>
         <p:spPr>
           <a:xfrm>
-            <a:off x="6406896" y="2858126"/>
+            <a:off x="6428162" y="2454089"/>
             <a:ext cx="908304" cy="600164"/>
           </a:xfrm>
           <a:prstGeom prst="rect">
@@ -7734,7 +7734,7 @@
         </p:blipFill>
         <p:spPr>
           <a:xfrm>
-            <a:off x="5911314" y="3642150"/>
+            <a:off x="5932580" y="3238113"/>
             <a:ext cx="540829" cy="540829"/>
           </a:xfrm>
           <a:prstGeom prst="rect">
@@ -7756,7 +7756,7 @@
         </p:nvSpPr>
         <p:spPr>
           <a:xfrm>
-            <a:off x="6430040" y="3582815"/>
+            <a:off x="6451306" y="3178778"/>
             <a:ext cx="908304" cy="600164"/>
           </a:xfrm>
           <a:prstGeom prst="rect">
@@ -7870,7 +7870,7 @@
         </p:blipFill>
         <p:spPr>
           <a:xfrm>
-            <a:off x="5900004" y="4403726"/>
+            <a:off x="5921270" y="3999689"/>
             <a:ext cx="540829" cy="540829"/>
           </a:xfrm>
           <a:prstGeom prst="rect">
@@ -7892,7 +7892,7 @@
         </p:nvSpPr>
         <p:spPr>
           <a:xfrm>
-            <a:off x="6363449" y="4366839"/>
+            <a:off x="6384715" y="3962802"/>
             <a:ext cx="989756" cy="769441"/>
           </a:xfrm>
           <a:prstGeom prst="rect">
@@ -7991,7 +7991,7 @@
         </p:nvCxnSpPr>
         <p:spPr>
           <a:xfrm>
-            <a:off x="4352544" y="2390190"/>
+            <a:off x="4373810" y="1986153"/>
             <a:ext cx="0" cy="2831034"/>
           </a:xfrm>
           <a:prstGeom prst="line">
@@ -8036,7 +8036,7 @@
         </p:nvCxnSpPr>
         <p:spPr>
           <a:xfrm>
-            <a:off x="5062728" y="2390190"/>
+            <a:off x="5083994" y="1986153"/>
             <a:ext cx="0" cy="2831034"/>
           </a:xfrm>
           <a:prstGeom prst="line">
@@ -8077,7 +8077,7 @@
         </p:nvSpPr>
         <p:spPr>
           <a:xfrm>
-            <a:off x="3972740" y="5221699"/>
+            <a:off x="3994006" y="4817662"/>
             <a:ext cx="823100" cy="430887"/>
           </a:xfrm>
           <a:prstGeom prst="rect">
@@ -8160,7 +8160,7 @@
         </p:nvSpPr>
         <p:spPr>
           <a:xfrm>
-            <a:off x="4797235" y="5221699"/>
+            <a:off x="4818501" y="4817662"/>
             <a:ext cx="823100" cy="430887"/>
           </a:xfrm>
           <a:prstGeom prst="rect">
@@ -8241,7 +8241,7 @@
         </p:nvCxnSpPr>
         <p:spPr>
           <a:xfrm>
-            <a:off x="3632537" y="3219094"/>
+            <a:off x="3653803" y="2815057"/>
             <a:ext cx="727797" cy="0"/>
           </a:xfrm>
           <a:prstGeom prst="line">
@@ -8287,7 +8287,7 @@
         </p:nvCxnSpPr>
         <p:spPr>
           <a:xfrm>
-            <a:off x="3624838" y="4013459"/>
+            <a:off x="3646104" y="3609422"/>
             <a:ext cx="735495" cy="0"/>
           </a:xfrm>
           <a:prstGeom prst="line">
@@ -8332,7 +8332,7 @@
         </p:nvCxnSpPr>
         <p:spPr>
           <a:xfrm>
-            <a:off x="4341234" y="3187875"/>
+            <a:off x="4362500" y="2783838"/>
             <a:ext cx="1558770" cy="0"/>
           </a:xfrm>
           <a:prstGeom prst="line">
@@ -8377,7 +8377,7 @@
         </p:nvCxnSpPr>
         <p:spPr>
           <a:xfrm>
-            <a:off x="4360333" y="3876468"/>
+            <a:off x="4381599" y="3472431"/>
             <a:ext cx="1558770" cy="0"/>
           </a:xfrm>
           <a:prstGeom prst="line">
@@ -8422,7 +8422,7 @@
         </p:nvCxnSpPr>
         <p:spPr>
           <a:xfrm>
-            <a:off x="3662341" y="4807824"/>
+            <a:off x="3683607" y="4403787"/>
             <a:ext cx="1400387" cy="0"/>
           </a:xfrm>
           <a:prstGeom prst="line">
@@ -8468,7 +8468,7 @@
         </p:nvCxnSpPr>
         <p:spPr>
           <a:xfrm>
-            <a:off x="5062728" y="4762259"/>
+            <a:off x="5083994" y="4358222"/>
             <a:ext cx="867347" cy="0"/>
           </a:xfrm>
           <a:prstGeom prst="line">
@@ -8514,7 +8514,7 @@
         </p:nvCxnSpPr>
         <p:spPr>
           <a:xfrm>
-            <a:off x="4352544" y="4633928"/>
+            <a:off x="4373810" y="4229891"/>
             <a:ext cx="1558770" cy="0"/>
           </a:xfrm>
           <a:prstGeom prst="line">
@@ -8559,7 +8559,7 @@
         </p:nvCxnSpPr>
         <p:spPr>
           <a:xfrm flipH="1">
-            <a:off x="4384290" y="3123760"/>
+            <a:off x="4405556" y="2719723"/>
             <a:ext cx="1447868" cy="0"/>
           </a:xfrm>
           <a:prstGeom prst="straightConnector1">
@@ -8604,7 +8604,7 @@
         </p:nvCxnSpPr>
         <p:spPr>
           <a:xfrm flipH="1">
-            <a:off x="3636399" y="3126475"/>
+            <a:off x="3657665" y="2722438"/>
             <a:ext cx="633849" cy="0"/>
           </a:xfrm>
           <a:prstGeom prst="straightConnector1">
@@ -8651,7 +8651,7 @@
         </p:nvCxnSpPr>
         <p:spPr>
           <a:xfrm flipH="1">
-            <a:off x="4384290" y="3945763"/>
+            <a:off x="4405556" y="3541726"/>
             <a:ext cx="1515714" cy="0"/>
           </a:xfrm>
           <a:prstGeom prst="straightConnector1">
@@ -8696,7 +8696,7 @@
         </p:nvCxnSpPr>
         <p:spPr>
           <a:xfrm flipH="1">
-            <a:off x="3658343" y="3929943"/>
+            <a:off x="3679609" y="3525906"/>
             <a:ext cx="668483" cy="0"/>
           </a:xfrm>
           <a:prstGeom prst="straightConnector1">
@@ -8741,7 +8741,7 @@
         </p:nvCxnSpPr>
         <p:spPr>
           <a:xfrm flipV="1">
-            <a:off x="4279392" y="3288922"/>
+            <a:off x="4300658" y="2884885"/>
             <a:ext cx="0" cy="641021"/>
           </a:xfrm>
           <a:prstGeom prst="straightConnector1">
@@ -8786,7 +8786,7 @@
         </p:nvCxnSpPr>
         <p:spPr>
           <a:xfrm flipH="1" flipV="1">
-            <a:off x="3657610" y="3317519"/>
+            <a:off x="3678876" y="2913482"/>
             <a:ext cx="580893" cy="0"/>
           </a:xfrm>
           <a:prstGeom prst="straightConnector1">
@@ -8831,7 +8831,7 @@
         </p:nvCxnSpPr>
         <p:spPr>
           <a:xfrm flipH="1">
-            <a:off x="5070923" y="4843273"/>
+            <a:off x="5092189" y="4439236"/>
             <a:ext cx="840864" cy="0"/>
           </a:xfrm>
           <a:prstGeom prst="straightConnector1">
@@ -8876,7 +8876,7 @@
         </p:nvCxnSpPr>
         <p:spPr>
           <a:xfrm flipH="1">
-            <a:off x="3657610" y="4871405"/>
+            <a:off x="3678876" y="4467368"/>
             <a:ext cx="1289984" cy="0"/>
           </a:xfrm>
           <a:prstGeom prst="straightConnector1">
@@ -8921,7 +8921,7 @@
         </p:nvCxnSpPr>
         <p:spPr>
           <a:xfrm flipH="1">
-            <a:off x="4374072" y="4712367"/>
+            <a:off x="4395338" y="4308330"/>
             <a:ext cx="1515714" cy="0"/>
           </a:xfrm>
           <a:prstGeom prst="straightConnector1">
@@ -8966,7 +8966,7 @@
         </p:nvCxnSpPr>
         <p:spPr>
           <a:xfrm flipV="1">
-            <a:off x="4276344" y="4083215"/>
+            <a:off x="4297610" y="3679178"/>
             <a:ext cx="0" cy="641021"/>
           </a:xfrm>
           <a:prstGeom prst="straightConnector1">
@@ -9011,7 +9011,7 @@
         </p:nvCxnSpPr>
         <p:spPr>
           <a:xfrm flipH="1">
-            <a:off x="3638498" y="4083215"/>
+            <a:off x="3659764" y="3679178"/>
             <a:ext cx="668483" cy="0"/>
           </a:xfrm>
           <a:prstGeom prst="straightConnector1">
@@ -9062,7 +9062,7 @@
         </p:blipFill>
         <p:spPr>
           <a:xfrm>
-            <a:off x="5108224" y="745743"/>
+            <a:off x="4965928" y="426766"/>
             <a:ext cx="485714" cy="538509"/>
           </a:xfrm>
           <a:prstGeom prst="rect">

</xml_diff>

<commit_message>
Update the PLC simulator and update the read me introduction section.
</commit_message>
<xml_diff>
--- a/doc/designDoc.pptx
+++ b/doc/designDoc.pptx
@@ -7210,7 +7210,7 @@
         </p:nvCxnSpPr>
         <p:spPr>
           <a:xfrm flipH="1">
-            <a:off x="7061465" y="1611187"/>
+            <a:off x="7061465" y="1932728"/>
             <a:ext cx="0" cy="924467"/>
           </a:xfrm>
           <a:prstGeom prst="straightConnector1">
@@ -7253,7 +7253,7 @@
         </p:nvSpPr>
         <p:spPr>
           <a:xfrm>
-            <a:off x="9035233" y="1731249"/>
+            <a:off x="9035233" y="2052790"/>
             <a:ext cx="2271981" cy="4388326"/>
           </a:xfrm>
           <a:prstGeom prst="rect">
@@ -7306,7 +7306,7 @@
         </p:nvSpPr>
         <p:spPr>
           <a:xfrm>
-            <a:off x="7506584" y="1945356"/>
+            <a:off x="7506584" y="2266897"/>
             <a:ext cx="1351663" cy="3288716"/>
           </a:xfrm>
           <a:prstGeom prst="roundRect">
@@ -7358,7 +7358,7 @@
         </p:nvSpPr>
         <p:spPr>
           <a:xfrm>
-            <a:off x="1196115" y="1925538"/>
+            <a:off x="1196115" y="2247079"/>
             <a:ext cx="1324292" cy="3353788"/>
           </a:xfrm>
           <a:prstGeom prst="roundRect">
@@ -7439,7 +7439,7 @@
         </p:nvSpPr>
         <p:spPr>
           <a:xfrm>
-            <a:off x="5218550" y="1925538"/>
+            <a:off x="5218550" y="2247079"/>
             <a:ext cx="1453201" cy="3353787"/>
           </a:xfrm>
           <a:prstGeom prst="roundRect">
@@ -7522,7 +7522,7 @@
         </p:nvSpPr>
         <p:spPr>
           <a:xfrm>
-            <a:off x="1252584" y="2033706"/>
+            <a:off x="1252584" y="2355247"/>
             <a:ext cx="1324292" cy="738664"/>
           </a:xfrm>
           <a:prstGeom prst="rect">
@@ -7658,7 +7658,7 @@
         </p:nvSpPr>
         <p:spPr>
           <a:xfrm>
-            <a:off x="5275019" y="2033706"/>
+            <a:off x="5275019" y="2355247"/>
             <a:ext cx="1391555" cy="738664"/>
           </a:xfrm>
           <a:prstGeom prst="rect">
@@ -7808,7 +7808,7 @@
         </p:blipFill>
         <p:spPr>
           <a:xfrm>
-            <a:off x="1914730" y="2951522"/>
+            <a:off x="1914730" y="3273063"/>
             <a:ext cx="553020" cy="560840"/>
           </a:xfrm>
           <a:prstGeom prst="rect">
@@ -7835,7 +7835,7 @@
         </p:nvSpPr>
         <p:spPr>
           <a:xfrm>
-            <a:off x="1167880" y="2941197"/>
+            <a:off x="1167880" y="3262738"/>
             <a:ext cx="800310" cy="430887"/>
           </a:xfrm>
           <a:prstGeom prst="rect">
@@ -7928,7 +7928,7 @@
         </p:blipFill>
         <p:spPr>
           <a:xfrm>
-            <a:off x="1918461" y="4540252"/>
+            <a:off x="1918461" y="4861793"/>
             <a:ext cx="568419" cy="560840"/>
           </a:xfrm>
           <a:prstGeom prst="rect">
@@ -7963,7 +7963,7 @@
         </p:blipFill>
         <p:spPr>
           <a:xfrm>
-            <a:off x="1926161" y="3745887"/>
+            <a:off x="1926161" y="4067428"/>
             <a:ext cx="553020" cy="560840"/>
           </a:xfrm>
           <a:prstGeom prst="rect">
@@ -7990,7 +7990,7 @@
         </p:nvSpPr>
         <p:spPr>
           <a:xfrm>
-            <a:off x="1156631" y="3764940"/>
+            <a:off x="1156631" y="4086481"/>
             <a:ext cx="800310" cy="430887"/>
           </a:xfrm>
           <a:prstGeom prst="rect">
@@ -8075,7 +8075,7 @@
         </p:nvSpPr>
         <p:spPr>
           <a:xfrm>
-            <a:off x="1139646" y="4558942"/>
+            <a:off x="1139646" y="4880483"/>
             <a:ext cx="856779" cy="430887"/>
           </a:xfrm>
           <a:prstGeom prst="rect">
@@ -8177,7 +8177,7 @@
         </p:blipFill>
         <p:spPr>
           <a:xfrm>
-            <a:off x="5388698" y="2930309"/>
+            <a:off x="5388698" y="3251850"/>
             <a:ext cx="540829" cy="540829"/>
           </a:xfrm>
           <a:prstGeom prst="rect">
@@ -8199,7 +8199,7 @@
         </p:nvSpPr>
         <p:spPr>
           <a:xfrm>
-            <a:off x="5872203" y="2840335"/>
+            <a:off x="5872203" y="3161876"/>
             <a:ext cx="908304" cy="600164"/>
           </a:xfrm>
           <a:prstGeom prst="rect">
@@ -8323,7 +8323,7 @@
         </p:blipFill>
         <p:spPr>
           <a:xfrm>
-            <a:off x="5388697" y="3654998"/>
+            <a:off x="5388697" y="3976539"/>
             <a:ext cx="540829" cy="540829"/>
           </a:xfrm>
           <a:prstGeom prst="rect">
@@ -8345,7 +8345,7 @@
         </p:nvSpPr>
         <p:spPr>
           <a:xfrm>
-            <a:off x="5907423" y="3595663"/>
+            <a:off x="5907423" y="3917204"/>
             <a:ext cx="908304" cy="600164"/>
           </a:xfrm>
           <a:prstGeom prst="rect">
@@ -8459,7 +8459,7 @@
         </p:blipFill>
         <p:spPr>
           <a:xfrm>
-            <a:off x="5385581" y="4493992"/>
+            <a:off x="5385581" y="4815533"/>
             <a:ext cx="540829" cy="540829"/>
           </a:xfrm>
           <a:prstGeom prst="rect">
@@ -8481,7 +8481,7 @@
         </p:nvSpPr>
         <p:spPr>
           <a:xfrm>
-            <a:off x="5884279" y="4332495"/>
+            <a:off x="5884279" y="4654036"/>
             <a:ext cx="989756" cy="769441"/>
           </a:xfrm>
           <a:prstGeom prst="rect">
@@ -8580,7 +8580,7 @@
         </p:nvCxnSpPr>
         <p:spPr>
           <a:xfrm>
-            <a:off x="3206887" y="2403038"/>
+            <a:off x="3206887" y="2724579"/>
             <a:ext cx="0" cy="2831034"/>
           </a:xfrm>
           <a:prstGeom prst="line">
@@ -8625,7 +8625,7 @@
         </p:nvCxnSpPr>
         <p:spPr>
           <a:xfrm>
-            <a:off x="4520277" y="2403038"/>
+            <a:off x="4520277" y="2724579"/>
             <a:ext cx="0" cy="2831034"/>
           </a:xfrm>
           <a:prstGeom prst="line">
@@ -8666,7 +8666,7 @@
         </p:nvSpPr>
         <p:spPr>
           <a:xfrm>
-            <a:off x="2486880" y="4894885"/>
+            <a:off x="2486880" y="5216426"/>
             <a:ext cx="823100" cy="461665"/>
           </a:xfrm>
           <a:prstGeom prst="rect">
@@ -8749,7 +8749,7 @@
         </p:nvSpPr>
         <p:spPr>
           <a:xfrm>
-            <a:off x="4515710" y="4874131"/>
+            <a:off x="4515710" y="5195672"/>
             <a:ext cx="823100" cy="461665"/>
           </a:xfrm>
           <a:prstGeom prst="rect">
@@ -8830,7 +8830,7 @@
         </p:nvCxnSpPr>
         <p:spPr>
           <a:xfrm>
-            <a:off x="2486880" y="3279567"/>
+            <a:off x="2486880" y="3601108"/>
             <a:ext cx="727797" cy="0"/>
           </a:xfrm>
           <a:prstGeom prst="line">
@@ -8876,7 +8876,7 @@
         </p:nvCxnSpPr>
         <p:spPr>
           <a:xfrm>
-            <a:off x="2479181" y="4026307"/>
+            <a:off x="2479181" y="4347848"/>
             <a:ext cx="735495" cy="0"/>
           </a:xfrm>
           <a:prstGeom prst="line">
@@ -8921,7 +8921,7 @@
         </p:nvCxnSpPr>
         <p:spPr>
           <a:xfrm>
-            <a:off x="3195577" y="3219011"/>
+            <a:off x="3195577" y="3540552"/>
             <a:ext cx="2193120" cy="0"/>
           </a:xfrm>
           <a:prstGeom prst="line">
@@ -8966,7 +8966,7 @@
         </p:nvCxnSpPr>
         <p:spPr>
           <a:xfrm>
-            <a:off x="3214676" y="3889316"/>
+            <a:off x="3214676" y="4210857"/>
             <a:ext cx="2162711" cy="0"/>
           </a:xfrm>
           <a:prstGeom prst="line">
@@ -9011,7 +9011,7 @@
         </p:nvCxnSpPr>
         <p:spPr>
           <a:xfrm>
-            <a:off x="2516684" y="4820672"/>
+            <a:off x="2516684" y="5142213"/>
             <a:ext cx="2003593" cy="0"/>
           </a:xfrm>
           <a:prstGeom prst="line">
@@ -9057,7 +9057,7 @@
         </p:nvCxnSpPr>
         <p:spPr>
           <a:xfrm>
-            <a:off x="4520277" y="4775107"/>
+            <a:off x="4520277" y="5096648"/>
             <a:ext cx="867347" cy="0"/>
           </a:xfrm>
           <a:prstGeom prst="line">
@@ -9103,7 +9103,7 @@
         </p:nvCxnSpPr>
         <p:spPr>
           <a:xfrm>
-            <a:off x="3206887" y="4646776"/>
+            <a:off x="3206887" y="4968317"/>
             <a:ext cx="2170500" cy="0"/>
           </a:xfrm>
           <a:prstGeom prst="line">
@@ -9148,7 +9148,7 @@
         </p:nvCxnSpPr>
         <p:spPr>
           <a:xfrm flipH="1">
-            <a:off x="3246827" y="3368467"/>
+            <a:off x="3246827" y="3690008"/>
             <a:ext cx="2138754" cy="0"/>
           </a:xfrm>
           <a:prstGeom prst="straightConnector1">
@@ -9193,7 +9193,7 @@
         </p:nvCxnSpPr>
         <p:spPr>
           <a:xfrm flipH="1">
-            <a:off x="2500267" y="3186948"/>
+            <a:off x="2500267" y="3508489"/>
             <a:ext cx="633849" cy="0"/>
           </a:xfrm>
           <a:prstGeom prst="straightConnector1">
@@ -9240,7 +9240,7 @@
         </p:nvCxnSpPr>
         <p:spPr>
           <a:xfrm flipH="1">
-            <a:off x="3238633" y="3958611"/>
+            <a:off x="3238633" y="4280152"/>
             <a:ext cx="2138754" cy="0"/>
           </a:xfrm>
           <a:prstGeom prst="straightConnector1">
@@ -9285,7 +9285,7 @@
         </p:nvCxnSpPr>
         <p:spPr>
           <a:xfrm flipH="1">
-            <a:off x="2512686" y="3942791"/>
+            <a:off x="2512686" y="4264332"/>
             <a:ext cx="668483" cy="0"/>
           </a:xfrm>
           <a:prstGeom prst="straightConnector1">
@@ -9330,7 +9330,7 @@
         </p:nvCxnSpPr>
         <p:spPr>
           <a:xfrm flipH="1" flipV="1">
-            <a:off x="3124591" y="3409950"/>
+            <a:off x="3124591" y="3731491"/>
             <a:ext cx="0" cy="532841"/>
           </a:xfrm>
           <a:prstGeom prst="straightConnector1">
@@ -9375,7 +9375,7 @@
         </p:nvCxnSpPr>
         <p:spPr>
           <a:xfrm flipH="1" flipV="1">
-            <a:off x="2511953" y="3368467"/>
+            <a:off x="2511953" y="3690008"/>
             <a:ext cx="580893" cy="0"/>
           </a:xfrm>
           <a:prstGeom prst="straightConnector1">
@@ -9420,7 +9420,7 @@
         </p:nvCxnSpPr>
         <p:spPr>
           <a:xfrm flipH="1">
-            <a:off x="4528472" y="4856121"/>
+            <a:off x="4528472" y="5177662"/>
             <a:ext cx="840864" cy="0"/>
           </a:xfrm>
           <a:prstGeom prst="straightConnector1">
@@ -9465,7 +9465,7 @@
         </p:nvCxnSpPr>
         <p:spPr>
           <a:xfrm flipH="1">
-            <a:off x="2511953" y="4884253"/>
+            <a:off x="2511953" y="5205794"/>
             <a:ext cx="1962725" cy="0"/>
           </a:xfrm>
           <a:prstGeom prst="straightConnector1">
@@ -9510,7 +9510,7 @@
         </p:nvCxnSpPr>
         <p:spPr>
           <a:xfrm flipH="1">
-            <a:off x="3228415" y="4725215"/>
+            <a:off x="3228415" y="5046756"/>
             <a:ext cx="2140921" cy="0"/>
           </a:xfrm>
           <a:prstGeom prst="straightConnector1">
@@ -9555,7 +9555,7 @@
         </p:nvCxnSpPr>
         <p:spPr>
           <a:xfrm flipV="1">
-            <a:off x="3130687" y="4096063"/>
+            <a:off x="3130687" y="4417604"/>
             <a:ext cx="0" cy="641021"/>
           </a:xfrm>
           <a:prstGeom prst="straightConnector1">
@@ -9600,7 +9600,7 @@
         </p:nvCxnSpPr>
         <p:spPr>
           <a:xfrm flipH="1">
-            <a:off x="2492841" y="4096063"/>
+            <a:off x="2492841" y="4417604"/>
             <a:ext cx="668483" cy="0"/>
           </a:xfrm>
           <a:prstGeom prst="straightConnector1">
@@ -9651,7 +9651,7 @@
         </p:blipFill>
         <p:spPr>
           <a:xfrm>
-            <a:off x="4474678" y="882035"/>
+            <a:off x="4474678" y="1203576"/>
             <a:ext cx="595784" cy="660543"/>
           </a:xfrm>
           <a:prstGeom prst="rect">
@@ -9686,7 +9686,7 @@
         </p:blipFill>
         <p:spPr>
           <a:xfrm>
-            <a:off x="2250830" y="703305"/>
+            <a:off x="2250830" y="1024846"/>
             <a:ext cx="1841996" cy="1031518"/>
           </a:xfrm>
           <a:prstGeom prst="rect">
@@ -9717,7 +9717,7 @@
         </p:nvCxnSpPr>
         <p:spPr>
           <a:xfrm flipH="1">
-            <a:off x="4092826" y="1212307"/>
+            <a:off x="4092826" y="1533848"/>
             <a:ext cx="381852" cy="6757"/>
           </a:xfrm>
           <a:prstGeom prst="straightConnector1">
@@ -9761,7 +9761,7 @@
         </p:nvCxnSpPr>
         <p:spPr>
           <a:xfrm>
-            <a:off x="2827082" y="1734823"/>
+            <a:off x="2827082" y="2056364"/>
             <a:ext cx="0" cy="1254110"/>
           </a:xfrm>
           <a:prstGeom prst="straightConnector1">
@@ -9805,7 +9805,7 @@
         </p:nvCxnSpPr>
         <p:spPr>
           <a:xfrm flipH="1">
-            <a:off x="2486880" y="2988933"/>
+            <a:off x="2486880" y="3310474"/>
             <a:ext cx="340202" cy="3687"/>
           </a:xfrm>
           <a:prstGeom prst="straightConnector1">
@@ -9849,7 +9849,7 @@
         </p:nvCxnSpPr>
         <p:spPr>
           <a:xfrm>
-            <a:off x="2942906" y="1734823"/>
+            <a:off x="2942906" y="2056364"/>
             <a:ext cx="0" cy="3002261"/>
           </a:xfrm>
           <a:prstGeom prst="straightConnector1">
@@ -9893,7 +9893,7 @@
         </p:nvCxnSpPr>
         <p:spPr>
           <a:xfrm flipH="1" flipV="1">
-            <a:off x="2502428" y="4708509"/>
+            <a:off x="2502428" y="5030050"/>
             <a:ext cx="406634" cy="0"/>
           </a:xfrm>
           <a:prstGeom prst="straightConnector1">
@@ -9935,7 +9935,7 @@
         </p:nvSpPr>
         <p:spPr>
           <a:xfrm>
-            <a:off x="2191240" y="1417124"/>
+            <a:off x="2191240" y="1738665"/>
             <a:ext cx="2268357" cy="276999"/>
           </a:xfrm>
           <a:prstGeom prst="rect">
@@ -10008,7 +10008,7 @@
         </p:nvSpPr>
         <p:spPr>
           <a:xfrm>
-            <a:off x="2904411" y="1736362"/>
+            <a:off x="2904411" y="2057903"/>
             <a:ext cx="1342973" cy="600164"/>
           </a:xfrm>
           <a:prstGeom prst="rect">
@@ -10121,7 +10121,7 @@
         </p:blipFill>
         <p:spPr>
           <a:xfrm>
-            <a:off x="4285623" y="1846070"/>
+            <a:off x="4285623" y="2167611"/>
             <a:ext cx="500639" cy="331765"/>
           </a:xfrm>
           <a:prstGeom prst="rect">
@@ -10145,7 +10145,7 @@
         </p:nvCxnSpPr>
         <p:spPr>
           <a:xfrm>
-            <a:off x="4594106" y="1534815"/>
+            <a:off x="4594106" y="1856356"/>
             <a:ext cx="0" cy="311255"/>
           </a:xfrm>
           <a:prstGeom prst="straightConnector1">
@@ -10187,7 +10187,7 @@
         </p:nvSpPr>
         <p:spPr>
           <a:xfrm>
-            <a:off x="4714438" y="1604440"/>
+            <a:off x="4714438" y="1925981"/>
             <a:ext cx="1110808" cy="430887"/>
           </a:xfrm>
           <a:prstGeom prst="rect">
@@ -10268,7 +10268,7 @@
         </p:nvCxnSpPr>
         <p:spPr>
           <a:xfrm>
-            <a:off x="4308010" y="2177835"/>
+            <a:off x="4308010" y="2499376"/>
             <a:ext cx="0" cy="873873"/>
           </a:xfrm>
           <a:prstGeom prst="straightConnector1">
@@ -10313,7 +10313,7 @@
         </p:nvCxnSpPr>
         <p:spPr>
           <a:xfrm flipH="1">
-            <a:off x="2511953" y="4540252"/>
+            <a:off x="2511953" y="4861793"/>
             <a:ext cx="2202485" cy="0"/>
           </a:xfrm>
           <a:prstGeom prst="straightConnector1">
@@ -10356,7 +10356,7 @@
         </p:nvSpPr>
         <p:spPr>
           <a:xfrm>
-            <a:off x="3204151" y="2615870"/>
+            <a:off x="3204151" y="2937411"/>
             <a:ext cx="1159965" cy="430887"/>
           </a:xfrm>
           <a:prstGeom prst="rect">
@@ -10437,7 +10437,7 @@
         </p:nvCxnSpPr>
         <p:spPr>
           <a:xfrm flipH="1">
-            <a:off x="937260" y="3409950"/>
+            <a:off x="937260" y="3731491"/>
             <a:ext cx="977470" cy="0"/>
           </a:xfrm>
           <a:prstGeom prst="line">
@@ -10482,7 +10482,7 @@
         </p:nvCxnSpPr>
         <p:spPr>
           <a:xfrm flipH="1">
-            <a:off x="937260" y="4229355"/>
+            <a:off x="937260" y="4550896"/>
             <a:ext cx="977470" cy="0"/>
           </a:xfrm>
           <a:prstGeom prst="line">
@@ -10527,7 +10527,7 @@
         </p:nvCxnSpPr>
         <p:spPr>
           <a:xfrm flipH="1">
-            <a:off x="937260" y="5037362"/>
+            <a:off x="937260" y="5358903"/>
             <a:ext cx="977470" cy="0"/>
           </a:xfrm>
           <a:prstGeom prst="line">
@@ -10572,7 +10572,7 @@
         </p:nvCxnSpPr>
         <p:spPr>
           <a:xfrm rot="16200000" flipH="1">
-            <a:off x="6204312" y="2925939"/>
+            <a:off x="6204312" y="3247480"/>
             <a:ext cx="124525" cy="1214922"/>
           </a:xfrm>
           <a:prstGeom prst="bentConnector2">
@@ -10618,7 +10618,7 @@
         </p:nvCxnSpPr>
         <p:spPr>
           <a:xfrm rot="16200000" flipH="1">
-            <a:off x="6203556" y="3651383"/>
+            <a:off x="6203556" y="3972924"/>
             <a:ext cx="118942" cy="1207830"/>
           </a:xfrm>
           <a:prstGeom prst="bentConnector2">
@@ -10664,7 +10664,7 @@
         </p:nvCxnSpPr>
         <p:spPr>
           <a:xfrm rot="16200000" flipH="1">
-            <a:off x="6233029" y="4457788"/>
+            <a:off x="6233029" y="4779329"/>
             <a:ext cx="63972" cy="1218038"/>
           </a:xfrm>
           <a:prstGeom prst="bentConnector2">
@@ -10709,7 +10709,7 @@
         </p:nvCxnSpPr>
         <p:spPr>
           <a:xfrm flipV="1">
-            <a:off x="937260" y="3409950"/>
+            <a:off x="937260" y="3731491"/>
             <a:ext cx="0" cy="2729511"/>
           </a:xfrm>
           <a:prstGeom prst="line">
@@ -10754,7 +10754,7 @@
         </p:nvCxnSpPr>
         <p:spPr>
           <a:xfrm flipH="1">
-            <a:off x="937260" y="6116700"/>
+            <a:off x="937260" y="6438241"/>
             <a:ext cx="7625715" cy="22761"/>
           </a:xfrm>
           <a:prstGeom prst="line">
@@ -10799,7 +10799,7 @@
         </p:nvCxnSpPr>
         <p:spPr>
           <a:xfrm flipH="1" flipV="1">
-            <a:off x="6866942" y="3589714"/>
+            <a:off x="6866942" y="3911255"/>
             <a:ext cx="7092" cy="1509079"/>
           </a:xfrm>
           <a:prstGeom prst="line">
@@ -10842,7 +10842,7 @@
         </p:nvSpPr>
         <p:spPr>
           <a:xfrm>
-            <a:off x="1716406" y="5280493"/>
+            <a:off x="1716406" y="5602034"/>
             <a:ext cx="131394" cy="214001"/>
           </a:xfrm>
           <a:prstGeom prst="downArrow">
@@ -10891,7 +10891,7 @@
         </p:nvSpPr>
         <p:spPr>
           <a:xfrm rot="5400000">
-            <a:off x="3734755" y="3972071"/>
+            <a:off x="3734755" y="4293612"/>
             <a:ext cx="228786" cy="2851734"/>
           </a:xfrm>
           <a:prstGeom prst="rightBrace">
@@ -10938,7 +10938,7 @@
         </p:nvSpPr>
         <p:spPr>
           <a:xfrm>
-            <a:off x="5887666" y="5266687"/>
+            <a:off x="5887666" y="5588228"/>
             <a:ext cx="131394" cy="214001"/>
           </a:xfrm>
           <a:prstGeom prst="downArrow">
@@ -10987,7 +10987,7 @@
         </p:nvSpPr>
         <p:spPr>
           <a:xfrm>
-            <a:off x="3228790" y="3376971"/>
+            <a:off x="3228790" y="3698512"/>
             <a:ext cx="1268689" cy="430887"/>
           </a:xfrm>
           <a:prstGeom prst="rect">
@@ -11070,7 +11070,7 @@
         </p:nvSpPr>
         <p:spPr>
           <a:xfrm>
-            <a:off x="3278501" y="4840779"/>
+            <a:off x="3278501" y="5162320"/>
             <a:ext cx="1268689" cy="430887"/>
           </a:xfrm>
           <a:prstGeom prst="rect">
@@ -11163,7 +11163,7 @@
         </p:blipFill>
         <p:spPr>
           <a:xfrm>
-            <a:off x="1623748" y="5519424"/>
+            <a:off x="1623748" y="5840965"/>
             <a:ext cx="368852" cy="368852"/>
           </a:xfrm>
           <a:prstGeom prst="rect">
@@ -11199,7 +11199,7 @@
         </p:blipFill>
         <p:spPr>
           <a:xfrm>
-            <a:off x="3723974" y="5498235"/>
+            <a:off x="3723974" y="5819776"/>
             <a:ext cx="368852" cy="368852"/>
           </a:xfrm>
           <a:prstGeom prst="rect">
@@ -11235,7 +11235,7 @@
         </p:blipFill>
         <p:spPr>
           <a:xfrm>
-            <a:off x="5786370" y="5460602"/>
+            <a:off x="5786370" y="5782143"/>
             <a:ext cx="368852" cy="368852"/>
           </a:xfrm>
           <a:prstGeom prst="rect">
@@ -11257,7 +11257,7 @@
         </p:nvSpPr>
         <p:spPr>
           <a:xfrm>
-            <a:off x="884786" y="5545287"/>
+            <a:off x="884786" y="5866828"/>
             <a:ext cx="880834" cy="600164"/>
           </a:xfrm>
           <a:prstGeom prst="rect">
@@ -11381,7 +11381,7 @@
         </p:nvSpPr>
         <p:spPr>
           <a:xfrm>
-            <a:off x="1880766" y="5495739"/>
+            <a:off x="1880766" y="5817280"/>
             <a:ext cx="1192862" cy="430887"/>
           </a:xfrm>
           <a:prstGeom prst="rect">
@@ -11454,7 +11454,7 @@
         </p:nvSpPr>
         <p:spPr>
           <a:xfrm>
-            <a:off x="4005216" y="5466808"/>
+            <a:off x="4005216" y="5788349"/>
             <a:ext cx="1192862" cy="430887"/>
           </a:xfrm>
           <a:prstGeom prst="rect">
@@ -11533,7 +11533,7 @@
         </p:nvSpPr>
         <p:spPr>
           <a:xfrm>
-            <a:off x="6075813" y="5455613"/>
+            <a:off x="6075813" y="5777154"/>
             <a:ext cx="1218038" cy="430887"/>
           </a:xfrm>
           <a:prstGeom prst="rect">
@@ -11598,7 +11598,7 @@
         </p:nvSpPr>
         <p:spPr>
           <a:xfrm>
-            <a:off x="6848737" y="3974487"/>
+            <a:off x="6848737" y="4296028"/>
             <a:ext cx="891215" cy="600164"/>
           </a:xfrm>
           <a:prstGeom prst="rect">
@@ -11697,7 +11697,7 @@
         </p:nvCxnSpPr>
         <p:spPr>
           <a:xfrm>
-            <a:off x="1782103" y="5859799"/>
+            <a:off x="1782103" y="6181340"/>
             <a:ext cx="0" cy="141049"/>
           </a:xfrm>
           <a:prstGeom prst="line">
@@ -11743,7 +11743,7 @@
         </p:nvCxnSpPr>
         <p:spPr>
           <a:xfrm flipH="1">
-            <a:off x="3897299" y="5838199"/>
+            <a:off x="3897299" y="6159740"/>
             <a:ext cx="0" cy="134172"/>
           </a:xfrm>
           <a:prstGeom prst="line">
@@ -11789,7 +11789,7 @@
         </p:nvCxnSpPr>
         <p:spPr>
           <a:xfrm flipV="1">
-            <a:off x="5970796" y="5813082"/>
+            <a:off x="5970796" y="6134623"/>
             <a:ext cx="0" cy="151405"/>
           </a:xfrm>
           <a:prstGeom prst="line">
@@ -11835,7 +11835,7 @@
         </p:nvCxnSpPr>
         <p:spPr>
           <a:xfrm>
-            <a:off x="1772578" y="5981798"/>
+            <a:off x="1772578" y="6303339"/>
             <a:ext cx="6418922" cy="0"/>
           </a:xfrm>
           <a:prstGeom prst="line">
@@ -11879,7 +11879,7 @@
         </p:nvSpPr>
         <p:spPr>
           <a:xfrm>
-            <a:off x="7598270" y="4456818"/>
+            <a:off x="7598270" y="4778359"/>
             <a:ext cx="823458" cy="560532"/>
           </a:xfrm>
           <a:prstGeom prst="can">
@@ -11925,7 +11925,7 @@
         </p:nvSpPr>
         <p:spPr>
           <a:xfrm>
-            <a:off x="7577533" y="4560097"/>
+            <a:off x="7577533" y="4881638"/>
             <a:ext cx="978797" cy="461665"/>
           </a:xfrm>
           <a:prstGeom prst="rect">
@@ -12006,7 +12006,7 @@
         </p:nvCxnSpPr>
         <p:spPr>
           <a:xfrm>
-            <a:off x="8172838" y="5034820"/>
+            <a:off x="8172838" y="5356361"/>
             <a:ext cx="0" cy="944626"/>
           </a:xfrm>
           <a:prstGeom prst="line">
@@ -12050,7 +12050,7 @@
         </p:nvSpPr>
         <p:spPr>
           <a:xfrm>
-            <a:off x="7506584" y="2011952"/>
+            <a:off x="7506584" y="2333493"/>
             <a:ext cx="1391555" cy="523220"/>
           </a:xfrm>
           <a:prstGeom prst="rect">
@@ -12129,7 +12129,7 @@
         </p:blipFill>
         <p:spPr>
           <a:xfrm>
-            <a:off x="7971955" y="2828852"/>
+            <a:off x="7971955" y="3150393"/>
             <a:ext cx="615511" cy="615511"/>
           </a:xfrm>
           <a:prstGeom prst="rect">
@@ -12165,7 +12165,7 @@
         </p:blipFill>
         <p:spPr>
           <a:xfrm>
-            <a:off x="7836940" y="3818555"/>
+            <a:off x="7836940" y="4140096"/>
             <a:ext cx="535535" cy="535535"/>
           </a:xfrm>
           <a:prstGeom prst="rect">
@@ -12189,7 +12189,7 @@
         </p:nvCxnSpPr>
         <p:spPr>
           <a:xfrm flipH="1">
-            <a:off x="6874034" y="3980383"/>
+            <a:off x="6874034" y="4301924"/>
             <a:ext cx="965041" cy="0"/>
           </a:xfrm>
           <a:prstGeom prst="line">
@@ -12234,7 +12234,7 @@
         </p:nvCxnSpPr>
         <p:spPr>
           <a:xfrm flipH="1" flipV="1">
-            <a:off x="8556714" y="4083924"/>
+            <a:off x="8556714" y="4405465"/>
             <a:ext cx="395" cy="2029737"/>
           </a:xfrm>
           <a:prstGeom prst="line">
@@ -12279,7 +12279,7 @@
         </p:nvCxnSpPr>
         <p:spPr>
           <a:xfrm>
-            <a:off x="8318672" y="4105588"/>
+            <a:off x="8318672" y="4427129"/>
             <a:ext cx="244303" cy="0"/>
           </a:xfrm>
           <a:prstGeom prst="line">
@@ -12324,7 +12324,7 @@
         </p:nvCxnSpPr>
         <p:spPr>
           <a:xfrm>
-            <a:off x="7684376" y="4072220"/>
+            <a:off x="7684376" y="4393761"/>
             <a:ext cx="0" cy="400759"/>
           </a:xfrm>
           <a:prstGeom prst="line">
@@ -12369,7 +12369,7 @@
         </p:nvCxnSpPr>
         <p:spPr>
           <a:xfrm flipH="1">
-            <a:off x="7674851" y="4096063"/>
+            <a:off x="7674851" y="4417604"/>
             <a:ext cx="167084" cy="0"/>
           </a:xfrm>
           <a:prstGeom prst="line">
@@ -12412,7 +12412,7 @@
         </p:nvSpPr>
         <p:spPr>
           <a:xfrm>
-            <a:off x="7582842" y="3471137"/>
+            <a:off x="7582842" y="3792678"/>
             <a:ext cx="1230831" cy="430887"/>
           </a:xfrm>
           <a:prstGeom prst="rect">
@@ -12491,7 +12491,7 @@
         </p:nvSpPr>
         <p:spPr>
           <a:xfrm>
-            <a:off x="7478835" y="2614771"/>
+            <a:off x="7478835" y="2936312"/>
             <a:ext cx="1333630" cy="430887"/>
           </a:xfrm>
           <a:prstGeom prst="rect">
@@ -12598,7 +12598,7 @@
         </p:nvCxnSpPr>
         <p:spPr>
           <a:xfrm flipH="1">
-            <a:off x="7581900" y="3905250"/>
+            <a:off x="7581900" y="4226791"/>
             <a:ext cx="351449" cy="0"/>
           </a:xfrm>
           <a:prstGeom prst="straightConnector1">
@@ -12643,7 +12643,7 @@
         </p:nvCxnSpPr>
         <p:spPr>
           <a:xfrm flipV="1">
-            <a:off x="7613335" y="3216473"/>
+            <a:off x="7613335" y="3538014"/>
             <a:ext cx="0" cy="611607"/>
           </a:xfrm>
           <a:prstGeom prst="straightConnector1">
@@ -12688,7 +12688,7 @@
         </p:nvCxnSpPr>
         <p:spPr>
           <a:xfrm>
-            <a:off x="7627416" y="3215909"/>
+            <a:off x="7627416" y="3537450"/>
             <a:ext cx="373584" cy="0"/>
           </a:xfrm>
           <a:prstGeom prst="straightConnector1">
@@ -12745,7 +12745,7 @@
         </p:blipFill>
         <p:spPr>
           <a:xfrm>
-            <a:off x="9249094" y="2058605"/>
+            <a:off x="9249094" y="2380146"/>
             <a:ext cx="1943100" cy="1142118"/>
           </a:xfrm>
           <a:prstGeom prst="rect">
@@ -12786,7 +12786,7 @@
         </p:blipFill>
         <p:spPr>
           <a:xfrm>
-            <a:off x="9249094" y="3494075"/>
+            <a:off x="9249094" y="3815616"/>
             <a:ext cx="1933256" cy="1080890"/>
           </a:xfrm>
           <a:prstGeom prst="rect">
@@ -12827,7 +12827,7 @@
         </p:blipFill>
         <p:spPr>
           <a:xfrm>
-            <a:off x="9232805" y="4879482"/>
+            <a:off x="9232805" y="5201023"/>
             <a:ext cx="1911445" cy="1167893"/>
           </a:xfrm>
           <a:prstGeom prst="rect">
@@ -12854,7 +12854,7 @@
         </p:nvSpPr>
         <p:spPr>
           <a:xfrm>
-            <a:off x="7350604" y="5373687"/>
+            <a:off x="7350604" y="5695228"/>
             <a:ext cx="891215" cy="600164"/>
           </a:xfrm>
           <a:prstGeom prst="rect">
@@ -12932,7 +12932,7 @@
         </p:nvSpPr>
         <p:spPr>
           <a:xfrm>
-            <a:off x="9163046" y="1787038"/>
+            <a:off x="9163046" y="2108579"/>
             <a:ext cx="2247903" cy="276999"/>
           </a:xfrm>
           <a:prstGeom prst="rect">
@@ -13005,7 +13005,7 @@
         </p:nvSpPr>
         <p:spPr>
           <a:xfrm>
-            <a:off x="9153318" y="3219011"/>
+            <a:off x="9153318" y="3540552"/>
             <a:ext cx="2247903" cy="276999"/>
           </a:xfrm>
           <a:prstGeom prst="rect">
@@ -13084,7 +13084,7 @@
         </p:nvSpPr>
         <p:spPr>
           <a:xfrm>
-            <a:off x="9200582" y="4607254"/>
+            <a:off x="9200582" y="4928795"/>
             <a:ext cx="1943667" cy="276999"/>
           </a:xfrm>
           <a:prstGeom prst="rect">
@@ -13165,7 +13165,7 @@
         </p:blipFill>
         <p:spPr>
           <a:xfrm>
-            <a:off x="8656866" y="953758"/>
+            <a:off x="8656866" y="1275299"/>
             <a:ext cx="914696" cy="581057"/>
           </a:xfrm>
           <a:prstGeom prst="rect">
@@ -13192,7 +13192,7 @@
         </p:nvSpPr>
         <p:spPr>
           <a:xfrm>
-            <a:off x="8410575" y="605036"/>
+            <a:off x="8410575" y="926577"/>
             <a:ext cx="1777554" cy="276999"/>
           </a:xfrm>
           <a:prstGeom prst="rect">
@@ -13236,7 +13236,7 @@
         </p:nvSpPr>
         <p:spPr>
           <a:xfrm>
-            <a:off x="4200468" y="621805"/>
+            <a:off x="4200468" y="943346"/>
             <a:ext cx="1777554" cy="276999"/>
           </a:xfrm>
           <a:prstGeom prst="rect">
@@ -13283,7 +13283,7 @@
         </p:nvCxnSpPr>
         <p:spPr>
           <a:xfrm flipV="1">
-            <a:off x="8587466" y="2629664"/>
+            <a:off x="8587466" y="2951205"/>
             <a:ext cx="661628" cy="506944"/>
           </a:xfrm>
           <a:prstGeom prst="bentConnector3">
@@ -13325,7 +13325,7 @@
         </p:nvCxnSpPr>
         <p:spPr>
           <a:xfrm rot="16200000" flipH="1">
-            <a:off x="8638056" y="3423482"/>
+            <a:off x="8638056" y="3745023"/>
             <a:ext cx="897910" cy="324166"/>
           </a:xfrm>
           <a:prstGeom prst="bentConnector2">
@@ -13367,7 +13367,7 @@
         </p:nvCxnSpPr>
         <p:spPr>
           <a:xfrm>
-            <a:off x="8448485" y="4737084"/>
+            <a:off x="8448485" y="5058625"/>
             <a:ext cx="784320" cy="726345"/>
           </a:xfrm>
           <a:prstGeom prst="bentConnector3">
@@ -13411,7 +13411,7 @@
         </p:nvCxnSpPr>
         <p:spPr>
           <a:xfrm>
-            <a:off x="9571562" y="1244287"/>
+            <a:off x="9571562" y="1565828"/>
             <a:ext cx="296338" cy="486962"/>
           </a:xfrm>
           <a:prstGeom prst="bentConnector2">
@@ -13457,7 +13457,7 @@
         </p:nvCxnSpPr>
         <p:spPr>
           <a:xfrm rot="10800000" flipV="1">
-            <a:off x="8182416" y="1244286"/>
+            <a:off x="8182416" y="1565827"/>
             <a:ext cx="474450" cy="701069"/>
           </a:xfrm>
           <a:prstGeom prst="bentConnector2">
@@ -13499,7 +13499,7 @@
         </p:nvSpPr>
         <p:spPr>
           <a:xfrm>
-            <a:off x="9828323" y="1319371"/>
+            <a:off x="9828323" y="1640912"/>
             <a:ext cx="976442" cy="430887"/>
           </a:xfrm>
           <a:prstGeom prst="rect">
@@ -13564,7 +13564,7 @@
         </p:nvSpPr>
         <p:spPr>
           <a:xfrm>
-            <a:off x="8157297" y="1359568"/>
+            <a:off x="8157297" y="1681109"/>
             <a:ext cx="976442" cy="600164"/>
           </a:xfrm>
           <a:prstGeom prst="rect">
@@ -13651,7 +13651,7 @@
         </p:blipFill>
         <p:spPr>
           <a:xfrm>
-            <a:off x="10018823" y="152640"/>
+            <a:off x="10018823" y="474181"/>
             <a:ext cx="1171569" cy="1171569"/>
           </a:xfrm>
           <a:prstGeom prst="rect">
@@ -13688,7 +13688,7 @@
         </p:blipFill>
         <p:spPr bwMode="auto">
           <a:xfrm>
-            <a:off x="6823808" y="2535654"/>
+            <a:off x="6823808" y="2857195"/>
             <a:ext cx="475314" cy="475314"/>
           </a:xfrm>
           <a:prstGeom prst="rect">
@@ -13734,7 +13734,7 @@
         </p:blipFill>
         <p:spPr>
           <a:xfrm>
-            <a:off x="6792583" y="1063912"/>
+            <a:off x="6792583" y="1385453"/>
             <a:ext cx="547275" cy="547275"/>
           </a:xfrm>
           <a:prstGeom prst="rect">
@@ -13756,7 +13756,7 @@
         </p:nvSpPr>
         <p:spPr>
           <a:xfrm>
-            <a:off x="6598074" y="640041"/>
+            <a:off x="6598074" y="961582"/>
             <a:ext cx="908304" cy="461665"/>
           </a:xfrm>
           <a:prstGeom prst="rect">
@@ -13806,7 +13806,7 @@
         </p:nvCxnSpPr>
         <p:spPr>
           <a:xfrm>
-            <a:off x="4714438" y="2190098"/>
+            <a:off x="4714438" y="2511639"/>
             <a:ext cx="0" cy="2350154"/>
           </a:xfrm>
           <a:prstGeom prst="straightConnector1">
@@ -13851,7 +13851,7 @@
         </p:nvCxnSpPr>
         <p:spPr>
           <a:xfrm flipH="1">
-            <a:off x="2495141" y="3063884"/>
+            <a:off x="2495141" y="3385425"/>
             <a:ext cx="1812869" cy="0"/>
           </a:xfrm>
           <a:prstGeom prst="straightConnector1">
@@ -13894,7 +13894,7 @@
         </p:nvSpPr>
         <p:spPr>
           <a:xfrm>
-            <a:off x="3214165" y="4129148"/>
+            <a:off x="3214165" y="4450689"/>
             <a:ext cx="1284175" cy="430887"/>
           </a:xfrm>
           <a:prstGeom prst="rect">
@@ -13975,7 +13975,7 @@
         </p:nvCxnSpPr>
         <p:spPr>
           <a:xfrm>
-            <a:off x="7047675" y="3036470"/>
+            <a:off x="7047675" y="3358011"/>
             <a:ext cx="0" cy="383005"/>
           </a:xfrm>
           <a:prstGeom prst="straightConnector1">
@@ -14020,7 +14020,7 @@
         </p:nvCxnSpPr>
         <p:spPr>
           <a:xfrm flipH="1">
-            <a:off x="5825246" y="3419475"/>
+            <a:off x="5825246" y="3741016"/>
             <a:ext cx="1204204" cy="9525"/>
           </a:xfrm>
           <a:prstGeom prst="straightConnector1">
@@ -14065,7 +14065,7 @@
         </p:nvCxnSpPr>
         <p:spPr>
           <a:xfrm>
-            <a:off x="2250830" y="2831313"/>
+            <a:off x="2250830" y="3152854"/>
             <a:ext cx="0" cy="120209"/>
           </a:xfrm>
           <a:prstGeom prst="straightConnector1">
@@ -14108,7 +14108,7 @@
         </p:nvSpPr>
         <p:spPr>
           <a:xfrm>
-            <a:off x="6708740" y="1837795"/>
+            <a:off x="6708740" y="2159336"/>
             <a:ext cx="976442" cy="600164"/>
           </a:xfrm>
           <a:prstGeom prst="rect">
@@ -14191,7 +14191,7 @@
         </p:nvSpPr>
         <p:spPr>
           <a:xfrm>
-            <a:off x="827050" y="206858"/>
+            <a:off x="827050" y="528399"/>
             <a:ext cx="8364575" cy="369332"/>
           </a:xfrm>
           <a:prstGeom prst="rect">
@@ -14248,7 +14248,7 @@
         </p:blipFill>
         <p:spPr bwMode="auto">
           <a:xfrm>
-            <a:off x="901989" y="1210126"/>
+            <a:off x="901989" y="1531667"/>
             <a:ext cx="475314" cy="475314"/>
           </a:xfrm>
           <a:prstGeom prst="rect">
@@ -14282,7 +14282,7 @@
         </p:nvCxnSpPr>
         <p:spPr>
           <a:xfrm>
-            <a:off x="1055701" y="1694123"/>
+            <a:off x="1055701" y="2015664"/>
             <a:ext cx="0" cy="1960875"/>
           </a:xfrm>
           <a:prstGeom prst="straightConnector1">
@@ -14325,7 +14325,7 @@
         </p:nvSpPr>
         <p:spPr>
           <a:xfrm>
-            <a:off x="1325203" y="1142222"/>
+            <a:off x="1325203" y="1463763"/>
             <a:ext cx="906095" cy="600164"/>
           </a:xfrm>
           <a:prstGeom prst="rect">
@@ -14459,7 +14459,7 @@
         </p:nvCxnSpPr>
         <p:spPr>
           <a:xfrm>
-            <a:off x="1053707" y="3684858"/>
+            <a:off x="1053707" y="4006399"/>
             <a:ext cx="2333" cy="793231"/>
           </a:xfrm>
           <a:prstGeom prst="straightConnector1">
@@ -14505,7 +14505,7 @@
         </p:nvCxnSpPr>
         <p:spPr>
           <a:xfrm flipV="1">
-            <a:off x="1093422" y="3512362"/>
+            <a:off x="1093422" y="3833903"/>
             <a:ext cx="1097818" cy="146968"/>
           </a:xfrm>
           <a:prstGeom prst="bentConnector2">
@@ -14550,7 +14550,7 @@
         </p:nvCxnSpPr>
         <p:spPr>
           <a:xfrm flipV="1">
-            <a:off x="1066544" y="4313050"/>
+            <a:off x="1066544" y="4634591"/>
             <a:ext cx="1097818" cy="146968"/>
           </a:xfrm>
           <a:prstGeom prst="bentConnector2">

</xml_diff>

<commit_message>
update the deception section.
</commit_message>
<xml_diff>
--- a/doc/designDoc.pptx
+++ b/doc/designDoc.pptx
@@ -5,7 +5,7 @@
     <p:sldMasterId id="2147483648" r:id="rId1"/>
   </p:sldMasterIdLst>
   <p:notesMasterIdLst>
-    <p:notesMasterId r:id="rId8"/>
+    <p:notesMasterId r:id="rId10"/>
   </p:notesMasterIdLst>
   <p:sldIdLst>
     <p:sldId id="256" r:id="rId2"/>
@@ -14,6 +14,8 @@
     <p:sldId id="259" r:id="rId5"/>
     <p:sldId id="260" r:id="rId6"/>
     <p:sldId id="261" r:id="rId7"/>
+    <p:sldId id="262" r:id="rId8"/>
+    <p:sldId id="263" r:id="rId9"/>
   </p:sldIdLst>
   <p:sldSz cx="12192000" cy="6858000"/>
   <p:notesSz cx="6858000" cy="9144000"/>
@@ -23288,6 +23290,506 @@
     <p:extLst>
       <p:ext uri="{BB962C8B-B14F-4D97-AF65-F5344CB8AC3E}">
         <p14:creationId xmlns:p14="http://schemas.microsoft.com/office/powerpoint/2010/main" val="883440771"/>
+      </p:ext>
+    </p:extLst>
+  </p:cSld>
+  <p:clrMapOvr>
+    <a:masterClrMapping/>
+  </p:clrMapOvr>
+</p:sld>
+</file>
+
+<file path=ppt/slides/slide7.xml><?xml version="1.0" encoding="utf-8"?>
+<p:sld xmlns:a="http://schemas.openxmlformats.org/drawingml/2006/main" xmlns:r="http://schemas.openxmlformats.org/officeDocument/2006/relationships" xmlns:p="http://schemas.openxmlformats.org/presentationml/2006/main">
+  <p:cSld>
+    <p:spTree>
+      <p:nvGrpSpPr>
+        <p:cNvPr id="1" name=""/>
+        <p:cNvGrpSpPr/>
+        <p:nvPr/>
+      </p:nvGrpSpPr>
+      <p:grpSpPr>
+        <a:xfrm>
+          <a:off x="0" y="0"/>
+          <a:ext cx="0" cy="0"/>
+          <a:chOff x="0" y="0"/>
+          <a:chExt cx="0" cy="0"/>
+        </a:xfrm>
+      </p:grpSpPr>
+      <p:pic>
+        <p:nvPicPr>
+          <p:cNvPr id="1026" name="Picture 2" descr="Machine Expert - Basic 1/10 - YouTube">
+            <a:extLst>
+              <a:ext uri="{FF2B5EF4-FFF2-40B4-BE49-F238E27FC236}">
+                <a16:creationId xmlns:a16="http://schemas.microsoft.com/office/drawing/2014/main" id="{B7B5AC75-946A-1432-12E0-7B6D19561970}"/>
+              </a:ext>
+            </a:extLst>
+          </p:cNvPr>
+          <p:cNvPicPr>
+            <a:picLocks noChangeAspect="1" noChangeArrowheads="1"/>
+          </p:cNvPicPr>
+          <p:nvPr/>
+        </p:nvPicPr>
+        <p:blipFill>
+          <a:blip r:embed="rId2">
+            <a:extLst>
+              <a:ext uri="{28A0092B-C50C-407E-A947-70E740481C1C}">
+                <a14:useLocalDpi xmlns:a14="http://schemas.microsoft.com/office/drawing/2010/main" val="0"/>
+              </a:ext>
+            </a:extLst>
+          </a:blip>
+          <a:srcRect/>
+          <a:stretch>
+            <a:fillRect/>
+          </a:stretch>
+        </p:blipFill>
+        <p:spPr bwMode="auto">
+          <a:xfrm>
+            <a:off x="853476" y="1383641"/>
+            <a:ext cx="4913691" cy="2764847"/>
+          </a:xfrm>
+          <a:prstGeom prst="rect">
+            <a:avLst/>
+          </a:prstGeom>
+          <a:noFill/>
+          <a:ln w="9525">
+            <a:solidFill>
+              <a:schemeClr val="tx1"/>
+            </a:solidFill>
+          </a:ln>
+          <a:extLst>
+            <a:ext uri="{909E8E84-426E-40DD-AFC4-6F175D3DCCD1}">
+              <a14:hiddenFill xmlns:a14="http://schemas.microsoft.com/office/drawing/2010/main">
+                <a:solidFill>
+                  <a:srgbClr val="FFFFFF"/>
+                </a:solidFill>
+              </a14:hiddenFill>
+            </a:ext>
+          </a:extLst>
+        </p:spPr>
+      </p:pic>
+      <p:pic>
+        <p:nvPicPr>
+          <p:cNvPr id="5" name="Picture 4" descr="A screenshot of a computer&#10;&#10;Description automatically generated">
+            <a:extLst>
+              <a:ext uri="{FF2B5EF4-FFF2-40B4-BE49-F238E27FC236}">
+                <a16:creationId xmlns:a16="http://schemas.microsoft.com/office/drawing/2014/main" id="{423027FC-E29B-99B5-CA3B-9D3D6215EE4E}"/>
+              </a:ext>
+            </a:extLst>
+          </p:cNvPr>
+          <p:cNvPicPr>
+            <a:picLocks noChangeAspect="1"/>
+          </p:cNvPicPr>
+          <p:nvPr/>
+        </p:nvPicPr>
+        <p:blipFill>
+          <a:blip r:embed="rId3">
+            <a:extLst>
+              <a:ext uri="{28A0092B-C50C-407E-A947-70E740481C1C}">
+                <a14:useLocalDpi xmlns:a14="http://schemas.microsoft.com/office/drawing/2010/main" val="0"/>
+              </a:ext>
+            </a:extLst>
+          </a:blip>
+          <a:stretch>
+            <a:fillRect/>
+          </a:stretch>
+        </p:blipFill>
+        <p:spPr>
+          <a:xfrm>
+            <a:off x="6035615" y="1383641"/>
+            <a:ext cx="4913691" cy="2758079"/>
+          </a:xfrm>
+          <a:prstGeom prst="rect">
+            <a:avLst/>
+          </a:prstGeom>
+          <a:ln w="9525">
+            <a:solidFill>
+              <a:schemeClr val="tx1"/>
+            </a:solidFill>
+          </a:ln>
+        </p:spPr>
+      </p:pic>
+      <p:sp>
+        <p:nvSpPr>
+          <p:cNvPr id="6" name="TextBox 5">
+            <a:extLst>
+              <a:ext uri="{FF2B5EF4-FFF2-40B4-BE49-F238E27FC236}">
+                <a16:creationId xmlns:a16="http://schemas.microsoft.com/office/drawing/2014/main" id="{9E119FF5-9C25-6BFE-1804-3C7AEFDDAF84}"/>
+              </a:ext>
+            </a:extLst>
+          </p:cNvPr>
+          <p:cNvSpPr txBox="1"/>
+          <p:nvPr/>
+        </p:nvSpPr>
+        <p:spPr>
+          <a:xfrm>
+            <a:off x="780892" y="853974"/>
+            <a:ext cx="4455342" cy="523220"/>
+          </a:xfrm>
+          <a:prstGeom prst="rect">
+            <a:avLst/>
+          </a:prstGeom>
+          <a:noFill/>
+        </p:spPr>
+        <p:txBody>
+          <a:bodyPr wrap="square" rtlCol="0">
+            <a:spAutoFit/>
+          </a:bodyPr>
+          <a:lstStyle/>
+          <a:p>
+            <a:r>
+              <a:rPr lang="en-SG" sz="1400" b="1" dirty="0"/>
+              <a:t>Schneider Electric </a:t>
+            </a:r>
+            <a:r>
+              <a:rPr lang="en-SG" sz="1400" b="1" dirty="0" err="1"/>
+              <a:t>EcoStruxure</a:t>
+            </a:r>
+            <a:r>
+              <a:rPr lang="en-SG" sz="1400" b="1" dirty="0"/>
+              <a:t> Machine Expert M22X PLC Configuration Interface</a:t>
+            </a:r>
+          </a:p>
+        </p:txBody>
+      </p:sp>
+      <p:sp>
+        <p:nvSpPr>
+          <p:cNvPr id="7" name="TextBox 6">
+            <a:extLst>
+              <a:ext uri="{FF2B5EF4-FFF2-40B4-BE49-F238E27FC236}">
+                <a16:creationId xmlns:a16="http://schemas.microsoft.com/office/drawing/2014/main" id="{E8A02EBA-6177-F921-0360-C79B304899FA}"/>
+              </a:ext>
+            </a:extLst>
+          </p:cNvPr>
+          <p:cNvSpPr txBox="1"/>
+          <p:nvPr/>
+        </p:nvSpPr>
+        <p:spPr>
+          <a:xfrm>
+            <a:off x="5989607" y="853974"/>
+            <a:ext cx="4455342" cy="523220"/>
+          </a:xfrm>
+          <a:prstGeom prst="rect">
+            <a:avLst/>
+          </a:prstGeom>
+          <a:noFill/>
+        </p:spPr>
+        <p:txBody>
+          <a:bodyPr wrap="square" rtlCol="0">
+            <a:spAutoFit/>
+          </a:bodyPr>
+          <a:lstStyle/>
+          <a:p>
+            <a:r>
+              <a:rPr lang="en-US" sz="1400" b="1" dirty="0">
+                <a:solidFill>
+                  <a:srgbClr val="C00000"/>
+                </a:solidFill>
+              </a:rPr>
+              <a:t>Honeypot Deception PLC Configuration Web Interface</a:t>
+            </a:r>
+            <a:endParaRPr lang="en-SG" sz="1400" b="1" dirty="0">
+              <a:solidFill>
+                <a:srgbClr val="C00000"/>
+              </a:solidFill>
+            </a:endParaRPr>
+          </a:p>
+        </p:txBody>
+      </p:sp>
+      <p:sp>
+        <p:nvSpPr>
+          <p:cNvPr id="8" name="Arrow: Right 7">
+            <a:extLst>
+              <a:ext uri="{FF2B5EF4-FFF2-40B4-BE49-F238E27FC236}">
+                <a16:creationId xmlns:a16="http://schemas.microsoft.com/office/drawing/2014/main" id="{958D35FA-4E1D-2C80-E3A9-CEC604233054}"/>
+              </a:ext>
+            </a:extLst>
+          </p:cNvPr>
+          <p:cNvSpPr/>
+          <p:nvPr/>
+        </p:nvSpPr>
+        <p:spPr>
+          <a:xfrm>
+            <a:off x="5767167" y="2762680"/>
+            <a:ext cx="268448" cy="204807"/>
+          </a:xfrm>
+          <a:prstGeom prst="rightArrow">
+            <a:avLst/>
+          </a:prstGeom>
+          <a:solidFill>
+            <a:srgbClr val="FF0000"/>
+          </a:solidFill>
+        </p:spPr>
+        <p:style>
+          <a:lnRef idx="2">
+            <a:schemeClr val="accent1">
+              <a:shade val="15000"/>
+            </a:schemeClr>
+          </a:lnRef>
+          <a:fillRef idx="1">
+            <a:schemeClr val="accent1"/>
+          </a:fillRef>
+          <a:effectRef idx="0">
+            <a:schemeClr val="accent1"/>
+          </a:effectRef>
+          <a:fontRef idx="minor">
+            <a:schemeClr val="lt1"/>
+          </a:fontRef>
+        </p:style>
+        <p:txBody>
+          <a:bodyPr rtlCol="0" anchor="ctr"/>
+          <a:lstStyle/>
+          <a:p>
+            <a:pPr algn="ctr"/>
+            <a:endParaRPr lang="en-SG"/>
+          </a:p>
+        </p:txBody>
+      </p:sp>
+    </p:spTree>
+    <p:extLst>
+      <p:ext uri="{BB962C8B-B14F-4D97-AF65-F5344CB8AC3E}">
+        <p14:creationId xmlns:p14="http://schemas.microsoft.com/office/powerpoint/2010/main" val="2267016856"/>
+      </p:ext>
+    </p:extLst>
+  </p:cSld>
+  <p:clrMapOvr>
+    <a:masterClrMapping/>
+  </p:clrMapOvr>
+</p:sld>
+</file>
+
+<file path=ppt/slides/slide8.xml><?xml version="1.0" encoding="utf-8"?>
+<p:sld xmlns:a="http://schemas.openxmlformats.org/drawingml/2006/main" xmlns:r="http://schemas.openxmlformats.org/officeDocument/2006/relationships" xmlns:p="http://schemas.openxmlformats.org/presentationml/2006/main">
+  <p:cSld>
+    <p:spTree>
+      <p:nvGrpSpPr>
+        <p:cNvPr id="1" name=""/>
+        <p:cNvGrpSpPr/>
+        <p:nvPr/>
+      </p:nvGrpSpPr>
+      <p:grpSpPr>
+        <a:xfrm>
+          <a:off x="0" y="0"/>
+          <a:ext cx="0" cy="0"/>
+          <a:chOff x="0" y="0"/>
+          <a:chExt cx="0" cy="0"/>
+        </a:xfrm>
+      </p:grpSpPr>
+      <p:pic>
+        <p:nvPicPr>
+          <p:cNvPr id="2050" name="Picture 2" descr="Siemens s7-1200 Web Server">
+            <a:extLst>
+              <a:ext uri="{FF2B5EF4-FFF2-40B4-BE49-F238E27FC236}">
+                <a16:creationId xmlns:a16="http://schemas.microsoft.com/office/drawing/2014/main" id="{348E36EA-A97B-D2FF-ACC9-8EC81CEC98B6}"/>
+              </a:ext>
+            </a:extLst>
+          </p:cNvPr>
+          <p:cNvPicPr>
+            <a:picLocks noChangeAspect="1" noChangeArrowheads="1"/>
+          </p:cNvPicPr>
+          <p:nvPr/>
+        </p:nvPicPr>
+        <p:blipFill>
+          <a:blip r:embed="rId2">
+            <a:extLst>
+              <a:ext uri="{28A0092B-C50C-407E-A947-70E740481C1C}">
+                <a14:useLocalDpi xmlns:a14="http://schemas.microsoft.com/office/drawing/2010/main" val="0"/>
+              </a:ext>
+            </a:extLst>
+          </a:blip>
+          <a:srcRect/>
+          <a:stretch>
+            <a:fillRect/>
+          </a:stretch>
+        </p:blipFill>
+        <p:spPr bwMode="auto">
+          <a:xfrm>
+            <a:off x="967572" y="1347537"/>
+            <a:ext cx="4685665" cy="3385528"/>
+          </a:xfrm>
+          <a:prstGeom prst="rect">
+            <a:avLst/>
+          </a:prstGeom>
+          <a:noFill/>
+          <a:extLst>
+            <a:ext uri="{909E8E84-426E-40DD-AFC4-6F175D3DCCD1}">
+              <a14:hiddenFill xmlns:a14="http://schemas.microsoft.com/office/drawing/2010/main">
+                <a:solidFill>
+                  <a:srgbClr val="FFFFFF"/>
+                </a:solidFill>
+              </a14:hiddenFill>
+            </a:ext>
+          </a:extLst>
+        </p:spPr>
+      </p:pic>
+      <p:pic>
+        <p:nvPicPr>
+          <p:cNvPr id="7" name="Picture 6">
+            <a:extLst>
+              <a:ext uri="{FF2B5EF4-FFF2-40B4-BE49-F238E27FC236}">
+                <a16:creationId xmlns:a16="http://schemas.microsoft.com/office/drawing/2014/main" id="{97B18E11-802C-E3B4-B011-C8CBDE92F670}"/>
+              </a:ext>
+            </a:extLst>
+          </p:cNvPr>
+          <p:cNvPicPr>
+            <a:picLocks noChangeAspect="1"/>
+          </p:cNvPicPr>
+          <p:nvPr/>
+        </p:nvPicPr>
+        <p:blipFill>
+          <a:blip r:embed="rId3"/>
+          <a:stretch>
+            <a:fillRect/>
+          </a:stretch>
+        </p:blipFill>
+        <p:spPr>
+          <a:xfrm>
+            <a:off x="5984694" y="1319779"/>
+            <a:ext cx="4996732" cy="3413286"/>
+          </a:xfrm>
+          <a:prstGeom prst="rect">
+            <a:avLst/>
+          </a:prstGeom>
+          <a:ln w="9525">
+            <a:solidFill>
+              <a:schemeClr val="tx1"/>
+            </a:solidFill>
+          </a:ln>
+        </p:spPr>
+      </p:pic>
+      <p:sp>
+        <p:nvSpPr>
+          <p:cNvPr id="8" name="TextBox 7">
+            <a:extLst>
+              <a:ext uri="{FF2B5EF4-FFF2-40B4-BE49-F238E27FC236}">
+                <a16:creationId xmlns:a16="http://schemas.microsoft.com/office/drawing/2014/main" id="{D341C830-735E-1349-C8A9-4A297B5037AB}"/>
+              </a:ext>
+            </a:extLst>
+          </p:cNvPr>
+          <p:cNvSpPr txBox="1"/>
+          <p:nvPr/>
+        </p:nvSpPr>
+        <p:spPr>
+          <a:xfrm>
+            <a:off x="858530" y="922985"/>
+            <a:ext cx="4455342" cy="307777"/>
+          </a:xfrm>
+          <a:prstGeom prst="rect">
+            <a:avLst/>
+          </a:prstGeom>
+          <a:noFill/>
+        </p:spPr>
+        <p:txBody>
+          <a:bodyPr wrap="square" rtlCol="0">
+            <a:spAutoFit/>
+          </a:bodyPr>
+          <a:lstStyle/>
+          <a:p>
+            <a:r>
+              <a:rPr lang="en-US" sz="1400" b="1" dirty="0"/>
+              <a:t>Siemens  SIMATIC S7-1200 / S7-1500 Web Server</a:t>
+            </a:r>
+            <a:endParaRPr lang="en-SG" sz="1400" b="1" dirty="0"/>
+          </a:p>
+        </p:txBody>
+      </p:sp>
+      <p:sp>
+        <p:nvSpPr>
+          <p:cNvPr id="9" name="TextBox 8">
+            <a:extLst>
+              <a:ext uri="{FF2B5EF4-FFF2-40B4-BE49-F238E27FC236}">
+                <a16:creationId xmlns:a16="http://schemas.microsoft.com/office/drawing/2014/main" id="{4D38BA79-7F42-966B-FEB3-2D1DD81E3B0A}"/>
+              </a:ext>
+            </a:extLst>
+          </p:cNvPr>
+          <p:cNvSpPr txBox="1"/>
+          <p:nvPr/>
+        </p:nvSpPr>
+        <p:spPr>
+          <a:xfrm>
+            <a:off x="5952261" y="922985"/>
+            <a:ext cx="4668929" cy="307777"/>
+          </a:xfrm>
+          <a:prstGeom prst="rect">
+            <a:avLst/>
+          </a:prstGeom>
+          <a:noFill/>
+        </p:spPr>
+        <p:txBody>
+          <a:bodyPr wrap="square" rtlCol="0">
+            <a:spAutoFit/>
+          </a:bodyPr>
+          <a:lstStyle/>
+          <a:p>
+            <a:r>
+              <a:rPr lang="en-US" sz="1400" b="1" dirty="0">
+                <a:solidFill>
+                  <a:srgbClr val="C00000"/>
+                </a:solidFill>
+              </a:rPr>
+              <a:t>Honeypot Deception PLC Configuration Web Interface</a:t>
+            </a:r>
+            <a:endParaRPr lang="en-SG" sz="1400" b="1" dirty="0">
+              <a:solidFill>
+                <a:srgbClr val="C00000"/>
+              </a:solidFill>
+            </a:endParaRPr>
+          </a:p>
+        </p:txBody>
+      </p:sp>
+      <p:sp>
+        <p:nvSpPr>
+          <p:cNvPr id="10" name="Arrow: Right 9">
+            <a:extLst>
+              <a:ext uri="{FF2B5EF4-FFF2-40B4-BE49-F238E27FC236}">
+                <a16:creationId xmlns:a16="http://schemas.microsoft.com/office/drawing/2014/main" id="{B6C22809-53BF-8E09-5DD9-8B66B375FF53}"/>
+              </a:ext>
+            </a:extLst>
+          </p:cNvPr>
+          <p:cNvSpPr/>
+          <p:nvPr/>
+        </p:nvSpPr>
+        <p:spPr>
+          <a:xfrm>
+            <a:off x="5696404" y="2821615"/>
+            <a:ext cx="268448" cy="204807"/>
+          </a:xfrm>
+          <a:prstGeom prst="rightArrow">
+            <a:avLst/>
+          </a:prstGeom>
+          <a:solidFill>
+            <a:srgbClr val="FF0000"/>
+          </a:solidFill>
+        </p:spPr>
+        <p:style>
+          <a:lnRef idx="2">
+            <a:schemeClr val="accent1">
+              <a:shade val="15000"/>
+            </a:schemeClr>
+          </a:lnRef>
+          <a:fillRef idx="1">
+            <a:schemeClr val="accent1"/>
+          </a:fillRef>
+          <a:effectRef idx="0">
+            <a:schemeClr val="accent1"/>
+          </a:effectRef>
+          <a:fontRef idx="minor">
+            <a:schemeClr val="lt1"/>
+          </a:fontRef>
+        </p:style>
+        <p:txBody>
+          <a:bodyPr rtlCol="0" anchor="ctr"/>
+          <a:lstStyle/>
+          <a:p>
+            <a:pPr algn="ctr"/>
+            <a:endParaRPr lang="en-SG"/>
+          </a:p>
+        </p:txBody>
+      </p:sp>
+    </p:spTree>
+    <p:extLst>
+      <p:ext uri="{BB962C8B-B14F-4D97-AF65-F5344CB8AC3E}">
+        <p14:creationId xmlns:p14="http://schemas.microsoft.com/office/powerpoint/2010/main" val="3428833704"/>
       </p:ext>
     </p:extLst>
   </p:cSld>

</xml_diff>

<commit_message>
Update the readme log archive system.
</commit_message>
<xml_diff>
--- a/doc/designDoc.pptx
+++ b/doc/designDoc.pptx
@@ -5,7 +5,7 @@
     <p:sldMasterId id="2147483648" r:id="rId1"/>
   </p:sldMasterIdLst>
   <p:notesMasterIdLst>
-    <p:notesMasterId r:id="rId12"/>
+    <p:notesMasterId r:id="rId13"/>
   </p:notesMasterIdLst>
   <p:sldIdLst>
     <p:sldId id="256" r:id="rId2"/>
@@ -18,6 +18,7 @@
     <p:sldId id="263" r:id="rId9"/>
     <p:sldId id="264" r:id="rId10"/>
     <p:sldId id="265" r:id="rId11"/>
+    <p:sldId id="266" r:id="rId12"/>
   </p:sldIdLst>
   <p:sldSz cx="12192000" cy="6858000"/>
   <p:notesSz cx="6858000" cy="9144000"/>
@@ -4306,6 +4307,190 @@
     <p:extLst>
       <p:ext uri="{BB962C8B-B14F-4D97-AF65-F5344CB8AC3E}">
         <p14:creationId xmlns:p14="http://schemas.microsoft.com/office/powerpoint/2010/main" val="3935892349"/>
+      </p:ext>
+    </p:extLst>
+  </p:cSld>
+  <p:clrMapOvr>
+    <a:masterClrMapping/>
+  </p:clrMapOvr>
+</p:sld>
+</file>
+
+<file path=ppt/slides/slide11.xml><?xml version="1.0" encoding="utf-8"?>
+<p:sld xmlns:a="http://schemas.openxmlformats.org/drawingml/2006/main" xmlns:r="http://schemas.openxmlformats.org/officeDocument/2006/relationships" xmlns:p="http://schemas.openxmlformats.org/presentationml/2006/main">
+  <p:cSld>
+    <p:spTree>
+      <p:nvGrpSpPr>
+        <p:cNvPr id="1" name=""/>
+        <p:cNvGrpSpPr/>
+        <p:nvPr/>
+      </p:nvGrpSpPr>
+      <p:grpSpPr>
+        <a:xfrm>
+          <a:off x="0" y="0"/>
+          <a:ext cx="0" cy="0"/>
+          <a:chOff x="0" y="0"/>
+          <a:chExt cx="0" cy="0"/>
+        </a:xfrm>
+      </p:grpSpPr>
+      <p:pic>
+        <p:nvPicPr>
+          <p:cNvPr id="5" name="Picture 4" descr="A screenshot of a computer&#10;&#10;Description automatically generated">
+            <a:extLst>
+              <a:ext uri="{FF2B5EF4-FFF2-40B4-BE49-F238E27FC236}">
+                <a16:creationId xmlns:a16="http://schemas.microsoft.com/office/drawing/2014/main" id="{BB017847-D560-748F-25C5-3E94E1049500}"/>
+              </a:ext>
+            </a:extLst>
+          </p:cNvPr>
+          <p:cNvPicPr>
+            <a:picLocks noChangeAspect="1"/>
+          </p:cNvPicPr>
+          <p:nvPr/>
+        </p:nvPicPr>
+        <p:blipFill>
+          <a:blip r:embed="rId2">
+            <a:extLst>
+              <a:ext uri="{28A0092B-C50C-407E-A947-70E740481C1C}">
+                <a14:useLocalDpi xmlns:a14="http://schemas.microsoft.com/office/drawing/2010/main" val="0"/>
+              </a:ext>
+            </a:extLst>
+          </a:blip>
+          <a:stretch>
+            <a:fillRect/>
+          </a:stretch>
+        </p:blipFill>
+        <p:spPr>
+          <a:xfrm>
+            <a:off x="6177689" y="1410099"/>
+            <a:ext cx="5026119" cy="3399825"/>
+          </a:xfrm>
+          <a:prstGeom prst="rect">
+            <a:avLst/>
+          </a:prstGeom>
+          <a:ln w="9525">
+            <a:solidFill>
+              <a:schemeClr val="tx1"/>
+            </a:solidFill>
+          </a:ln>
+        </p:spPr>
+      </p:pic>
+      <p:pic>
+        <p:nvPicPr>
+          <p:cNvPr id="7" name="Picture 6" descr="A screenshot of a computer&#10;&#10;Description automatically generated">
+            <a:extLst>
+              <a:ext uri="{FF2B5EF4-FFF2-40B4-BE49-F238E27FC236}">
+                <a16:creationId xmlns:a16="http://schemas.microsoft.com/office/drawing/2014/main" id="{C2EDA158-3B1E-8F2C-9681-9DEC488E6E01}"/>
+              </a:ext>
+            </a:extLst>
+          </p:cNvPr>
+          <p:cNvPicPr>
+            <a:picLocks noChangeAspect="1"/>
+          </p:cNvPicPr>
+          <p:nvPr/>
+        </p:nvPicPr>
+        <p:blipFill>
+          <a:blip r:embed="rId3">
+            <a:extLst>
+              <a:ext uri="{28A0092B-C50C-407E-A947-70E740481C1C}">
+                <a14:useLocalDpi xmlns:a14="http://schemas.microsoft.com/office/drawing/2010/main" val="0"/>
+              </a:ext>
+            </a:extLst>
+          </a:blip>
+          <a:stretch>
+            <a:fillRect/>
+          </a:stretch>
+        </p:blipFill>
+        <p:spPr>
+          <a:xfrm>
+            <a:off x="882063" y="1410100"/>
+            <a:ext cx="5026119" cy="3399824"/>
+          </a:xfrm>
+          <a:prstGeom prst="rect">
+            <a:avLst/>
+          </a:prstGeom>
+          <a:ln w="9525">
+            <a:solidFill>
+              <a:schemeClr val="tx1"/>
+            </a:solidFill>
+          </a:ln>
+        </p:spPr>
+      </p:pic>
+      <p:sp>
+        <p:nvSpPr>
+          <p:cNvPr id="8" name="TextBox 7">
+            <a:extLst>
+              <a:ext uri="{FF2B5EF4-FFF2-40B4-BE49-F238E27FC236}">
+                <a16:creationId xmlns:a16="http://schemas.microsoft.com/office/drawing/2014/main" id="{3FAEBA81-3727-E737-6127-3AAE90550387}"/>
+              </a:ext>
+            </a:extLst>
+          </p:cNvPr>
+          <p:cNvSpPr txBox="1"/>
+          <p:nvPr/>
+        </p:nvSpPr>
+        <p:spPr>
+          <a:xfrm>
+            <a:off x="806771" y="1033949"/>
+            <a:ext cx="4455342" cy="307777"/>
+          </a:xfrm>
+          <a:prstGeom prst="rect">
+            <a:avLst/>
+          </a:prstGeom>
+          <a:noFill/>
+        </p:spPr>
+        <p:txBody>
+          <a:bodyPr wrap="square" rtlCol="0">
+            <a:spAutoFit/>
+          </a:bodyPr>
+          <a:lstStyle/>
+          <a:p>
+            <a:r>
+              <a:rPr lang="en-US" sz="1400" b="1" dirty="0"/>
+              <a:t>Honeypot log archive server main page</a:t>
+            </a:r>
+            <a:endParaRPr lang="en-SG" sz="1400" b="1" dirty="0"/>
+          </a:p>
+        </p:txBody>
+      </p:sp>
+      <p:sp>
+        <p:nvSpPr>
+          <p:cNvPr id="9" name="TextBox 8">
+            <a:extLst>
+              <a:ext uri="{FF2B5EF4-FFF2-40B4-BE49-F238E27FC236}">
+                <a16:creationId xmlns:a16="http://schemas.microsoft.com/office/drawing/2014/main" id="{857652EA-9C2C-5B20-160A-B6D2C775E4D7}"/>
+              </a:ext>
+            </a:extLst>
+          </p:cNvPr>
+          <p:cNvSpPr txBox="1"/>
+          <p:nvPr/>
+        </p:nvSpPr>
+        <p:spPr>
+          <a:xfrm>
+            <a:off x="6096000" y="1033948"/>
+            <a:ext cx="4853069" cy="307777"/>
+          </a:xfrm>
+          <a:prstGeom prst="rect">
+            <a:avLst/>
+          </a:prstGeom>
+          <a:noFill/>
+        </p:spPr>
+        <p:txBody>
+          <a:bodyPr wrap="square" rtlCol="0">
+            <a:spAutoFit/>
+          </a:bodyPr>
+          <a:lstStyle/>
+          <a:p>
+            <a:r>
+              <a:rPr lang="en-US" sz="1400" b="1" dirty="0"/>
+              <a:t>Honeypot log archive server components log view page</a:t>
+            </a:r>
+            <a:endParaRPr lang="en-SG" sz="1400" b="1" dirty="0"/>
+          </a:p>
+        </p:txBody>
+      </p:sp>
+    </p:spTree>
+    <p:extLst>
+      <p:ext uri="{BB962C8B-B14F-4D97-AF65-F5344CB8AC3E}">
+        <p14:creationId xmlns:p14="http://schemas.microsoft.com/office/powerpoint/2010/main" val="1215515222"/>
       </p:ext>
     </p:extLst>
   </p:cSld>

</xml_diff>

<commit_message>
Update the monitor section.
</commit_message>
<xml_diff>
--- a/doc/designDoc.pptx
+++ b/doc/designDoc.pptx
@@ -5,7 +5,7 @@
     <p:sldMasterId id="2147483648" r:id="rId1"/>
   </p:sldMasterIdLst>
   <p:notesMasterIdLst>
-    <p:notesMasterId r:id="rId14"/>
+    <p:notesMasterId r:id="rId17"/>
   </p:notesMasterIdLst>
   <p:sldIdLst>
     <p:sldId id="256" r:id="rId2"/>
@@ -19,7 +19,10 @@
     <p:sldId id="263" r:id="rId10"/>
     <p:sldId id="264" r:id="rId11"/>
     <p:sldId id="265" r:id="rId12"/>
-    <p:sldId id="266" r:id="rId13"/>
+    <p:sldId id="268" r:id="rId13"/>
+    <p:sldId id="266" r:id="rId14"/>
+    <p:sldId id="269" r:id="rId15"/>
+    <p:sldId id="270" r:id="rId16"/>
   </p:sldIdLst>
   <p:sldSz cx="12192000" cy="6858000"/>
   <p:notesSz cx="6858000" cy="9144000"/>
@@ -208,7 +211,7 @@
           <a:p>
             <a:fld id="{C711259C-07AC-49B2-B02B-76ECE0D8068C}" type="datetimeFigureOut">
               <a:rPr lang="en-SG" smtClean="0"/>
-              <a:t>23/11/2024</a:t>
+              <a:t>24/11/2024</a:t>
             </a:fld>
             <a:endParaRPr lang="en-SG"/>
           </a:p>
@@ -709,7 +712,7 @@
           <a:p>
             <a:fld id="{E7602038-B3F0-4825-ABDA-D66CE1C4CFDA}" type="datetimeFigureOut">
               <a:rPr lang="en-SG" smtClean="0"/>
-              <a:t>23/11/2024</a:t>
+              <a:t>24/11/2024</a:t>
             </a:fld>
             <a:endParaRPr lang="en-SG"/>
           </a:p>
@@ -909,7 +912,7 @@
           <a:p>
             <a:fld id="{E7602038-B3F0-4825-ABDA-D66CE1C4CFDA}" type="datetimeFigureOut">
               <a:rPr lang="en-SG" smtClean="0"/>
-              <a:t>23/11/2024</a:t>
+              <a:t>24/11/2024</a:t>
             </a:fld>
             <a:endParaRPr lang="en-SG"/>
           </a:p>
@@ -1119,7 +1122,7 @@
           <a:p>
             <a:fld id="{E7602038-B3F0-4825-ABDA-D66CE1C4CFDA}" type="datetimeFigureOut">
               <a:rPr lang="en-SG" smtClean="0"/>
-              <a:t>23/11/2024</a:t>
+              <a:t>24/11/2024</a:t>
             </a:fld>
             <a:endParaRPr lang="en-SG"/>
           </a:p>
@@ -1319,7 +1322,7 @@
           <a:p>
             <a:fld id="{E7602038-B3F0-4825-ABDA-D66CE1C4CFDA}" type="datetimeFigureOut">
               <a:rPr lang="en-SG" smtClean="0"/>
-              <a:t>23/11/2024</a:t>
+              <a:t>24/11/2024</a:t>
             </a:fld>
             <a:endParaRPr lang="en-SG"/>
           </a:p>
@@ -1595,7 +1598,7 @@
           <a:p>
             <a:fld id="{E7602038-B3F0-4825-ABDA-D66CE1C4CFDA}" type="datetimeFigureOut">
               <a:rPr lang="en-SG" smtClean="0"/>
-              <a:t>23/11/2024</a:t>
+              <a:t>24/11/2024</a:t>
             </a:fld>
             <a:endParaRPr lang="en-SG"/>
           </a:p>
@@ -1863,7 +1866,7 @@
           <a:p>
             <a:fld id="{E7602038-B3F0-4825-ABDA-D66CE1C4CFDA}" type="datetimeFigureOut">
               <a:rPr lang="en-SG" smtClean="0"/>
-              <a:t>23/11/2024</a:t>
+              <a:t>24/11/2024</a:t>
             </a:fld>
             <a:endParaRPr lang="en-SG"/>
           </a:p>
@@ -2278,7 +2281,7 @@
           <a:p>
             <a:fld id="{E7602038-B3F0-4825-ABDA-D66CE1C4CFDA}" type="datetimeFigureOut">
               <a:rPr lang="en-SG" smtClean="0"/>
-              <a:t>23/11/2024</a:t>
+              <a:t>24/11/2024</a:t>
             </a:fld>
             <a:endParaRPr lang="en-SG"/>
           </a:p>
@@ -2420,7 +2423,7 @@
           <a:p>
             <a:fld id="{E7602038-B3F0-4825-ABDA-D66CE1C4CFDA}" type="datetimeFigureOut">
               <a:rPr lang="en-SG" smtClean="0"/>
-              <a:t>23/11/2024</a:t>
+              <a:t>24/11/2024</a:t>
             </a:fld>
             <a:endParaRPr lang="en-SG"/>
           </a:p>
@@ -2533,7 +2536,7 @@
           <a:p>
             <a:fld id="{E7602038-B3F0-4825-ABDA-D66CE1C4CFDA}" type="datetimeFigureOut">
               <a:rPr lang="en-SG" smtClean="0"/>
-              <a:t>23/11/2024</a:t>
+              <a:t>24/11/2024</a:t>
             </a:fld>
             <a:endParaRPr lang="en-SG"/>
           </a:p>
@@ -2846,7 +2849,7 @@
           <a:p>
             <a:fld id="{E7602038-B3F0-4825-ABDA-D66CE1C4CFDA}" type="datetimeFigureOut">
               <a:rPr lang="en-SG" smtClean="0"/>
-              <a:t>23/11/2024</a:t>
+              <a:t>24/11/2024</a:t>
             </a:fld>
             <a:endParaRPr lang="en-SG"/>
           </a:p>
@@ -3135,7 +3138,7 @@
           <a:p>
             <a:fld id="{E7602038-B3F0-4825-ABDA-D66CE1C4CFDA}" type="datetimeFigureOut">
               <a:rPr lang="en-SG" smtClean="0"/>
-              <a:t>23/11/2024</a:t>
+              <a:t>24/11/2024</a:t>
             </a:fld>
             <a:endParaRPr lang="en-SG"/>
           </a:p>
@@ -3378,7 +3381,7 @@
           <a:p>
             <a:fld id="{E7602038-B3F0-4825-ABDA-D66CE1C4CFDA}" type="datetimeFigureOut">
               <a:rPr lang="en-SG" smtClean="0"/>
-              <a:t>23/11/2024</a:t>
+              <a:t>24/11/2024</a:t>
             </a:fld>
             <a:endParaRPr lang="en-SG"/>
           </a:p>
@@ -4732,12 +4735,220 @@
           <a:chExt cx="0" cy="0"/>
         </a:xfrm>
       </p:grpSpPr>
+      <p:sp>
+        <p:nvSpPr>
+          <p:cNvPr id="100" name="Cloud 99">
+            <a:extLst>
+              <a:ext uri="{FF2B5EF4-FFF2-40B4-BE49-F238E27FC236}">
+                <a16:creationId xmlns:a16="http://schemas.microsoft.com/office/drawing/2014/main" id="{6D2DAC49-10E2-2F14-CB5B-2931D0212CBA}"/>
+              </a:ext>
+            </a:extLst>
+          </p:cNvPr>
+          <p:cNvSpPr/>
+          <p:nvPr/>
+        </p:nvSpPr>
+        <p:spPr>
+          <a:xfrm>
+            <a:off x="6247969" y="2567379"/>
+            <a:ext cx="798601" cy="502819"/>
+          </a:xfrm>
+          <a:prstGeom prst="cloud">
+            <a:avLst/>
+          </a:prstGeom>
+          <a:solidFill>
+            <a:schemeClr val="bg1">
+              <a:lumMod val="85000"/>
+            </a:schemeClr>
+          </a:solidFill>
+        </p:spPr>
+        <p:style>
+          <a:lnRef idx="2">
+            <a:schemeClr val="accent1">
+              <a:shade val="15000"/>
+            </a:schemeClr>
+          </a:lnRef>
+          <a:fillRef idx="1">
+            <a:schemeClr val="accent1"/>
+          </a:fillRef>
+          <a:effectRef idx="0">
+            <a:schemeClr val="accent1"/>
+          </a:effectRef>
+          <a:fontRef idx="minor">
+            <a:schemeClr val="lt1"/>
+          </a:fontRef>
+        </p:style>
+        <p:txBody>
+          <a:bodyPr rtlCol="0" anchor="ctr"/>
+          <a:lstStyle/>
+          <a:p>
+            <a:pPr algn="ctr"/>
+            <a:endParaRPr lang="en-SG" sz="1050" b="1" dirty="0">
+              <a:solidFill>
+                <a:schemeClr val="tx1"/>
+              </a:solidFill>
+            </a:endParaRPr>
+          </a:p>
+        </p:txBody>
+      </p:sp>
+      <p:sp>
+        <p:nvSpPr>
+          <p:cNvPr id="68" name="Rectangle 67">
+            <a:extLst>
+              <a:ext uri="{FF2B5EF4-FFF2-40B4-BE49-F238E27FC236}">
+                <a16:creationId xmlns:a16="http://schemas.microsoft.com/office/drawing/2014/main" id="{2C58E68F-1D70-9A11-0372-844F383B7565}"/>
+              </a:ext>
+            </a:extLst>
+          </p:cNvPr>
+          <p:cNvSpPr/>
+          <p:nvPr/>
+        </p:nvSpPr>
+        <p:spPr>
+          <a:xfrm>
+            <a:off x="7729936" y="3575580"/>
+            <a:ext cx="1292611" cy="553568"/>
+          </a:xfrm>
+          <a:prstGeom prst="rect">
+            <a:avLst/>
+          </a:prstGeom>
+          <a:solidFill>
+            <a:schemeClr val="bg2"/>
+          </a:solidFill>
+        </p:spPr>
+        <p:style>
+          <a:lnRef idx="2">
+            <a:schemeClr val="accent1">
+              <a:shade val="15000"/>
+            </a:schemeClr>
+          </a:lnRef>
+          <a:fillRef idx="1">
+            <a:schemeClr val="accent1"/>
+          </a:fillRef>
+          <a:effectRef idx="0">
+            <a:schemeClr val="accent1"/>
+          </a:effectRef>
+          <a:fontRef idx="minor">
+            <a:schemeClr val="lt1"/>
+          </a:fontRef>
+        </p:style>
+        <p:txBody>
+          <a:bodyPr rtlCol="0" anchor="ctr"/>
+          <a:lstStyle/>
+          <a:p>
+            <a:pPr algn="ctr"/>
+            <a:endParaRPr lang="en-SG"/>
+          </a:p>
+        </p:txBody>
+      </p:sp>
+      <p:sp>
+        <p:nvSpPr>
+          <p:cNvPr id="4" name="Rectangle 3">
+            <a:extLst>
+              <a:ext uri="{FF2B5EF4-FFF2-40B4-BE49-F238E27FC236}">
+                <a16:creationId xmlns:a16="http://schemas.microsoft.com/office/drawing/2014/main" id="{496D88C8-BD96-6952-AA27-F68D5F71DEAB}"/>
+              </a:ext>
+            </a:extLst>
+          </p:cNvPr>
+          <p:cNvSpPr/>
+          <p:nvPr/>
+        </p:nvSpPr>
+        <p:spPr>
+          <a:xfrm>
+            <a:off x="1915545" y="1220939"/>
+            <a:ext cx="1614918" cy="545618"/>
+          </a:xfrm>
+          <a:prstGeom prst="rect">
+            <a:avLst/>
+          </a:prstGeom>
+          <a:solidFill>
+            <a:schemeClr val="tx2">
+              <a:lumMod val="75000"/>
+            </a:schemeClr>
+          </a:solidFill>
+        </p:spPr>
+        <p:style>
+          <a:lnRef idx="2">
+            <a:schemeClr val="accent1">
+              <a:shade val="50000"/>
+            </a:schemeClr>
+          </a:lnRef>
+          <a:fillRef idx="1">
+            <a:schemeClr val="accent1"/>
+          </a:fillRef>
+          <a:effectRef idx="0">
+            <a:schemeClr val="accent1"/>
+          </a:effectRef>
+          <a:fontRef idx="minor">
+            <a:schemeClr val="lt1"/>
+          </a:fontRef>
+        </p:style>
+        <p:txBody>
+          <a:bodyPr rtlCol="0" anchor="ctr"/>
+          <a:lstStyle/>
+          <a:p>
+            <a:pPr algn="ctr"/>
+            <a:r>
+              <a:rPr lang="en-US" sz="1200" dirty="0"/>
+              <a:t>PLC Emulator or Controller  programs </a:t>
+            </a:r>
+            <a:endParaRPr lang="en-SG" sz="1200" dirty="0"/>
+          </a:p>
+        </p:txBody>
+      </p:sp>
+      <p:sp>
+        <p:nvSpPr>
+          <p:cNvPr id="5" name="Rectangle 4">
+            <a:extLst>
+              <a:ext uri="{FF2B5EF4-FFF2-40B4-BE49-F238E27FC236}">
+                <a16:creationId xmlns:a16="http://schemas.microsoft.com/office/drawing/2014/main" id="{6C55582E-04FE-061A-F785-C02A766BBE90}"/>
+              </a:ext>
+            </a:extLst>
+          </p:cNvPr>
+          <p:cNvSpPr/>
+          <p:nvPr/>
+        </p:nvSpPr>
+        <p:spPr>
+          <a:xfrm>
+            <a:off x="2232558" y="2571084"/>
+            <a:ext cx="1088441" cy="408331"/>
+          </a:xfrm>
+          <a:prstGeom prst="rect">
+            <a:avLst/>
+          </a:prstGeom>
+          <a:solidFill>
+            <a:schemeClr val="bg2"/>
+          </a:solidFill>
+        </p:spPr>
+        <p:style>
+          <a:lnRef idx="2">
+            <a:schemeClr val="accent1">
+              <a:shade val="15000"/>
+            </a:schemeClr>
+          </a:lnRef>
+          <a:fillRef idx="1">
+            <a:schemeClr val="accent1"/>
+          </a:fillRef>
+          <a:effectRef idx="0">
+            <a:schemeClr val="accent1"/>
+          </a:effectRef>
+          <a:fontRef idx="minor">
+            <a:schemeClr val="lt1"/>
+          </a:fontRef>
+        </p:style>
+        <p:txBody>
+          <a:bodyPr rtlCol="0" anchor="ctr"/>
+          <a:lstStyle/>
+          <a:p>
+            <a:pPr algn="ctr"/>
+            <a:endParaRPr lang="en-SG"/>
+          </a:p>
+        </p:txBody>
+      </p:sp>
       <p:pic>
         <p:nvPicPr>
-          <p:cNvPr id="5" name="Picture 4" descr="A screenshot of a computer&#10;&#10;Description automatically generated">
-            <a:extLst>
-              <a:ext uri="{FF2B5EF4-FFF2-40B4-BE49-F238E27FC236}">
-                <a16:creationId xmlns:a16="http://schemas.microsoft.com/office/drawing/2014/main" id="{BB017847-D560-748F-25C5-3E94E1049500}"/>
+          <p:cNvPr id="6" name="Picture 5">
+            <a:extLst>
+              <a:ext uri="{FF2B5EF4-FFF2-40B4-BE49-F238E27FC236}">
+                <a16:creationId xmlns:a16="http://schemas.microsoft.com/office/drawing/2014/main" id="{1DA25188-39D5-AB9C-C956-AB6425A37745}"/>
               </a:ext>
             </a:extLst>
           </p:cNvPr>
@@ -4747,7 +4958,2712 @@
           <p:nvPr/>
         </p:nvPicPr>
         <p:blipFill>
-          <a:blip r:embed="rId2">
+          <a:blip r:embed="rId2"/>
+          <a:stretch>
+            <a:fillRect/>
+          </a:stretch>
+        </p:blipFill>
+        <p:spPr>
+          <a:xfrm>
+            <a:off x="2291633" y="2619470"/>
+            <a:ext cx="261165" cy="276835"/>
+          </a:xfrm>
+          <a:prstGeom prst="rect">
+            <a:avLst/>
+          </a:prstGeom>
+        </p:spPr>
+      </p:pic>
+      <p:pic>
+        <p:nvPicPr>
+          <p:cNvPr id="7" name="Picture 6">
+            <a:extLst>
+              <a:ext uri="{FF2B5EF4-FFF2-40B4-BE49-F238E27FC236}">
+                <a16:creationId xmlns:a16="http://schemas.microsoft.com/office/drawing/2014/main" id="{197E98A7-FB19-A178-8AE5-3973524022B1}"/>
+              </a:ext>
+            </a:extLst>
+          </p:cNvPr>
+          <p:cNvPicPr>
+            <a:picLocks noChangeAspect="1"/>
+          </p:cNvPicPr>
+          <p:nvPr/>
+        </p:nvPicPr>
+        <p:blipFill>
+          <a:blip r:embed="rId2"/>
+          <a:stretch>
+            <a:fillRect/>
+          </a:stretch>
+        </p:blipFill>
+        <p:spPr>
+          <a:xfrm>
+            <a:off x="2627540" y="2619470"/>
+            <a:ext cx="261165" cy="276835"/>
+          </a:xfrm>
+          <a:prstGeom prst="rect">
+            <a:avLst/>
+          </a:prstGeom>
+        </p:spPr>
+      </p:pic>
+      <p:pic>
+        <p:nvPicPr>
+          <p:cNvPr id="8" name="Picture 7">
+            <a:extLst>
+              <a:ext uri="{FF2B5EF4-FFF2-40B4-BE49-F238E27FC236}">
+                <a16:creationId xmlns:a16="http://schemas.microsoft.com/office/drawing/2014/main" id="{FE4E10A0-AEE1-CA69-AF29-3F1CEB5AF14E}"/>
+              </a:ext>
+            </a:extLst>
+          </p:cNvPr>
+          <p:cNvPicPr>
+            <a:picLocks noChangeAspect="1"/>
+          </p:cNvPicPr>
+          <p:nvPr/>
+        </p:nvPicPr>
+        <p:blipFill>
+          <a:blip r:embed="rId2"/>
+          <a:stretch>
+            <a:fillRect/>
+          </a:stretch>
+        </p:blipFill>
+        <p:spPr>
+          <a:xfrm>
+            <a:off x="2986741" y="2619470"/>
+            <a:ext cx="261165" cy="276835"/>
+          </a:xfrm>
+          <a:prstGeom prst="rect">
+            <a:avLst/>
+          </a:prstGeom>
+        </p:spPr>
+      </p:pic>
+      <p:sp>
+        <p:nvSpPr>
+          <p:cNvPr id="9" name="TextBox 8">
+            <a:extLst>
+              <a:ext uri="{FF2B5EF4-FFF2-40B4-BE49-F238E27FC236}">
+                <a16:creationId xmlns:a16="http://schemas.microsoft.com/office/drawing/2014/main" id="{D00B3B4F-06B8-90F9-4153-D2B91596C555}"/>
+              </a:ext>
+            </a:extLst>
+          </p:cNvPr>
+          <p:cNvSpPr txBox="1"/>
+          <p:nvPr/>
+        </p:nvSpPr>
+        <p:spPr>
+          <a:xfrm>
+            <a:off x="2146391" y="2331315"/>
+            <a:ext cx="1260772" cy="261610"/>
+          </a:xfrm>
+          <a:prstGeom prst="rect">
+            <a:avLst/>
+          </a:prstGeom>
+          <a:noFill/>
+        </p:spPr>
+        <p:txBody>
+          <a:bodyPr wrap="square" rtlCol="0">
+            <a:spAutoFit/>
+          </a:bodyPr>
+          <a:lstStyle/>
+          <a:p>
+            <a:r>
+              <a:rPr lang="en-US" sz="1050" b="1" dirty="0"/>
+              <a:t>Local log storage </a:t>
+            </a:r>
+            <a:endParaRPr lang="en-SG" sz="1050" b="1" dirty="0"/>
+          </a:p>
+        </p:txBody>
+      </p:sp>
+      <p:cxnSp>
+        <p:nvCxnSpPr>
+          <p:cNvPr id="11" name="Connector: Elbow 10">
+            <a:extLst>
+              <a:ext uri="{FF2B5EF4-FFF2-40B4-BE49-F238E27FC236}">
+                <a16:creationId xmlns:a16="http://schemas.microsoft.com/office/drawing/2014/main" id="{22E5D778-3240-E25B-D41E-524984A90173}"/>
+              </a:ext>
+            </a:extLst>
+          </p:cNvPr>
+          <p:cNvCxnSpPr>
+            <a:cxnSpLocks/>
+            <a:stCxn id="4" idx="2"/>
+            <a:endCxn id="6" idx="1"/>
+          </p:cNvCxnSpPr>
+          <p:nvPr/>
+        </p:nvCxnSpPr>
+        <p:spPr>
+          <a:xfrm rot="5400000">
+            <a:off x="2011654" y="2046537"/>
+            <a:ext cx="991331" cy="431371"/>
+          </a:xfrm>
+          <a:prstGeom prst="bentConnector4">
+            <a:avLst>
+              <a:gd name="adj1" fmla="val 43019"/>
+              <a:gd name="adj2" fmla="val 152994"/>
+            </a:avLst>
+          </a:prstGeom>
+          <a:ln>
+            <a:prstDash val="sysDash"/>
+            <a:tailEnd type="triangle"/>
+          </a:ln>
+        </p:spPr>
+        <p:style>
+          <a:lnRef idx="2">
+            <a:schemeClr val="accent1"/>
+          </a:lnRef>
+          <a:fillRef idx="0">
+            <a:schemeClr val="accent1"/>
+          </a:fillRef>
+          <a:effectRef idx="1">
+            <a:schemeClr val="accent1"/>
+          </a:effectRef>
+          <a:fontRef idx="minor">
+            <a:schemeClr val="tx1"/>
+          </a:fontRef>
+        </p:style>
+      </p:cxnSp>
+      <p:sp>
+        <p:nvSpPr>
+          <p:cNvPr id="13" name="TextBox 12">
+            <a:extLst>
+              <a:ext uri="{FF2B5EF4-FFF2-40B4-BE49-F238E27FC236}">
+                <a16:creationId xmlns:a16="http://schemas.microsoft.com/office/drawing/2014/main" id="{6C632DF0-708C-63FD-4A42-261E68062EB5}"/>
+              </a:ext>
+            </a:extLst>
+          </p:cNvPr>
+          <p:cNvSpPr txBox="1"/>
+          <p:nvPr/>
+        </p:nvSpPr>
+        <p:spPr>
+          <a:xfrm>
+            <a:off x="1923950" y="1819768"/>
+            <a:ext cx="928254" cy="415498"/>
+          </a:xfrm>
+          <a:prstGeom prst="rect">
+            <a:avLst/>
+          </a:prstGeom>
+          <a:noFill/>
+        </p:spPr>
+        <p:txBody>
+          <a:bodyPr wrap="square" rtlCol="0">
+            <a:spAutoFit/>
+          </a:bodyPr>
+          <a:lstStyle/>
+          <a:p>
+            <a:r>
+              <a:rPr lang="en-US" sz="1050" dirty="0"/>
+              <a:t>Create log files</a:t>
+            </a:r>
+            <a:endParaRPr lang="en-SG" sz="1050" dirty="0"/>
+          </a:p>
+        </p:txBody>
+      </p:sp>
+      <p:sp>
+        <p:nvSpPr>
+          <p:cNvPr id="14" name="Rectangle 13">
+            <a:extLst>
+              <a:ext uri="{FF2B5EF4-FFF2-40B4-BE49-F238E27FC236}">
+                <a16:creationId xmlns:a16="http://schemas.microsoft.com/office/drawing/2014/main" id="{62560CF6-5A8E-9887-6077-F154D0313745}"/>
+              </a:ext>
+            </a:extLst>
+          </p:cNvPr>
+          <p:cNvSpPr/>
+          <p:nvPr/>
+        </p:nvSpPr>
+        <p:spPr>
+          <a:xfrm>
+            <a:off x="3761753" y="1214053"/>
+            <a:ext cx="1614919" cy="276834"/>
+          </a:xfrm>
+          <a:prstGeom prst="rect">
+            <a:avLst/>
+          </a:prstGeom>
+          <a:solidFill>
+            <a:schemeClr val="accent2">
+              <a:lumMod val="75000"/>
+            </a:schemeClr>
+          </a:solidFill>
+        </p:spPr>
+        <p:style>
+          <a:lnRef idx="2">
+            <a:schemeClr val="accent1">
+              <a:shade val="50000"/>
+            </a:schemeClr>
+          </a:lnRef>
+          <a:fillRef idx="1">
+            <a:schemeClr val="accent1"/>
+          </a:fillRef>
+          <a:effectRef idx="0">
+            <a:schemeClr val="accent1"/>
+          </a:effectRef>
+          <a:fontRef idx="minor">
+            <a:schemeClr val="lt1"/>
+          </a:fontRef>
+        </p:style>
+        <p:txBody>
+          <a:bodyPr rtlCol="0" anchor="ctr"/>
+          <a:lstStyle/>
+          <a:p>
+            <a:pPr algn="ctr"/>
+            <a:r>
+              <a:rPr lang="en-US" sz="1200" dirty="0"/>
+              <a:t>Log Archive Agent Init </a:t>
+            </a:r>
+            <a:endParaRPr lang="en-SG" sz="1200" dirty="0"/>
+          </a:p>
+        </p:txBody>
+      </p:sp>
+      <p:pic>
+        <p:nvPicPr>
+          <p:cNvPr id="16" name="Picture 15">
+            <a:extLst>
+              <a:ext uri="{FF2B5EF4-FFF2-40B4-BE49-F238E27FC236}">
+                <a16:creationId xmlns:a16="http://schemas.microsoft.com/office/drawing/2014/main" id="{9ABF01B6-5F7F-F0FC-0810-7C7C627A0DA4}"/>
+              </a:ext>
+            </a:extLst>
+          </p:cNvPr>
+          <p:cNvPicPr>
+            <a:picLocks noChangeAspect="1"/>
+          </p:cNvPicPr>
+          <p:nvPr/>
+        </p:nvPicPr>
+        <p:blipFill>
+          <a:blip r:embed="rId3"/>
+          <a:stretch>
+            <a:fillRect/>
+          </a:stretch>
+        </p:blipFill>
+        <p:spPr>
+          <a:xfrm>
+            <a:off x="5680648" y="1092875"/>
+            <a:ext cx="391132" cy="488914"/>
+          </a:xfrm>
+          <a:prstGeom prst="rect">
+            <a:avLst/>
+          </a:prstGeom>
+        </p:spPr>
+      </p:pic>
+      <p:cxnSp>
+        <p:nvCxnSpPr>
+          <p:cNvPr id="18" name="Straight Arrow Connector 17">
+            <a:extLst>
+              <a:ext uri="{FF2B5EF4-FFF2-40B4-BE49-F238E27FC236}">
+                <a16:creationId xmlns:a16="http://schemas.microsoft.com/office/drawing/2014/main" id="{F94E17D0-8445-9BF2-4BE2-18DFC68052C3}"/>
+              </a:ext>
+            </a:extLst>
+          </p:cNvPr>
+          <p:cNvCxnSpPr>
+            <a:cxnSpLocks/>
+            <a:stCxn id="16" idx="1"/>
+          </p:cNvCxnSpPr>
+          <p:nvPr/>
+        </p:nvCxnSpPr>
+        <p:spPr>
+          <a:xfrm flipH="1">
+            <a:off x="5376672" y="1337332"/>
+            <a:ext cx="303976" cy="0"/>
+          </a:xfrm>
+          <a:prstGeom prst="straightConnector1">
+            <a:avLst/>
+          </a:prstGeom>
+          <a:ln>
+            <a:prstDash val="sysDash"/>
+            <a:tailEnd type="triangle"/>
+          </a:ln>
+        </p:spPr>
+        <p:style>
+          <a:lnRef idx="2">
+            <a:schemeClr val="accent1"/>
+          </a:lnRef>
+          <a:fillRef idx="0">
+            <a:schemeClr val="accent1"/>
+          </a:fillRef>
+          <a:effectRef idx="1">
+            <a:schemeClr val="accent1"/>
+          </a:effectRef>
+          <a:fontRef idx="minor">
+            <a:schemeClr val="tx1"/>
+          </a:fontRef>
+        </p:style>
+      </p:cxnSp>
+      <p:sp>
+        <p:nvSpPr>
+          <p:cNvPr id="19" name="TextBox 18">
+            <a:extLst>
+              <a:ext uri="{FF2B5EF4-FFF2-40B4-BE49-F238E27FC236}">
+                <a16:creationId xmlns:a16="http://schemas.microsoft.com/office/drawing/2014/main" id="{70BCD31F-3A65-DFE0-52C3-0BDE59819CF1}"/>
+              </a:ext>
+            </a:extLst>
+          </p:cNvPr>
+          <p:cNvSpPr txBox="1"/>
+          <p:nvPr/>
+        </p:nvSpPr>
+        <p:spPr>
+          <a:xfrm>
+            <a:off x="6070599" y="1102672"/>
+            <a:ext cx="813841" cy="415498"/>
+          </a:xfrm>
+          <a:prstGeom prst="rect">
+            <a:avLst/>
+          </a:prstGeom>
+          <a:noFill/>
+        </p:spPr>
+        <p:txBody>
+          <a:bodyPr wrap="square" rtlCol="0">
+            <a:spAutoFit/>
+          </a:bodyPr>
+          <a:lstStyle/>
+          <a:p>
+            <a:r>
+              <a:rPr lang="en-US" sz="1050" dirty="0"/>
+              <a:t>Agent config  file</a:t>
+            </a:r>
+            <a:endParaRPr lang="en-SG" sz="1050" dirty="0"/>
+          </a:p>
+        </p:txBody>
+      </p:sp>
+      <p:sp>
+        <p:nvSpPr>
+          <p:cNvPr id="20" name="Rectangle 19">
+            <a:extLst>
+              <a:ext uri="{FF2B5EF4-FFF2-40B4-BE49-F238E27FC236}">
+                <a16:creationId xmlns:a16="http://schemas.microsoft.com/office/drawing/2014/main" id="{B7213DE0-86D4-AD5C-94BE-501C084D4EAA}"/>
+              </a:ext>
+            </a:extLst>
+          </p:cNvPr>
+          <p:cNvSpPr/>
+          <p:nvPr/>
+        </p:nvSpPr>
+        <p:spPr>
+          <a:xfrm>
+            <a:off x="3761752" y="1876002"/>
+            <a:ext cx="1614919" cy="276834"/>
+          </a:xfrm>
+          <a:prstGeom prst="rect">
+            <a:avLst/>
+          </a:prstGeom>
+          <a:solidFill>
+            <a:schemeClr val="accent2">
+              <a:lumMod val="75000"/>
+            </a:schemeClr>
+          </a:solidFill>
+        </p:spPr>
+        <p:style>
+          <a:lnRef idx="2">
+            <a:schemeClr val="accent1">
+              <a:shade val="50000"/>
+            </a:schemeClr>
+          </a:lnRef>
+          <a:fillRef idx="1">
+            <a:schemeClr val="accent1"/>
+          </a:fillRef>
+          <a:effectRef idx="0">
+            <a:schemeClr val="accent1"/>
+          </a:effectRef>
+          <a:fontRef idx="minor">
+            <a:schemeClr val="lt1"/>
+          </a:fontRef>
+        </p:style>
+        <p:txBody>
+          <a:bodyPr rtlCol="0" anchor="ctr"/>
+          <a:lstStyle/>
+          <a:p>
+            <a:pPr algn="ctr"/>
+            <a:r>
+              <a:rPr lang="en-US" sz="1200" dirty="0"/>
+              <a:t>Record manager </a:t>
+            </a:r>
+            <a:endParaRPr lang="en-SG" sz="1200" dirty="0"/>
+          </a:p>
+        </p:txBody>
+      </p:sp>
+      <p:cxnSp>
+        <p:nvCxnSpPr>
+          <p:cNvPr id="22" name="Straight Arrow Connector 21">
+            <a:extLst>
+              <a:ext uri="{FF2B5EF4-FFF2-40B4-BE49-F238E27FC236}">
+                <a16:creationId xmlns:a16="http://schemas.microsoft.com/office/drawing/2014/main" id="{4D1BA325-B458-8E68-D9F2-5227D907CC92}"/>
+              </a:ext>
+            </a:extLst>
+          </p:cNvPr>
+          <p:cNvCxnSpPr>
+            <a:stCxn id="14" idx="2"/>
+            <a:endCxn id="20" idx="0"/>
+          </p:cNvCxnSpPr>
+          <p:nvPr/>
+        </p:nvCxnSpPr>
+        <p:spPr>
+          <a:xfrm flipH="1">
+            <a:off x="4569212" y="1490887"/>
+            <a:ext cx="1" cy="385115"/>
+          </a:xfrm>
+          <a:prstGeom prst="straightConnector1">
+            <a:avLst/>
+          </a:prstGeom>
+          <a:ln>
+            <a:tailEnd type="triangle"/>
+          </a:ln>
+        </p:spPr>
+        <p:style>
+          <a:lnRef idx="2">
+            <a:schemeClr val="dk1"/>
+          </a:lnRef>
+          <a:fillRef idx="0">
+            <a:schemeClr val="dk1"/>
+          </a:fillRef>
+          <a:effectRef idx="1">
+            <a:schemeClr val="dk1"/>
+          </a:effectRef>
+          <a:fontRef idx="minor">
+            <a:schemeClr val="tx1"/>
+          </a:fontRef>
+        </p:style>
+      </p:cxnSp>
+      <p:sp>
+        <p:nvSpPr>
+          <p:cNvPr id="23" name="TextBox 22">
+            <a:extLst>
+              <a:ext uri="{FF2B5EF4-FFF2-40B4-BE49-F238E27FC236}">
+                <a16:creationId xmlns:a16="http://schemas.microsoft.com/office/drawing/2014/main" id="{A1B5F95B-A149-1892-2605-E67E22F28CA3}"/>
+              </a:ext>
+            </a:extLst>
+          </p:cNvPr>
+          <p:cNvSpPr txBox="1"/>
+          <p:nvPr/>
+        </p:nvSpPr>
+        <p:spPr>
+          <a:xfrm>
+            <a:off x="4541040" y="1587167"/>
+            <a:ext cx="928254" cy="253916"/>
+          </a:xfrm>
+          <a:prstGeom prst="rect">
+            <a:avLst/>
+          </a:prstGeom>
+          <a:noFill/>
+        </p:spPr>
+        <p:txBody>
+          <a:bodyPr wrap="square" rtlCol="0">
+            <a:spAutoFit/>
+          </a:bodyPr>
+          <a:lstStyle/>
+          <a:p>
+            <a:r>
+              <a:rPr lang="en-US" sz="1050" b="1" dirty="0">
+                <a:solidFill>
+                  <a:schemeClr val="accent2">
+                    <a:lumMod val="75000"/>
+                  </a:schemeClr>
+                </a:solidFill>
+              </a:rPr>
+              <a:t>Main thread </a:t>
+            </a:r>
+            <a:endParaRPr lang="en-SG" sz="1050" b="1" dirty="0">
+              <a:solidFill>
+                <a:schemeClr val="accent2">
+                  <a:lumMod val="75000"/>
+                </a:schemeClr>
+              </a:solidFill>
+            </a:endParaRPr>
+          </a:p>
+        </p:txBody>
+      </p:sp>
+      <p:pic>
+        <p:nvPicPr>
+          <p:cNvPr id="24" name="Picture 23">
+            <a:extLst>
+              <a:ext uri="{FF2B5EF4-FFF2-40B4-BE49-F238E27FC236}">
+                <a16:creationId xmlns:a16="http://schemas.microsoft.com/office/drawing/2014/main" id="{95BC0253-1333-F998-53CB-116684E1A0E7}"/>
+              </a:ext>
+            </a:extLst>
+          </p:cNvPr>
+          <p:cNvPicPr>
+            <a:picLocks noChangeAspect="1"/>
+          </p:cNvPicPr>
+          <p:nvPr/>
+        </p:nvPicPr>
+        <p:blipFill>
+          <a:blip r:embed="rId4"/>
+          <a:stretch>
+            <a:fillRect/>
+          </a:stretch>
+        </p:blipFill>
+        <p:spPr>
+          <a:xfrm>
+            <a:off x="5672269" y="1716187"/>
+            <a:ext cx="391133" cy="469360"/>
+          </a:xfrm>
+          <a:prstGeom prst="rect">
+            <a:avLst/>
+          </a:prstGeom>
+        </p:spPr>
+      </p:pic>
+      <p:sp>
+        <p:nvSpPr>
+          <p:cNvPr id="25" name="TextBox 24">
+            <a:extLst>
+              <a:ext uri="{FF2B5EF4-FFF2-40B4-BE49-F238E27FC236}">
+                <a16:creationId xmlns:a16="http://schemas.microsoft.com/office/drawing/2014/main" id="{70FCC12F-FBCB-A1AF-B123-E283DC6CC99A}"/>
+              </a:ext>
+            </a:extLst>
+          </p:cNvPr>
+          <p:cNvSpPr txBox="1"/>
+          <p:nvPr/>
+        </p:nvSpPr>
+        <p:spPr>
+          <a:xfrm>
+            <a:off x="5989914" y="1685640"/>
+            <a:ext cx="738172" cy="577081"/>
+          </a:xfrm>
+          <a:prstGeom prst="rect">
+            <a:avLst/>
+          </a:prstGeom>
+          <a:noFill/>
+        </p:spPr>
+        <p:txBody>
+          <a:bodyPr wrap="square" rtlCol="0">
+            <a:spAutoFit/>
+          </a:bodyPr>
+          <a:lstStyle/>
+          <a:p>
+            <a:r>
+              <a:rPr lang="en-US" sz="1050" dirty="0"/>
+              <a:t>Log file uploaded record </a:t>
+            </a:r>
+            <a:endParaRPr lang="en-SG" sz="1050" dirty="0"/>
+          </a:p>
+        </p:txBody>
+      </p:sp>
+      <p:cxnSp>
+        <p:nvCxnSpPr>
+          <p:cNvPr id="29" name="Straight Arrow Connector 28">
+            <a:extLst>
+              <a:ext uri="{FF2B5EF4-FFF2-40B4-BE49-F238E27FC236}">
+                <a16:creationId xmlns:a16="http://schemas.microsoft.com/office/drawing/2014/main" id="{2492E826-3D95-021C-EEEC-FD254A42EAC4}"/>
+              </a:ext>
+            </a:extLst>
+          </p:cNvPr>
+          <p:cNvCxnSpPr>
+            <a:cxnSpLocks/>
+          </p:cNvCxnSpPr>
+          <p:nvPr/>
+        </p:nvCxnSpPr>
+        <p:spPr>
+          <a:xfrm flipH="1">
+            <a:off x="5376671" y="1999213"/>
+            <a:ext cx="303976" cy="0"/>
+          </a:xfrm>
+          <a:prstGeom prst="straightConnector1">
+            <a:avLst/>
+          </a:prstGeom>
+          <a:ln>
+            <a:prstDash val="sysDash"/>
+            <a:tailEnd type="triangle"/>
+          </a:ln>
+        </p:spPr>
+        <p:style>
+          <a:lnRef idx="2">
+            <a:schemeClr val="accent1"/>
+          </a:lnRef>
+          <a:fillRef idx="0">
+            <a:schemeClr val="accent1"/>
+          </a:fillRef>
+          <a:effectRef idx="1">
+            <a:schemeClr val="accent1"/>
+          </a:effectRef>
+          <a:fontRef idx="minor">
+            <a:schemeClr val="tx1"/>
+          </a:fontRef>
+        </p:style>
+      </p:cxnSp>
+      <p:sp>
+        <p:nvSpPr>
+          <p:cNvPr id="30" name="Rectangle 29">
+            <a:extLst>
+              <a:ext uri="{FF2B5EF4-FFF2-40B4-BE49-F238E27FC236}">
+                <a16:creationId xmlns:a16="http://schemas.microsoft.com/office/drawing/2014/main" id="{51D73CC6-7F4F-5922-9FA4-4B322CF3394C}"/>
+              </a:ext>
+            </a:extLst>
+          </p:cNvPr>
+          <p:cNvSpPr/>
+          <p:nvPr/>
+        </p:nvSpPr>
+        <p:spPr>
+          <a:xfrm>
+            <a:off x="3761752" y="2538442"/>
+            <a:ext cx="1317949" cy="357863"/>
+          </a:xfrm>
+          <a:prstGeom prst="rect">
+            <a:avLst/>
+          </a:prstGeom>
+          <a:solidFill>
+            <a:schemeClr val="accent2">
+              <a:lumMod val="75000"/>
+            </a:schemeClr>
+          </a:solidFill>
+        </p:spPr>
+        <p:style>
+          <a:lnRef idx="2">
+            <a:schemeClr val="accent1">
+              <a:shade val="50000"/>
+            </a:schemeClr>
+          </a:lnRef>
+          <a:fillRef idx="1">
+            <a:schemeClr val="accent1"/>
+          </a:fillRef>
+          <a:effectRef idx="0">
+            <a:schemeClr val="accent1"/>
+          </a:effectRef>
+          <a:fontRef idx="minor">
+            <a:schemeClr val="lt1"/>
+          </a:fontRef>
+        </p:style>
+        <p:txBody>
+          <a:bodyPr rtlCol="0" anchor="ctr"/>
+          <a:lstStyle/>
+          <a:p>
+            <a:pPr algn="ctr"/>
+            <a:r>
+              <a:rPr lang="en-US" sz="1200" dirty="0"/>
+              <a:t>Log directory tree generator </a:t>
+            </a:r>
+            <a:endParaRPr lang="en-SG" sz="1200" dirty="0"/>
+          </a:p>
+        </p:txBody>
+      </p:sp>
+      <p:cxnSp>
+        <p:nvCxnSpPr>
+          <p:cNvPr id="31" name="Straight Arrow Connector 30">
+            <a:extLst>
+              <a:ext uri="{FF2B5EF4-FFF2-40B4-BE49-F238E27FC236}">
+                <a16:creationId xmlns:a16="http://schemas.microsoft.com/office/drawing/2014/main" id="{CCC4D898-E624-6F4E-F398-6F1C03C84DF2}"/>
+              </a:ext>
+            </a:extLst>
+          </p:cNvPr>
+          <p:cNvCxnSpPr/>
+          <p:nvPr/>
+        </p:nvCxnSpPr>
+        <p:spPr>
+          <a:xfrm flipH="1">
+            <a:off x="4571250" y="2146831"/>
+            <a:ext cx="1" cy="385115"/>
+          </a:xfrm>
+          <a:prstGeom prst="straightConnector1">
+            <a:avLst/>
+          </a:prstGeom>
+          <a:ln>
+            <a:tailEnd type="triangle"/>
+          </a:ln>
+        </p:spPr>
+        <p:style>
+          <a:lnRef idx="2">
+            <a:schemeClr val="dk1"/>
+          </a:lnRef>
+          <a:fillRef idx="0">
+            <a:schemeClr val="dk1"/>
+          </a:fillRef>
+          <a:effectRef idx="1">
+            <a:schemeClr val="dk1"/>
+          </a:effectRef>
+          <a:fontRef idx="minor">
+            <a:schemeClr val="tx1"/>
+          </a:fontRef>
+        </p:style>
+      </p:cxnSp>
+      <p:cxnSp>
+        <p:nvCxnSpPr>
+          <p:cNvPr id="32" name="Straight Arrow Connector 31">
+            <a:extLst>
+              <a:ext uri="{FF2B5EF4-FFF2-40B4-BE49-F238E27FC236}">
+                <a16:creationId xmlns:a16="http://schemas.microsoft.com/office/drawing/2014/main" id="{AB29D6D9-05C6-3D31-DFEA-31D271D25E73}"/>
+              </a:ext>
+            </a:extLst>
+          </p:cNvPr>
+          <p:cNvCxnSpPr>
+            <a:cxnSpLocks/>
+            <a:stCxn id="30" idx="1"/>
+          </p:cNvCxnSpPr>
+          <p:nvPr/>
+        </p:nvCxnSpPr>
+        <p:spPr>
+          <a:xfrm flipH="1" flipV="1">
+            <a:off x="3320999" y="2717373"/>
+            <a:ext cx="440753" cy="1"/>
+          </a:xfrm>
+          <a:prstGeom prst="straightConnector1">
+            <a:avLst/>
+          </a:prstGeom>
+          <a:ln>
+            <a:tailEnd type="triangle"/>
+          </a:ln>
+        </p:spPr>
+        <p:style>
+          <a:lnRef idx="2">
+            <a:schemeClr val="dk1"/>
+          </a:lnRef>
+          <a:fillRef idx="0">
+            <a:schemeClr val="dk1"/>
+          </a:fillRef>
+          <a:effectRef idx="1">
+            <a:schemeClr val="dk1"/>
+          </a:effectRef>
+          <a:fontRef idx="minor">
+            <a:schemeClr val="tx1"/>
+          </a:fontRef>
+        </p:style>
+      </p:cxnSp>
+      <p:sp>
+        <p:nvSpPr>
+          <p:cNvPr id="35" name="Rectangle 34">
+            <a:extLst>
+              <a:ext uri="{FF2B5EF4-FFF2-40B4-BE49-F238E27FC236}">
+                <a16:creationId xmlns:a16="http://schemas.microsoft.com/office/drawing/2014/main" id="{BFE26ECC-5C79-100C-9923-98C6F5E0D7F5}"/>
+              </a:ext>
+            </a:extLst>
+          </p:cNvPr>
+          <p:cNvSpPr/>
+          <p:nvPr/>
+        </p:nvSpPr>
+        <p:spPr>
+          <a:xfrm>
+            <a:off x="3761751" y="3250068"/>
+            <a:ext cx="1317949" cy="357863"/>
+          </a:xfrm>
+          <a:prstGeom prst="rect">
+            <a:avLst/>
+          </a:prstGeom>
+          <a:solidFill>
+            <a:schemeClr val="accent2">
+              <a:lumMod val="75000"/>
+            </a:schemeClr>
+          </a:solidFill>
+        </p:spPr>
+        <p:style>
+          <a:lnRef idx="2">
+            <a:schemeClr val="accent1">
+              <a:shade val="50000"/>
+            </a:schemeClr>
+          </a:lnRef>
+          <a:fillRef idx="1">
+            <a:schemeClr val="accent1"/>
+          </a:fillRef>
+          <a:effectRef idx="0">
+            <a:schemeClr val="accent1"/>
+          </a:effectRef>
+          <a:fontRef idx="minor">
+            <a:schemeClr val="lt1"/>
+          </a:fontRef>
+        </p:style>
+        <p:txBody>
+          <a:bodyPr rtlCol="0" anchor="ctr"/>
+          <a:lstStyle/>
+          <a:p>
+            <a:pPr algn="ctr"/>
+            <a:r>
+              <a:rPr lang="en-US" sz="1200" dirty="0"/>
+              <a:t>New log upload queue manager </a:t>
+            </a:r>
+            <a:endParaRPr lang="en-SG" sz="1200" dirty="0"/>
+          </a:p>
+        </p:txBody>
+      </p:sp>
+      <p:cxnSp>
+        <p:nvCxnSpPr>
+          <p:cNvPr id="36" name="Connector: Elbow 35">
+            <a:extLst>
+              <a:ext uri="{FF2B5EF4-FFF2-40B4-BE49-F238E27FC236}">
+                <a16:creationId xmlns:a16="http://schemas.microsoft.com/office/drawing/2014/main" id="{00EC06A7-8EBF-3F0D-D534-6B0A1E6FE489}"/>
+              </a:ext>
+            </a:extLst>
+          </p:cNvPr>
+          <p:cNvCxnSpPr>
+            <a:cxnSpLocks/>
+            <a:stCxn id="7" idx="2"/>
+            <a:endCxn id="35" idx="1"/>
+          </p:cNvCxnSpPr>
+          <p:nvPr/>
+        </p:nvCxnSpPr>
+        <p:spPr>
+          <a:xfrm rot="16200000" flipH="1">
+            <a:off x="2993590" y="2660838"/>
+            <a:ext cx="532695" cy="1003628"/>
+          </a:xfrm>
+          <a:prstGeom prst="bentConnector2">
+            <a:avLst/>
+          </a:prstGeom>
+          <a:ln>
+            <a:prstDash val="sysDash"/>
+            <a:tailEnd type="triangle"/>
+          </a:ln>
+        </p:spPr>
+        <p:style>
+          <a:lnRef idx="2">
+            <a:schemeClr val="accent1"/>
+          </a:lnRef>
+          <a:fillRef idx="0">
+            <a:schemeClr val="accent1"/>
+          </a:fillRef>
+          <a:effectRef idx="1">
+            <a:schemeClr val="accent1"/>
+          </a:effectRef>
+          <a:fontRef idx="minor">
+            <a:schemeClr val="tx1"/>
+          </a:fontRef>
+        </p:style>
+      </p:cxnSp>
+      <p:cxnSp>
+        <p:nvCxnSpPr>
+          <p:cNvPr id="39" name="Straight Arrow Connector 38">
+            <a:extLst>
+              <a:ext uri="{FF2B5EF4-FFF2-40B4-BE49-F238E27FC236}">
+                <a16:creationId xmlns:a16="http://schemas.microsoft.com/office/drawing/2014/main" id="{C246206C-2EB8-9240-56E6-18AFA09AF31E}"/>
+              </a:ext>
+            </a:extLst>
+          </p:cNvPr>
+          <p:cNvCxnSpPr>
+            <a:cxnSpLocks/>
+          </p:cNvCxnSpPr>
+          <p:nvPr/>
+        </p:nvCxnSpPr>
+        <p:spPr>
+          <a:xfrm>
+            <a:off x="4569212" y="2902801"/>
+            <a:ext cx="0" cy="347267"/>
+          </a:xfrm>
+          <a:prstGeom prst="straightConnector1">
+            <a:avLst/>
+          </a:prstGeom>
+          <a:ln>
+            <a:tailEnd type="triangle"/>
+          </a:ln>
+        </p:spPr>
+        <p:style>
+          <a:lnRef idx="2">
+            <a:schemeClr val="dk1"/>
+          </a:lnRef>
+          <a:fillRef idx="0">
+            <a:schemeClr val="dk1"/>
+          </a:fillRef>
+          <a:effectRef idx="1">
+            <a:schemeClr val="dk1"/>
+          </a:effectRef>
+          <a:fontRef idx="minor">
+            <a:schemeClr val="tx1"/>
+          </a:fontRef>
+        </p:style>
+      </p:cxnSp>
+      <p:sp>
+        <p:nvSpPr>
+          <p:cNvPr id="41" name="Rectangle 40">
+            <a:extLst>
+              <a:ext uri="{FF2B5EF4-FFF2-40B4-BE49-F238E27FC236}">
+                <a16:creationId xmlns:a16="http://schemas.microsoft.com/office/drawing/2014/main" id="{DF178ED5-4C6A-02E9-BC97-BF2DF07276AF}"/>
+              </a:ext>
+            </a:extLst>
+          </p:cNvPr>
+          <p:cNvSpPr/>
+          <p:nvPr/>
+        </p:nvSpPr>
+        <p:spPr>
+          <a:xfrm>
+            <a:off x="4284364" y="4042733"/>
+            <a:ext cx="1092307" cy="276834"/>
+          </a:xfrm>
+          <a:prstGeom prst="rect">
+            <a:avLst/>
+          </a:prstGeom>
+          <a:solidFill>
+            <a:schemeClr val="accent2">
+              <a:lumMod val="75000"/>
+            </a:schemeClr>
+          </a:solidFill>
+        </p:spPr>
+        <p:style>
+          <a:lnRef idx="2">
+            <a:schemeClr val="accent1">
+              <a:shade val="50000"/>
+            </a:schemeClr>
+          </a:lnRef>
+          <a:fillRef idx="1">
+            <a:schemeClr val="accent1"/>
+          </a:fillRef>
+          <a:effectRef idx="0">
+            <a:schemeClr val="accent1"/>
+          </a:effectRef>
+          <a:fontRef idx="minor">
+            <a:schemeClr val="lt1"/>
+          </a:fontRef>
+        </p:style>
+        <p:txBody>
+          <a:bodyPr rtlCol="0" anchor="ctr"/>
+          <a:lstStyle/>
+          <a:p>
+            <a:pPr algn="ctr"/>
+            <a:r>
+              <a:rPr lang="en-US" sz="1200" dirty="0"/>
+              <a:t>FTP Client</a:t>
+            </a:r>
+            <a:endParaRPr lang="en-SG" sz="1200" dirty="0"/>
+          </a:p>
+        </p:txBody>
+      </p:sp>
+      <p:cxnSp>
+        <p:nvCxnSpPr>
+          <p:cNvPr id="42" name="Straight Arrow Connector 41">
+            <a:extLst>
+              <a:ext uri="{FF2B5EF4-FFF2-40B4-BE49-F238E27FC236}">
+                <a16:creationId xmlns:a16="http://schemas.microsoft.com/office/drawing/2014/main" id="{BD992CBA-34C7-8132-4F9D-6BC4BE0E0986}"/>
+              </a:ext>
+            </a:extLst>
+          </p:cNvPr>
+          <p:cNvCxnSpPr>
+            <a:cxnSpLocks/>
+          </p:cNvCxnSpPr>
+          <p:nvPr/>
+        </p:nvCxnSpPr>
+        <p:spPr>
+          <a:xfrm>
+            <a:off x="5279396" y="2157681"/>
+            <a:ext cx="0" cy="1885052"/>
+          </a:xfrm>
+          <a:prstGeom prst="straightConnector1">
+            <a:avLst/>
+          </a:prstGeom>
+          <a:ln>
+            <a:tailEnd type="triangle"/>
+          </a:ln>
+        </p:spPr>
+        <p:style>
+          <a:lnRef idx="2">
+            <a:schemeClr val="dk1"/>
+          </a:lnRef>
+          <a:fillRef idx="0">
+            <a:schemeClr val="dk1"/>
+          </a:fillRef>
+          <a:effectRef idx="1">
+            <a:schemeClr val="dk1"/>
+          </a:effectRef>
+          <a:fontRef idx="minor">
+            <a:schemeClr val="tx1"/>
+          </a:fontRef>
+        </p:style>
+      </p:cxnSp>
+      <p:cxnSp>
+        <p:nvCxnSpPr>
+          <p:cNvPr id="44" name="Straight Arrow Connector 43">
+            <a:extLst>
+              <a:ext uri="{FF2B5EF4-FFF2-40B4-BE49-F238E27FC236}">
+                <a16:creationId xmlns:a16="http://schemas.microsoft.com/office/drawing/2014/main" id="{5ADFE0B6-1732-88F1-7159-5C61D01E925C}"/>
+              </a:ext>
+            </a:extLst>
+          </p:cNvPr>
+          <p:cNvCxnSpPr>
+            <a:cxnSpLocks/>
+          </p:cNvCxnSpPr>
+          <p:nvPr/>
+        </p:nvCxnSpPr>
+        <p:spPr>
+          <a:xfrm>
+            <a:off x="4672020" y="3607931"/>
+            <a:ext cx="0" cy="419287"/>
+          </a:xfrm>
+          <a:prstGeom prst="straightConnector1">
+            <a:avLst/>
+          </a:prstGeom>
+          <a:ln>
+            <a:prstDash val="sysDash"/>
+            <a:tailEnd type="triangle"/>
+          </a:ln>
+        </p:spPr>
+        <p:style>
+          <a:lnRef idx="2">
+            <a:schemeClr val="accent1"/>
+          </a:lnRef>
+          <a:fillRef idx="0">
+            <a:schemeClr val="accent1"/>
+          </a:fillRef>
+          <a:effectRef idx="1">
+            <a:schemeClr val="accent1"/>
+          </a:effectRef>
+          <a:fontRef idx="minor">
+            <a:schemeClr val="tx1"/>
+          </a:fontRef>
+        </p:style>
+      </p:cxnSp>
+      <p:pic>
+        <p:nvPicPr>
+          <p:cNvPr id="46" name="Picture 45">
+            <a:extLst>
+              <a:ext uri="{FF2B5EF4-FFF2-40B4-BE49-F238E27FC236}">
+                <a16:creationId xmlns:a16="http://schemas.microsoft.com/office/drawing/2014/main" id="{CB4E1298-B556-1BDC-5640-FEBCF558393F}"/>
+              </a:ext>
+            </a:extLst>
+          </p:cNvPr>
+          <p:cNvPicPr>
+            <a:picLocks noChangeAspect="1"/>
+          </p:cNvPicPr>
+          <p:nvPr/>
+        </p:nvPicPr>
+        <p:blipFill>
+          <a:blip r:embed="rId2"/>
+          <a:stretch>
+            <a:fillRect/>
+          </a:stretch>
+        </p:blipFill>
+        <p:spPr>
+          <a:xfrm>
+            <a:off x="4539003" y="3648533"/>
+            <a:ext cx="261165" cy="276835"/>
+          </a:xfrm>
+          <a:prstGeom prst="rect">
+            <a:avLst/>
+          </a:prstGeom>
+        </p:spPr>
+      </p:pic>
+      <p:sp>
+        <p:nvSpPr>
+          <p:cNvPr id="47" name="TextBox 46">
+            <a:extLst>
+              <a:ext uri="{FF2B5EF4-FFF2-40B4-BE49-F238E27FC236}">
+                <a16:creationId xmlns:a16="http://schemas.microsoft.com/office/drawing/2014/main" id="{BE63C44E-155B-9BA1-8771-2FEDE300E438}"/>
+              </a:ext>
+            </a:extLst>
+          </p:cNvPr>
+          <p:cNvSpPr txBox="1"/>
+          <p:nvPr/>
+        </p:nvSpPr>
+        <p:spPr>
+          <a:xfrm>
+            <a:off x="4912544" y="2937470"/>
+            <a:ext cx="928254" cy="253916"/>
+          </a:xfrm>
+          <a:prstGeom prst="rect">
+            <a:avLst/>
+          </a:prstGeom>
+          <a:noFill/>
+        </p:spPr>
+        <p:txBody>
+          <a:bodyPr wrap="square" rtlCol="0">
+            <a:spAutoFit/>
+          </a:bodyPr>
+          <a:lstStyle/>
+          <a:p>
+            <a:r>
+              <a:rPr lang="en-US" sz="1050" b="1" dirty="0">
+                <a:solidFill>
+                  <a:schemeClr val="accent2">
+                    <a:lumMod val="75000"/>
+                  </a:schemeClr>
+                </a:solidFill>
+              </a:rPr>
+              <a:t>Sub-thread </a:t>
+            </a:r>
+            <a:endParaRPr lang="en-SG" sz="1050" b="1" dirty="0">
+              <a:solidFill>
+                <a:schemeClr val="accent2">
+                  <a:lumMod val="75000"/>
+                </a:schemeClr>
+              </a:solidFill>
+            </a:endParaRPr>
+          </a:p>
+        </p:txBody>
+      </p:sp>
+      <p:sp>
+        <p:nvSpPr>
+          <p:cNvPr id="48" name="TextBox 47">
+            <a:extLst>
+              <a:ext uri="{FF2B5EF4-FFF2-40B4-BE49-F238E27FC236}">
+                <a16:creationId xmlns:a16="http://schemas.microsoft.com/office/drawing/2014/main" id="{82664086-C091-9FDE-117B-C903F07DE3CB}"/>
+              </a:ext>
+            </a:extLst>
+          </p:cNvPr>
+          <p:cNvSpPr txBox="1"/>
+          <p:nvPr/>
+        </p:nvSpPr>
+        <p:spPr>
+          <a:xfrm>
+            <a:off x="3297627" y="2866413"/>
+            <a:ext cx="928254" cy="415498"/>
+          </a:xfrm>
+          <a:prstGeom prst="rect">
+            <a:avLst/>
+          </a:prstGeom>
+          <a:noFill/>
+        </p:spPr>
+        <p:txBody>
+          <a:bodyPr wrap="square" rtlCol="0">
+            <a:spAutoFit/>
+          </a:bodyPr>
+          <a:lstStyle/>
+          <a:p>
+            <a:r>
+              <a:rPr lang="en-US" sz="1050" b="1" dirty="0">
+                <a:solidFill>
+                  <a:schemeClr val="accent2">
+                    <a:lumMod val="75000"/>
+                  </a:schemeClr>
+                </a:solidFill>
+              </a:rPr>
+              <a:t>New log check loop </a:t>
+            </a:r>
+            <a:endParaRPr lang="en-SG" sz="1050" b="1" dirty="0">
+              <a:solidFill>
+                <a:schemeClr val="accent2">
+                  <a:lumMod val="75000"/>
+                </a:schemeClr>
+              </a:solidFill>
+            </a:endParaRPr>
+          </a:p>
+        </p:txBody>
+      </p:sp>
+      <p:sp>
+        <p:nvSpPr>
+          <p:cNvPr id="49" name="Rectangle 48">
+            <a:extLst>
+              <a:ext uri="{FF2B5EF4-FFF2-40B4-BE49-F238E27FC236}">
+                <a16:creationId xmlns:a16="http://schemas.microsoft.com/office/drawing/2014/main" id="{AD703DAB-FC70-C486-045C-B9F88EAB410D}"/>
+              </a:ext>
+            </a:extLst>
+          </p:cNvPr>
+          <p:cNvSpPr/>
+          <p:nvPr/>
+        </p:nvSpPr>
+        <p:spPr>
+          <a:xfrm>
+            <a:off x="7877962" y="1188429"/>
+            <a:ext cx="1292611" cy="336935"/>
+          </a:xfrm>
+          <a:prstGeom prst="rect">
+            <a:avLst/>
+          </a:prstGeom>
+          <a:solidFill>
+            <a:schemeClr val="accent6">
+              <a:lumMod val="75000"/>
+            </a:schemeClr>
+          </a:solidFill>
+        </p:spPr>
+        <p:style>
+          <a:lnRef idx="2">
+            <a:schemeClr val="accent1">
+              <a:shade val="50000"/>
+            </a:schemeClr>
+          </a:lnRef>
+          <a:fillRef idx="1">
+            <a:schemeClr val="accent1"/>
+          </a:fillRef>
+          <a:effectRef idx="0">
+            <a:schemeClr val="accent1"/>
+          </a:effectRef>
+          <a:fontRef idx="minor">
+            <a:schemeClr val="lt1"/>
+          </a:fontRef>
+        </p:style>
+        <p:txBody>
+          <a:bodyPr rtlCol="0" anchor="ctr"/>
+          <a:lstStyle/>
+          <a:p>
+            <a:pPr algn="ctr"/>
+            <a:r>
+              <a:rPr lang="en-US" sz="1200" dirty="0"/>
+              <a:t>Log Archive Service Init </a:t>
+            </a:r>
+            <a:endParaRPr lang="en-SG" sz="1200" dirty="0"/>
+          </a:p>
+        </p:txBody>
+      </p:sp>
+      <p:cxnSp>
+        <p:nvCxnSpPr>
+          <p:cNvPr id="50" name="Straight Arrow Connector 49">
+            <a:extLst>
+              <a:ext uri="{FF2B5EF4-FFF2-40B4-BE49-F238E27FC236}">
+                <a16:creationId xmlns:a16="http://schemas.microsoft.com/office/drawing/2014/main" id="{4C03E642-0F87-45E5-DADA-A9E439332D23}"/>
+              </a:ext>
+            </a:extLst>
+          </p:cNvPr>
+          <p:cNvCxnSpPr/>
+          <p:nvPr/>
+        </p:nvCxnSpPr>
+        <p:spPr>
+          <a:xfrm flipH="1">
+            <a:off x="8524266" y="1514292"/>
+            <a:ext cx="1" cy="385115"/>
+          </a:xfrm>
+          <a:prstGeom prst="straightConnector1">
+            <a:avLst/>
+          </a:prstGeom>
+          <a:ln>
+            <a:tailEnd type="triangle"/>
+          </a:ln>
+        </p:spPr>
+        <p:style>
+          <a:lnRef idx="2">
+            <a:schemeClr val="dk1"/>
+          </a:lnRef>
+          <a:fillRef idx="0">
+            <a:schemeClr val="dk1"/>
+          </a:fillRef>
+          <a:effectRef idx="1">
+            <a:schemeClr val="dk1"/>
+          </a:effectRef>
+          <a:fontRef idx="minor">
+            <a:schemeClr val="tx1"/>
+          </a:fontRef>
+        </p:style>
+      </p:cxnSp>
+      <p:pic>
+        <p:nvPicPr>
+          <p:cNvPr id="51" name="Picture 50">
+            <a:extLst>
+              <a:ext uri="{FF2B5EF4-FFF2-40B4-BE49-F238E27FC236}">
+                <a16:creationId xmlns:a16="http://schemas.microsoft.com/office/drawing/2014/main" id="{7603F518-6FD8-17CD-53B1-DD5A2470106F}"/>
+              </a:ext>
+            </a:extLst>
+          </p:cNvPr>
+          <p:cNvPicPr>
+            <a:picLocks noChangeAspect="1"/>
+          </p:cNvPicPr>
+          <p:nvPr/>
+        </p:nvPicPr>
+        <p:blipFill>
+          <a:blip r:embed="rId3"/>
+          <a:stretch>
+            <a:fillRect/>
+          </a:stretch>
+        </p:blipFill>
+        <p:spPr>
+          <a:xfrm>
+            <a:off x="9481504" y="1102672"/>
+            <a:ext cx="391132" cy="488914"/>
+          </a:xfrm>
+          <a:prstGeom prst="rect">
+            <a:avLst/>
+          </a:prstGeom>
+        </p:spPr>
+      </p:pic>
+      <p:cxnSp>
+        <p:nvCxnSpPr>
+          <p:cNvPr id="52" name="Straight Arrow Connector 51">
+            <a:extLst>
+              <a:ext uri="{FF2B5EF4-FFF2-40B4-BE49-F238E27FC236}">
+                <a16:creationId xmlns:a16="http://schemas.microsoft.com/office/drawing/2014/main" id="{3FD550CB-D37B-FF2D-FB55-6F002C66346A}"/>
+              </a:ext>
+            </a:extLst>
+          </p:cNvPr>
+          <p:cNvCxnSpPr>
+            <a:cxnSpLocks/>
+            <a:stCxn id="51" idx="1"/>
+          </p:cNvCxnSpPr>
+          <p:nvPr/>
+        </p:nvCxnSpPr>
+        <p:spPr>
+          <a:xfrm flipH="1">
+            <a:off x="9177528" y="1347129"/>
+            <a:ext cx="303976" cy="0"/>
+          </a:xfrm>
+          <a:prstGeom prst="straightConnector1">
+            <a:avLst/>
+          </a:prstGeom>
+          <a:ln>
+            <a:prstDash val="sysDash"/>
+            <a:tailEnd type="triangle"/>
+          </a:ln>
+        </p:spPr>
+        <p:style>
+          <a:lnRef idx="2">
+            <a:schemeClr val="accent1"/>
+          </a:lnRef>
+          <a:fillRef idx="0">
+            <a:schemeClr val="accent1"/>
+          </a:fillRef>
+          <a:effectRef idx="1">
+            <a:schemeClr val="accent1"/>
+          </a:effectRef>
+          <a:fontRef idx="minor">
+            <a:schemeClr val="tx1"/>
+          </a:fontRef>
+        </p:style>
+      </p:cxnSp>
+      <p:sp>
+        <p:nvSpPr>
+          <p:cNvPr id="53" name="TextBox 52">
+            <a:extLst>
+              <a:ext uri="{FF2B5EF4-FFF2-40B4-BE49-F238E27FC236}">
+                <a16:creationId xmlns:a16="http://schemas.microsoft.com/office/drawing/2014/main" id="{8D75903C-9BC8-4322-9031-F3A1DD077D5E}"/>
+              </a:ext>
+            </a:extLst>
+          </p:cNvPr>
+          <p:cNvSpPr txBox="1"/>
+          <p:nvPr/>
+        </p:nvSpPr>
+        <p:spPr>
+          <a:xfrm>
+            <a:off x="9871455" y="1112469"/>
+            <a:ext cx="813841" cy="415498"/>
+          </a:xfrm>
+          <a:prstGeom prst="rect">
+            <a:avLst/>
+          </a:prstGeom>
+          <a:noFill/>
+        </p:spPr>
+        <p:txBody>
+          <a:bodyPr wrap="square" rtlCol="0">
+            <a:spAutoFit/>
+          </a:bodyPr>
+          <a:lstStyle/>
+          <a:p>
+            <a:r>
+              <a:rPr lang="en-US" sz="1050" dirty="0"/>
+              <a:t>Server config  file</a:t>
+            </a:r>
+            <a:endParaRPr lang="en-SG" sz="1050" dirty="0"/>
+          </a:p>
+        </p:txBody>
+      </p:sp>
+      <p:sp>
+        <p:nvSpPr>
+          <p:cNvPr id="54" name="Rectangle 53">
+            <a:extLst>
+              <a:ext uri="{FF2B5EF4-FFF2-40B4-BE49-F238E27FC236}">
+                <a16:creationId xmlns:a16="http://schemas.microsoft.com/office/drawing/2014/main" id="{202118A9-72D9-CCC0-655D-02982240C2E6}"/>
+              </a:ext>
+            </a:extLst>
+          </p:cNvPr>
+          <p:cNvSpPr/>
+          <p:nvPr/>
+        </p:nvSpPr>
+        <p:spPr>
+          <a:xfrm>
+            <a:off x="7892152" y="1888334"/>
+            <a:ext cx="1292611" cy="270829"/>
+          </a:xfrm>
+          <a:prstGeom prst="rect">
+            <a:avLst/>
+          </a:prstGeom>
+          <a:solidFill>
+            <a:schemeClr val="accent6">
+              <a:lumMod val="75000"/>
+            </a:schemeClr>
+          </a:solidFill>
+        </p:spPr>
+        <p:style>
+          <a:lnRef idx="2">
+            <a:schemeClr val="accent1">
+              <a:shade val="50000"/>
+            </a:schemeClr>
+          </a:lnRef>
+          <a:fillRef idx="1">
+            <a:schemeClr val="accent1"/>
+          </a:fillRef>
+          <a:effectRef idx="0">
+            <a:schemeClr val="accent1"/>
+          </a:effectRef>
+          <a:fontRef idx="minor">
+            <a:schemeClr val="lt1"/>
+          </a:fontRef>
+        </p:style>
+        <p:txBody>
+          <a:bodyPr rtlCol="0" anchor="ctr"/>
+          <a:lstStyle/>
+          <a:p>
+            <a:pPr algn="ctr"/>
+            <a:r>
+              <a:rPr lang="en-US" sz="1200" dirty="0"/>
+              <a:t>Agent manager </a:t>
+            </a:r>
+            <a:endParaRPr lang="en-SG" sz="1200" dirty="0"/>
+          </a:p>
+        </p:txBody>
+      </p:sp>
+      <p:sp>
+        <p:nvSpPr>
+          <p:cNvPr id="55" name="TextBox 54">
+            <a:extLst>
+              <a:ext uri="{FF2B5EF4-FFF2-40B4-BE49-F238E27FC236}">
+                <a16:creationId xmlns:a16="http://schemas.microsoft.com/office/drawing/2014/main" id="{D4C72711-9726-C359-30A3-FAD7FE352882}"/>
+              </a:ext>
+            </a:extLst>
+          </p:cNvPr>
+          <p:cNvSpPr txBox="1"/>
+          <p:nvPr/>
+        </p:nvSpPr>
+        <p:spPr>
+          <a:xfrm>
+            <a:off x="8524266" y="1622086"/>
+            <a:ext cx="928254" cy="253916"/>
+          </a:xfrm>
+          <a:prstGeom prst="rect">
+            <a:avLst/>
+          </a:prstGeom>
+          <a:noFill/>
+        </p:spPr>
+        <p:txBody>
+          <a:bodyPr wrap="square" rtlCol="0">
+            <a:spAutoFit/>
+          </a:bodyPr>
+          <a:lstStyle/>
+          <a:p>
+            <a:r>
+              <a:rPr lang="en-US" sz="1050" b="1" dirty="0">
+                <a:solidFill>
+                  <a:schemeClr val="accent6">
+                    <a:lumMod val="75000"/>
+                  </a:schemeClr>
+                </a:solidFill>
+              </a:rPr>
+              <a:t>Main thread </a:t>
+            </a:r>
+            <a:endParaRPr lang="en-SG" sz="1050" b="1" dirty="0">
+              <a:solidFill>
+                <a:schemeClr val="accent6">
+                  <a:lumMod val="75000"/>
+                </a:schemeClr>
+              </a:solidFill>
+            </a:endParaRPr>
+          </a:p>
+        </p:txBody>
+      </p:sp>
+      <p:cxnSp>
+        <p:nvCxnSpPr>
+          <p:cNvPr id="56" name="Straight Arrow Connector 55">
+            <a:extLst>
+              <a:ext uri="{FF2B5EF4-FFF2-40B4-BE49-F238E27FC236}">
+                <a16:creationId xmlns:a16="http://schemas.microsoft.com/office/drawing/2014/main" id="{E73567CA-D82B-6523-9B48-B12D02E3086E}"/>
+              </a:ext>
+            </a:extLst>
+          </p:cNvPr>
+          <p:cNvCxnSpPr>
+            <a:cxnSpLocks/>
+          </p:cNvCxnSpPr>
+          <p:nvPr/>
+        </p:nvCxnSpPr>
+        <p:spPr>
+          <a:xfrm flipH="1">
+            <a:off x="9184763" y="2023748"/>
+            <a:ext cx="303976" cy="0"/>
+          </a:xfrm>
+          <a:prstGeom prst="straightConnector1">
+            <a:avLst/>
+          </a:prstGeom>
+          <a:ln>
+            <a:prstDash val="sysDash"/>
+            <a:tailEnd type="triangle"/>
+          </a:ln>
+        </p:spPr>
+        <p:style>
+          <a:lnRef idx="2">
+            <a:schemeClr val="accent1"/>
+          </a:lnRef>
+          <a:fillRef idx="0">
+            <a:schemeClr val="accent1"/>
+          </a:fillRef>
+          <a:effectRef idx="1">
+            <a:schemeClr val="accent1"/>
+          </a:effectRef>
+          <a:fontRef idx="minor">
+            <a:schemeClr val="tx1"/>
+          </a:fontRef>
+        </p:style>
+      </p:cxnSp>
+      <p:pic>
+        <p:nvPicPr>
+          <p:cNvPr id="57" name="Picture 56">
+            <a:extLst>
+              <a:ext uri="{FF2B5EF4-FFF2-40B4-BE49-F238E27FC236}">
+                <a16:creationId xmlns:a16="http://schemas.microsoft.com/office/drawing/2014/main" id="{B8DFA6F9-A8DB-4D66-B1D2-E128427B5016}"/>
+              </a:ext>
+            </a:extLst>
+          </p:cNvPr>
+          <p:cNvPicPr>
+            <a:picLocks noChangeAspect="1"/>
+          </p:cNvPicPr>
+          <p:nvPr/>
+        </p:nvPicPr>
+        <p:blipFill>
+          <a:blip r:embed="rId3"/>
+          <a:stretch>
+            <a:fillRect/>
+          </a:stretch>
+        </p:blipFill>
+        <p:spPr>
+          <a:xfrm>
+            <a:off x="9488739" y="1746352"/>
+            <a:ext cx="391132" cy="488914"/>
+          </a:xfrm>
+          <a:prstGeom prst="rect">
+            <a:avLst/>
+          </a:prstGeom>
+        </p:spPr>
+      </p:pic>
+      <p:sp>
+        <p:nvSpPr>
+          <p:cNvPr id="58" name="TextBox 57">
+            <a:extLst>
+              <a:ext uri="{FF2B5EF4-FFF2-40B4-BE49-F238E27FC236}">
+                <a16:creationId xmlns:a16="http://schemas.microsoft.com/office/drawing/2014/main" id="{112DE8E2-D0C2-67D2-8ACC-6D157CE14A59}"/>
+              </a:ext>
+            </a:extLst>
+          </p:cNvPr>
+          <p:cNvSpPr txBox="1"/>
+          <p:nvPr/>
+        </p:nvSpPr>
+        <p:spPr>
+          <a:xfrm>
+            <a:off x="9863116" y="1827365"/>
+            <a:ext cx="813841" cy="415498"/>
+          </a:xfrm>
+          <a:prstGeom prst="rect">
+            <a:avLst/>
+          </a:prstGeom>
+          <a:noFill/>
+        </p:spPr>
+        <p:txBody>
+          <a:bodyPr wrap="square" rtlCol="0">
+            <a:spAutoFit/>
+          </a:bodyPr>
+          <a:lstStyle/>
+          <a:p>
+            <a:r>
+              <a:rPr lang="en-US" sz="1050" dirty="0"/>
+              <a:t>User Config file </a:t>
+            </a:r>
+            <a:endParaRPr lang="en-SG" sz="1050" dirty="0"/>
+          </a:p>
+        </p:txBody>
+      </p:sp>
+      <p:sp>
+        <p:nvSpPr>
+          <p:cNvPr id="59" name="Rectangle 58">
+            <a:extLst>
+              <a:ext uri="{FF2B5EF4-FFF2-40B4-BE49-F238E27FC236}">
+                <a16:creationId xmlns:a16="http://schemas.microsoft.com/office/drawing/2014/main" id="{E5D11581-6B52-B8F0-E935-8FB8EA6139D0}"/>
+              </a:ext>
+            </a:extLst>
+          </p:cNvPr>
+          <p:cNvSpPr/>
+          <p:nvPr/>
+        </p:nvSpPr>
+        <p:spPr>
+          <a:xfrm>
+            <a:off x="7877962" y="2595584"/>
+            <a:ext cx="1000864" cy="270829"/>
+          </a:xfrm>
+          <a:prstGeom prst="rect">
+            <a:avLst/>
+          </a:prstGeom>
+          <a:solidFill>
+            <a:schemeClr val="accent6">
+              <a:lumMod val="75000"/>
+            </a:schemeClr>
+          </a:solidFill>
+        </p:spPr>
+        <p:style>
+          <a:lnRef idx="2">
+            <a:schemeClr val="accent1">
+              <a:shade val="50000"/>
+            </a:schemeClr>
+          </a:lnRef>
+          <a:fillRef idx="1">
+            <a:schemeClr val="accent1"/>
+          </a:fillRef>
+          <a:effectRef idx="0">
+            <a:schemeClr val="accent1"/>
+          </a:effectRef>
+          <a:fontRef idx="minor">
+            <a:schemeClr val="lt1"/>
+          </a:fontRef>
+        </p:style>
+        <p:txBody>
+          <a:bodyPr rtlCol="0" anchor="ctr"/>
+          <a:lstStyle/>
+          <a:p>
+            <a:pPr algn="ctr"/>
+            <a:r>
+              <a:rPr lang="en-US" sz="1200" dirty="0"/>
+              <a:t>FTP Server </a:t>
+            </a:r>
+            <a:endParaRPr lang="en-SG" sz="1200" dirty="0"/>
+          </a:p>
+        </p:txBody>
+      </p:sp>
+      <p:cxnSp>
+        <p:nvCxnSpPr>
+          <p:cNvPr id="60" name="Straight Arrow Connector 59">
+            <a:extLst>
+              <a:ext uri="{FF2B5EF4-FFF2-40B4-BE49-F238E27FC236}">
+                <a16:creationId xmlns:a16="http://schemas.microsoft.com/office/drawing/2014/main" id="{A02EB35C-3168-7CA7-65E4-1865AE3CDBF3}"/>
+              </a:ext>
+            </a:extLst>
+          </p:cNvPr>
+          <p:cNvCxnSpPr>
+            <a:cxnSpLocks/>
+            <a:endCxn id="59" idx="0"/>
+          </p:cNvCxnSpPr>
+          <p:nvPr/>
+        </p:nvCxnSpPr>
+        <p:spPr>
+          <a:xfrm flipH="1">
+            <a:off x="8378394" y="2153327"/>
+            <a:ext cx="1" cy="442257"/>
+          </a:xfrm>
+          <a:prstGeom prst="straightConnector1">
+            <a:avLst/>
+          </a:prstGeom>
+          <a:ln>
+            <a:tailEnd type="triangle"/>
+          </a:ln>
+        </p:spPr>
+        <p:style>
+          <a:lnRef idx="2">
+            <a:schemeClr val="dk1"/>
+          </a:lnRef>
+          <a:fillRef idx="0">
+            <a:schemeClr val="dk1"/>
+          </a:fillRef>
+          <a:effectRef idx="1">
+            <a:schemeClr val="dk1"/>
+          </a:effectRef>
+          <a:fontRef idx="minor">
+            <a:schemeClr val="tx1"/>
+          </a:fontRef>
+        </p:style>
+      </p:cxnSp>
+      <p:cxnSp>
+        <p:nvCxnSpPr>
+          <p:cNvPr id="63" name="Connector: Elbow 62">
+            <a:extLst>
+              <a:ext uri="{FF2B5EF4-FFF2-40B4-BE49-F238E27FC236}">
+                <a16:creationId xmlns:a16="http://schemas.microsoft.com/office/drawing/2014/main" id="{3A40EE42-642D-7A91-BD2D-208876400D37}"/>
+              </a:ext>
+            </a:extLst>
+          </p:cNvPr>
+          <p:cNvCxnSpPr>
+            <a:stCxn id="41" idx="3"/>
+            <a:endCxn id="59" idx="1"/>
+          </p:cNvCxnSpPr>
+          <p:nvPr/>
+        </p:nvCxnSpPr>
+        <p:spPr>
+          <a:xfrm flipV="1">
+            <a:off x="5376671" y="2730999"/>
+            <a:ext cx="2501291" cy="1450151"/>
+          </a:xfrm>
+          <a:prstGeom prst="bentConnector3">
+            <a:avLst/>
+          </a:prstGeom>
+          <a:ln>
+            <a:prstDash val="sysDash"/>
+            <a:tailEnd type="triangle"/>
+          </a:ln>
+        </p:spPr>
+        <p:style>
+          <a:lnRef idx="2">
+            <a:schemeClr val="accent1"/>
+          </a:lnRef>
+          <a:fillRef idx="0">
+            <a:schemeClr val="accent1"/>
+          </a:fillRef>
+          <a:effectRef idx="1">
+            <a:schemeClr val="accent1"/>
+          </a:effectRef>
+          <a:fontRef idx="minor">
+            <a:schemeClr val="tx1"/>
+          </a:fontRef>
+        </p:style>
+      </p:cxnSp>
+      <p:pic>
+        <p:nvPicPr>
+          <p:cNvPr id="64" name="Picture 63">
+            <a:extLst>
+              <a:ext uri="{FF2B5EF4-FFF2-40B4-BE49-F238E27FC236}">
+                <a16:creationId xmlns:a16="http://schemas.microsoft.com/office/drawing/2014/main" id="{0C39788A-A20D-F1B5-3FFD-CA89543F23B6}"/>
+              </a:ext>
+            </a:extLst>
+          </p:cNvPr>
+          <p:cNvPicPr>
+            <a:picLocks noChangeAspect="1"/>
+          </p:cNvPicPr>
+          <p:nvPr/>
+        </p:nvPicPr>
+        <p:blipFill>
+          <a:blip r:embed="rId2"/>
+          <a:stretch>
+            <a:fillRect/>
+          </a:stretch>
+        </p:blipFill>
+        <p:spPr>
+          <a:xfrm>
+            <a:off x="6477519" y="3179239"/>
+            <a:ext cx="261165" cy="276835"/>
+          </a:xfrm>
+          <a:prstGeom prst="rect">
+            <a:avLst/>
+          </a:prstGeom>
+        </p:spPr>
+      </p:pic>
+      <p:sp>
+        <p:nvSpPr>
+          <p:cNvPr id="65" name="Rectangle 64">
+            <a:extLst>
+              <a:ext uri="{FF2B5EF4-FFF2-40B4-BE49-F238E27FC236}">
+                <a16:creationId xmlns:a16="http://schemas.microsoft.com/office/drawing/2014/main" id="{4F815B60-82AC-DF5D-4ED9-C9B8B3FD490E}"/>
+              </a:ext>
+            </a:extLst>
+          </p:cNvPr>
+          <p:cNvSpPr/>
+          <p:nvPr/>
+        </p:nvSpPr>
+        <p:spPr>
+          <a:xfrm>
+            <a:off x="7773724" y="3642583"/>
+            <a:ext cx="482420" cy="408331"/>
+          </a:xfrm>
+          <a:prstGeom prst="rect">
+            <a:avLst/>
+          </a:prstGeom>
+          <a:solidFill>
+            <a:schemeClr val="bg2"/>
+          </a:solidFill>
+        </p:spPr>
+        <p:style>
+          <a:lnRef idx="2">
+            <a:schemeClr val="accent1">
+              <a:shade val="15000"/>
+            </a:schemeClr>
+          </a:lnRef>
+          <a:fillRef idx="1">
+            <a:schemeClr val="accent1"/>
+          </a:fillRef>
+          <a:effectRef idx="0">
+            <a:schemeClr val="accent1"/>
+          </a:effectRef>
+          <a:fontRef idx="minor">
+            <a:schemeClr val="lt1"/>
+          </a:fontRef>
+        </p:style>
+        <p:txBody>
+          <a:bodyPr rtlCol="0" anchor="ctr"/>
+          <a:lstStyle/>
+          <a:p>
+            <a:pPr algn="ctr"/>
+            <a:endParaRPr lang="en-SG"/>
+          </a:p>
+        </p:txBody>
+      </p:sp>
+      <p:pic>
+        <p:nvPicPr>
+          <p:cNvPr id="66" name="Picture 65">
+            <a:extLst>
+              <a:ext uri="{FF2B5EF4-FFF2-40B4-BE49-F238E27FC236}">
+                <a16:creationId xmlns:a16="http://schemas.microsoft.com/office/drawing/2014/main" id="{6FF5BB39-AA4A-48DB-44A5-066129EBCFEA}"/>
+              </a:ext>
+            </a:extLst>
+          </p:cNvPr>
+          <p:cNvPicPr>
+            <a:picLocks noChangeAspect="1"/>
+          </p:cNvPicPr>
+          <p:nvPr/>
+        </p:nvPicPr>
+        <p:blipFill>
+          <a:blip r:embed="rId2"/>
+          <a:stretch>
+            <a:fillRect/>
+          </a:stretch>
+        </p:blipFill>
+        <p:spPr>
+          <a:xfrm>
+            <a:off x="7921886" y="3690969"/>
+            <a:ext cx="261165" cy="276835"/>
+          </a:xfrm>
+          <a:prstGeom prst="rect">
+            <a:avLst/>
+          </a:prstGeom>
+        </p:spPr>
+      </p:pic>
+      <p:pic>
+        <p:nvPicPr>
+          <p:cNvPr id="67" name="Picture 66">
+            <a:extLst>
+              <a:ext uri="{FF2B5EF4-FFF2-40B4-BE49-F238E27FC236}">
+                <a16:creationId xmlns:a16="http://schemas.microsoft.com/office/drawing/2014/main" id="{C11D0E90-FDD4-9C31-60B4-4B2A434C0A2B}"/>
+              </a:ext>
+            </a:extLst>
+          </p:cNvPr>
+          <p:cNvPicPr>
+            <a:picLocks noChangeAspect="1"/>
+          </p:cNvPicPr>
+          <p:nvPr/>
+        </p:nvPicPr>
+        <p:blipFill>
+          <a:blip r:embed="rId2"/>
+          <a:stretch>
+            <a:fillRect/>
+          </a:stretch>
+        </p:blipFill>
+        <p:spPr>
+          <a:xfrm>
+            <a:off x="7827850" y="3739355"/>
+            <a:ext cx="261165" cy="276835"/>
+          </a:xfrm>
+          <a:prstGeom prst="rect">
+            <a:avLst/>
+          </a:prstGeom>
+        </p:spPr>
+      </p:pic>
+      <p:sp>
+        <p:nvSpPr>
+          <p:cNvPr id="70" name="Rectangle 69">
+            <a:extLst>
+              <a:ext uri="{FF2B5EF4-FFF2-40B4-BE49-F238E27FC236}">
+                <a16:creationId xmlns:a16="http://schemas.microsoft.com/office/drawing/2014/main" id="{5B16D855-F035-CB10-6E86-DCE0037C7398}"/>
+              </a:ext>
+            </a:extLst>
+          </p:cNvPr>
+          <p:cNvSpPr/>
+          <p:nvPr/>
+        </p:nvSpPr>
+        <p:spPr>
+          <a:xfrm>
+            <a:off x="8398443" y="3637117"/>
+            <a:ext cx="482420" cy="408331"/>
+          </a:xfrm>
+          <a:prstGeom prst="rect">
+            <a:avLst/>
+          </a:prstGeom>
+          <a:solidFill>
+            <a:schemeClr val="bg2"/>
+          </a:solidFill>
+        </p:spPr>
+        <p:style>
+          <a:lnRef idx="2">
+            <a:schemeClr val="accent1">
+              <a:shade val="15000"/>
+            </a:schemeClr>
+          </a:lnRef>
+          <a:fillRef idx="1">
+            <a:schemeClr val="accent1"/>
+          </a:fillRef>
+          <a:effectRef idx="0">
+            <a:schemeClr val="accent1"/>
+          </a:effectRef>
+          <a:fontRef idx="minor">
+            <a:schemeClr val="lt1"/>
+          </a:fontRef>
+        </p:style>
+        <p:txBody>
+          <a:bodyPr rtlCol="0" anchor="ctr"/>
+          <a:lstStyle/>
+          <a:p>
+            <a:pPr algn="ctr"/>
+            <a:endParaRPr lang="en-SG"/>
+          </a:p>
+        </p:txBody>
+      </p:sp>
+      <p:pic>
+        <p:nvPicPr>
+          <p:cNvPr id="71" name="Picture 70">
+            <a:extLst>
+              <a:ext uri="{FF2B5EF4-FFF2-40B4-BE49-F238E27FC236}">
+                <a16:creationId xmlns:a16="http://schemas.microsoft.com/office/drawing/2014/main" id="{681AE601-4EED-53A3-E4D4-4FF8EE7BF324}"/>
+              </a:ext>
+            </a:extLst>
+          </p:cNvPr>
+          <p:cNvPicPr>
+            <a:picLocks noChangeAspect="1"/>
+          </p:cNvPicPr>
+          <p:nvPr/>
+        </p:nvPicPr>
+        <p:blipFill>
+          <a:blip r:embed="rId2"/>
+          <a:stretch>
+            <a:fillRect/>
+          </a:stretch>
+        </p:blipFill>
+        <p:spPr>
+          <a:xfrm>
+            <a:off x="8546605" y="3685503"/>
+            <a:ext cx="261165" cy="276835"/>
+          </a:xfrm>
+          <a:prstGeom prst="rect">
+            <a:avLst/>
+          </a:prstGeom>
+        </p:spPr>
+      </p:pic>
+      <p:pic>
+        <p:nvPicPr>
+          <p:cNvPr id="72" name="Picture 71">
+            <a:extLst>
+              <a:ext uri="{FF2B5EF4-FFF2-40B4-BE49-F238E27FC236}">
+                <a16:creationId xmlns:a16="http://schemas.microsoft.com/office/drawing/2014/main" id="{6C18E292-4DAB-6FE4-0F42-A6D8EBAC988A}"/>
+              </a:ext>
+            </a:extLst>
+          </p:cNvPr>
+          <p:cNvPicPr>
+            <a:picLocks noChangeAspect="1"/>
+          </p:cNvPicPr>
+          <p:nvPr/>
+        </p:nvPicPr>
+        <p:blipFill>
+          <a:blip r:embed="rId2"/>
+          <a:stretch>
+            <a:fillRect/>
+          </a:stretch>
+        </p:blipFill>
+        <p:spPr>
+          <a:xfrm>
+            <a:off x="8452569" y="3733889"/>
+            <a:ext cx="261165" cy="276835"/>
+          </a:xfrm>
+          <a:prstGeom prst="rect">
+            <a:avLst/>
+          </a:prstGeom>
+        </p:spPr>
+      </p:pic>
+      <p:sp>
+        <p:nvSpPr>
+          <p:cNvPr id="73" name="TextBox 72">
+            <a:extLst>
+              <a:ext uri="{FF2B5EF4-FFF2-40B4-BE49-F238E27FC236}">
+                <a16:creationId xmlns:a16="http://schemas.microsoft.com/office/drawing/2014/main" id="{02758C61-C566-91E2-D87F-CF9D86CE6017}"/>
+              </a:ext>
+            </a:extLst>
+          </p:cNvPr>
+          <p:cNvSpPr txBox="1"/>
+          <p:nvPr/>
+        </p:nvSpPr>
+        <p:spPr>
+          <a:xfrm>
+            <a:off x="7692242" y="4157745"/>
+            <a:ext cx="1558640" cy="253916"/>
+          </a:xfrm>
+          <a:prstGeom prst="rect">
+            <a:avLst/>
+          </a:prstGeom>
+          <a:noFill/>
+        </p:spPr>
+        <p:txBody>
+          <a:bodyPr wrap="square" rtlCol="0">
+            <a:spAutoFit/>
+          </a:bodyPr>
+          <a:lstStyle/>
+          <a:p>
+            <a:r>
+              <a:rPr lang="en-US" sz="1050" b="1" dirty="0"/>
+              <a:t>Server log storage </a:t>
+            </a:r>
+            <a:endParaRPr lang="en-SG" sz="1050" b="1" dirty="0"/>
+          </a:p>
+        </p:txBody>
+      </p:sp>
+      <p:cxnSp>
+        <p:nvCxnSpPr>
+          <p:cNvPr id="74" name="Straight Arrow Connector 73">
+            <a:extLst>
+              <a:ext uri="{FF2B5EF4-FFF2-40B4-BE49-F238E27FC236}">
+                <a16:creationId xmlns:a16="http://schemas.microsoft.com/office/drawing/2014/main" id="{FDDD5643-1B95-8200-53D9-758470965901}"/>
+              </a:ext>
+            </a:extLst>
+          </p:cNvPr>
+          <p:cNvCxnSpPr>
+            <a:cxnSpLocks/>
+          </p:cNvCxnSpPr>
+          <p:nvPr/>
+        </p:nvCxnSpPr>
+        <p:spPr>
+          <a:xfrm>
+            <a:off x="8089015" y="2884408"/>
+            <a:ext cx="0" cy="723523"/>
+          </a:xfrm>
+          <a:prstGeom prst="straightConnector1">
+            <a:avLst/>
+          </a:prstGeom>
+          <a:ln>
+            <a:prstDash val="sysDash"/>
+            <a:tailEnd type="triangle"/>
+          </a:ln>
+        </p:spPr>
+        <p:style>
+          <a:lnRef idx="2">
+            <a:schemeClr val="accent1"/>
+          </a:lnRef>
+          <a:fillRef idx="0">
+            <a:schemeClr val="accent1"/>
+          </a:fillRef>
+          <a:effectRef idx="1">
+            <a:schemeClr val="accent1"/>
+          </a:effectRef>
+          <a:fontRef idx="minor">
+            <a:schemeClr val="tx1"/>
+          </a:fontRef>
+        </p:style>
+      </p:cxnSp>
+      <p:pic>
+        <p:nvPicPr>
+          <p:cNvPr id="76" name="Picture 75">
+            <a:extLst>
+              <a:ext uri="{FF2B5EF4-FFF2-40B4-BE49-F238E27FC236}">
+                <a16:creationId xmlns:a16="http://schemas.microsoft.com/office/drawing/2014/main" id="{189F491F-C939-985A-50EB-EDAB2E5180E2}"/>
+              </a:ext>
+            </a:extLst>
+          </p:cNvPr>
+          <p:cNvPicPr>
+            <a:picLocks noChangeAspect="1"/>
+          </p:cNvPicPr>
+          <p:nvPr/>
+        </p:nvPicPr>
+        <p:blipFill>
+          <a:blip r:embed="rId2"/>
+          <a:stretch>
+            <a:fillRect/>
+          </a:stretch>
+        </p:blipFill>
+        <p:spPr>
+          <a:xfrm>
+            <a:off x="7936470" y="3040821"/>
+            <a:ext cx="261165" cy="276835"/>
+          </a:xfrm>
+          <a:prstGeom prst="rect">
+            <a:avLst/>
+          </a:prstGeom>
+        </p:spPr>
+      </p:pic>
+      <p:sp>
+        <p:nvSpPr>
+          <p:cNvPr id="78" name="Rectangle 77">
+            <a:extLst>
+              <a:ext uri="{FF2B5EF4-FFF2-40B4-BE49-F238E27FC236}">
+                <a16:creationId xmlns:a16="http://schemas.microsoft.com/office/drawing/2014/main" id="{7397C8B8-401A-84F1-0356-6873DD9071E4}"/>
+              </a:ext>
+            </a:extLst>
+          </p:cNvPr>
+          <p:cNvSpPr/>
+          <p:nvPr/>
+        </p:nvSpPr>
+        <p:spPr>
+          <a:xfrm>
+            <a:off x="9029027" y="3107226"/>
+            <a:ext cx="1350223" cy="391043"/>
+          </a:xfrm>
+          <a:prstGeom prst="rect">
+            <a:avLst/>
+          </a:prstGeom>
+          <a:solidFill>
+            <a:schemeClr val="accent6">
+              <a:lumMod val="75000"/>
+            </a:schemeClr>
+          </a:solidFill>
+        </p:spPr>
+        <p:style>
+          <a:lnRef idx="2">
+            <a:schemeClr val="accent1">
+              <a:shade val="50000"/>
+            </a:schemeClr>
+          </a:lnRef>
+          <a:fillRef idx="1">
+            <a:schemeClr val="accent1"/>
+          </a:fillRef>
+          <a:effectRef idx="0">
+            <a:schemeClr val="accent1"/>
+          </a:effectRef>
+          <a:fontRef idx="minor">
+            <a:schemeClr val="lt1"/>
+          </a:fontRef>
+        </p:style>
+        <p:txBody>
+          <a:bodyPr rtlCol="0" anchor="ctr"/>
+          <a:lstStyle/>
+          <a:p>
+            <a:pPr algn="ctr"/>
+            <a:r>
+              <a:rPr lang="en-US" sz="1200" dirty="0"/>
+              <a:t>Log directory tree generator</a:t>
+            </a:r>
+            <a:endParaRPr lang="en-SG" sz="1200" dirty="0"/>
+          </a:p>
+        </p:txBody>
+      </p:sp>
+      <p:cxnSp>
+        <p:nvCxnSpPr>
+          <p:cNvPr id="79" name="Straight Arrow Connector 78">
+            <a:extLst>
+              <a:ext uri="{FF2B5EF4-FFF2-40B4-BE49-F238E27FC236}">
+                <a16:creationId xmlns:a16="http://schemas.microsoft.com/office/drawing/2014/main" id="{5E80CB5E-9709-1031-652F-4E8A8735F026}"/>
+              </a:ext>
+            </a:extLst>
+          </p:cNvPr>
+          <p:cNvCxnSpPr>
+            <a:cxnSpLocks/>
+          </p:cNvCxnSpPr>
+          <p:nvPr/>
+        </p:nvCxnSpPr>
+        <p:spPr>
+          <a:xfrm>
+            <a:off x="9082501" y="2177213"/>
+            <a:ext cx="0" cy="385515"/>
+          </a:xfrm>
+          <a:prstGeom prst="straightConnector1">
+            <a:avLst/>
+          </a:prstGeom>
+          <a:ln>
+            <a:tailEnd type="triangle"/>
+          </a:ln>
+        </p:spPr>
+        <p:style>
+          <a:lnRef idx="2">
+            <a:schemeClr val="dk1"/>
+          </a:lnRef>
+          <a:fillRef idx="0">
+            <a:schemeClr val="dk1"/>
+          </a:fillRef>
+          <a:effectRef idx="1">
+            <a:schemeClr val="dk1"/>
+          </a:effectRef>
+          <a:fontRef idx="minor">
+            <a:schemeClr val="tx1"/>
+          </a:fontRef>
+        </p:style>
+      </p:cxnSp>
+      <p:sp>
+        <p:nvSpPr>
+          <p:cNvPr id="81" name="TextBox 80">
+            <a:extLst>
+              <a:ext uri="{FF2B5EF4-FFF2-40B4-BE49-F238E27FC236}">
+                <a16:creationId xmlns:a16="http://schemas.microsoft.com/office/drawing/2014/main" id="{1DBE606A-644C-2C60-E31C-6AEC76A55D69}"/>
+              </a:ext>
+            </a:extLst>
+          </p:cNvPr>
+          <p:cNvSpPr txBox="1"/>
+          <p:nvPr/>
+        </p:nvSpPr>
+        <p:spPr>
+          <a:xfrm>
+            <a:off x="9058853" y="2284917"/>
+            <a:ext cx="928254" cy="253916"/>
+          </a:xfrm>
+          <a:prstGeom prst="rect">
+            <a:avLst/>
+          </a:prstGeom>
+          <a:noFill/>
+        </p:spPr>
+        <p:txBody>
+          <a:bodyPr wrap="square" rtlCol="0">
+            <a:spAutoFit/>
+          </a:bodyPr>
+          <a:lstStyle/>
+          <a:p>
+            <a:r>
+              <a:rPr lang="en-US" sz="1050" b="1" dirty="0">
+                <a:solidFill>
+                  <a:schemeClr val="accent6">
+                    <a:lumMod val="75000"/>
+                  </a:schemeClr>
+                </a:solidFill>
+              </a:rPr>
+              <a:t>Sub-thread</a:t>
+            </a:r>
+            <a:r>
+              <a:rPr lang="en-US" sz="1050" b="1" dirty="0">
+                <a:solidFill>
+                  <a:schemeClr val="accent2">
+                    <a:lumMod val="75000"/>
+                  </a:schemeClr>
+                </a:solidFill>
+              </a:rPr>
+              <a:t> </a:t>
+            </a:r>
+            <a:endParaRPr lang="en-SG" sz="1050" b="1" dirty="0">
+              <a:solidFill>
+                <a:schemeClr val="accent2">
+                  <a:lumMod val="75000"/>
+                </a:schemeClr>
+              </a:solidFill>
+            </a:endParaRPr>
+          </a:p>
+        </p:txBody>
+      </p:sp>
+      <p:sp>
+        <p:nvSpPr>
+          <p:cNvPr id="82" name="Rectangle 81">
+            <a:extLst>
+              <a:ext uri="{FF2B5EF4-FFF2-40B4-BE49-F238E27FC236}">
+                <a16:creationId xmlns:a16="http://schemas.microsoft.com/office/drawing/2014/main" id="{906EE6A2-D084-EECE-CE24-29E19EB65D6A}"/>
+              </a:ext>
+            </a:extLst>
+          </p:cNvPr>
+          <p:cNvSpPr/>
+          <p:nvPr/>
+        </p:nvSpPr>
+        <p:spPr>
+          <a:xfrm>
+            <a:off x="9022547" y="2592039"/>
+            <a:ext cx="1356705" cy="270829"/>
+          </a:xfrm>
+          <a:prstGeom prst="rect">
+            <a:avLst/>
+          </a:prstGeom>
+          <a:solidFill>
+            <a:schemeClr val="accent6">
+              <a:lumMod val="75000"/>
+            </a:schemeClr>
+          </a:solidFill>
+        </p:spPr>
+        <p:style>
+          <a:lnRef idx="2">
+            <a:schemeClr val="accent1">
+              <a:shade val="50000"/>
+            </a:schemeClr>
+          </a:lnRef>
+          <a:fillRef idx="1">
+            <a:schemeClr val="accent1"/>
+          </a:fillRef>
+          <a:effectRef idx="0">
+            <a:schemeClr val="accent1"/>
+          </a:effectRef>
+          <a:fontRef idx="minor">
+            <a:schemeClr val="lt1"/>
+          </a:fontRef>
+        </p:style>
+        <p:txBody>
+          <a:bodyPr rtlCol="0" anchor="ctr"/>
+          <a:lstStyle/>
+          <a:p>
+            <a:pPr algn="ctr"/>
+            <a:r>
+              <a:rPr lang="en-US" sz="1200" dirty="0"/>
+              <a:t>Web host module </a:t>
+            </a:r>
+            <a:endParaRPr lang="en-SG" sz="1200" dirty="0"/>
+          </a:p>
+        </p:txBody>
+      </p:sp>
+      <p:cxnSp>
+        <p:nvCxnSpPr>
+          <p:cNvPr id="84" name="Connector: Elbow 83">
+            <a:extLst>
+              <a:ext uri="{FF2B5EF4-FFF2-40B4-BE49-F238E27FC236}">
+                <a16:creationId xmlns:a16="http://schemas.microsoft.com/office/drawing/2014/main" id="{624110EF-0E05-0F1F-C594-46D8E7C8A911}"/>
+              </a:ext>
+            </a:extLst>
+          </p:cNvPr>
+          <p:cNvCxnSpPr>
+            <a:cxnSpLocks/>
+            <a:stCxn id="68" idx="0"/>
+            <a:endCxn id="78" idx="1"/>
+          </p:cNvCxnSpPr>
+          <p:nvPr/>
+        </p:nvCxnSpPr>
+        <p:spPr>
+          <a:xfrm rot="5400000" flipH="1" flipV="1">
+            <a:off x="8566218" y="3112772"/>
+            <a:ext cx="272832" cy="652785"/>
+          </a:xfrm>
+          <a:prstGeom prst="bentConnector2">
+            <a:avLst/>
+          </a:prstGeom>
+          <a:ln>
+            <a:prstDash val="sysDash"/>
+            <a:tailEnd type="triangle"/>
+          </a:ln>
+        </p:spPr>
+        <p:style>
+          <a:lnRef idx="2">
+            <a:schemeClr val="accent1"/>
+          </a:lnRef>
+          <a:fillRef idx="0">
+            <a:schemeClr val="accent1"/>
+          </a:fillRef>
+          <a:effectRef idx="1">
+            <a:schemeClr val="accent1"/>
+          </a:effectRef>
+          <a:fontRef idx="minor">
+            <a:schemeClr val="tx1"/>
+          </a:fontRef>
+        </p:style>
+      </p:cxnSp>
+      <p:cxnSp>
+        <p:nvCxnSpPr>
+          <p:cNvPr id="88" name="Straight Arrow Connector 87">
+            <a:extLst>
+              <a:ext uri="{FF2B5EF4-FFF2-40B4-BE49-F238E27FC236}">
+                <a16:creationId xmlns:a16="http://schemas.microsoft.com/office/drawing/2014/main" id="{F28445BB-6C1D-D028-44EB-426FA869EA73}"/>
+              </a:ext>
+            </a:extLst>
+          </p:cNvPr>
+          <p:cNvCxnSpPr>
+            <a:cxnSpLocks/>
+          </p:cNvCxnSpPr>
+          <p:nvPr/>
+        </p:nvCxnSpPr>
+        <p:spPr>
+          <a:xfrm>
+            <a:off x="9704137" y="3516740"/>
+            <a:ext cx="1" cy="434298"/>
+          </a:xfrm>
+          <a:prstGeom prst="straightConnector1">
+            <a:avLst/>
+          </a:prstGeom>
+          <a:ln>
+            <a:prstDash val="sysDash"/>
+            <a:tailEnd type="triangle"/>
+          </a:ln>
+        </p:spPr>
+        <p:style>
+          <a:lnRef idx="2">
+            <a:schemeClr val="accent1"/>
+          </a:lnRef>
+          <a:fillRef idx="0">
+            <a:schemeClr val="accent1"/>
+          </a:fillRef>
+          <a:effectRef idx="1">
+            <a:schemeClr val="accent1"/>
+          </a:effectRef>
+          <a:fontRef idx="minor">
+            <a:schemeClr val="tx1"/>
+          </a:fontRef>
+        </p:style>
+      </p:cxnSp>
+      <p:cxnSp>
+        <p:nvCxnSpPr>
+          <p:cNvPr id="90" name="Straight Arrow Connector 89">
+            <a:extLst>
+              <a:ext uri="{FF2B5EF4-FFF2-40B4-BE49-F238E27FC236}">
+                <a16:creationId xmlns:a16="http://schemas.microsoft.com/office/drawing/2014/main" id="{7DEF8381-AF4A-1C8D-CA4F-5EC6E25AE0D1}"/>
+              </a:ext>
+            </a:extLst>
+          </p:cNvPr>
+          <p:cNvCxnSpPr>
+            <a:cxnSpLocks/>
+            <a:stCxn id="82" idx="2"/>
+            <a:endCxn id="78" idx="0"/>
+          </p:cNvCxnSpPr>
+          <p:nvPr/>
+        </p:nvCxnSpPr>
+        <p:spPr>
+          <a:xfrm>
+            <a:off x="9700900" y="2862868"/>
+            <a:ext cx="0" cy="244358"/>
+          </a:xfrm>
+          <a:prstGeom prst="straightConnector1">
+            <a:avLst/>
+          </a:prstGeom>
+          <a:ln>
+            <a:tailEnd type="triangle"/>
+          </a:ln>
+        </p:spPr>
+        <p:style>
+          <a:lnRef idx="2">
+            <a:schemeClr val="dk1"/>
+          </a:lnRef>
+          <a:fillRef idx="0">
+            <a:schemeClr val="dk1"/>
+          </a:fillRef>
+          <a:effectRef idx="1">
+            <a:schemeClr val="dk1"/>
+          </a:effectRef>
+          <a:fontRef idx="minor">
+            <a:schemeClr val="tx1"/>
+          </a:fontRef>
+        </p:style>
+      </p:cxnSp>
+      <p:sp>
+        <p:nvSpPr>
+          <p:cNvPr id="95" name="TextBox 94">
+            <a:extLst>
+              <a:ext uri="{FF2B5EF4-FFF2-40B4-BE49-F238E27FC236}">
+                <a16:creationId xmlns:a16="http://schemas.microsoft.com/office/drawing/2014/main" id="{090A86F7-DD3C-69A4-9535-EC02D3958741}"/>
+              </a:ext>
+            </a:extLst>
+          </p:cNvPr>
+          <p:cNvSpPr txBox="1"/>
+          <p:nvPr/>
+        </p:nvSpPr>
+        <p:spPr>
+          <a:xfrm>
+            <a:off x="9216814" y="3991641"/>
+            <a:ext cx="1292603" cy="276999"/>
+          </a:xfrm>
+          <a:prstGeom prst="rect">
+            <a:avLst/>
+          </a:prstGeom>
+        </p:spPr>
+        <p:style>
+          <a:lnRef idx="2">
+            <a:schemeClr val="dk1"/>
+          </a:lnRef>
+          <a:fillRef idx="1">
+            <a:schemeClr val="lt1"/>
+          </a:fillRef>
+          <a:effectRef idx="0">
+            <a:schemeClr val="dk1"/>
+          </a:effectRef>
+          <a:fontRef idx="minor">
+            <a:schemeClr val="dk1"/>
+          </a:fontRef>
+        </p:style>
+        <p:txBody>
+          <a:bodyPr wrap="square" rtlCol="0">
+            <a:spAutoFit/>
+          </a:bodyPr>
+          <a:lstStyle/>
+          <a:p>
+            <a:r>
+              <a:rPr lang="en-US" altLang="zh-CN" sz="1200" b="1" dirty="0"/>
+              <a:t>Web-Browser </a:t>
+            </a:r>
+            <a:endParaRPr lang="zh-CN" altLang="en-US" sz="1200" dirty="0"/>
+          </a:p>
+        </p:txBody>
+      </p:sp>
+      <p:pic>
+        <p:nvPicPr>
+          <p:cNvPr id="97" name="Picture 96">
+            <a:extLst>
+              <a:ext uri="{FF2B5EF4-FFF2-40B4-BE49-F238E27FC236}">
+                <a16:creationId xmlns:a16="http://schemas.microsoft.com/office/drawing/2014/main" id="{D1F7042D-354F-3908-E764-0312869F52A9}"/>
+              </a:ext>
+            </a:extLst>
+          </p:cNvPr>
+          <p:cNvPicPr>
+            <a:picLocks noChangeAspect="1"/>
+          </p:cNvPicPr>
+          <p:nvPr/>
+        </p:nvPicPr>
+        <p:blipFill>
+          <a:blip r:embed="rId2"/>
+          <a:stretch>
+            <a:fillRect/>
+          </a:stretch>
+        </p:blipFill>
+        <p:spPr>
+          <a:xfrm>
+            <a:off x="9567323" y="3575580"/>
+            <a:ext cx="261165" cy="276835"/>
+          </a:xfrm>
+          <a:prstGeom prst="rect">
+            <a:avLst/>
+          </a:prstGeom>
+        </p:spPr>
+      </p:pic>
+      <p:pic>
+        <p:nvPicPr>
+          <p:cNvPr id="98" name="Picture 97">
+            <a:extLst>
+              <a:ext uri="{FF2B5EF4-FFF2-40B4-BE49-F238E27FC236}">
+                <a16:creationId xmlns:a16="http://schemas.microsoft.com/office/drawing/2014/main" id="{ED944A51-E086-C35D-6158-74C913C5FDC7}"/>
+              </a:ext>
+            </a:extLst>
+          </p:cNvPr>
+          <p:cNvPicPr>
+            <a:picLocks noChangeAspect="1"/>
+          </p:cNvPicPr>
+          <p:nvPr/>
+        </p:nvPicPr>
+        <p:blipFill>
+          <a:blip r:embed="rId5"/>
+          <a:stretch>
+            <a:fillRect/>
+          </a:stretch>
+        </p:blipFill>
+        <p:spPr>
+          <a:xfrm>
+            <a:off x="10278375" y="4057257"/>
+            <a:ext cx="176680" cy="175361"/>
+          </a:xfrm>
+          <a:prstGeom prst="rect">
+            <a:avLst/>
+          </a:prstGeom>
+        </p:spPr>
+      </p:pic>
+      <p:sp>
+        <p:nvSpPr>
+          <p:cNvPr id="101" name="TextBox 100">
+            <a:extLst>
+              <a:ext uri="{FF2B5EF4-FFF2-40B4-BE49-F238E27FC236}">
+                <a16:creationId xmlns:a16="http://schemas.microsoft.com/office/drawing/2014/main" id="{36A592AB-AE90-FACA-BCD5-C242C6E8F792}"/>
+              </a:ext>
+            </a:extLst>
+          </p:cNvPr>
+          <p:cNvSpPr txBox="1"/>
+          <p:nvPr/>
+        </p:nvSpPr>
+        <p:spPr>
+          <a:xfrm>
+            <a:off x="5878506" y="2270481"/>
+            <a:ext cx="2381970" cy="307777"/>
+          </a:xfrm>
+          <a:prstGeom prst="rect">
+            <a:avLst/>
+          </a:prstGeom>
+          <a:noFill/>
+        </p:spPr>
+        <p:txBody>
+          <a:bodyPr wrap="square" rtlCol="0">
+            <a:spAutoFit/>
+          </a:bodyPr>
+          <a:lstStyle/>
+          <a:p>
+            <a:r>
+              <a:rPr lang="en-US" sz="1400" b="1" dirty="0">
+                <a:solidFill>
+                  <a:srgbClr val="0070C0"/>
+                </a:solidFill>
+              </a:rPr>
+              <a:t>Orchestration Network </a:t>
+            </a:r>
+            <a:endParaRPr lang="en-SG" sz="1400" b="1" dirty="0">
+              <a:solidFill>
+                <a:srgbClr val="0070C0"/>
+              </a:solidFill>
+            </a:endParaRPr>
+          </a:p>
+        </p:txBody>
+      </p:sp>
+      <p:sp>
+        <p:nvSpPr>
+          <p:cNvPr id="104" name="TextBox 103">
+            <a:extLst>
+              <a:ext uri="{FF2B5EF4-FFF2-40B4-BE49-F238E27FC236}">
+                <a16:creationId xmlns:a16="http://schemas.microsoft.com/office/drawing/2014/main" id="{36069048-C737-E667-7FA4-544F357FD4D9}"/>
+              </a:ext>
+            </a:extLst>
+          </p:cNvPr>
+          <p:cNvSpPr txBox="1"/>
+          <p:nvPr/>
+        </p:nvSpPr>
+        <p:spPr>
+          <a:xfrm>
+            <a:off x="3000068" y="4461399"/>
+            <a:ext cx="3728018" cy="307777"/>
+          </a:xfrm>
+          <a:prstGeom prst="rect">
+            <a:avLst/>
+          </a:prstGeom>
+          <a:noFill/>
+        </p:spPr>
+        <p:txBody>
+          <a:bodyPr wrap="square" rtlCol="0">
+            <a:spAutoFit/>
+          </a:bodyPr>
+          <a:lstStyle/>
+          <a:p>
+            <a:r>
+              <a:rPr lang="en-US" sz="1400" b="1" dirty="0">
+                <a:solidFill>
+                  <a:schemeClr val="accent2">
+                    <a:lumMod val="75000"/>
+                  </a:schemeClr>
+                </a:solidFill>
+              </a:rPr>
+              <a:t>Honeypot PLC Emulator or Controller  Node</a:t>
+            </a:r>
+            <a:endParaRPr lang="en-SG" sz="1400" b="1" dirty="0">
+              <a:solidFill>
+                <a:schemeClr val="accent2">
+                  <a:lumMod val="75000"/>
+                </a:schemeClr>
+              </a:solidFill>
+            </a:endParaRPr>
+          </a:p>
+        </p:txBody>
+      </p:sp>
+      <p:sp>
+        <p:nvSpPr>
+          <p:cNvPr id="105" name="TextBox 104">
+            <a:extLst>
+              <a:ext uri="{FF2B5EF4-FFF2-40B4-BE49-F238E27FC236}">
+                <a16:creationId xmlns:a16="http://schemas.microsoft.com/office/drawing/2014/main" id="{0F09C422-F843-3FE8-8A20-6FE006A683FC}"/>
+              </a:ext>
+            </a:extLst>
+          </p:cNvPr>
+          <p:cNvSpPr txBox="1"/>
+          <p:nvPr/>
+        </p:nvSpPr>
+        <p:spPr>
+          <a:xfrm>
+            <a:off x="7187093" y="4446592"/>
+            <a:ext cx="2721658" cy="307777"/>
+          </a:xfrm>
+          <a:prstGeom prst="rect">
+            <a:avLst/>
+          </a:prstGeom>
+          <a:noFill/>
+        </p:spPr>
+        <p:txBody>
+          <a:bodyPr wrap="square" rtlCol="0">
+            <a:spAutoFit/>
+          </a:bodyPr>
+          <a:lstStyle/>
+          <a:p>
+            <a:r>
+              <a:rPr lang="en-US" sz="1400" b="1" dirty="0">
+                <a:solidFill>
+                  <a:schemeClr val="accent6">
+                    <a:lumMod val="75000"/>
+                  </a:schemeClr>
+                </a:solidFill>
+              </a:rPr>
+              <a:t>Honeypot Log Archive Server</a:t>
+            </a:r>
+            <a:endParaRPr lang="en-SG" sz="1400" b="1" dirty="0">
+              <a:solidFill>
+                <a:schemeClr val="accent6">
+                  <a:lumMod val="75000"/>
+                </a:schemeClr>
+              </a:solidFill>
+            </a:endParaRPr>
+          </a:p>
+        </p:txBody>
+      </p:sp>
+      <p:sp>
+        <p:nvSpPr>
+          <p:cNvPr id="15" name="TextBox 14">
+            <a:extLst>
+              <a:ext uri="{FF2B5EF4-FFF2-40B4-BE49-F238E27FC236}">
+                <a16:creationId xmlns:a16="http://schemas.microsoft.com/office/drawing/2014/main" id="{D6AE0089-DFFB-5686-5AB2-DE843763FB12}"/>
+              </a:ext>
+            </a:extLst>
+          </p:cNvPr>
+          <p:cNvSpPr txBox="1"/>
+          <p:nvPr/>
+        </p:nvSpPr>
+        <p:spPr>
+          <a:xfrm>
+            <a:off x="1859141" y="642776"/>
+            <a:ext cx="5327952" cy="369332"/>
+          </a:xfrm>
+          <a:prstGeom prst="rect">
+            <a:avLst/>
+          </a:prstGeom>
+          <a:noFill/>
+          <a:ln w="12700">
+            <a:solidFill>
+              <a:schemeClr val="tx1"/>
+            </a:solidFill>
+            <a:prstDash val="sysDash"/>
+          </a:ln>
+        </p:spPr>
+        <p:txBody>
+          <a:bodyPr wrap="square">
+            <a:spAutoFit/>
+          </a:bodyPr>
+          <a:lstStyle/>
+          <a:p>
+            <a:r>
+              <a:rPr lang="en-US" b="1" dirty="0"/>
+              <a:t>PLC Honeypot Log Archive System Workflow</a:t>
+            </a:r>
+            <a:endParaRPr lang="en-SG" b="1" dirty="0"/>
+          </a:p>
+        </p:txBody>
+      </p:sp>
+      <p:pic>
+        <p:nvPicPr>
+          <p:cNvPr id="21" name="Picture 20" descr="A close-up of a device&#10;&#10;Description automatically generated">
+            <a:extLst>
+              <a:ext uri="{FF2B5EF4-FFF2-40B4-BE49-F238E27FC236}">
+                <a16:creationId xmlns:a16="http://schemas.microsoft.com/office/drawing/2014/main" id="{9418027E-B621-502F-0849-EB0D0D487C3B}"/>
+              </a:ext>
+            </a:extLst>
+          </p:cNvPr>
+          <p:cNvPicPr>
+            <a:picLocks noChangeAspect="1"/>
+          </p:cNvPicPr>
+          <p:nvPr/>
+        </p:nvPicPr>
+        <p:blipFill>
+          <a:blip r:embed="rId6">
             <a:extLst>
               <a:ext uri="{28A0092B-C50C-407E-A947-70E740481C1C}">
                 <a14:useLocalDpi xmlns:a14="http://schemas.microsoft.com/office/drawing/2010/main" val="0"/>
@@ -4760,6 +7676,72 @@
         </p:blipFill>
         <p:spPr>
           <a:xfrm>
+            <a:off x="1869507" y="3570832"/>
+            <a:ext cx="1171569" cy="1171569"/>
+          </a:xfrm>
+          <a:prstGeom prst="rect">
+            <a:avLst/>
+          </a:prstGeom>
+        </p:spPr>
+      </p:pic>
+    </p:spTree>
+    <p:extLst>
+      <p:ext uri="{BB962C8B-B14F-4D97-AF65-F5344CB8AC3E}">
+        <p14:creationId xmlns:p14="http://schemas.microsoft.com/office/powerpoint/2010/main" val="2627749273"/>
+      </p:ext>
+    </p:extLst>
+  </p:cSld>
+  <p:clrMapOvr>
+    <a:masterClrMapping/>
+  </p:clrMapOvr>
+</p:sld>
+</file>
+
+<file path=ppt/slides/slide13.xml><?xml version="1.0" encoding="utf-8"?>
+<p:sld xmlns:a="http://schemas.openxmlformats.org/drawingml/2006/main" xmlns:r="http://schemas.openxmlformats.org/officeDocument/2006/relationships" xmlns:p="http://schemas.openxmlformats.org/presentationml/2006/main">
+  <p:cSld>
+    <p:spTree>
+      <p:nvGrpSpPr>
+        <p:cNvPr id="1" name=""/>
+        <p:cNvGrpSpPr/>
+        <p:nvPr/>
+      </p:nvGrpSpPr>
+      <p:grpSpPr>
+        <a:xfrm>
+          <a:off x="0" y="0"/>
+          <a:ext cx="0" cy="0"/>
+          <a:chOff x="0" y="0"/>
+          <a:chExt cx="0" cy="0"/>
+        </a:xfrm>
+      </p:grpSpPr>
+      <p:pic>
+        <p:nvPicPr>
+          <p:cNvPr id="5" name="Picture 4" descr="A screenshot of a computer&#10;&#10;Description automatically generated">
+            <a:extLst>
+              <a:ext uri="{FF2B5EF4-FFF2-40B4-BE49-F238E27FC236}">
+                <a16:creationId xmlns:a16="http://schemas.microsoft.com/office/drawing/2014/main" id="{BB017847-D560-748F-25C5-3E94E1049500}"/>
+              </a:ext>
+            </a:extLst>
+          </p:cNvPr>
+          <p:cNvPicPr>
+            <a:picLocks noChangeAspect="1"/>
+          </p:cNvPicPr>
+          <p:nvPr/>
+        </p:nvPicPr>
+        <p:blipFill>
+          <a:blip r:embed="rId2">
+            <a:extLst>
+              <a:ext uri="{28A0092B-C50C-407E-A947-70E740481C1C}">
+                <a14:useLocalDpi xmlns:a14="http://schemas.microsoft.com/office/drawing/2010/main" val="0"/>
+              </a:ext>
+            </a:extLst>
+          </a:blip>
+          <a:stretch>
+            <a:fillRect/>
+          </a:stretch>
+        </p:blipFill>
+        <p:spPr>
+          <a:xfrm>
             <a:off x="6177689" y="1410099"/>
             <a:ext cx="5026119" cy="3399825"/>
           </a:xfrm>
@@ -4890,6 +7872,386 @@
     <p:extLst>
       <p:ext uri="{BB962C8B-B14F-4D97-AF65-F5344CB8AC3E}">
         <p14:creationId xmlns:p14="http://schemas.microsoft.com/office/powerpoint/2010/main" val="1215515222"/>
+      </p:ext>
+    </p:extLst>
+  </p:cSld>
+  <p:clrMapOvr>
+    <a:masterClrMapping/>
+  </p:clrMapOvr>
+</p:sld>
+</file>
+
+<file path=ppt/slides/slide14.xml><?xml version="1.0" encoding="utf-8"?>
+<p:sld xmlns:a="http://schemas.openxmlformats.org/drawingml/2006/main" xmlns:r="http://schemas.openxmlformats.org/officeDocument/2006/relationships" xmlns:p="http://schemas.openxmlformats.org/presentationml/2006/main">
+  <p:cSld>
+    <p:spTree>
+      <p:nvGrpSpPr>
+        <p:cNvPr id="1" name=""/>
+        <p:cNvGrpSpPr/>
+        <p:nvPr/>
+      </p:nvGrpSpPr>
+      <p:grpSpPr>
+        <a:xfrm>
+          <a:off x="0" y="0"/>
+          <a:ext cx="0" cy="0"/>
+          <a:chOff x="0" y="0"/>
+          <a:chExt cx="0" cy="0"/>
+        </a:xfrm>
+      </p:grpSpPr>
+      <p:pic>
+        <p:nvPicPr>
+          <p:cNvPr id="5" name="Picture 4" descr="A screenshot of a computer&#10;&#10;Description automatically generated">
+            <a:extLst>
+              <a:ext uri="{FF2B5EF4-FFF2-40B4-BE49-F238E27FC236}">
+                <a16:creationId xmlns:a16="http://schemas.microsoft.com/office/drawing/2014/main" id="{F90B9404-6229-B514-C888-9496E8D82BE7}"/>
+              </a:ext>
+            </a:extLst>
+          </p:cNvPr>
+          <p:cNvPicPr>
+            <a:picLocks noChangeAspect="1"/>
+          </p:cNvPicPr>
+          <p:nvPr/>
+        </p:nvPicPr>
+        <p:blipFill>
+          <a:blip r:embed="rId2">
+            <a:extLst>
+              <a:ext uri="{28A0092B-C50C-407E-A947-70E740481C1C}">
+                <a14:useLocalDpi xmlns:a14="http://schemas.microsoft.com/office/drawing/2010/main" val="0"/>
+              </a:ext>
+            </a:extLst>
+          </a:blip>
+          <a:stretch>
+            <a:fillRect/>
+          </a:stretch>
+        </p:blipFill>
+        <p:spPr>
+          <a:xfrm>
+            <a:off x="5990122" y="603767"/>
+            <a:ext cx="5132668" cy="3327847"/>
+          </a:xfrm>
+          <a:prstGeom prst="rect">
+            <a:avLst/>
+          </a:prstGeom>
+        </p:spPr>
+      </p:pic>
+      <p:pic>
+        <p:nvPicPr>
+          <p:cNvPr id="10" name="Picture 9" descr="A screenshot of a computer&#10;&#10;Description automatically generated">
+            <a:extLst>
+              <a:ext uri="{FF2B5EF4-FFF2-40B4-BE49-F238E27FC236}">
+                <a16:creationId xmlns:a16="http://schemas.microsoft.com/office/drawing/2014/main" id="{3D133DA9-B3D2-F0DD-AEFF-4059F336116C}"/>
+              </a:ext>
+            </a:extLst>
+          </p:cNvPr>
+          <p:cNvPicPr>
+            <a:picLocks noChangeAspect="1"/>
+          </p:cNvPicPr>
+          <p:nvPr/>
+        </p:nvPicPr>
+        <p:blipFill>
+          <a:blip r:embed="rId3">
+            <a:extLst>
+              <a:ext uri="{28A0092B-C50C-407E-A947-70E740481C1C}">
+                <a14:useLocalDpi xmlns:a14="http://schemas.microsoft.com/office/drawing/2010/main" val="0"/>
+              </a:ext>
+            </a:extLst>
+          </a:blip>
+          <a:stretch>
+            <a:fillRect/>
+          </a:stretch>
+        </p:blipFill>
+        <p:spPr>
+          <a:xfrm>
+            <a:off x="679819" y="603766"/>
+            <a:ext cx="5132668" cy="3327847"/>
+          </a:xfrm>
+          <a:prstGeom prst="rect">
+            <a:avLst/>
+          </a:prstGeom>
+        </p:spPr>
+      </p:pic>
+      <p:sp>
+        <p:nvSpPr>
+          <p:cNvPr id="8" name="TextBox 7">
+            <a:extLst>
+              <a:ext uri="{FF2B5EF4-FFF2-40B4-BE49-F238E27FC236}">
+                <a16:creationId xmlns:a16="http://schemas.microsoft.com/office/drawing/2014/main" id="{40B841C6-A7CA-D048-19DF-B27B02CC3E5F}"/>
+              </a:ext>
+            </a:extLst>
+          </p:cNvPr>
+          <p:cNvSpPr txBox="1"/>
+          <p:nvPr/>
+        </p:nvSpPr>
+        <p:spPr>
+          <a:xfrm>
+            <a:off x="761497" y="3544236"/>
+            <a:ext cx="3845009" cy="307777"/>
+          </a:xfrm>
+          <a:prstGeom prst="rect">
+            <a:avLst/>
+          </a:prstGeom>
+          <a:noFill/>
+        </p:spPr>
+        <p:txBody>
+          <a:bodyPr wrap="square" rtlCol="0">
+            <a:spAutoFit/>
+          </a:bodyPr>
+          <a:lstStyle/>
+          <a:p>
+            <a:r>
+              <a:rPr lang="en-US" sz="1400" b="1" dirty="0">
+                <a:solidFill>
+                  <a:schemeClr val="bg1"/>
+                </a:solidFill>
+              </a:rPr>
+              <a:t>Honeypot All PLC Emulators Overview Page </a:t>
+            </a:r>
+            <a:endParaRPr lang="en-SG" sz="1400" b="1" dirty="0">
+              <a:solidFill>
+                <a:schemeClr val="bg1"/>
+              </a:solidFill>
+            </a:endParaRPr>
+          </a:p>
+        </p:txBody>
+      </p:sp>
+      <p:sp>
+        <p:nvSpPr>
+          <p:cNvPr id="11" name="TextBox 10">
+            <a:extLst>
+              <a:ext uri="{FF2B5EF4-FFF2-40B4-BE49-F238E27FC236}">
+                <a16:creationId xmlns:a16="http://schemas.microsoft.com/office/drawing/2014/main" id="{7F53C18B-FA87-CB6B-BA38-3E210FB0803E}"/>
+              </a:ext>
+            </a:extLst>
+          </p:cNvPr>
+          <p:cNvSpPr txBox="1"/>
+          <p:nvPr/>
+        </p:nvSpPr>
+        <p:spPr>
+          <a:xfrm>
+            <a:off x="6167384" y="3533002"/>
+            <a:ext cx="4063544" cy="307777"/>
+          </a:xfrm>
+          <a:prstGeom prst="rect">
+            <a:avLst/>
+          </a:prstGeom>
+          <a:noFill/>
+        </p:spPr>
+        <p:txBody>
+          <a:bodyPr wrap="square" rtlCol="0">
+            <a:spAutoFit/>
+          </a:bodyPr>
+          <a:lstStyle/>
+          <a:p>
+            <a:r>
+              <a:rPr lang="en-US" sz="1400" b="1" dirty="0">
+                <a:solidFill>
+                  <a:schemeClr val="bg1"/>
+                </a:solidFill>
+              </a:rPr>
+              <a:t>Honeypot All PLC Emulator Detailed State Page </a:t>
+            </a:r>
+            <a:endParaRPr lang="en-SG" sz="1400" b="1" dirty="0">
+              <a:solidFill>
+                <a:schemeClr val="bg1"/>
+              </a:solidFill>
+            </a:endParaRPr>
+          </a:p>
+        </p:txBody>
+      </p:sp>
+    </p:spTree>
+    <p:extLst>
+      <p:ext uri="{BB962C8B-B14F-4D97-AF65-F5344CB8AC3E}">
+        <p14:creationId xmlns:p14="http://schemas.microsoft.com/office/powerpoint/2010/main" val="3498106395"/>
+      </p:ext>
+    </p:extLst>
+  </p:cSld>
+  <p:clrMapOvr>
+    <a:masterClrMapping/>
+  </p:clrMapOvr>
+</p:sld>
+</file>
+
+<file path=ppt/slides/slide15.xml><?xml version="1.0" encoding="utf-8"?>
+<p:sld xmlns:a="http://schemas.openxmlformats.org/drawingml/2006/main" xmlns:r="http://schemas.openxmlformats.org/officeDocument/2006/relationships" xmlns:p="http://schemas.openxmlformats.org/presentationml/2006/main">
+  <p:cSld>
+    <p:spTree>
+      <p:nvGrpSpPr>
+        <p:cNvPr id="1" name=""/>
+        <p:cNvGrpSpPr/>
+        <p:nvPr/>
+      </p:nvGrpSpPr>
+      <p:grpSpPr>
+        <a:xfrm>
+          <a:off x="0" y="0"/>
+          <a:ext cx="0" cy="0"/>
+          <a:chOff x="0" y="0"/>
+          <a:chExt cx="0" cy="0"/>
+        </a:xfrm>
+      </p:grpSpPr>
+      <p:pic>
+        <p:nvPicPr>
+          <p:cNvPr id="5" name="Picture 4" descr="A screenshot of a computer&#10;&#10;Description automatically generated">
+            <a:extLst>
+              <a:ext uri="{FF2B5EF4-FFF2-40B4-BE49-F238E27FC236}">
+                <a16:creationId xmlns:a16="http://schemas.microsoft.com/office/drawing/2014/main" id="{E969B081-D194-62DE-FB67-9D6CD3B7CFA5}"/>
+              </a:ext>
+            </a:extLst>
+          </p:cNvPr>
+          <p:cNvPicPr>
+            <a:picLocks noChangeAspect="1"/>
+          </p:cNvPicPr>
+          <p:nvPr/>
+        </p:nvPicPr>
+        <p:blipFill>
+          <a:blip r:embed="rId2">
+            <a:extLst>
+              <a:ext uri="{28A0092B-C50C-407E-A947-70E740481C1C}">
+                <a14:useLocalDpi xmlns:a14="http://schemas.microsoft.com/office/drawing/2010/main" val="0"/>
+              </a:ext>
+            </a:extLst>
+          </a:blip>
+          <a:stretch>
+            <a:fillRect/>
+          </a:stretch>
+        </p:blipFill>
+        <p:spPr>
+          <a:xfrm>
+            <a:off x="6096000" y="943277"/>
+            <a:ext cx="5237344" cy="3395716"/>
+          </a:xfrm>
+          <a:prstGeom prst="rect">
+            <a:avLst/>
+          </a:prstGeom>
+        </p:spPr>
+      </p:pic>
+      <p:pic>
+        <p:nvPicPr>
+          <p:cNvPr id="7" name="Picture 6" descr="A screenshot of a computer&#10;&#10;Description automatically generated">
+            <a:extLst>
+              <a:ext uri="{FF2B5EF4-FFF2-40B4-BE49-F238E27FC236}">
+                <a16:creationId xmlns:a16="http://schemas.microsoft.com/office/drawing/2014/main" id="{26504F4D-5CE9-95EA-F1FE-880AE73EFD6E}"/>
+              </a:ext>
+            </a:extLst>
+          </p:cNvPr>
+          <p:cNvPicPr>
+            <a:picLocks noChangeAspect="1"/>
+          </p:cNvPicPr>
+          <p:nvPr/>
+        </p:nvPicPr>
+        <p:blipFill>
+          <a:blip r:embed="rId3">
+            <a:extLst>
+              <a:ext uri="{28A0092B-C50C-407E-A947-70E740481C1C}">
+                <a14:useLocalDpi xmlns:a14="http://schemas.microsoft.com/office/drawing/2010/main" val="0"/>
+              </a:ext>
+            </a:extLst>
+          </a:blip>
+          <a:stretch>
+            <a:fillRect/>
+          </a:stretch>
+        </p:blipFill>
+        <p:spPr>
+          <a:xfrm>
+            <a:off x="590588" y="943277"/>
+            <a:ext cx="5237344" cy="3395716"/>
+          </a:xfrm>
+          <a:prstGeom prst="rect">
+            <a:avLst/>
+          </a:prstGeom>
+        </p:spPr>
+      </p:pic>
+      <p:sp>
+        <p:nvSpPr>
+          <p:cNvPr id="8" name="TextBox 7">
+            <a:extLst>
+              <a:ext uri="{FF2B5EF4-FFF2-40B4-BE49-F238E27FC236}">
+                <a16:creationId xmlns:a16="http://schemas.microsoft.com/office/drawing/2014/main" id="{5909CDA7-C311-0E75-6A5F-055EA3C5A82C}"/>
+              </a:ext>
+            </a:extLst>
+          </p:cNvPr>
+          <p:cNvSpPr txBox="1"/>
+          <p:nvPr/>
+        </p:nvSpPr>
+        <p:spPr>
+          <a:xfrm>
+            <a:off x="713371" y="3958124"/>
+            <a:ext cx="3845009" cy="307777"/>
+          </a:xfrm>
+          <a:prstGeom prst="rect">
+            <a:avLst/>
+          </a:prstGeom>
+          <a:noFill/>
+        </p:spPr>
+        <p:txBody>
+          <a:bodyPr wrap="square" rtlCol="0">
+            <a:spAutoFit/>
+          </a:bodyPr>
+          <a:lstStyle/>
+          <a:p>
+            <a:r>
+              <a:rPr lang="en-US" sz="1400" b="1" dirty="0">
+                <a:solidFill>
+                  <a:schemeClr val="bg1"/>
+                </a:solidFill>
+              </a:rPr>
+              <a:t>Honeypot All PLC Controller Overview Page </a:t>
+            </a:r>
+            <a:endParaRPr lang="en-SG" sz="1400" b="1" dirty="0">
+              <a:solidFill>
+                <a:schemeClr val="bg1"/>
+              </a:solidFill>
+            </a:endParaRPr>
+          </a:p>
+        </p:txBody>
+      </p:sp>
+      <p:sp>
+        <p:nvSpPr>
+          <p:cNvPr id="9" name="TextBox 8">
+            <a:extLst>
+              <a:ext uri="{FF2B5EF4-FFF2-40B4-BE49-F238E27FC236}">
+                <a16:creationId xmlns:a16="http://schemas.microsoft.com/office/drawing/2014/main" id="{2E052D89-B166-AA3F-4D3E-14F9B2FA3864}"/>
+              </a:ext>
+            </a:extLst>
+          </p:cNvPr>
+          <p:cNvSpPr txBox="1"/>
+          <p:nvPr/>
+        </p:nvSpPr>
+        <p:spPr>
+          <a:xfrm>
+            <a:off x="6167384" y="3958123"/>
+            <a:ext cx="4063544" cy="307777"/>
+          </a:xfrm>
+          <a:prstGeom prst="rect">
+            <a:avLst/>
+          </a:prstGeom>
+          <a:noFill/>
+        </p:spPr>
+        <p:txBody>
+          <a:bodyPr wrap="square" rtlCol="0">
+            <a:spAutoFit/>
+          </a:bodyPr>
+          <a:lstStyle/>
+          <a:p>
+            <a:r>
+              <a:rPr lang="en-US" sz="1400" b="1" dirty="0">
+                <a:solidFill>
+                  <a:schemeClr val="bg1"/>
+                </a:solidFill>
+              </a:rPr>
+              <a:t>Honeypot All PLC Controller Detailed State Page </a:t>
+            </a:r>
+            <a:endParaRPr lang="en-SG" sz="1400" b="1" dirty="0">
+              <a:solidFill>
+                <a:schemeClr val="bg1"/>
+              </a:solidFill>
+            </a:endParaRPr>
+          </a:p>
+        </p:txBody>
+      </p:sp>
+    </p:spTree>
+    <p:extLst>
+      <p:ext uri="{BB962C8B-B14F-4D97-AF65-F5344CB8AC3E}">
+        <p14:creationId xmlns:p14="http://schemas.microsoft.com/office/powerpoint/2010/main" val="2305504984"/>
       </p:ext>
     </p:extLst>
   </p:cSld>

</xml_diff>

<commit_message>
update the Design of Attack Alert and Notification section of the read me file.
</commit_message>
<xml_diff>
--- a/doc/designDoc.pptx
+++ b/doc/designDoc.pptx
@@ -5,7 +5,7 @@
     <p:sldMasterId id="2147483648" r:id="rId1"/>
   </p:sldMasterIdLst>
   <p:notesMasterIdLst>
-    <p:notesMasterId r:id="rId17"/>
+    <p:notesMasterId r:id="rId19"/>
   </p:notesMasterIdLst>
   <p:sldIdLst>
     <p:sldId id="256" r:id="rId2"/>
@@ -23,6 +23,8 @@
     <p:sldId id="266" r:id="rId14"/>
     <p:sldId id="269" r:id="rId15"/>
     <p:sldId id="270" r:id="rId16"/>
+    <p:sldId id="271" r:id="rId17"/>
+    <p:sldId id="272" r:id="rId18"/>
   </p:sldIdLst>
   <p:sldSz cx="12192000" cy="6858000"/>
   <p:notesSz cx="6858000" cy="9144000"/>
@@ -211,7 +213,7 @@
           <a:p>
             <a:fld id="{C711259C-07AC-49B2-B02B-76ECE0D8068C}" type="datetimeFigureOut">
               <a:rPr lang="en-SG" smtClean="0"/>
-              <a:t>24/11/2024</a:t>
+              <a:t>26/11/2024</a:t>
             </a:fld>
             <a:endParaRPr lang="en-SG"/>
           </a:p>
@@ -712,7 +714,7 @@
           <a:p>
             <a:fld id="{E7602038-B3F0-4825-ABDA-D66CE1C4CFDA}" type="datetimeFigureOut">
               <a:rPr lang="en-SG" smtClean="0"/>
-              <a:t>24/11/2024</a:t>
+              <a:t>26/11/2024</a:t>
             </a:fld>
             <a:endParaRPr lang="en-SG"/>
           </a:p>
@@ -912,7 +914,7 @@
           <a:p>
             <a:fld id="{E7602038-B3F0-4825-ABDA-D66CE1C4CFDA}" type="datetimeFigureOut">
               <a:rPr lang="en-SG" smtClean="0"/>
-              <a:t>24/11/2024</a:t>
+              <a:t>26/11/2024</a:t>
             </a:fld>
             <a:endParaRPr lang="en-SG"/>
           </a:p>
@@ -1122,7 +1124,7 @@
           <a:p>
             <a:fld id="{E7602038-B3F0-4825-ABDA-D66CE1C4CFDA}" type="datetimeFigureOut">
               <a:rPr lang="en-SG" smtClean="0"/>
-              <a:t>24/11/2024</a:t>
+              <a:t>26/11/2024</a:t>
             </a:fld>
             <a:endParaRPr lang="en-SG"/>
           </a:p>
@@ -1322,7 +1324,7 @@
           <a:p>
             <a:fld id="{E7602038-B3F0-4825-ABDA-D66CE1C4CFDA}" type="datetimeFigureOut">
               <a:rPr lang="en-SG" smtClean="0"/>
-              <a:t>24/11/2024</a:t>
+              <a:t>26/11/2024</a:t>
             </a:fld>
             <a:endParaRPr lang="en-SG"/>
           </a:p>
@@ -1598,7 +1600,7 @@
           <a:p>
             <a:fld id="{E7602038-B3F0-4825-ABDA-D66CE1C4CFDA}" type="datetimeFigureOut">
               <a:rPr lang="en-SG" smtClean="0"/>
-              <a:t>24/11/2024</a:t>
+              <a:t>26/11/2024</a:t>
             </a:fld>
             <a:endParaRPr lang="en-SG"/>
           </a:p>
@@ -1866,7 +1868,7 @@
           <a:p>
             <a:fld id="{E7602038-B3F0-4825-ABDA-D66CE1C4CFDA}" type="datetimeFigureOut">
               <a:rPr lang="en-SG" smtClean="0"/>
-              <a:t>24/11/2024</a:t>
+              <a:t>26/11/2024</a:t>
             </a:fld>
             <a:endParaRPr lang="en-SG"/>
           </a:p>
@@ -2281,7 +2283,7 @@
           <a:p>
             <a:fld id="{E7602038-B3F0-4825-ABDA-D66CE1C4CFDA}" type="datetimeFigureOut">
               <a:rPr lang="en-SG" smtClean="0"/>
-              <a:t>24/11/2024</a:t>
+              <a:t>26/11/2024</a:t>
             </a:fld>
             <a:endParaRPr lang="en-SG"/>
           </a:p>
@@ -2423,7 +2425,7 @@
           <a:p>
             <a:fld id="{E7602038-B3F0-4825-ABDA-D66CE1C4CFDA}" type="datetimeFigureOut">
               <a:rPr lang="en-SG" smtClean="0"/>
-              <a:t>24/11/2024</a:t>
+              <a:t>26/11/2024</a:t>
             </a:fld>
             <a:endParaRPr lang="en-SG"/>
           </a:p>
@@ -2536,7 +2538,7 @@
           <a:p>
             <a:fld id="{E7602038-B3F0-4825-ABDA-D66CE1C4CFDA}" type="datetimeFigureOut">
               <a:rPr lang="en-SG" smtClean="0"/>
-              <a:t>24/11/2024</a:t>
+              <a:t>26/11/2024</a:t>
             </a:fld>
             <a:endParaRPr lang="en-SG"/>
           </a:p>
@@ -2849,7 +2851,7 @@
           <a:p>
             <a:fld id="{E7602038-B3F0-4825-ABDA-D66CE1C4CFDA}" type="datetimeFigureOut">
               <a:rPr lang="en-SG" smtClean="0"/>
-              <a:t>24/11/2024</a:t>
+              <a:t>26/11/2024</a:t>
             </a:fld>
             <a:endParaRPr lang="en-SG"/>
           </a:p>
@@ -3138,7 +3140,7 @@
           <a:p>
             <a:fld id="{E7602038-B3F0-4825-ABDA-D66CE1C4CFDA}" type="datetimeFigureOut">
               <a:rPr lang="en-SG" smtClean="0"/>
-              <a:t>24/11/2024</a:t>
+              <a:t>26/11/2024</a:t>
             </a:fld>
             <a:endParaRPr lang="en-SG"/>
           </a:p>
@@ -3381,7 +3383,7 @@
           <a:p>
             <a:fld id="{E7602038-B3F0-4825-ABDA-D66CE1C4CFDA}" type="datetimeFigureOut">
               <a:rPr lang="en-SG" smtClean="0"/>
-              <a:t>24/11/2024</a:t>
+              <a:t>26/11/2024</a:t>
             </a:fld>
             <a:endParaRPr lang="en-SG"/>
           </a:p>
@@ -8116,7 +8118,7 @@
         </p:blipFill>
         <p:spPr>
           <a:xfrm>
-            <a:off x="6096000" y="943277"/>
+            <a:off x="6015613" y="259989"/>
             <a:ext cx="5237344" cy="3395716"/>
           </a:xfrm>
           <a:prstGeom prst="rect">
@@ -8152,7 +8154,7 @@
         </p:blipFill>
         <p:spPr>
           <a:xfrm>
-            <a:off x="590588" y="943277"/>
+            <a:off x="510201" y="259989"/>
             <a:ext cx="5237344" cy="3395716"/>
           </a:xfrm>
           <a:prstGeom prst="rect">
@@ -8174,7 +8176,7 @@
         </p:nvSpPr>
         <p:spPr>
           <a:xfrm>
-            <a:off x="713371" y="3958124"/>
+            <a:off x="632984" y="3274836"/>
             <a:ext cx="3845009" cy="307777"/>
           </a:xfrm>
           <a:prstGeom prst="rect">
@@ -8218,7 +8220,7 @@
         </p:nvSpPr>
         <p:spPr>
           <a:xfrm>
-            <a:off x="6167384" y="3958123"/>
+            <a:off x="6086997" y="3274835"/>
             <a:ext cx="4063544" cy="307777"/>
           </a:xfrm>
           <a:prstGeom prst="rect">
@@ -8252,6 +8254,700 @@
     <p:extLst>
       <p:ext uri="{BB962C8B-B14F-4D97-AF65-F5344CB8AC3E}">
         <p14:creationId xmlns:p14="http://schemas.microsoft.com/office/powerpoint/2010/main" val="2305504984"/>
+      </p:ext>
+    </p:extLst>
+  </p:cSld>
+  <p:clrMapOvr>
+    <a:masterClrMapping/>
+  </p:clrMapOvr>
+</p:sld>
+</file>
+
+<file path=ppt/slides/slide16.xml><?xml version="1.0" encoding="utf-8"?>
+<p:sld xmlns:a="http://schemas.openxmlformats.org/drawingml/2006/main" xmlns:r="http://schemas.openxmlformats.org/officeDocument/2006/relationships" xmlns:p="http://schemas.openxmlformats.org/presentationml/2006/main">
+  <p:cSld>
+    <p:spTree>
+      <p:nvGrpSpPr>
+        <p:cNvPr id="1" name=""/>
+        <p:cNvGrpSpPr/>
+        <p:nvPr/>
+      </p:nvGrpSpPr>
+      <p:grpSpPr>
+        <a:xfrm>
+          <a:off x="0" y="0"/>
+          <a:ext cx="0" cy="0"/>
+          <a:chOff x="0" y="0"/>
+          <a:chExt cx="0" cy="0"/>
+        </a:xfrm>
+      </p:grpSpPr>
+      <p:pic>
+        <p:nvPicPr>
+          <p:cNvPr id="5" name="Picture 4" descr="A screenshot of a computer screen&#10;&#10;Description automatically generated">
+            <a:extLst>
+              <a:ext uri="{FF2B5EF4-FFF2-40B4-BE49-F238E27FC236}">
+                <a16:creationId xmlns:a16="http://schemas.microsoft.com/office/drawing/2014/main" id="{352A9041-9E9B-A942-D1F7-BD75AA59B7A0}"/>
+              </a:ext>
+            </a:extLst>
+          </p:cNvPr>
+          <p:cNvPicPr>
+            <a:picLocks noChangeAspect="1"/>
+          </p:cNvPicPr>
+          <p:nvPr/>
+        </p:nvPicPr>
+        <p:blipFill>
+          <a:blip r:embed="rId2">
+            <a:extLst>
+              <a:ext uri="{28A0092B-C50C-407E-A947-70E740481C1C}">
+                <a14:useLocalDpi xmlns:a14="http://schemas.microsoft.com/office/drawing/2010/main" val="0"/>
+              </a:ext>
+            </a:extLst>
+          </a:blip>
+          <a:stretch>
+            <a:fillRect/>
+          </a:stretch>
+        </p:blipFill>
+        <p:spPr>
+          <a:xfrm>
+            <a:off x="741054" y="1123778"/>
+            <a:ext cx="9847619" cy="1390476"/>
+          </a:xfrm>
+          <a:prstGeom prst="rect">
+            <a:avLst/>
+          </a:prstGeom>
+        </p:spPr>
+      </p:pic>
+      <p:pic>
+        <p:nvPicPr>
+          <p:cNvPr id="7" name="Picture 6" descr="A screen shot of a computer&#10;&#10;Description automatically generated">
+            <a:extLst>
+              <a:ext uri="{FF2B5EF4-FFF2-40B4-BE49-F238E27FC236}">
+                <a16:creationId xmlns:a16="http://schemas.microsoft.com/office/drawing/2014/main" id="{0F91B437-09AD-E87A-F39C-486B6B33109F}"/>
+              </a:ext>
+            </a:extLst>
+          </p:cNvPr>
+          <p:cNvPicPr>
+            <a:picLocks noChangeAspect="1"/>
+          </p:cNvPicPr>
+          <p:nvPr/>
+        </p:nvPicPr>
+        <p:blipFill>
+          <a:blip r:embed="rId3">
+            <a:extLst>
+              <a:ext uri="{28A0092B-C50C-407E-A947-70E740481C1C}">
+                <a14:useLocalDpi xmlns:a14="http://schemas.microsoft.com/office/drawing/2010/main" val="0"/>
+              </a:ext>
+            </a:extLst>
+          </a:blip>
+          <a:stretch>
+            <a:fillRect/>
+          </a:stretch>
+        </p:blipFill>
+        <p:spPr>
+          <a:xfrm>
+            <a:off x="779149" y="3253434"/>
+            <a:ext cx="9885714" cy="1457143"/>
+          </a:xfrm>
+          <a:prstGeom prst="rect">
+            <a:avLst/>
+          </a:prstGeom>
+        </p:spPr>
+      </p:pic>
+      <p:sp>
+        <p:nvSpPr>
+          <p:cNvPr id="8" name="TextBox 7">
+            <a:extLst>
+              <a:ext uri="{FF2B5EF4-FFF2-40B4-BE49-F238E27FC236}">
+                <a16:creationId xmlns:a16="http://schemas.microsoft.com/office/drawing/2014/main" id="{CC47F56D-EEF8-E929-C081-B5BB1C2152D6}"/>
+              </a:ext>
+            </a:extLst>
+          </p:cNvPr>
+          <p:cNvSpPr txBox="1"/>
+          <p:nvPr/>
+        </p:nvSpPr>
+        <p:spPr>
+          <a:xfrm>
+            <a:off x="702959" y="705469"/>
+            <a:ext cx="4455342" cy="307777"/>
+          </a:xfrm>
+          <a:prstGeom prst="rect">
+            <a:avLst/>
+          </a:prstGeom>
+          <a:noFill/>
+        </p:spPr>
+        <p:txBody>
+          <a:bodyPr wrap="square" rtlCol="0">
+            <a:spAutoFit/>
+          </a:bodyPr>
+          <a:lstStyle/>
+          <a:p>
+            <a:r>
+              <a:rPr lang="en-US" sz="1400" b="1" dirty="0"/>
+              <a:t>Honeypot Monitor Hub: Before PLC Report Alert</a:t>
+            </a:r>
+            <a:endParaRPr lang="en-SG" sz="1400" b="1" dirty="0"/>
+          </a:p>
+        </p:txBody>
+      </p:sp>
+      <p:sp>
+        <p:nvSpPr>
+          <p:cNvPr id="9" name="TextBox 8">
+            <a:extLst>
+              <a:ext uri="{FF2B5EF4-FFF2-40B4-BE49-F238E27FC236}">
+                <a16:creationId xmlns:a16="http://schemas.microsoft.com/office/drawing/2014/main" id="{D9007676-167B-11AA-8732-D45D7D1ED81E}"/>
+              </a:ext>
+            </a:extLst>
+          </p:cNvPr>
+          <p:cNvSpPr txBox="1"/>
+          <p:nvPr/>
+        </p:nvSpPr>
+        <p:spPr>
+          <a:xfrm>
+            <a:off x="741054" y="2945657"/>
+            <a:ext cx="4455342" cy="307777"/>
+          </a:xfrm>
+          <a:prstGeom prst="rect">
+            <a:avLst/>
+          </a:prstGeom>
+          <a:noFill/>
+        </p:spPr>
+        <p:txBody>
+          <a:bodyPr wrap="square" rtlCol="0">
+            <a:spAutoFit/>
+          </a:bodyPr>
+          <a:lstStyle/>
+          <a:p>
+            <a:r>
+              <a:rPr lang="en-US" sz="1400" b="1" dirty="0">
+                <a:solidFill>
+                  <a:srgbClr val="C00000"/>
+                </a:solidFill>
+              </a:rPr>
+              <a:t>Honeypot Monitor Hub: After PLC Report Alert</a:t>
+            </a:r>
+            <a:endParaRPr lang="en-SG" sz="1400" b="1" dirty="0">
+              <a:solidFill>
+                <a:srgbClr val="C00000"/>
+              </a:solidFill>
+            </a:endParaRPr>
+          </a:p>
+        </p:txBody>
+      </p:sp>
+      <p:sp>
+        <p:nvSpPr>
+          <p:cNvPr id="10" name="Arrow: Down 9">
+            <a:extLst>
+              <a:ext uri="{FF2B5EF4-FFF2-40B4-BE49-F238E27FC236}">
+                <a16:creationId xmlns:a16="http://schemas.microsoft.com/office/drawing/2014/main" id="{E58B61E5-D9C3-5712-1705-A3D007D0121D}"/>
+              </a:ext>
+            </a:extLst>
+          </p:cNvPr>
+          <p:cNvSpPr/>
+          <p:nvPr/>
+        </p:nvSpPr>
+        <p:spPr>
+          <a:xfrm>
+            <a:off x="5293074" y="2641161"/>
+            <a:ext cx="371789" cy="401934"/>
+          </a:xfrm>
+          <a:prstGeom prst="downArrow">
+            <a:avLst/>
+          </a:prstGeom>
+        </p:spPr>
+        <p:style>
+          <a:lnRef idx="2">
+            <a:schemeClr val="accent1">
+              <a:shade val="15000"/>
+            </a:schemeClr>
+          </a:lnRef>
+          <a:fillRef idx="1">
+            <a:schemeClr val="accent1"/>
+          </a:fillRef>
+          <a:effectRef idx="0">
+            <a:schemeClr val="accent1"/>
+          </a:effectRef>
+          <a:fontRef idx="minor">
+            <a:schemeClr val="lt1"/>
+          </a:fontRef>
+        </p:style>
+        <p:txBody>
+          <a:bodyPr rtlCol="0" anchor="ctr"/>
+          <a:lstStyle/>
+          <a:p>
+            <a:pPr algn="ctr"/>
+            <a:endParaRPr lang="en-SG"/>
+          </a:p>
+        </p:txBody>
+      </p:sp>
+      <p:sp>
+        <p:nvSpPr>
+          <p:cNvPr id="11" name="Rectangle 10">
+            <a:extLst>
+              <a:ext uri="{FF2B5EF4-FFF2-40B4-BE49-F238E27FC236}">
+                <a16:creationId xmlns:a16="http://schemas.microsoft.com/office/drawing/2014/main" id="{8D17A57C-B2B2-3A4D-57A8-F9F78FEA1D4F}"/>
+              </a:ext>
+            </a:extLst>
+          </p:cNvPr>
+          <p:cNvSpPr/>
+          <p:nvPr/>
+        </p:nvSpPr>
+        <p:spPr>
+          <a:xfrm>
+            <a:off x="8219552" y="1517301"/>
+            <a:ext cx="1215850" cy="803868"/>
+          </a:xfrm>
+          <a:prstGeom prst="rect">
+            <a:avLst/>
+          </a:prstGeom>
+          <a:noFill/>
+          <a:ln w="28575">
+            <a:solidFill>
+              <a:srgbClr val="00B050"/>
+            </a:solidFill>
+            <a:prstDash val="sysDash"/>
+          </a:ln>
+        </p:spPr>
+        <p:style>
+          <a:lnRef idx="2">
+            <a:schemeClr val="accent1">
+              <a:shade val="15000"/>
+            </a:schemeClr>
+          </a:lnRef>
+          <a:fillRef idx="1">
+            <a:schemeClr val="accent1"/>
+          </a:fillRef>
+          <a:effectRef idx="0">
+            <a:schemeClr val="accent1"/>
+          </a:effectRef>
+          <a:fontRef idx="minor">
+            <a:schemeClr val="lt1"/>
+          </a:fontRef>
+        </p:style>
+        <p:txBody>
+          <a:bodyPr rtlCol="0" anchor="ctr"/>
+          <a:lstStyle/>
+          <a:p>
+            <a:pPr algn="ctr"/>
+            <a:endParaRPr lang="en-SG" dirty="0"/>
+          </a:p>
+        </p:txBody>
+      </p:sp>
+      <p:sp>
+        <p:nvSpPr>
+          <p:cNvPr id="12" name="Rectangle 11">
+            <a:extLst>
+              <a:ext uri="{FF2B5EF4-FFF2-40B4-BE49-F238E27FC236}">
+                <a16:creationId xmlns:a16="http://schemas.microsoft.com/office/drawing/2014/main" id="{1B48D5DA-0634-17C3-21E5-098B6F99644D}"/>
+              </a:ext>
+            </a:extLst>
+          </p:cNvPr>
+          <p:cNvSpPr/>
+          <p:nvPr/>
+        </p:nvSpPr>
+        <p:spPr>
+          <a:xfrm>
+            <a:off x="8219552" y="3709516"/>
+            <a:ext cx="1215850" cy="803868"/>
+          </a:xfrm>
+          <a:prstGeom prst="rect">
+            <a:avLst/>
+          </a:prstGeom>
+          <a:noFill/>
+          <a:ln w="28575">
+            <a:solidFill>
+              <a:srgbClr val="FF0000"/>
+            </a:solidFill>
+            <a:prstDash val="sysDash"/>
+          </a:ln>
+        </p:spPr>
+        <p:style>
+          <a:lnRef idx="2">
+            <a:schemeClr val="accent1">
+              <a:shade val="15000"/>
+            </a:schemeClr>
+          </a:lnRef>
+          <a:fillRef idx="1">
+            <a:schemeClr val="accent1"/>
+          </a:fillRef>
+          <a:effectRef idx="0">
+            <a:schemeClr val="accent1"/>
+          </a:effectRef>
+          <a:fontRef idx="minor">
+            <a:schemeClr val="lt1"/>
+          </a:fontRef>
+        </p:style>
+        <p:txBody>
+          <a:bodyPr rtlCol="0" anchor="ctr"/>
+          <a:lstStyle/>
+          <a:p>
+            <a:pPr algn="ctr"/>
+            <a:endParaRPr lang="en-SG" dirty="0"/>
+          </a:p>
+        </p:txBody>
+      </p:sp>
+      <p:cxnSp>
+        <p:nvCxnSpPr>
+          <p:cNvPr id="14" name="Straight Arrow Connector 13">
+            <a:extLst>
+              <a:ext uri="{FF2B5EF4-FFF2-40B4-BE49-F238E27FC236}">
+                <a16:creationId xmlns:a16="http://schemas.microsoft.com/office/drawing/2014/main" id="{819D74D9-AC4F-7F2A-2C43-96A45BC3C660}"/>
+              </a:ext>
+            </a:extLst>
+          </p:cNvPr>
+          <p:cNvCxnSpPr>
+            <a:cxnSpLocks/>
+          </p:cNvCxnSpPr>
+          <p:nvPr/>
+        </p:nvCxnSpPr>
+        <p:spPr>
+          <a:xfrm>
+            <a:off x="8857622" y="2321169"/>
+            <a:ext cx="0" cy="1388347"/>
+          </a:xfrm>
+          <a:prstGeom prst="straightConnector1">
+            <a:avLst/>
+          </a:prstGeom>
+          <a:ln>
+            <a:solidFill>
+              <a:srgbClr val="FF0000"/>
+            </a:solidFill>
+            <a:tailEnd type="triangle"/>
+          </a:ln>
+        </p:spPr>
+        <p:style>
+          <a:lnRef idx="2">
+            <a:schemeClr val="accent1"/>
+          </a:lnRef>
+          <a:fillRef idx="0">
+            <a:schemeClr val="accent1"/>
+          </a:fillRef>
+          <a:effectRef idx="1">
+            <a:schemeClr val="accent1"/>
+          </a:effectRef>
+          <a:fontRef idx="minor">
+            <a:schemeClr val="tx1"/>
+          </a:fontRef>
+        </p:style>
+      </p:cxnSp>
+    </p:spTree>
+    <p:extLst>
+      <p:ext uri="{BB962C8B-B14F-4D97-AF65-F5344CB8AC3E}">
+        <p14:creationId xmlns:p14="http://schemas.microsoft.com/office/powerpoint/2010/main" val="2735021815"/>
+      </p:ext>
+    </p:extLst>
+  </p:cSld>
+  <p:clrMapOvr>
+    <a:masterClrMapping/>
+  </p:clrMapOvr>
+</p:sld>
+</file>
+
+<file path=ppt/slides/slide17.xml><?xml version="1.0" encoding="utf-8"?>
+<p:sld xmlns:a="http://schemas.openxmlformats.org/drawingml/2006/main" xmlns:r="http://schemas.openxmlformats.org/officeDocument/2006/relationships" xmlns:p="http://schemas.openxmlformats.org/presentationml/2006/main">
+  <p:cSld>
+    <p:spTree>
+      <p:nvGrpSpPr>
+        <p:cNvPr id="1" name=""/>
+        <p:cNvGrpSpPr/>
+        <p:nvPr/>
+      </p:nvGrpSpPr>
+      <p:grpSpPr>
+        <a:xfrm>
+          <a:off x="0" y="0"/>
+          <a:ext cx="0" cy="0"/>
+          <a:chOff x="0" y="0"/>
+          <a:chExt cx="0" cy="0"/>
+        </a:xfrm>
+      </p:grpSpPr>
+      <p:pic>
+        <p:nvPicPr>
+          <p:cNvPr id="5" name="Picture 4" descr="A screenshot of a computer&#10;&#10;Description automatically generated">
+            <a:extLst>
+              <a:ext uri="{FF2B5EF4-FFF2-40B4-BE49-F238E27FC236}">
+                <a16:creationId xmlns:a16="http://schemas.microsoft.com/office/drawing/2014/main" id="{DE282D43-D5B3-5D3E-8684-B8FD6476F2C4}"/>
+              </a:ext>
+            </a:extLst>
+          </p:cNvPr>
+          <p:cNvPicPr>
+            <a:picLocks noChangeAspect="1"/>
+          </p:cNvPicPr>
+          <p:nvPr/>
+        </p:nvPicPr>
+        <p:blipFill>
+          <a:blip r:embed="rId2">
+            <a:extLst>
+              <a:ext uri="{28A0092B-C50C-407E-A947-70E740481C1C}">
+                <a14:useLocalDpi xmlns:a14="http://schemas.microsoft.com/office/drawing/2010/main" val="0"/>
+              </a:ext>
+            </a:extLst>
+          </a:blip>
+          <a:stretch>
+            <a:fillRect/>
+          </a:stretch>
+        </p:blipFill>
+        <p:spPr>
+          <a:xfrm>
+            <a:off x="168443" y="340328"/>
+            <a:ext cx="11155128" cy="3369188"/>
+          </a:xfrm>
+          <a:prstGeom prst="rect">
+            <a:avLst/>
+          </a:prstGeom>
+        </p:spPr>
+      </p:pic>
+      <p:sp>
+        <p:nvSpPr>
+          <p:cNvPr id="6" name="Rectangle 5">
+            <a:extLst>
+              <a:ext uri="{FF2B5EF4-FFF2-40B4-BE49-F238E27FC236}">
+                <a16:creationId xmlns:a16="http://schemas.microsoft.com/office/drawing/2014/main" id="{4B92A9C7-8A73-1F59-AE31-EE1051BE199F}"/>
+              </a:ext>
+            </a:extLst>
+          </p:cNvPr>
+          <p:cNvSpPr/>
+          <p:nvPr/>
+        </p:nvSpPr>
+        <p:spPr>
+          <a:xfrm>
+            <a:off x="7100614" y="2490536"/>
+            <a:ext cx="4040627" cy="565485"/>
+          </a:xfrm>
+          <a:prstGeom prst="rect">
+            <a:avLst/>
+          </a:prstGeom>
+          <a:noFill/>
+          <a:ln w="28575">
+            <a:solidFill>
+              <a:srgbClr val="FF0000"/>
+            </a:solidFill>
+            <a:prstDash val="sysDash"/>
+          </a:ln>
+        </p:spPr>
+        <p:style>
+          <a:lnRef idx="2">
+            <a:schemeClr val="accent1">
+              <a:shade val="15000"/>
+            </a:schemeClr>
+          </a:lnRef>
+          <a:fillRef idx="1">
+            <a:schemeClr val="accent1"/>
+          </a:fillRef>
+          <a:effectRef idx="0">
+            <a:schemeClr val="accent1"/>
+          </a:effectRef>
+          <a:fontRef idx="minor">
+            <a:schemeClr val="lt1"/>
+          </a:fontRef>
+        </p:style>
+        <p:txBody>
+          <a:bodyPr rtlCol="0" anchor="ctr"/>
+          <a:lstStyle/>
+          <a:p>
+            <a:pPr algn="ctr"/>
+            <a:endParaRPr lang="en-SG" dirty="0"/>
+          </a:p>
+        </p:txBody>
+      </p:sp>
+      <p:sp>
+        <p:nvSpPr>
+          <p:cNvPr id="7" name="Rectangle 6">
+            <a:extLst>
+              <a:ext uri="{FF2B5EF4-FFF2-40B4-BE49-F238E27FC236}">
+                <a16:creationId xmlns:a16="http://schemas.microsoft.com/office/drawing/2014/main" id="{C3217513-9A28-0F53-3F9D-54DB3B762560}"/>
+              </a:ext>
+            </a:extLst>
+          </p:cNvPr>
+          <p:cNvSpPr/>
+          <p:nvPr/>
+        </p:nvSpPr>
+        <p:spPr>
+          <a:xfrm>
+            <a:off x="3125037" y="2944387"/>
+            <a:ext cx="3793247" cy="565485"/>
+          </a:xfrm>
+          <a:prstGeom prst="rect">
+            <a:avLst/>
+          </a:prstGeom>
+          <a:noFill/>
+          <a:ln w="28575">
+            <a:solidFill>
+              <a:srgbClr val="FF0000"/>
+            </a:solidFill>
+            <a:prstDash val="sysDash"/>
+          </a:ln>
+        </p:spPr>
+        <p:style>
+          <a:lnRef idx="2">
+            <a:schemeClr val="accent1">
+              <a:shade val="15000"/>
+            </a:schemeClr>
+          </a:lnRef>
+          <a:fillRef idx="1">
+            <a:schemeClr val="accent1"/>
+          </a:fillRef>
+          <a:effectRef idx="0">
+            <a:schemeClr val="accent1"/>
+          </a:effectRef>
+          <a:fontRef idx="minor">
+            <a:schemeClr val="lt1"/>
+          </a:fontRef>
+        </p:style>
+        <p:txBody>
+          <a:bodyPr rtlCol="0" anchor="ctr"/>
+          <a:lstStyle/>
+          <a:p>
+            <a:pPr algn="ctr"/>
+            <a:endParaRPr lang="en-SG" dirty="0"/>
+          </a:p>
+        </p:txBody>
+      </p:sp>
+      <p:cxnSp>
+        <p:nvCxnSpPr>
+          <p:cNvPr id="8" name="Straight Arrow Connector 7">
+            <a:extLst>
+              <a:ext uri="{FF2B5EF4-FFF2-40B4-BE49-F238E27FC236}">
+                <a16:creationId xmlns:a16="http://schemas.microsoft.com/office/drawing/2014/main" id="{1BA035D1-EFDF-2FF0-71E7-113E5A86965E}"/>
+              </a:ext>
+            </a:extLst>
+          </p:cNvPr>
+          <p:cNvCxnSpPr>
+            <a:cxnSpLocks/>
+          </p:cNvCxnSpPr>
+          <p:nvPr/>
+        </p:nvCxnSpPr>
+        <p:spPr>
+          <a:xfrm flipH="1" flipV="1">
+            <a:off x="6998677" y="3492111"/>
+            <a:ext cx="758651" cy="0"/>
+          </a:xfrm>
+          <a:prstGeom prst="straightConnector1">
+            <a:avLst/>
+          </a:prstGeom>
+          <a:ln>
+            <a:solidFill>
+              <a:srgbClr val="FF0000"/>
+            </a:solidFill>
+            <a:tailEnd type="triangle"/>
+          </a:ln>
+        </p:spPr>
+        <p:style>
+          <a:lnRef idx="2">
+            <a:schemeClr val="accent1"/>
+          </a:lnRef>
+          <a:fillRef idx="0">
+            <a:schemeClr val="accent1"/>
+          </a:fillRef>
+          <a:effectRef idx="1">
+            <a:schemeClr val="accent1"/>
+          </a:effectRef>
+          <a:fontRef idx="minor">
+            <a:schemeClr val="tx1"/>
+          </a:fontRef>
+        </p:style>
+      </p:cxnSp>
+      <p:cxnSp>
+        <p:nvCxnSpPr>
+          <p:cNvPr id="11" name="Straight Arrow Connector 10">
+            <a:extLst>
+              <a:ext uri="{FF2B5EF4-FFF2-40B4-BE49-F238E27FC236}">
+                <a16:creationId xmlns:a16="http://schemas.microsoft.com/office/drawing/2014/main" id="{0A604918-06C7-3826-EC50-E29F1D5F18C2}"/>
+              </a:ext>
+            </a:extLst>
+          </p:cNvPr>
+          <p:cNvCxnSpPr>
+            <a:cxnSpLocks/>
+          </p:cNvCxnSpPr>
+          <p:nvPr/>
+        </p:nvCxnSpPr>
+        <p:spPr>
+          <a:xfrm flipV="1">
+            <a:off x="9266255" y="3056021"/>
+            <a:ext cx="0" cy="225074"/>
+          </a:xfrm>
+          <a:prstGeom prst="straightConnector1">
+            <a:avLst/>
+          </a:prstGeom>
+          <a:ln>
+            <a:solidFill>
+              <a:srgbClr val="FF0000"/>
+            </a:solidFill>
+            <a:tailEnd type="triangle"/>
+          </a:ln>
+        </p:spPr>
+        <p:style>
+          <a:lnRef idx="2">
+            <a:schemeClr val="accent1"/>
+          </a:lnRef>
+          <a:fillRef idx="0">
+            <a:schemeClr val="accent1"/>
+          </a:fillRef>
+          <a:effectRef idx="1">
+            <a:schemeClr val="accent1"/>
+          </a:effectRef>
+          <a:fontRef idx="minor">
+            <a:schemeClr val="tx1"/>
+          </a:fontRef>
+        </p:style>
+      </p:cxnSp>
+      <p:sp>
+        <p:nvSpPr>
+          <p:cNvPr id="13" name="TextBox 12">
+            <a:extLst>
+              <a:ext uri="{FF2B5EF4-FFF2-40B4-BE49-F238E27FC236}">
+                <a16:creationId xmlns:a16="http://schemas.microsoft.com/office/drawing/2014/main" id="{AAE9B18F-ED8F-912D-DC7B-46214CF3A669}"/>
+              </a:ext>
+            </a:extLst>
+          </p:cNvPr>
+          <p:cNvSpPr txBox="1"/>
+          <p:nvPr/>
+        </p:nvSpPr>
+        <p:spPr>
+          <a:xfrm>
+            <a:off x="7853659" y="3313729"/>
+            <a:ext cx="3095932" cy="307777"/>
+          </a:xfrm>
+          <a:prstGeom prst="rect">
+            <a:avLst/>
+          </a:prstGeom>
+          <a:noFill/>
+        </p:spPr>
+        <p:txBody>
+          <a:bodyPr wrap="square" rtlCol="0">
+            <a:spAutoFit/>
+          </a:bodyPr>
+          <a:lstStyle/>
+          <a:p>
+            <a:r>
+              <a:rPr lang="en-US" sz="1400" b="1" dirty="0">
+                <a:solidFill>
+                  <a:srgbClr val="FF0000"/>
+                </a:solidFill>
+              </a:rPr>
+              <a:t>PLC alert report detail information</a:t>
+            </a:r>
+            <a:r>
+              <a:rPr lang="en-US" sz="1400" b="1" dirty="0">
+                <a:solidFill>
+                  <a:schemeClr val="accent2">
+                    <a:lumMod val="75000"/>
+                  </a:schemeClr>
+                </a:solidFill>
+              </a:rPr>
+              <a:t>.</a:t>
+            </a:r>
+            <a:endParaRPr lang="en-SG" sz="1400" b="1" dirty="0">
+              <a:solidFill>
+                <a:schemeClr val="accent2">
+                  <a:lumMod val="75000"/>
+                </a:schemeClr>
+              </a:solidFill>
+            </a:endParaRPr>
+          </a:p>
+        </p:txBody>
+      </p:sp>
+    </p:spTree>
+    <p:extLst>
+      <p:ext uri="{BB962C8B-B14F-4D97-AF65-F5344CB8AC3E}">
+        <p14:creationId xmlns:p14="http://schemas.microsoft.com/office/powerpoint/2010/main" val="211169707"/>
       </p:ext>
     </p:extLst>
   </p:cSld>

</xml_diff>

<commit_message>
Update the deployment section in the user manual.
</commit_message>
<xml_diff>
--- a/doc/designDoc.pptx
+++ b/doc/designDoc.pptx
@@ -214,7 +214,7 @@
           <a:p>
             <a:fld id="{C711259C-07AC-49B2-B02B-76ECE0D8068C}" type="datetimeFigureOut">
               <a:rPr lang="en-SG" smtClean="0"/>
-              <a:t>27/11/2024</a:t>
+              <a:t>28/11/2024</a:t>
             </a:fld>
             <a:endParaRPr lang="en-SG"/>
           </a:p>
@@ -715,7 +715,7 @@
           <a:p>
             <a:fld id="{E7602038-B3F0-4825-ABDA-D66CE1C4CFDA}" type="datetimeFigureOut">
               <a:rPr lang="en-SG" smtClean="0"/>
-              <a:t>27/11/2024</a:t>
+              <a:t>28/11/2024</a:t>
             </a:fld>
             <a:endParaRPr lang="en-SG"/>
           </a:p>
@@ -915,7 +915,7 @@
           <a:p>
             <a:fld id="{E7602038-B3F0-4825-ABDA-D66CE1C4CFDA}" type="datetimeFigureOut">
               <a:rPr lang="en-SG" smtClean="0"/>
-              <a:t>27/11/2024</a:t>
+              <a:t>28/11/2024</a:t>
             </a:fld>
             <a:endParaRPr lang="en-SG"/>
           </a:p>
@@ -1125,7 +1125,7 @@
           <a:p>
             <a:fld id="{E7602038-B3F0-4825-ABDA-D66CE1C4CFDA}" type="datetimeFigureOut">
               <a:rPr lang="en-SG" smtClean="0"/>
-              <a:t>27/11/2024</a:t>
+              <a:t>28/11/2024</a:t>
             </a:fld>
             <a:endParaRPr lang="en-SG"/>
           </a:p>
@@ -1325,7 +1325,7 @@
           <a:p>
             <a:fld id="{E7602038-B3F0-4825-ABDA-D66CE1C4CFDA}" type="datetimeFigureOut">
               <a:rPr lang="en-SG" smtClean="0"/>
-              <a:t>27/11/2024</a:t>
+              <a:t>28/11/2024</a:t>
             </a:fld>
             <a:endParaRPr lang="en-SG"/>
           </a:p>
@@ -1601,7 +1601,7 @@
           <a:p>
             <a:fld id="{E7602038-B3F0-4825-ABDA-D66CE1C4CFDA}" type="datetimeFigureOut">
               <a:rPr lang="en-SG" smtClean="0"/>
-              <a:t>27/11/2024</a:t>
+              <a:t>28/11/2024</a:t>
             </a:fld>
             <a:endParaRPr lang="en-SG"/>
           </a:p>
@@ -1869,7 +1869,7 @@
           <a:p>
             <a:fld id="{E7602038-B3F0-4825-ABDA-D66CE1C4CFDA}" type="datetimeFigureOut">
               <a:rPr lang="en-SG" smtClean="0"/>
-              <a:t>27/11/2024</a:t>
+              <a:t>28/11/2024</a:t>
             </a:fld>
             <a:endParaRPr lang="en-SG"/>
           </a:p>
@@ -2284,7 +2284,7 @@
           <a:p>
             <a:fld id="{E7602038-B3F0-4825-ABDA-D66CE1C4CFDA}" type="datetimeFigureOut">
               <a:rPr lang="en-SG" smtClean="0"/>
-              <a:t>27/11/2024</a:t>
+              <a:t>28/11/2024</a:t>
             </a:fld>
             <a:endParaRPr lang="en-SG"/>
           </a:p>
@@ -2426,7 +2426,7 @@
           <a:p>
             <a:fld id="{E7602038-B3F0-4825-ABDA-D66CE1C4CFDA}" type="datetimeFigureOut">
               <a:rPr lang="en-SG" smtClean="0"/>
-              <a:t>27/11/2024</a:t>
+              <a:t>28/11/2024</a:t>
             </a:fld>
             <a:endParaRPr lang="en-SG"/>
           </a:p>
@@ -2539,7 +2539,7 @@
           <a:p>
             <a:fld id="{E7602038-B3F0-4825-ABDA-D66CE1C4CFDA}" type="datetimeFigureOut">
               <a:rPr lang="en-SG" smtClean="0"/>
-              <a:t>27/11/2024</a:t>
+              <a:t>28/11/2024</a:t>
             </a:fld>
             <a:endParaRPr lang="en-SG"/>
           </a:p>
@@ -2852,7 +2852,7 @@
           <a:p>
             <a:fld id="{E7602038-B3F0-4825-ABDA-D66CE1C4CFDA}" type="datetimeFigureOut">
               <a:rPr lang="en-SG" smtClean="0"/>
-              <a:t>27/11/2024</a:t>
+              <a:t>28/11/2024</a:t>
             </a:fld>
             <a:endParaRPr lang="en-SG"/>
           </a:p>
@@ -3141,7 +3141,7 @@
           <a:p>
             <a:fld id="{E7602038-B3F0-4825-ABDA-D66CE1C4CFDA}" type="datetimeFigureOut">
               <a:rPr lang="en-SG" smtClean="0"/>
-              <a:t>27/11/2024</a:t>
+              <a:t>28/11/2024</a:t>
             </a:fld>
             <a:endParaRPr lang="en-SG"/>
           </a:p>
@@ -3384,7 +3384,7 @@
           <a:p>
             <a:fld id="{E7602038-B3F0-4825-ABDA-D66CE1C4CFDA}" type="datetimeFigureOut">
               <a:rPr lang="en-SG" smtClean="0"/>
-              <a:t>27/11/2024</a:t>
+              <a:t>28/11/2024</a:t>
             </a:fld>
             <a:endParaRPr lang="en-SG"/>
           </a:p>
@@ -23643,7 +23643,7 @@
           <a:p>
             <a:r>
               <a:rPr lang="en-US" sz="900" b="1" dirty="0"/>
-              <a:t>ID:Controller01</a:t>
+              <a:t>ID:Controller02</a:t>
             </a:r>
           </a:p>
         </p:txBody>
@@ -23965,7 +23965,7 @@
           <a:p>
             <a:r>
               <a:rPr lang="en-US" sz="900" b="1" dirty="0"/>
-              <a:t>ID:Controller00</a:t>
+              <a:t>ID:Controller01</a:t>
             </a:r>
           </a:p>
         </p:txBody>
@@ -25019,6 +25019,76 @@
           </a:p>
         </p:txBody>
       </p:sp>
+      <p:pic>
+        <p:nvPicPr>
+          <p:cNvPr id="2" name="Picture 1">
+            <a:extLst>
+              <a:ext uri="{FF2B5EF4-FFF2-40B4-BE49-F238E27FC236}">
+                <a16:creationId xmlns:a16="http://schemas.microsoft.com/office/drawing/2014/main" id="{05507C8C-8361-71BD-E110-CC00C5B411A2}"/>
+              </a:ext>
+            </a:extLst>
+          </p:cNvPr>
+          <p:cNvPicPr>
+            <a:picLocks noChangeAspect="1"/>
+          </p:cNvPicPr>
+          <p:nvPr/>
+        </p:nvPicPr>
+        <p:blipFill>
+          <a:blip r:embed="rId8"/>
+          <a:stretch>
+            <a:fillRect/>
+          </a:stretch>
+        </p:blipFill>
+        <p:spPr>
+          <a:xfrm>
+            <a:off x="1268739" y="4911716"/>
+            <a:ext cx="516027" cy="572116"/>
+          </a:xfrm>
+          <a:prstGeom prst="rect">
+            <a:avLst/>
+          </a:prstGeom>
+          <a:ln w="9525">
+            <a:solidFill>
+              <a:schemeClr val="tx1"/>
+            </a:solidFill>
+          </a:ln>
+        </p:spPr>
+      </p:pic>
+      <p:pic>
+        <p:nvPicPr>
+          <p:cNvPr id="3" name="Picture 2">
+            <a:extLst>
+              <a:ext uri="{FF2B5EF4-FFF2-40B4-BE49-F238E27FC236}">
+                <a16:creationId xmlns:a16="http://schemas.microsoft.com/office/drawing/2014/main" id="{644B92E1-04B2-0040-6133-9DEE94759551}"/>
+              </a:ext>
+            </a:extLst>
+          </p:cNvPr>
+          <p:cNvPicPr>
+            <a:picLocks noChangeAspect="1"/>
+          </p:cNvPicPr>
+          <p:nvPr/>
+        </p:nvPicPr>
+        <p:blipFill>
+          <a:blip r:embed="rId9"/>
+          <a:stretch>
+            <a:fillRect/>
+          </a:stretch>
+        </p:blipFill>
+        <p:spPr>
+          <a:xfrm>
+            <a:off x="8383972" y="5043246"/>
+            <a:ext cx="750246" cy="476591"/>
+          </a:xfrm>
+          <a:prstGeom prst="rect">
+            <a:avLst/>
+          </a:prstGeom>
+          <a:ln w="9525">
+            <a:solidFill>
+              <a:schemeClr val="tx1"/>
+            </a:solidFill>
+          </a:ln>
+        </p:spPr>
+      </p:pic>
     </p:spTree>
     <p:extLst>
       <p:ext uri="{BB962C8B-B14F-4D97-AF65-F5344CB8AC3E}">

</xml_diff>

<commit_message>
update the design document and the attack detection case study section of the user manual file.
</commit_message>
<xml_diff>
--- a/doc/designDoc.pptx
+++ b/doc/designDoc.pptx
@@ -25843,6 +25843,58 @@
       </p:grpSpPr>
       <p:sp>
         <p:nvSpPr>
+          <p:cNvPr id="146" name="Rectangle 145">
+            <a:extLst>
+              <a:ext uri="{FF2B5EF4-FFF2-40B4-BE49-F238E27FC236}">
+                <a16:creationId xmlns:a16="http://schemas.microsoft.com/office/drawing/2014/main" id="{6B2F8EB0-5FAB-D44A-2D43-9CCDBADD8367}"/>
+              </a:ext>
+            </a:extLst>
+          </p:cNvPr>
+          <p:cNvSpPr/>
+          <p:nvPr/>
+        </p:nvSpPr>
+        <p:spPr>
+          <a:xfrm>
+            <a:off x="1173192" y="566191"/>
+            <a:ext cx="10006642" cy="5903628"/>
+          </a:xfrm>
+          <a:prstGeom prst="rect">
+            <a:avLst/>
+          </a:prstGeom>
+          <a:solidFill>
+            <a:schemeClr val="bg1"/>
+          </a:solidFill>
+          <a:ln>
+            <a:prstDash val="sysDash"/>
+          </a:ln>
+        </p:spPr>
+        <p:style>
+          <a:lnRef idx="2">
+            <a:schemeClr val="accent1">
+              <a:shade val="15000"/>
+            </a:schemeClr>
+          </a:lnRef>
+          <a:fillRef idx="1">
+            <a:schemeClr val="accent1"/>
+          </a:fillRef>
+          <a:effectRef idx="0">
+            <a:schemeClr val="accent1"/>
+          </a:effectRef>
+          <a:fontRef idx="minor">
+            <a:schemeClr val="lt1"/>
+          </a:fontRef>
+        </p:style>
+        <p:txBody>
+          <a:bodyPr rtlCol="0" anchor="ctr"/>
+          <a:lstStyle/>
+          <a:p>
+            <a:pPr algn="ctr"/>
+            <a:endParaRPr lang="en-SG"/>
+          </a:p>
+        </p:txBody>
+      </p:sp>
+      <p:sp>
+        <p:nvSpPr>
           <p:cNvPr id="100" name="Rectangle 99">
             <a:extLst>
               <a:ext uri="{FF2B5EF4-FFF2-40B4-BE49-F238E27FC236}">
@@ -25855,7 +25907,7 @@
         </p:nvSpPr>
         <p:spPr>
           <a:xfrm>
-            <a:off x="5816543" y="518830"/>
+            <a:off x="6360007" y="1407358"/>
             <a:ext cx="3854626" cy="4649787"/>
           </a:xfrm>
           <a:prstGeom prst="rect">
@@ -25911,7 +25963,7 @@
         </p:nvSpPr>
         <p:spPr>
           <a:xfrm>
-            <a:off x="1608610" y="518831"/>
+            <a:off x="2152074" y="1407359"/>
             <a:ext cx="3676757" cy="4667022"/>
           </a:xfrm>
           <a:prstGeom prst="rect">
@@ -25967,7 +26019,7 @@
         </p:nvSpPr>
         <p:spPr>
           <a:xfrm>
-            <a:off x="5029635" y="796222"/>
+            <a:off x="5573099" y="1684750"/>
             <a:ext cx="1136720" cy="772932"/>
           </a:xfrm>
           <a:prstGeom prst="rect">
@@ -26016,7 +26068,7 @@
         </p:nvSpPr>
         <p:spPr>
           <a:xfrm>
-            <a:off x="4724834" y="518831"/>
+            <a:off x="5268298" y="1407359"/>
             <a:ext cx="2037899" cy="261610"/>
           </a:xfrm>
           <a:prstGeom prst="rect">
@@ -26059,7 +26111,7 @@
         </p:blipFill>
         <p:spPr>
           <a:xfrm>
-            <a:off x="5372099" y="876406"/>
+            <a:off x="5915563" y="1764934"/>
             <a:ext cx="531176" cy="467941"/>
           </a:xfrm>
           <a:prstGeom prst="rect">
@@ -26089,7 +26141,7 @@
         </p:blipFill>
         <p:spPr>
           <a:xfrm>
-            <a:off x="5230963" y="991415"/>
+            <a:off x="5774427" y="1879943"/>
             <a:ext cx="297869" cy="175743"/>
           </a:xfrm>
           <a:prstGeom prst="rect">
@@ -26119,7 +26171,7 @@
         </p:nvSpPr>
         <p:spPr>
           <a:xfrm>
-            <a:off x="5069325" y="1362351"/>
+            <a:off x="5612789" y="2250879"/>
             <a:ext cx="1136720" cy="230832"/>
           </a:xfrm>
           <a:prstGeom prst="rect">
@@ -26162,7 +26214,7 @@
         </p:blipFill>
         <p:spPr>
           <a:xfrm>
-            <a:off x="4859947" y="1055939"/>
+            <a:off x="5403411" y="1944467"/>
             <a:ext cx="259996" cy="253497"/>
           </a:xfrm>
           <a:prstGeom prst="rect">
@@ -26192,7 +26244,7 @@
         </p:blipFill>
         <p:spPr>
           <a:xfrm>
-            <a:off x="6075226" y="1055938"/>
+            <a:off x="6618690" y="1944466"/>
             <a:ext cx="259996" cy="253497"/>
           </a:xfrm>
           <a:prstGeom prst="rect">
@@ -26214,7 +26266,7 @@
         </p:nvSpPr>
         <p:spPr>
           <a:xfrm>
-            <a:off x="3978597" y="737958"/>
+            <a:off x="4522061" y="1626486"/>
             <a:ext cx="1129950" cy="246221"/>
           </a:xfrm>
           <a:prstGeom prst="rect">
@@ -26249,7 +26301,7 @@
         </p:nvSpPr>
         <p:spPr>
           <a:xfrm>
-            <a:off x="6127679" y="838415"/>
+            <a:off x="6671143" y="1726943"/>
             <a:ext cx="939854" cy="246221"/>
           </a:xfrm>
           <a:prstGeom prst="rect">
@@ -26292,7 +26344,7 @@
         </p:blipFill>
         <p:spPr>
           <a:xfrm>
-            <a:off x="2836263" y="2584091"/>
+            <a:off x="3379727" y="3472619"/>
             <a:ext cx="830711" cy="473120"/>
           </a:xfrm>
           <a:prstGeom prst="rect">
@@ -26322,7 +26374,7 @@
         </p:nvCxnSpPr>
         <p:spPr>
           <a:xfrm rot="10800000" flipV="1">
-            <a:off x="3251619" y="1182687"/>
+            <a:off x="3795083" y="2071215"/>
             <a:ext cx="1608328" cy="1401403"/>
           </a:xfrm>
           <a:prstGeom prst="bentConnector2">
@@ -26365,7 +26417,7 @@
         </p:nvSpPr>
         <p:spPr>
           <a:xfrm>
-            <a:off x="2186444" y="2376516"/>
+            <a:off x="2729908" y="3265044"/>
             <a:ext cx="1129950" cy="246221"/>
           </a:xfrm>
           <a:prstGeom prst="rect">
@@ -26400,7 +26452,7 @@
         </p:nvSpPr>
         <p:spPr>
           <a:xfrm>
-            <a:off x="2836263" y="2795600"/>
+            <a:off x="3379727" y="3684128"/>
             <a:ext cx="805181" cy="261610"/>
           </a:xfrm>
           <a:prstGeom prst="rect">
@@ -26439,7 +26491,7 @@
         </p:nvSpPr>
         <p:spPr>
           <a:xfrm>
-            <a:off x="5029635" y="1924608"/>
+            <a:off x="5573099" y="2813136"/>
             <a:ext cx="1136720" cy="772932"/>
           </a:xfrm>
           <a:prstGeom prst="rect">
@@ -26488,7 +26540,7 @@
         </p:nvSpPr>
         <p:spPr>
           <a:xfrm>
-            <a:off x="4724834" y="1672147"/>
+            <a:off x="5268298" y="2560675"/>
             <a:ext cx="2299592" cy="261610"/>
           </a:xfrm>
           <a:prstGeom prst="rect">
@@ -26531,7 +26583,7 @@
         </p:blipFill>
         <p:spPr>
           <a:xfrm>
-            <a:off x="5372099" y="2004792"/>
+            <a:off x="5915563" y="2893320"/>
             <a:ext cx="531176" cy="467941"/>
           </a:xfrm>
           <a:prstGeom prst="rect">
@@ -26561,7 +26613,7 @@
         </p:blipFill>
         <p:spPr>
           <a:xfrm>
-            <a:off x="5230963" y="2119801"/>
+            <a:off x="5774427" y="3008329"/>
             <a:ext cx="297869" cy="175743"/>
           </a:xfrm>
           <a:prstGeom prst="rect">
@@ -26591,7 +26643,7 @@
         </p:nvSpPr>
         <p:spPr>
           <a:xfrm>
-            <a:off x="5069325" y="2490737"/>
+            <a:off x="5612789" y="3379265"/>
             <a:ext cx="1136720" cy="230832"/>
           </a:xfrm>
           <a:prstGeom prst="rect">
@@ -26634,7 +26686,7 @@
         </p:blipFill>
         <p:spPr>
           <a:xfrm>
-            <a:off x="4859947" y="2184325"/>
+            <a:off x="5403411" y="3072853"/>
             <a:ext cx="259996" cy="253497"/>
           </a:xfrm>
           <a:prstGeom prst="rect">
@@ -26664,7 +26716,7 @@
         </p:blipFill>
         <p:spPr>
           <a:xfrm>
-            <a:off x="6075226" y="2184324"/>
+            <a:off x="6618690" y="3072852"/>
             <a:ext cx="259996" cy="253497"/>
           </a:xfrm>
           <a:prstGeom prst="rect">
@@ -26686,7 +26738,7 @@
         </p:nvSpPr>
         <p:spPr>
           <a:xfrm>
-            <a:off x="4000349" y="1987557"/>
+            <a:off x="4543813" y="2876085"/>
             <a:ext cx="1129950" cy="246221"/>
           </a:xfrm>
           <a:prstGeom prst="rect">
@@ -26721,7 +26773,7 @@
         </p:nvSpPr>
         <p:spPr>
           <a:xfrm>
-            <a:off x="6155431" y="1964267"/>
+            <a:off x="6698895" y="2852795"/>
             <a:ext cx="939854" cy="246221"/>
           </a:xfrm>
           <a:prstGeom prst="rect">
@@ -26756,7 +26808,7 @@
         </p:nvCxnSpPr>
         <p:spPr>
           <a:xfrm flipH="1">
-            <a:off x="3251619" y="2295544"/>
+            <a:off x="3795083" y="3184072"/>
             <a:ext cx="1608328" cy="0"/>
           </a:xfrm>
           <a:prstGeom prst="line">
@@ -26799,7 +26851,7 @@
         </p:nvSpPr>
         <p:spPr>
           <a:xfrm>
-            <a:off x="5029635" y="3198501"/>
+            <a:off x="5573099" y="4087029"/>
             <a:ext cx="1136720" cy="772932"/>
           </a:xfrm>
           <a:prstGeom prst="rect">
@@ -26848,7 +26900,7 @@
         </p:nvSpPr>
         <p:spPr>
           <a:xfrm>
-            <a:off x="4724834" y="2946040"/>
+            <a:off x="5268298" y="3834568"/>
             <a:ext cx="2299592" cy="261610"/>
           </a:xfrm>
           <a:prstGeom prst="rect">
@@ -26891,7 +26943,7 @@
         </p:blipFill>
         <p:spPr>
           <a:xfrm>
-            <a:off x="5372099" y="3278685"/>
+            <a:off x="5915563" y="4167213"/>
             <a:ext cx="531176" cy="467941"/>
           </a:xfrm>
           <a:prstGeom prst="rect">
@@ -26913,7 +26965,7 @@
         </p:nvSpPr>
         <p:spPr>
           <a:xfrm>
-            <a:off x="5069325" y="3764630"/>
+            <a:off x="5612789" y="4653158"/>
             <a:ext cx="1136720" cy="230832"/>
           </a:xfrm>
           <a:prstGeom prst="rect">
@@ -26956,7 +27008,7 @@
         </p:blipFill>
         <p:spPr>
           <a:xfrm>
-            <a:off x="4859947" y="3458218"/>
+            <a:off x="5403411" y="4346746"/>
             <a:ext cx="259996" cy="253497"/>
           </a:xfrm>
           <a:prstGeom prst="rect">
@@ -26986,7 +27038,7 @@
         </p:blipFill>
         <p:spPr>
           <a:xfrm>
-            <a:off x="6075226" y="3458217"/>
+            <a:off x="6618690" y="4346745"/>
             <a:ext cx="259996" cy="253497"/>
           </a:xfrm>
           <a:prstGeom prst="rect">
@@ -27008,7 +27060,7 @@
         </p:nvSpPr>
         <p:spPr>
           <a:xfrm>
-            <a:off x="4000349" y="3261450"/>
+            <a:off x="4543813" y="4149978"/>
             <a:ext cx="1129950" cy="246221"/>
           </a:xfrm>
           <a:prstGeom prst="rect">
@@ -27043,7 +27095,7 @@
         </p:nvSpPr>
         <p:spPr>
           <a:xfrm>
-            <a:off x="6127679" y="3240694"/>
+            <a:off x="6671143" y="4129222"/>
             <a:ext cx="939854" cy="246221"/>
           </a:xfrm>
           <a:prstGeom prst="rect">
@@ -27078,7 +27130,7 @@
         </p:nvCxnSpPr>
         <p:spPr>
           <a:xfrm flipH="1">
-            <a:off x="3251619" y="3569437"/>
+            <a:off x="3795083" y="4457965"/>
             <a:ext cx="1608328" cy="0"/>
           </a:xfrm>
           <a:prstGeom prst="line">
@@ -27121,7 +27173,7 @@
         </p:nvSpPr>
         <p:spPr>
           <a:xfrm>
-            <a:off x="5034044" y="4311202"/>
+            <a:off x="5577508" y="5199730"/>
             <a:ext cx="1136720" cy="772932"/>
           </a:xfrm>
           <a:prstGeom prst="rect">
@@ -27170,7 +27222,7 @@
         </p:nvSpPr>
         <p:spPr>
           <a:xfrm>
-            <a:off x="4729243" y="4058741"/>
+            <a:off x="5272707" y="4947269"/>
             <a:ext cx="2299592" cy="261610"/>
           </a:xfrm>
           <a:prstGeom prst="rect">
@@ -27213,7 +27265,7 @@
         </p:blipFill>
         <p:spPr>
           <a:xfrm>
-            <a:off x="5376508" y="4391386"/>
+            <a:off x="5919972" y="5279914"/>
             <a:ext cx="531176" cy="467941"/>
           </a:xfrm>
           <a:prstGeom prst="rect">
@@ -27235,7 +27287,7 @@
         </p:nvSpPr>
         <p:spPr>
           <a:xfrm>
-            <a:off x="5073734" y="4877331"/>
+            <a:off x="5617198" y="5765859"/>
             <a:ext cx="1136720" cy="230832"/>
           </a:xfrm>
           <a:prstGeom prst="rect">
@@ -27278,7 +27330,7 @@
         </p:blipFill>
         <p:spPr>
           <a:xfrm>
-            <a:off x="4864356" y="4570919"/>
+            <a:off x="5407820" y="5459447"/>
             <a:ext cx="259996" cy="253497"/>
           </a:xfrm>
           <a:prstGeom prst="rect">
@@ -27308,7 +27360,7 @@
         </p:blipFill>
         <p:spPr>
           <a:xfrm>
-            <a:off x="6079635" y="4570918"/>
+            <a:off x="6623099" y="5459446"/>
             <a:ext cx="259996" cy="253497"/>
           </a:xfrm>
           <a:prstGeom prst="rect">
@@ -27330,7 +27382,7 @@
         </p:nvSpPr>
         <p:spPr>
           <a:xfrm>
-            <a:off x="4004758" y="4374151"/>
+            <a:off x="4548222" y="5262679"/>
             <a:ext cx="1129950" cy="246221"/>
           </a:xfrm>
           <a:prstGeom prst="rect">
@@ -27365,7 +27417,7 @@
         </p:nvSpPr>
         <p:spPr>
           <a:xfrm>
-            <a:off x="6132088" y="4353395"/>
+            <a:off x="6675552" y="5241923"/>
             <a:ext cx="939854" cy="246221"/>
           </a:xfrm>
           <a:prstGeom prst="rect">
@@ -27404,7 +27456,7 @@
         </p:nvCxnSpPr>
         <p:spPr>
           <a:xfrm rot="10800000">
-            <a:off x="3238854" y="3057210"/>
+            <a:off x="3782318" y="3945738"/>
             <a:ext cx="1625502" cy="1640458"/>
           </a:xfrm>
           <a:prstGeom prst="bentConnector2">
@@ -27455,7 +27507,7 @@
         </p:blipFill>
         <p:spPr>
           <a:xfrm>
-            <a:off x="2057101" y="1477767"/>
+            <a:off x="2600565" y="2366295"/>
             <a:ext cx="531176" cy="467941"/>
           </a:xfrm>
           <a:prstGeom prst="rect">
@@ -27482,7 +27534,7 @@
         </p:nvSpPr>
         <p:spPr>
           <a:xfrm>
-            <a:off x="1877039" y="1055938"/>
+            <a:off x="2420503" y="1944466"/>
             <a:ext cx="1284538" cy="430887"/>
           </a:xfrm>
           <a:prstGeom prst="rect">
@@ -27531,7 +27583,7 @@
         </p:blipFill>
         <p:spPr>
           <a:xfrm>
-            <a:off x="5216558" y="3285206"/>
+            <a:off x="5760022" y="4173734"/>
             <a:ext cx="341887" cy="341887"/>
           </a:xfrm>
           <a:prstGeom prst="rect">
@@ -27567,7 +27619,7 @@
         </p:blipFill>
         <p:spPr>
           <a:xfrm>
-            <a:off x="5188168" y="4401433"/>
+            <a:off x="5731632" y="5289961"/>
             <a:ext cx="341887" cy="341887"/>
           </a:xfrm>
           <a:prstGeom prst="rect">
@@ -27592,7 +27644,7 @@
         </p:nvCxnSpPr>
         <p:spPr>
           <a:xfrm rot="10800000">
-            <a:off x="2322690" y="1945708"/>
+            <a:off x="2866154" y="2834236"/>
             <a:ext cx="928929" cy="384280"/>
           </a:xfrm>
           <a:prstGeom prst="bentConnector2">
@@ -27635,7 +27687,7 @@
         </p:nvSpPr>
         <p:spPr>
           <a:xfrm>
-            <a:off x="2256845" y="1916320"/>
+            <a:off x="2800309" y="2804848"/>
             <a:ext cx="1129950" cy="246221"/>
           </a:xfrm>
           <a:prstGeom prst="rect">
@@ -27678,7 +27730,7 @@
         </p:blipFill>
         <p:spPr>
           <a:xfrm>
-            <a:off x="7556376" y="2584091"/>
+            <a:off x="8099840" y="3472619"/>
             <a:ext cx="830711" cy="473120"/>
           </a:xfrm>
           <a:prstGeom prst="rect">
@@ -27705,7 +27757,7 @@
         </p:nvSpPr>
         <p:spPr>
           <a:xfrm>
-            <a:off x="7556376" y="2795600"/>
+            <a:off x="8099840" y="3684128"/>
             <a:ext cx="805181" cy="261610"/>
           </a:xfrm>
           <a:prstGeom prst="rect">
@@ -27748,7 +27800,7 @@
         </p:nvCxnSpPr>
         <p:spPr>
           <a:xfrm>
-            <a:off x="6335222" y="1182687"/>
+            <a:off x="6878686" y="2071215"/>
             <a:ext cx="1636510" cy="1401404"/>
           </a:xfrm>
           <a:prstGeom prst="bentConnector2">
@@ -27787,7 +27839,7 @@
         </p:nvCxnSpPr>
         <p:spPr>
           <a:xfrm flipH="1" flipV="1">
-            <a:off x="6335222" y="2311073"/>
+            <a:off x="6878686" y="3199601"/>
             <a:ext cx="1636509" cy="4050"/>
           </a:xfrm>
           <a:prstGeom prst="line">
@@ -27827,7 +27879,7 @@
         </p:nvCxnSpPr>
         <p:spPr>
           <a:xfrm flipV="1">
-            <a:off x="6339631" y="3057211"/>
+            <a:off x="6883095" y="3945739"/>
             <a:ext cx="1632101" cy="1640456"/>
           </a:xfrm>
           <a:prstGeom prst="bentConnector2">
@@ -27866,7 +27918,7 @@
         </p:nvCxnSpPr>
         <p:spPr>
           <a:xfrm flipH="1" flipV="1">
-            <a:off x="6335222" y="3584966"/>
+            <a:off x="6878686" y="4473494"/>
             <a:ext cx="1623744" cy="0"/>
           </a:xfrm>
           <a:prstGeom prst="line">
@@ -27902,7 +27954,7 @@
         </p:nvSpPr>
         <p:spPr>
           <a:xfrm>
-            <a:off x="6695224" y="2683608"/>
+            <a:off x="8447873" y="3976604"/>
             <a:ext cx="1129950" cy="246221"/>
           </a:xfrm>
           <a:prstGeom prst="rect">
@@ -27945,7 +27997,7 @@
         </p:blipFill>
         <p:spPr>
           <a:xfrm>
-            <a:off x="8570560" y="1765837"/>
+            <a:off x="9114024" y="2654365"/>
             <a:ext cx="531176" cy="467941"/>
           </a:xfrm>
           <a:prstGeom prst="rect">
@@ -27972,7 +28024,7 @@
         </p:nvSpPr>
         <p:spPr>
           <a:xfrm>
-            <a:off x="8287089" y="1254186"/>
+            <a:off x="8830553" y="2142714"/>
             <a:ext cx="1212835" cy="430887"/>
           </a:xfrm>
           <a:prstGeom prst="rect">
@@ -28010,7 +28062,7 @@
         </p:nvCxnSpPr>
         <p:spPr>
           <a:xfrm flipH="1" flipV="1">
-            <a:off x="7965349" y="1987557"/>
+            <a:off x="8508813" y="2876085"/>
             <a:ext cx="605211" cy="0"/>
           </a:xfrm>
           <a:prstGeom prst="line">
@@ -28046,7 +28098,7 @@
         </p:nvSpPr>
         <p:spPr>
           <a:xfrm>
-            <a:off x="8409220" y="2258958"/>
+            <a:off x="8952684" y="3147486"/>
             <a:ext cx="939854" cy="246221"/>
           </a:xfrm>
           <a:prstGeom prst="rect">
@@ -28089,7 +28141,7 @@
         </p:blipFill>
         <p:spPr>
           <a:xfrm>
-            <a:off x="8597345" y="4129282"/>
+            <a:off x="9140809" y="5017810"/>
             <a:ext cx="531176" cy="467941"/>
           </a:xfrm>
           <a:prstGeom prst="rect">
@@ -28116,7 +28168,7 @@
         </p:nvSpPr>
         <p:spPr>
           <a:xfrm>
-            <a:off x="8035003" y="3754913"/>
+            <a:off x="8578467" y="4643441"/>
             <a:ext cx="1212835" cy="430887"/>
           </a:xfrm>
           <a:prstGeom prst="rect">
@@ -28153,7 +28205,7 @@
         </p:nvCxnSpPr>
         <p:spPr>
           <a:xfrm flipH="1" flipV="1">
-            <a:off x="7971731" y="4311202"/>
+            <a:off x="8515195" y="5199730"/>
             <a:ext cx="605211" cy="0"/>
           </a:xfrm>
           <a:prstGeom prst="line">
@@ -28189,7 +28241,7 @@
         </p:nvSpPr>
         <p:spPr>
           <a:xfrm>
-            <a:off x="8100633" y="4620209"/>
+            <a:off x="8644097" y="5508737"/>
             <a:ext cx="939854" cy="246221"/>
           </a:xfrm>
           <a:prstGeom prst="rect">
@@ -28224,7 +28276,7 @@
         </p:nvSpPr>
         <p:spPr>
           <a:xfrm>
-            <a:off x="1683166" y="619164"/>
+            <a:off x="2226630" y="1507692"/>
             <a:ext cx="2261583" cy="276999"/>
           </a:xfrm>
           <a:prstGeom prst="rect">
@@ -28268,7 +28320,7 @@
         </p:nvSpPr>
         <p:spPr>
           <a:xfrm>
-            <a:off x="7693651" y="582173"/>
+            <a:off x="8086282" y="1556709"/>
             <a:ext cx="2370991" cy="276999"/>
           </a:xfrm>
           <a:prstGeom prst="rect">
@@ -28326,7 +28378,7 @@
         </p:blipFill>
         <p:spPr>
           <a:xfrm>
-            <a:off x="786262" y="2854197"/>
+            <a:off x="1329726" y="3742725"/>
             <a:ext cx="516027" cy="572116"/>
           </a:xfrm>
           <a:prstGeom prst="rect">
@@ -28361,7 +28413,7 @@
         </p:blipFill>
         <p:spPr>
           <a:xfrm>
-            <a:off x="9311847" y="4221166"/>
+            <a:off x="9855311" y="5109694"/>
             <a:ext cx="926885" cy="588800"/>
           </a:xfrm>
           <a:prstGeom prst="rect">
@@ -28388,7 +28440,7 @@
         </p:nvSpPr>
         <p:spPr>
           <a:xfrm>
-            <a:off x="694491" y="2594923"/>
+            <a:off x="1237955" y="3483451"/>
             <a:ext cx="1129950" cy="246221"/>
           </a:xfrm>
           <a:prstGeom prst="rect">
@@ -28429,7 +28481,7 @@
         </p:nvCxnSpPr>
         <p:spPr>
           <a:xfrm flipV="1">
-            <a:off x="3161577" y="1079286"/>
+            <a:off x="3705041" y="1967814"/>
             <a:ext cx="0" cy="1446363"/>
           </a:xfrm>
           <a:prstGeom prst="straightConnector1">
@@ -28474,7 +28526,7 @@
         </p:nvCxnSpPr>
         <p:spPr>
           <a:xfrm>
-            <a:off x="3251618" y="1079286"/>
+            <a:off x="3795082" y="1967814"/>
             <a:ext cx="1608329" cy="0"/>
           </a:xfrm>
           <a:prstGeom prst="straightConnector1">
@@ -28519,7 +28571,7 @@
         </p:nvCxnSpPr>
         <p:spPr>
           <a:xfrm>
-            <a:off x="1357125" y="2902736"/>
+            <a:off x="1900589" y="3791264"/>
             <a:ext cx="1411144" cy="0"/>
           </a:xfrm>
           <a:prstGeom prst="straightConnector1">
@@ -28562,7 +28614,7 @@
         </p:nvSpPr>
         <p:spPr>
           <a:xfrm>
-            <a:off x="1970538" y="2811645"/>
+            <a:off x="2514002" y="3700173"/>
             <a:ext cx="198642" cy="214127"/>
           </a:xfrm>
           <a:prstGeom prst="ellipse">
@@ -28618,7 +28670,7 @@
         </p:nvSpPr>
         <p:spPr>
           <a:xfrm>
-            <a:off x="3032721" y="1517530"/>
+            <a:off x="3576185" y="2406058"/>
             <a:ext cx="198642" cy="214127"/>
           </a:xfrm>
           <a:prstGeom prst="ellipse">
@@ -28674,7 +28726,7 @@
         </p:nvSpPr>
         <p:spPr>
           <a:xfrm>
-            <a:off x="3880511" y="915758"/>
+            <a:off x="4423975" y="1804286"/>
             <a:ext cx="198642" cy="214127"/>
           </a:xfrm>
           <a:prstGeom prst="ellipse">
@@ -28744,7 +28796,7 @@
         </p:blipFill>
         <p:spPr>
           <a:xfrm>
-            <a:off x="1316416" y="4145470"/>
+            <a:off x="1859880" y="5033998"/>
             <a:ext cx="1526510" cy="912769"/>
           </a:xfrm>
           <a:prstGeom prst="rect">
@@ -28773,7 +28825,7 @@
         </p:nvCxnSpPr>
         <p:spPr>
           <a:xfrm flipH="1">
-            <a:off x="3436066" y="1301757"/>
+            <a:off x="3979530" y="2190285"/>
             <a:ext cx="1357237" cy="7678"/>
           </a:xfrm>
           <a:prstGeom prst="straightConnector1">
@@ -28818,7 +28870,7 @@
         </p:nvCxnSpPr>
         <p:spPr>
           <a:xfrm>
-            <a:off x="3375844" y="1340163"/>
+            <a:off x="3919308" y="2228691"/>
             <a:ext cx="0" cy="1150574"/>
           </a:xfrm>
           <a:prstGeom prst="straightConnector1">
@@ -28863,7 +28915,7 @@
         </p:nvCxnSpPr>
         <p:spPr>
           <a:xfrm>
-            <a:off x="3132042" y="3140255"/>
+            <a:off x="3675506" y="4028783"/>
             <a:ext cx="0" cy="1150574"/>
           </a:xfrm>
           <a:prstGeom prst="straightConnector1">
@@ -28908,7 +28960,7 @@
         </p:nvCxnSpPr>
         <p:spPr>
           <a:xfrm flipH="1">
-            <a:off x="2842926" y="4353395"/>
+            <a:off x="3386390" y="5241923"/>
             <a:ext cx="286488" cy="0"/>
           </a:xfrm>
           <a:prstGeom prst="straightConnector1">
@@ -28955,7 +29007,7 @@
         </p:nvCxnSpPr>
         <p:spPr>
           <a:xfrm rot="16200000" flipH="1">
-            <a:off x="592575" y="3878014"/>
+            <a:off x="1136039" y="4766542"/>
             <a:ext cx="1175542" cy="272140"/>
           </a:xfrm>
           <a:prstGeom prst="bentConnector2">
@@ -28998,7 +29050,7 @@
         </p:nvSpPr>
         <p:spPr>
           <a:xfrm>
-            <a:off x="4161798" y="1217001"/>
+            <a:off x="4705262" y="2105529"/>
             <a:ext cx="198642" cy="214127"/>
           </a:xfrm>
           <a:prstGeom prst="ellipse">
@@ -29059,7 +29111,7 @@
         </p:nvSpPr>
         <p:spPr>
           <a:xfrm>
-            <a:off x="3320223" y="1892743"/>
+            <a:off x="3863687" y="2781271"/>
             <a:ext cx="198642" cy="214127"/>
           </a:xfrm>
           <a:prstGeom prst="ellipse">
@@ -29120,7 +29172,7 @@
         </p:nvSpPr>
         <p:spPr>
           <a:xfrm>
-            <a:off x="3014281" y="3640690"/>
+            <a:off x="3557745" y="4529218"/>
             <a:ext cx="198642" cy="214127"/>
           </a:xfrm>
           <a:prstGeom prst="ellipse">
@@ -29181,7 +29233,7 @@
         </p:nvSpPr>
         <p:spPr>
           <a:xfrm>
-            <a:off x="928686" y="3781335"/>
+            <a:off x="1472150" y="4669863"/>
             <a:ext cx="198642" cy="214127"/>
           </a:xfrm>
           <a:prstGeom prst="ellipse">
@@ -29250,7 +29302,7 @@
         </p:blipFill>
         <p:spPr>
           <a:xfrm>
-            <a:off x="1765695" y="3195926"/>
+            <a:off x="2309159" y="4084454"/>
             <a:ext cx="608709" cy="403381"/>
           </a:xfrm>
           <a:prstGeom prst="rect">
@@ -29274,7 +29326,7 @@
         </p:nvCxnSpPr>
         <p:spPr>
           <a:xfrm>
-            <a:off x="1310652" y="3384560"/>
+            <a:off x="1854116" y="4273088"/>
             <a:ext cx="465091" cy="13057"/>
           </a:xfrm>
           <a:prstGeom prst="straightConnector1">
@@ -29319,7 +29371,7 @@
         </p:nvCxnSpPr>
         <p:spPr>
           <a:xfrm flipV="1">
-            <a:off x="3448803" y="1469629"/>
+            <a:off x="3992267" y="2358157"/>
             <a:ext cx="1411144" cy="990241"/>
           </a:xfrm>
           <a:prstGeom prst="straightConnector1">
@@ -29365,7 +29417,7 @@
         </p:nvCxnSpPr>
         <p:spPr>
           <a:xfrm flipV="1">
-            <a:off x="2374404" y="3114621"/>
+            <a:off x="2917868" y="4003149"/>
             <a:ext cx="586296" cy="282996"/>
           </a:xfrm>
           <a:prstGeom prst="bentConnector3">
@@ -29410,7 +29462,7 @@
         </p:nvSpPr>
         <p:spPr>
           <a:xfrm>
-            <a:off x="2557665" y="3319249"/>
+            <a:off x="3101129" y="4207777"/>
             <a:ext cx="198642" cy="214127"/>
           </a:xfrm>
           <a:prstGeom prst="ellipse">
@@ -29471,7 +29523,7 @@
         </p:nvSpPr>
         <p:spPr>
           <a:xfrm>
-            <a:off x="4206496" y="1714597"/>
+            <a:off x="4749960" y="2603125"/>
             <a:ext cx="198642" cy="214127"/>
           </a:xfrm>
           <a:prstGeom prst="ellipse">
@@ -29534,7 +29586,7 @@
         </p:nvCxnSpPr>
         <p:spPr>
           <a:xfrm>
-            <a:off x="6362044" y="1326226"/>
+            <a:off x="6905508" y="2214754"/>
             <a:ext cx="1466481" cy="0"/>
           </a:xfrm>
           <a:prstGeom prst="straightConnector1">
@@ -29579,7 +29631,7 @@
         </p:nvSpPr>
         <p:spPr>
           <a:xfrm>
-            <a:off x="2132204" y="4364034"/>
+            <a:off x="2675668" y="5252562"/>
             <a:ext cx="1269740" cy="646331"/>
           </a:xfrm>
           <a:prstGeom prst="rect">
@@ -29618,7 +29670,7 @@
         </p:nvSpPr>
         <p:spPr>
           <a:xfrm>
-            <a:off x="1170336" y="3554566"/>
+            <a:off x="1713800" y="4443094"/>
             <a:ext cx="2089664" cy="461665"/>
           </a:xfrm>
           <a:prstGeom prst="rect">
@@ -29657,7 +29709,7 @@
         </p:nvSpPr>
         <p:spPr>
           <a:xfrm>
-            <a:off x="1613539" y="2547951"/>
+            <a:off x="2157003" y="3436479"/>
             <a:ext cx="1111282" cy="276999"/>
           </a:xfrm>
           <a:prstGeom prst="rect">
@@ -29698,7 +29750,7 @@
         </p:nvCxnSpPr>
         <p:spPr>
           <a:xfrm>
-            <a:off x="6420235" y="4824415"/>
+            <a:off x="6963699" y="5712943"/>
             <a:ext cx="1466481" cy="0"/>
           </a:xfrm>
           <a:prstGeom prst="straightConnector1">
@@ -29745,7 +29797,7 @@
         </p:nvCxnSpPr>
         <p:spPr>
           <a:xfrm flipV="1">
-            <a:off x="7878579" y="3127945"/>
+            <a:off x="8422043" y="4016473"/>
             <a:ext cx="0" cy="1615375"/>
           </a:xfrm>
           <a:prstGeom prst="straightConnector1">
@@ -29792,7 +29844,7 @@
         </p:nvCxnSpPr>
         <p:spPr>
           <a:xfrm>
-            <a:off x="7839787" y="1362351"/>
+            <a:off x="8383251" y="2250879"/>
             <a:ext cx="0" cy="495885"/>
           </a:xfrm>
           <a:prstGeom prst="straightConnector1">
@@ -29839,7 +29891,7 @@
         </p:nvCxnSpPr>
         <p:spPr>
           <a:xfrm>
-            <a:off x="7902093" y="1892134"/>
+            <a:off x="8445557" y="2780662"/>
             <a:ext cx="588318" cy="0"/>
           </a:xfrm>
           <a:prstGeom prst="straightConnector1">
@@ -29886,7 +29938,7 @@
         </p:nvCxnSpPr>
         <p:spPr>
           <a:xfrm flipV="1">
-            <a:off x="7846686" y="2130256"/>
+            <a:off x="8390150" y="3018784"/>
             <a:ext cx="0" cy="395393"/>
           </a:xfrm>
           <a:prstGeom prst="straightConnector1">
@@ -29933,7 +29985,7 @@
         </p:nvCxnSpPr>
         <p:spPr>
           <a:xfrm flipV="1">
-            <a:off x="7884211" y="2121740"/>
+            <a:off x="8427675" y="3010268"/>
             <a:ext cx="618697" cy="0"/>
           </a:xfrm>
           <a:prstGeom prst="straightConnector1">
@@ -29992,7 +30044,7 @@
         </p:blipFill>
         <p:spPr>
           <a:xfrm>
-            <a:off x="8662158" y="2560058"/>
+            <a:off x="9205622" y="3448586"/>
             <a:ext cx="1860941" cy="1206571"/>
           </a:xfrm>
           <a:prstGeom prst="rect">
@@ -30022,7 +30074,7 @@
         </p:nvCxnSpPr>
         <p:spPr>
           <a:xfrm>
-            <a:off x="9101736" y="1999808"/>
+            <a:off x="9645200" y="2888336"/>
             <a:ext cx="490893" cy="560250"/>
           </a:xfrm>
           <a:prstGeom prst="bentConnector2">
@@ -30069,7 +30121,7 @@
         </p:nvCxnSpPr>
         <p:spPr>
           <a:xfrm>
-            <a:off x="9818469" y="3801913"/>
+            <a:off x="10361933" y="4690441"/>
             <a:ext cx="0" cy="383887"/>
           </a:xfrm>
           <a:prstGeom prst="straightConnector1">
@@ -30114,7 +30166,7 @@
         </p:nvSpPr>
         <p:spPr>
           <a:xfrm>
-            <a:off x="7010876" y="1254722"/>
+            <a:off x="7554340" y="2143250"/>
             <a:ext cx="198642" cy="214127"/>
           </a:xfrm>
           <a:prstGeom prst="ellipse">
@@ -30170,7 +30222,7 @@
         </p:nvSpPr>
         <p:spPr>
           <a:xfrm>
-            <a:off x="8140599" y="1708059"/>
+            <a:off x="8684063" y="2596587"/>
             <a:ext cx="198642" cy="214127"/>
           </a:xfrm>
           <a:prstGeom prst="ellipse">
@@ -30226,7 +30278,7 @@
         </p:nvSpPr>
         <p:spPr>
           <a:xfrm>
-            <a:off x="7110832" y="4738666"/>
+            <a:off x="7654296" y="5627194"/>
             <a:ext cx="198642" cy="214127"/>
           </a:xfrm>
           <a:prstGeom prst="ellipse">
@@ -30287,7 +30339,7 @@
         </p:nvSpPr>
         <p:spPr>
           <a:xfrm>
-            <a:off x="7718609" y="3255535"/>
+            <a:off x="8262073" y="4144063"/>
             <a:ext cx="198642" cy="214127"/>
           </a:xfrm>
           <a:prstGeom prst="ellipse">
@@ -30350,7 +30402,7 @@
         </p:nvCxnSpPr>
         <p:spPr>
           <a:xfrm flipH="1">
-            <a:off x="864158" y="5329294"/>
+            <a:off x="1407622" y="6217822"/>
             <a:ext cx="8911776" cy="0"/>
           </a:xfrm>
           <a:prstGeom prst="straightConnector1">
@@ -30397,7 +30449,7 @@
         </p:nvCxnSpPr>
         <p:spPr>
           <a:xfrm>
-            <a:off x="9808338" y="4866430"/>
+            <a:off x="10351802" y="5754958"/>
             <a:ext cx="0" cy="442011"/>
           </a:xfrm>
           <a:prstGeom prst="straightConnector1">
@@ -30442,7 +30494,7 @@
         </p:nvSpPr>
         <p:spPr>
           <a:xfrm>
-            <a:off x="5429511" y="5229531"/>
+            <a:off x="5972975" y="6118059"/>
             <a:ext cx="198642" cy="214127"/>
           </a:xfrm>
           <a:prstGeom prst="ellipse">
@@ -30503,7 +30555,7 @@
         </p:nvSpPr>
         <p:spPr>
           <a:xfrm>
-            <a:off x="9701040" y="4877331"/>
+            <a:off x="10244504" y="5765859"/>
             <a:ext cx="198642" cy="214127"/>
           </a:xfrm>
           <a:prstGeom prst="ellipse">
@@ -30566,7 +30618,7 @@
         </p:nvCxnSpPr>
         <p:spPr>
           <a:xfrm flipV="1">
-            <a:off x="870813" y="3526220"/>
+            <a:off x="1414277" y="4414748"/>
             <a:ext cx="0" cy="1730331"/>
           </a:xfrm>
           <a:prstGeom prst="straightConnector1">
@@ -30611,7 +30663,7 @@
         </p:nvSpPr>
         <p:spPr>
           <a:xfrm>
-            <a:off x="796084" y="4702902"/>
+            <a:off x="1339548" y="5591430"/>
             <a:ext cx="198642" cy="214127"/>
           </a:xfrm>
           <a:prstGeom prst="ellipse">
@@ -30658,6 +30710,1234 @@
           </a:p>
         </p:txBody>
       </p:sp>
+      <p:pic>
+        <p:nvPicPr>
+          <p:cNvPr id="4" name="Graphic 3" descr="Construction worker male with solid fill">
+            <a:extLst>
+              <a:ext uri="{FF2B5EF4-FFF2-40B4-BE49-F238E27FC236}">
+                <a16:creationId xmlns:a16="http://schemas.microsoft.com/office/drawing/2014/main" id="{F8E704A3-01D6-D99D-A78B-D02A752E06A4}"/>
+              </a:ext>
+            </a:extLst>
+          </p:cNvPr>
+          <p:cNvPicPr>
+            <a:picLocks noChangeAspect="1"/>
+          </p:cNvPicPr>
+          <p:nvPr/>
+        </p:nvPicPr>
+        <p:blipFill>
+          <a:blip r:embed="rId13">
+            <a:extLst>
+              <a:ext uri="{96DAC541-7B7A-43D3-8B79-37D633B846F1}">
+                <asvg:svgBlip xmlns:asvg="http://schemas.microsoft.com/office/drawing/2016/SVG/main" r:embed="rId14"/>
+              </a:ext>
+            </a:extLst>
+          </a:blip>
+          <a:stretch>
+            <a:fillRect/>
+          </a:stretch>
+        </p:blipFill>
+        <p:spPr>
+          <a:xfrm>
+            <a:off x="7740045" y="801792"/>
+            <a:ext cx="547275" cy="547275"/>
+          </a:xfrm>
+          <a:prstGeom prst="rect">
+            <a:avLst/>
+          </a:prstGeom>
+        </p:spPr>
+      </p:pic>
+      <p:sp>
+        <p:nvSpPr>
+          <p:cNvPr id="6" name="TextBox 5">
+            <a:extLst>
+              <a:ext uri="{FF2B5EF4-FFF2-40B4-BE49-F238E27FC236}">
+                <a16:creationId xmlns:a16="http://schemas.microsoft.com/office/drawing/2014/main" id="{2A28A767-6D0F-02DB-D0DE-11A781E89460}"/>
+              </a:ext>
+            </a:extLst>
+          </p:cNvPr>
+          <p:cNvSpPr txBox="1"/>
+          <p:nvPr/>
+        </p:nvSpPr>
+        <p:spPr>
+          <a:xfrm>
+            <a:off x="8259526" y="896816"/>
+            <a:ext cx="1783862" cy="276999"/>
+          </a:xfrm>
+          <a:prstGeom prst="rect">
+            <a:avLst/>
+          </a:prstGeom>
+          <a:noFill/>
+        </p:spPr>
+        <p:txBody>
+          <a:bodyPr wrap="square">
+            <a:spAutoFit/>
+          </a:bodyPr>
+          <a:lstStyle/>
+          <a:p>
+            <a:r>
+              <a:rPr lang="en-US" sz="1200" b="1" dirty="0">
+                <a:solidFill>
+                  <a:schemeClr val="accent6">
+                    <a:lumMod val="75000"/>
+                  </a:schemeClr>
+                </a:solidFill>
+              </a:rPr>
+              <a:t>Red Team Engineer</a:t>
+            </a:r>
+            <a:endParaRPr lang="en-SG" sz="1200" b="1" dirty="0">
+              <a:solidFill>
+                <a:schemeClr val="accent6">
+                  <a:lumMod val="75000"/>
+                </a:schemeClr>
+              </a:solidFill>
+            </a:endParaRPr>
+          </a:p>
+        </p:txBody>
+      </p:sp>
+      <p:sp>
+        <p:nvSpPr>
+          <p:cNvPr id="19" name="TextBox 18">
+            <a:extLst>
+              <a:ext uri="{FF2B5EF4-FFF2-40B4-BE49-F238E27FC236}">
+                <a16:creationId xmlns:a16="http://schemas.microsoft.com/office/drawing/2014/main" id="{C6D00F98-3CBF-FB5B-548A-5080D0B085F2}"/>
+              </a:ext>
+            </a:extLst>
+          </p:cNvPr>
+          <p:cNvSpPr txBox="1"/>
+          <p:nvPr/>
+        </p:nvSpPr>
+        <p:spPr>
+          <a:xfrm>
+            <a:off x="1763547" y="3810030"/>
+            <a:ext cx="990567" cy="276999"/>
+          </a:xfrm>
+          <a:prstGeom prst="rect">
+            <a:avLst/>
+          </a:prstGeom>
+          <a:noFill/>
+        </p:spPr>
+        <p:txBody>
+          <a:bodyPr wrap="square" rtlCol="0">
+            <a:spAutoFit/>
+          </a:bodyPr>
+          <a:lstStyle/>
+          <a:p>
+            <a:pPr marL="0" marR="0" lvl="0" indent="0" algn="l" defTabSz="914400" rtl="0" eaLnBrk="1" fontAlgn="auto" latinLnBrk="0" hangingPunct="1">
+              <a:lnSpc>
+                <a:spcPct val="100000"/>
+              </a:lnSpc>
+              <a:spcBef>
+                <a:spcPts val="0"/>
+              </a:spcBef>
+              <a:spcAft>
+                <a:spcPts val="0"/>
+              </a:spcAft>
+              <a:buClrTx/>
+              <a:buSzTx/>
+              <a:buFontTx/>
+              <a:buNone/>
+              <a:tabLst/>
+              <a:defRPr/>
+            </a:pPr>
+            <a:r>
+              <a:rPr kumimoji="0" lang="en-US" sz="1200" b="1" i="0" u="none" strike="noStrike" kern="1200" cap="none" spc="0" normalizeH="0" baseline="0" noProof="0" dirty="0">
+                <a:ln>
+                  <a:noFill/>
+                </a:ln>
+                <a:solidFill>
+                  <a:srgbClr val="C00000"/>
+                </a:solidFill>
+                <a:effectLst/>
+                <a:uLnTx/>
+                <a:uFillTx/>
+                <a:latin typeface="Calibri" panose="020F0502020204030204"/>
+                <a:ea typeface="+mn-ea"/>
+                <a:cs typeface="+mn-cs"/>
+              </a:rPr>
+              <a:t>Attacker</a:t>
+            </a:r>
+            <a:endParaRPr kumimoji="0" lang="en-SG" sz="1200" b="1" i="0" u="none" strike="noStrike" kern="1200" cap="none" spc="0" normalizeH="0" baseline="0" noProof="0" dirty="0">
+              <a:ln>
+                <a:noFill/>
+              </a:ln>
+              <a:solidFill>
+                <a:srgbClr val="C00000"/>
+              </a:solidFill>
+              <a:effectLst/>
+              <a:uLnTx/>
+              <a:uFillTx/>
+              <a:latin typeface="Calibri" panose="020F0502020204030204"/>
+              <a:ea typeface="+mn-ea"/>
+              <a:cs typeface="+mn-cs"/>
+            </a:endParaRPr>
+          </a:p>
+        </p:txBody>
+      </p:sp>
+      <p:sp>
+        <p:nvSpPr>
+          <p:cNvPr id="23" name="TextBox 22">
+            <a:extLst>
+              <a:ext uri="{FF2B5EF4-FFF2-40B4-BE49-F238E27FC236}">
+                <a16:creationId xmlns:a16="http://schemas.microsoft.com/office/drawing/2014/main" id="{2B5C1694-D098-A96A-570D-1EAA6FF98B70}"/>
+              </a:ext>
+            </a:extLst>
+          </p:cNvPr>
+          <p:cNvSpPr txBox="1"/>
+          <p:nvPr/>
+        </p:nvSpPr>
+        <p:spPr>
+          <a:xfrm>
+            <a:off x="9495426" y="5682029"/>
+            <a:ext cx="990567" cy="276999"/>
+          </a:xfrm>
+          <a:prstGeom prst="rect">
+            <a:avLst/>
+          </a:prstGeom>
+          <a:noFill/>
+        </p:spPr>
+        <p:txBody>
+          <a:bodyPr wrap="square" rtlCol="0">
+            <a:spAutoFit/>
+          </a:bodyPr>
+          <a:lstStyle/>
+          <a:p>
+            <a:pPr marL="0" marR="0" lvl="0" indent="0" algn="l" defTabSz="914400" rtl="0" eaLnBrk="1" fontAlgn="auto" latinLnBrk="0" hangingPunct="1">
+              <a:lnSpc>
+                <a:spcPct val="100000"/>
+              </a:lnSpc>
+              <a:spcBef>
+                <a:spcPts val="0"/>
+              </a:spcBef>
+              <a:spcAft>
+                <a:spcPts val="0"/>
+              </a:spcAft>
+              <a:buClrTx/>
+              <a:buSzTx/>
+              <a:buFontTx/>
+              <a:buNone/>
+              <a:tabLst/>
+              <a:defRPr/>
+            </a:pPr>
+            <a:r>
+              <a:rPr kumimoji="0" lang="en-US" sz="1200" b="1" i="0" u="none" strike="noStrike" kern="1200" cap="none" spc="0" normalizeH="0" baseline="0" noProof="0" dirty="0">
+                <a:ln>
+                  <a:noFill/>
+                </a:ln>
+                <a:solidFill>
+                  <a:srgbClr val="0070C0"/>
+                </a:solidFill>
+                <a:effectLst/>
+                <a:uLnTx/>
+                <a:uFillTx/>
+                <a:latin typeface="Calibri" panose="020F0502020204030204"/>
+                <a:ea typeface="+mn-ea"/>
+                <a:cs typeface="+mn-cs"/>
+              </a:rPr>
+              <a:t>Defender</a:t>
+            </a:r>
+            <a:r>
+              <a:rPr kumimoji="0" lang="en-US" sz="1200" b="1" i="0" u="none" strike="noStrike" kern="1200" cap="none" spc="0" normalizeH="0" baseline="0" noProof="0" dirty="0">
+                <a:ln>
+                  <a:noFill/>
+                </a:ln>
+                <a:solidFill>
+                  <a:srgbClr val="C00000"/>
+                </a:solidFill>
+                <a:effectLst/>
+                <a:uLnTx/>
+                <a:uFillTx/>
+                <a:latin typeface="Calibri" panose="020F0502020204030204"/>
+                <a:ea typeface="+mn-ea"/>
+                <a:cs typeface="+mn-cs"/>
+              </a:rPr>
+              <a:t> </a:t>
+            </a:r>
+            <a:endParaRPr kumimoji="0" lang="en-SG" sz="1200" b="1" i="0" u="none" strike="noStrike" kern="1200" cap="none" spc="0" normalizeH="0" baseline="0" noProof="0" dirty="0">
+              <a:ln>
+                <a:noFill/>
+              </a:ln>
+              <a:solidFill>
+                <a:srgbClr val="C00000"/>
+              </a:solidFill>
+              <a:effectLst/>
+              <a:uLnTx/>
+              <a:uFillTx/>
+              <a:latin typeface="Calibri" panose="020F0502020204030204"/>
+              <a:ea typeface="+mn-ea"/>
+              <a:cs typeface="+mn-cs"/>
+            </a:endParaRPr>
+          </a:p>
+        </p:txBody>
+      </p:sp>
+      <p:cxnSp>
+        <p:nvCxnSpPr>
+          <p:cNvPr id="57" name="Straight Connector 56">
+            <a:extLst>
+              <a:ext uri="{FF2B5EF4-FFF2-40B4-BE49-F238E27FC236}">
+                <a16:creationId xmlns:a16="http://schemas.microsoft.com/office/drawing/2014/main" id="{6B446FA8-A176-154B-DF1C-EFF2380EDC45}"/>
+              </a:ext>
+            </a:extLst>
+          </p:cNvPr>
+          <p:cNvCxnSpPr>
+            <a:cxnSpLocks/>
+            <a:stCxn id="4" idx="2"/>
+          </p:cNvCxnSpPr>
+          <p:nvPr/>
+        </p:nvCxnSpPr>
+        <p:spPr>
+          <a:xfrm>
+            <a:off x="8013683" y="1349067"/>
+            <a:ext cx="0" cy="3850663"/>
+          </a:xfrm>
+          <a:prstGeom prst="line">
+            <a:avLst/>
+          </a:prstGeom>
+          <a:ln w="19050">
+            <a:solidFill>
+              <a:schemeClr val="tx1">
+                <a:lumMod val="50000"/>
+                <a:lumOff val="50000"/>
+              </a:schemeClr>
+            </a:solidFill>
+            <a:prstDash val="sysDash"/>
+          </a:ln>
+        </p:spPr>
+        <p:style>
+          <a:lnRef idx="2">
+            <a:schemeClr val="accent1"/>
+          </a:lnRef>
+          <a:fillRef idx="0">
+            <a:schemeClr val="accent1"/>
+          </a:fillRef>
+          <a:effectRef idx="1">
+            <a:schemeClr val="accent1"/>
+          </a:effectRef>
+          <a:fontRef idx="minor">
+            <a:schemeClr val="tx1"/>
+          </a:fontRef>
+        </p:style>
+      </p:cxnSp>
+      <p:cxnSp>
+        <p:nvCxnSpPr>
+          <p:cNvPr id="72" name="Straight Arrow Connector 71">
+            <a:extLst>
+              <a:ext uri="{FF2B5EF4-FFF2-40B4-BE49-F238E27FC236}">
+                <a16:creationId xmlns:a16="http://schemas.microsoft.com/office/drawing/2014/main" id="{1CE5C074-B569-F1DE-CAB6-32201BF0D1D5}"/>
+              </a:ext>
+            </a:extLst>
+          </p:cNvPr>
+          <p:cNvCxnSpPr>
+            <a:cxnSpLocks/>
+          </p:cNvCxnSpPr>
+          <p:nvPr/>
+        </p:nvCxnSpPr>
+        <p:spPr>
+          <a:xfrm flipH="1" flipV="1">
+            <a:off x="6748688" y="5241923"/>
+            <a:ext cx="1271261" cy="0"/>
+          </a:xfrm>
+          <a:prstGeom prst="straightConnector1">
+            <a:avLst/>
+          </a:prstGeom>
+          <a:ln>
+            <a:solidFill>
+              <a:schemeClr val="tx1">
+                <a:lumMod val="50000"/>
+                <a:lumOff val="50000"/>
+              </a:schemeClr>
+            </a:solidFill>
+            <a:prstDash val="sysDash"/>
+            <a:tailEnd type="triangle"/>
+          </a:ln>
+        </p:spPr>
+        <p:style>
+          <a:lnRef idx="2">
+            <a:schemeClr val="accent1"/>
+          </a:lnRef>
+          <a:fillRef idx="0">
+            <a:schemeClr val="accent1"/>
+          </a:fillRef>
+          <a:effectRef idx="1">
+            <a:schemeClr val="accent1"/>
+          </a:effectRef>
+          <a:fontRef idx="minor">
+            <a:schemeClr val="tx1"/>
+          </a:fontRef>
+        </p:style>
+      </p:cxnSp>
+      <p:cxnSp>
+        <p:nvCxnSpPr>
+          <p:cNvPr id="78" name="Straight Arrow Connector 77">
+            <a:extLst>
+              <a:ext uri="{FF2B5EF4-FFF2-40B4-BE49-F238E27FC236}">
+                <a16:creationId xmlns:a16="http://schemas.microsoft.com/office/drawing/2014/main" id="{5FD78574-DD72-9734-E6F4-5ECD8E6512D8}"/>
+              </a:ext>
+            </a:extLst>
+          </p:cNvPr>
+          <p:cNvCxnSpPr>
+            <a:cxnSpLocks/>
+          </p:cNvCxnSpPr>
+          <p:nvPr/>
+        </p:nvCxnSpPr>
+        <p:spPr>
+          <a:xfrm flipH="1" flipV="1">
+            <a:off x="6698895" y="4717015"/>
+            <a:ext cx="1271261" cy="0"/>
+          </a:xfrm>
+          <a:prstGeom prst="straightConnector1">
+            <a:avLst/>
+          </a:prstGeom>
+          <a:ln>
+            <a:solidFill>
+              <a:schemeClr val="tx1">
+                <a:lumMod val="50000"/>
+                <a:lumOff val="50000"/>
+              </a:schemeClr>
+            </a:solidFill>
+            <a:prstDash val="sysDash"/>
+            <a:tailEnd type="triangle"/>
+          </a:ln>
+        </p:spPr>
+        <p:style>
+          <a:lnRef idx="2">
+            <a:schemeClr val="accent1"/>
+          </a:lnRef>
+          <a:fillRef idx="0">
+            <a:schemeClr val="accent1"/>
+          </a:fillRef>
+          <a:effectRef idx="1">
+            <a:schemeClr val="accent1"/>
+          </a:effectRef>
+          <a:fontRef idx="minor">
+            <a:schemeClr val="tx1"/>
+          </a:fontRef>
+        </p:style>
+      </p:cxnSp>
+      <p:cxnSp>
+        <p:nvCxnSpPr>
+          <p:cNvPr id="80" name="Straight Arrow Connector 79">
+            <a:extLst>
+              <a:ext uri="{FF2B5EF4-FFF2-40B4-BE49-F238E27FC236}">
+                <a16:creationId xmlns:a16="http://schemas.microsoft.com/office/drawing/2014/main" id="{75B5371E-D578-7902-E019-DC8A0600AC8B}"/>
+              </a:ext>
+            </a:extLst>
+          </p:cNvPr>
+          <p:cNvCxnSpPr>
+            <a:cxnSpLocks/>
+          </p:cNvCxnSpPr>
+          <p:nvPr/>
+        </p:nvCxnSpPr>
+        <p:spPr>
+          <a:xfrm flipH="1" flipV="1">
+            <a:off x="6748688" y="3414177"/>
+            <a:ext cx="1271261" cy="0"/>
+          </a:xfrm>
+          <a:prstGeom prst="straightConnector1">
+            <a:avLst/>
+          </a:prstGeom>
+          <a:ln>
+            <a:solidFill>
+              <a:schemeClr val="tx1">
+                <a:lumMod val="50000"/>
+                <a:lumOff val="50000"/>
+              </a:schemeClr>
+            </a:solidFill>
+            <a:prstDash val="sysDash"/>
+            <a:tailEnd type="triangle"/>
+          </a:ln>
+        </p:spPr>
+        <p:style>
+          <a:lnRef idx="2">
+            <a:schemeClr val="accent1"/>
+          </a:lnRef>
+          <a:fillRef idx="0">
+            <a:schemeClr val="accent1"/>
+          </a:fillRef>
+          <a:effectRef idx="1">
+            <a:schemeClr val="accent1"/>
+          </a:effectRef>
+          <a:fontRef idx="minor">
+            <a:schemeClr val="tx1"/>
+          </a:fontRef>
+        </p:style>
+      </p:cxnSp>
+      <p:cxnSp>
+        <p:nvCxnSpPr>
+          <p:cNvPr id="83" name="Straight Arrow Connector 82">
+            <a:extLst>
+              <a:ext uri="{FF2B5EF4-FFF2-40B4-BE49-F238E27FC236}">
+                <a16:creationId xmlns:a16="http://schemas.microsoft.com/office/drawing/2014/main" id="{B335D6D1-E2EE-7023-C729-31501697B164}"/>
+              </a:ext>
+            </a:extLst>
+          </p:cNvPr>
+          <p:cNvCxnSpPr>
+            <a:cxnSpLocks/>
+          </p:cNvCxnSpPr>
+          <p:nvPr/>
+        </p:nvCxnSpPr>
+        <p:spPr>
+          <a:xfrm flipH="1" flipV="1">
+            <a:off x="6721522" y="1714739"/>
+            <a:ext cx="1271261" cy="0"/>
+          </a:xfrm>
+          <a:prstGeom prst="straightConnector1">
+            <a:avLst/>
+          </a:prstGeom>
+          <a:ln>
+            <a:solidFill>
+              <a:schemeClr val="tx1">
+                <a:lumMod val="50000"/>
+                <a:lumOff val="50000"/>
+              </a:schemeClr>
+            </a:solidFill>
+            <a:prstDash val="sysDash"/>
+            <a:tailEnd type="triangle"/>
+          </a:ln>
+        </p:spPr>
+        <p:style>
+          <a:lnRef idx="2">
+            <a:schemeClr val="accent1"/>
+          </a:lnRef>
+          <a:fillRef idx="0">
+            <a:schemeClr val="accent1"/>
+          </a:fillRef>
+          <a:effectRef idx="1">
+            <a:schemeClr val="accent1"/>
+          </a:effectRef>
+          <a:fontRef idx="minor">
+            <a:schemeClr val="tx1"/>
+          </a:fontRef>
+        </p:style>
+      </p:cxnSp>
+      <p:cxnSp>
+        <p:nvCxnSpPr>
+          <p:cNvPr id="84" name="Straight Arrow Connector 83">
+            <a:extLst>
+              <a:ext uri="{FF2B5EF4-FFF2-40B4-BE49-F238E27FC236}">
+                <a16:creationId xmlns:a16="http://schemas.microsoft.com/office/drawing/2014/main" id="{980756B7-2225-EA88-155B-18C6F874145D}"/>
+              </a:ext>
+            </a:extLst>
+          </p:cNvPr>
+          <p:cNvCxnSpPr>
+            <a:cxnSpLocks/>
+          </p:cNvCxnSpPr>
+          <p:nvPr/>
+        </p:nvCxnSpPr>
+        <p:spPr>
+          <a:xfrm flipV="1">
+            <a:off x="8015572" y="3093172"/>
+            <a:ext cx="1058038" cy="8044"/>
+          </a:xfrm>
+          <a:prstGeom prst="straightConnector1">
+            <a:avLst/>
+          </a:prstGeom>
+          <a:ln>
+            <a:solidFill>
+              <a:schemeClr val="tx1">
+                <a:lumMod val="50000"/>
+                <a:lumOff val="50000"/>
+              </a:schemeClr>
+            </a:solidFill>
+            <a:prstDash val="sysDash"/>
+            <a:tailEnd type="triangle"/>
+          </a:ln>
+        </p:spPr>
+        <p:style>
+          <a:lnRef idx="2">
+            <a:schemeClr val="accent1"/>
+          </a:lnRef>
+          <a:fillRef idx="0">
+            <a:schemeClr val="accent1"/>
+          </a:fillRef>
+          <a:effectRef idx="1">
+            <a:schemeClr val="accent1"/>
+          </a:effectRef>
+          <a:fontRef idx="minor">
+            <a:schemeClr val="tx1"/>
+          </a:fontRef>
+        </p:style>
+      </p:cxnSp>
+      <p:cxnSp>
+        <p:nvCxnSpPr>
+          <p:cNvPr id="103" name="Straight Arrow Connector 102">
+            <a:extLst>
+              <a:ext uri="{FF2B5EF4-FFF2-40B4-BE49-F238E27FC236}">
+                <a16:creationId xmlns:a16="http://schemas.microsoft.com/office/drawing/2014/main" id="{5C4D2C37-F16D-F589-5D54-FA023F5B25BE}"/>
+              </a:ext>
+            </a:extLst>
+          </p:cNvPr>
+          <p:cNvCxnSpPr>
+            <a:cxnSpLocks/>
+          </p:cNvCxnSpPr>
+          <p:nvPr/>
+        </p:nvCxnSpPr>
+        <p:spPr>
+          <a:xfrm flipV="1">
+            <a:off x="8039732" y="5101578"/>
+            <a:ext cx="1058038" cy="8044"/>
+          </a:xfrm>
+          <a:prstGeom prst="straightConnector1">
+            <a:avLst/>
+          </a:prstGeom>
+          <a:ln>
+            <a:solidFill>
+              <a:schemeClr val="tx1">
+                <a:lumMod val="50000"/>
+                <a:lumOff val="50000"/>
+              </a:schemeClr>
+            </a:solidFill>
+            <a:prstDash val="sysDash"/>
+            <a:tailEnd type="triangle"/>
+          </a:ln>
+        </p:spPr>
+        <p:style>
+          <a:lnRef idx="2">
+            <a:schemeClr val="accent1"/>
+          </a:lnRef>
+          <a:fillRef idx="0">
+            <a:schemeClr val="accent1"/>
+          </a:fillRef>
+          <a:effectRef idx="1">
+            <a:schemeClr val="accent1"/>
+          </a:effectRef>
+          <a:fontRef idx="minor">
+            <a:schemeClr val="tx1"/>
+          </a:fontRef>
+        </p:style>
+      </p:cxnSp>
+      <p:cxnSp>
+        <p:nvCxnSpPr>
+          <p:cNvPr id="104" name="Straight Arrow Connector 103">
+            <a:extLst>
+              <a:ext uri="{FF2B5EF4-FFF2-40B4-BE49-F238E27FC236}">
+                <a16:creationId xmlns:a16="http://schemas.microsoft.com/office/drawing/2014/main" id="{B9EE26F0-0B5E-7E43-8E9C-A24FCF26E0D3}"/>
+              </a:ext>
+            </a:extLst>
+          </p:cNvPr>
+          <p:cNvCxnSpPr>
+            <a:cxnSpLocks/>
+          </p:cNvCxnSpPr>
+          <p:nvPr/>
+        </p:nvCxnSpPr>
+        <p:spPr>
+          <a:xfrm flipH="1">
+            <a:off x="4217283" y="3822417"/>
+            <a:ext cx="3789811" cy="0"/>
+          </a:xfrm>
+          <a:prstGeom prst="straightConnector1">
+            <a:avLst/>
+          </a:prstGeom>
+          <a:ln>
+            <a:solidFill>
+              <a:schemeClr val="tx1">
+                <a:lumMod val="50000"/>
+                <a:lumOff val="50000"/>
+              </a:schemeClr>
+            </a:solidFill>
+            <a:prstDash val="sysDash"/>
+            <a:tailEnd type="triangle"/>
+          </a:ln>
+        </p:spPr>
+        <p:style>
+          <a:lnRef idx="2">
+            <a:schemeClr val="accent1"/>
+          </a:lnRef>
+          <a:fillRef idx="0">
+            <a:schemeClr val="accent1"/>
+          </a:fillRef>
+          <a:effectRef idx="1">
+            <a:schemeClr val="accent1"/>
+          </a:effectRef>
+          <a:fontRef idx="minor">
+            <a:schemeClr val="tx1"/>
+          </a:fontRef>
+        </p:style>
+      </p:cxnSp>
+      <p:cxnSp>
+        <p:nvCxnSpPr>
+          <p:cNvPr id="110" name="Straight Arrow Connector 109">
+            <a:extLst>
+              <a:ext uri="{FF2B5EF4-FFF2-40B4-BE49-F238E27FC236}">
+                <a16:creationId xmlns:a16="http://schemas.microsoft.com/office/drawing/2014/main" id="{F69792D0-55D0-BDF2-5D0A-CD4AFB37BB71}"/>
+              </a:ext>
+            </a:extLst>
+          </p:cNvPr>
+          <p:cNvCxnSpPr>
+            <a:cxnSpLocks/>
+          </p:cNvCxnSpPr>
+          <p:nvPr/>
+        </p:nvCxnSpPr>
+        <p:spPr>
+          <a:xfrm>
+            <a:off x="8237115" y="3119687"/>
+            <a:ext cx="0" cy="352932"/>
+          </a:xfrm>
+          <a:prstGeom prst="straightConnector1">
+            <a:avLst/>
+          </a:prstGeom>
+          <a:ln>
+            <a:solidFill>
+              <a:schemeClr val="tx1">
+                <a:lumMod val="50000"/>
+                <a:lumOff val="50000"/>
+              </a:schemeClr>
+            </a:solidFill>
+            <a:prstDash val="sysDash"/>
+            <a:tailEnd type="triangle"/>
+          </a:ln>
+        </p:spPr>
+        <p:style>
+          <a:lnRef idx="2">
+            <a:schemeClr val="accent1"/>
+          </a:lnRef>
+          <a:fillRef idx="0">
+            <a:schemeClr val="accent1"/>
+          </a:fillRef>
+          <a:effectRef idx="1">
+            <a:schemeClr val="accent1"/>
+          </a:effectRef>
+          <a:fontRef idx="minor">
+            <a:schemeClr val="tx1"/>
+          </a:fontRef>
+        </p:style>
+      </p:cxnSp>
+      <p:cxnSp>
+        <p:nvCxnSpPr>
+          <p:cNvPr id="120" name="Straight Arrow Connector 119">
+            <a:extLst>
+              <a:ext uri="{FF2B5EF4-FFF2-40B4-BE49-F238E27FC236}">
+                <a16:creationId xmlns:a16="http://schemas.microsoft.com/office/drawing/2014/main" id="{C73707A3-582B-374A-E509-A0E372952FAD}"/>
+              </a:ext>
+            </a:extLst>
+          </p:cNvPr>
+          <p:cNvCxnSpPr>
+            <a:cxnSpLocks/>
+          </p:cNvCxnSpPr>
+          <p:nvPr/>
+        </p:nvCxnSpPr>
+        <p:spPr>
+          <a:xfrm flipV="1">
+            <a:off x="10369622" y="1669659"/>
+            <a:ext cx="0" cy="350906"/>
+          </a:xfrm>
+          <a:prstGeom prst="straightConnector1">
+            <a:avLst/>
+          </a:prstGeom>
+          <a:ln>
+            <a:solidFill>
+              <a:srgbClr val="C00000"/>
+            </a:solidFill>
+            <a:prstDash val="sysDash"/>
+            <a:tailEnd type="triangle"/>
+          </a:ln>
+        </p:spPr>
+        <p:style>
+          <a:lnRef idx="2">
+            <a:schemeClr val="accent1"/>
+          </a:lnRef>
+          <a:fillRef idx="0">
+            <a:schemeClr val="accent1"/>
+          </a:fillRef>
+          <a:effectRef idx="1">
+            <a:schemeClr val="accent1"/>
+          </a:effectRef>
+          <a:fontRef idx="minor">
+            <a:schemeClr val="tx1"/>
+          </a:fontRef>
+        </p:style>
+      </p:cxnSp>
+      <p:sp>
+        <p:nvSpPr>
+          <p:cNvPr id="122" name="TextBox 121">
+            <a:extLst>
+              <a:ext uri="{FF2B5EF4-FFF2-40B4-BE49-F238E27FC236}">
+                <a16:creationId xmlns:a16="http://schemas.microsoft.com/office/drawing/2014/main" id="{85FEEBF6-2DE7-9548-41EC-F7F5A30D0CBE}"/>
+              </a:ext>
+            </a:extLst>
+          </p:cNvPr>
+          <p:cNvSpPr txBox="1"/>
+          <p:nvPr/>
+        </p:nvSpPr>
+        <p:spPr>
+          <a:xfrm>
+            <a:off x="10372638" y="1600953"/>
+            <a:ext cx="800084" cy="461665"/>
+          </a:xfrm>
+          <a:prstGeom prst="rect">
+            <a:avLst/>
+          </a:prstGeom>
+          <a:noFill/>
+        </p:spPr>
+        <p:txBody>
+          <a:bodyPr wrap="square" rtlCol="0">
+            <a:spAutoFit/>
+          </a:bodyPr>
+          <a:lstStyle/>
+          <a:p>
+            <a:pPr marL="0" marR="0" lvl="0" indent="0" algn="l" defTabSz="914400" rtl="0" eaLnBrk="1" fontAlgn="auto" latinLnBrk="0" hangingPunct="1">
+              <a:lnSpc>
+                <a:spcPct val="100000"/>
+              </a:lnSpc>
+              <a:spcBef>
+                <a:spcPts val="0"/>
+              </a:spcBef>
+              <a:spcAft>
+                <a:spcPts val="0"/>
+              </a:spcAft>
+              <a:buClrTx/>
+              <a:buSzTx/>
+              <a:buFontTx/>
+              <a:buNone/>
+              <a:tabLst/>
+              <a:defRPr/>
+            </a:pPr>
+            <a:r>
+              <a:rPr kumimoji="0" lang="en-US" sz="1200" b="1" i="0" u="none" strike="noStrike" kern="1200" cap="none" spc="0" normalizeH="0" baseline="0" noProof="0" dirty="0">
+                <a:ln>
+                  <a:noFill/>
+                </a:ln>
+                <a:solidFill>
+                  <a:srgbClr val="C00000"/>
+                </a:solidFill>
+                <a:effectLst/>
+                <a:uLnTx/>
+                <a:uFillTx/>
+                <a:latin typeface="Calibri" panose="020F0502020204030204"/>
+                <a:ea typeface="+mn-ea"/>
+                <a:cs typeface="+mn-cs"/>
+              </a:rPr>
+              <a:t>Attack Path</a:t>
+            </a:r>
+            <a:endParaRPr kumimoji="0" lang="en-SG" sz="1200" b="1" i="0" u="none" strike="noStrike" kern="1200" cap="none" spc="0" normalizeH="0" baseline="0" noProof="0" dirty="0">
+              <a:ln>
+                <a:noFill/>
+              </a:ln>
+              <a:solidFill>
+                <a:srgbClr val="C00000"/>
+              </a:solidFill>
+              <a:effectLst/>
+              <a:uLnTx/>
+              <a:uFillTx/>
+              <a:latin typeface="Calibri" panose="020F0502020204030204"/>
+              <a:ea typeface="+mn-ea"/>
+              <a:cs typeface="+mn-cs"/>
+            </a:endParaRPr>
+          </a:p>
+        </p:txBody>
+      </p:sp>
+      <p:cxnSp>
+        <p:nvCxnSpPr>
+          <p:cNvPr id="126" name="Straight Arrow Connector 125">
+            <a:extLst>
+              <a:ext uri="{FF2B5EF4-FFF2-40B4-BE49-F238E27FC236}">
+                <a16:creationId xmlns:a16="http://schemas.microsoft.com/office/drawing/2014/main" id="{D4077EAB-7291-F3EE-703B-E446919A9BCF}"/>
+              </a:ext>
+            </a:extLst>
+          </p:cNvPr>
+          <p:cNvCxnSpPr>
+            <a:cxnSpLocks/>
+          </p:cNvCxnSpPr>
+          <p:nvPr/>
+        </p:nvCxnSpPr>
+        <p:spPr>
+          <a:xfrm flipH="1" flipV="1">
+            <a:off x="10385136" y="2260604"/>
+            <a:ext cx="0" cy="391175"/>
+          </a:xfrm>
+          <a:prstGeom prst="straightConnector1">
+            <a:avLst/>
+          </a:prstGeom>
+          <a:ln>
+            <a:solidFill>
+              <a:schemeClr val="tx1">
+                <a:lumMod val="50000"/>
+                <a:lumOff val="50000"/>
+              </a:schemeClr>
+            </a:solidFill>
+            <a:prstDash val="sysDash"/>
+            <a:tailEnd type="triangle"/>
+          </a:ln>
+        </p:spPr>
+        <p:style>
+          <a:lnRef idx="2">
+            <a:schemeClr val="accent1"/>
+          </a:lnRef>
+          <a:fillRef idx="0">
+            <a:schemeClr val="accent1"/>
+          </a:fillRef>
+          <a:effectRef idx="1">
+            <a:schemeClr val="accent1"/>
+          </a:effectRef>
+          <a:fontRef idx="minor">
+            <a:schemeClr val="tx1"/>
+          </a:fontRef>
+        </p:style>
+      </p:cxnSp>
+      <p:sp>
+        <p:nvSpPr>
+          <p:cNvPr id="137" name="TextBox 136">
+            <a:extLst>
+              <a:ext uri="{FF2B5EF4-FFF2-40B4-BE49-F238E27FC236}">
+                <a16:creationId xmlns:a16="http://schemas.microsoft.com/office/drawing/2014/main" id="{4E2E316E-2F4D-1023-73FD-12D71105B867}"/>
+              </a:ext>
+            </a:extLst>
+          </p:cNvPr>
+          <p:cNvSpPr txBox="1"/>
+          <p:nvPr/>
+        </p:nvSpPr>
+        <p:spPr>
+          <a:xfrm>
+            <a:off x="10373984" y="2194530"/>
+            <a:ext cx="1008216" cy="461665"/>
+          </a:xfrm>
+          <a:prstGeom prst="rect">
+            <a:avLst/>
+          </a:prstGeom>
+          <a:noFill/>
+        </p:spPr>
+        <p:txBody>
+          <a:bodyPr wrap="square" rtlCol="0">
+            <a:spAutoFit/>
+          </a:bodyPr>
+          <a:lstStyle/>
+          <a:p>
+            <a:pPr marL="0" marR="0" lvl="0" indent="0" algn="l" defTabSz="914400" rtl="0" eaLnBrk="1" fontAlgn="auto" latinLnBrk="0" hangingPunct="1">
+              <a:lnSpc>
+                <a:spcPct val="100000"/>
+              </a:lnSpc>
+              <a:spcBef>
+                <a:spcPts val="0"/>
+              </a:spcBef>
+              <a:spcAft>
+                <a:spcPts val="0"/>
+              </a:spcAft>
+              <a:buClrTx/>
+              <a:buSzTx/>
+              <a:buFontTx/>
+              <a:buNone/>
+              <a:tabLst/>
+              <a:defRPr/>
+            </a:pPr>
+            <a:r>
+              <a:rPr kumimoji="0" lang="en-US" sz="1200" b="1" i="0" u="none" strike="noStrike" kern="1200" cap="none" spc="0" normalizeH="0" baseline="0" noProof="0" dirty="0">
+                <a:ln>
+                  <a:noFill/>
+                </a:ln>
+                <a:solidFill>
+                  <a:schemeClr val="accent6">
+                    <a:lumMod val="50000"/>
+                  </a:schemeClr>
+                </a:solidFill>
+                <a:effectLst/>
+                <a:uLnTx/>
+                <a:uFillTx/>
+                <a:latin typeface="Calibri" panose="020F0502020204030204"/>
+                <a:ea typeface="+mn-ea"/>
+                <a:cs typeface="+mn-cs"/>
+              </a:rPr>
+              <a:t>Deploy</a:t>
+            </a:r>
+          </a:p>
+          <a:p>
+            <a:pPr marL="0" marR="0" lvl="0" indent="0" algn="l" defTabSz="914400" rtl="0" eaLnBrk="1" fontAlgn="auto" latinLnBrk="0" hangingPunct="1">
+              <a:lnSpc>
+                <a:spcPct val="100000"/>
+              </a:lnSpc>
+              <a:spcBef>
+                <a:spcPts val="0"/>
+              </a:spcBef>
+              <a:spcAft>
+                <a:spcPts val="0"/>
+              </a:spcAft>
+              <a:buClrTx/>
+              <a:buSzTx/>
+              <a:buFontTx/>
+              <a:buNone/>
+              <a:tabLst/>
+              <a:defRPr/>
+            </a:pPr>
+            <a:r>
+              <a:rPr kumimoji="0" lang="en-US" sz="1200" b="1" i="0" u="none" strike="noStrike" kern="1200" cap="none" spc="0" normalizeH="0" baseline="0" noProof="0" dirty="0">
+                <a:ln>
+                  <a:noFill/>
+                </a:ln>
+                <a:solidFill>
+                  <a:schemeClr val="accent6">
+                    <a:lumMod val="50000"/>
+                  </a:schemeClr>
+                </a:solidFill>
+                <a:effectLst/>
+                <a:uLnTx/>
+                <a:uFillTx/>
+                <a:latin typeface="Calibri" panose="020F0502020204030204"/>
+                <a:ea typeface="+mn-ea"/>
+                <a:cs typeface="+mn-cs"/>
+              </a:rPr>
+              <a:t>Path</a:t>
+            </a:r>
+            <a:endParaRPr kumimoji="0" lang="en-SG" sz="1200" b="1" i="0" u="none" strike="noStrike" kern="1200" cap="none" spc="0" normalizeH="0" baseline="0" noProof="0" dirty="0">
+              <a:ln>
+                <a:noFill/>
+              </a:ln>
+              <a:solidFill>
+                <a:schemeClr val="accent6">
+                  <a:lumMod val="50000"/>
+                </a:schemeClr>
+              </a:solidFill>
+              <a:effectLst/>
+              <a:uLnTx/>
+              <a:uFillTx/>
+              <a:latin typeface="Calibri" panose="020F0502020204030204"/>
+              <a:ea typeface="+mn-ea"/>
+              <a:cs typeface="+mn-cs"/>
+            </a:endParaRPr>
+          </a:p>
+        </p:txBody>
+      </p:sp>
+      <p:cxnSp>
+        <p:nvCxnSpPr>
+          <p:cNvPr id="138" name="Straight Arrow Connector 137">
+            <a:extLst>
+              <a:ext uri="{FF2B5EF4-FFF2-40B4-BE49-F238E27FC236}">
+                <a16:creationId xmlns:a16="http://schemas.microsoft.com/office/drawing/2014/main" id="{67952242-1E58-91EE-15C2-8E70C8E83AB8}"/>
+              </a:ext>
+            </a:extLst>
+          </p:cNvPr>
+          <p:cNvCxnSpPr>
+            <a:cxnSpLocks/>
+          </p:cNvCxnSpPr>
+          <p:nvPr/>
+        </p:nvCxnSpPr>
+        <p:spPr>
+          <a:xfrm flipV="1">
+            <a:off x="10391556" y="2899793"/>
+            <a:ext cx="0" cy="360074"/>
+          </a:xfrm>
+          <a:prstGeom prst="straightConnector1">
+            <a:avLst/>
+          </a:prstGeom>
+          <a:ln>
+            <a:solidFill>
+              <a:schemeClr val="accent5">
+                <a:lumMod val="75000"/>
+              </a:schemeClr>
+            </a:solidFill>
+            <a:prstDash val="sysDash"/>
+            <a:tailEnd type="triangle"/>
+          </a:ln>
+        </p:spPr>
+        <p:style>
+          <a:lnRef idx="2">
+            <a:schemeClr val="accent1"/>
+          </a:lnRef>
+          <a:fillRef idx="0">
+            <a:schemeClr val="accent1"/>
+          </a:fillRef>
+          <a:effectRef idx="1">
+            <a:schemeClr val="accent1"/>
+          </a:effectRef>
+          <a:fontRef idx="minor">
+            <a:schemeClr val="tx1"/>
+          </a:fontRef>
+        </p:style>
+      </p:cxnSp>
+      <p:sp>
+        <p:nvSpPr>
+          <p:cNvPr id="142" name="TextBox 141">
+            <a:extLst>
+              <a:ext uri="{FF2B5EF4-FFF2-40B4-BE49-F238E27FC236}">
+                <a16:creationId xmlns:a16="http://schemas.microsoft.com/office/drawing/2014/main" id="{B73434AD-2E39-6CE8-4BE1-ED6D38B54914}"/>
+              </a:ext>
+            </a:extLst>
+          </p:cNvPr>
+          <p:cNvSpPr txBox="1"/>
+          <p:nvPr/>
+        </p:nvSpPr>
+        <p:spPr>
+          <a:xfrm>
+            <a:off x="10457273" y="2810689"/>
+            <a:ext cx="1008216" cy="461665"/>
+          </a:xfrm>
+          <a:prstGeom prst="rect">
+            <a:avLst/>
+          </a:prstGeom>
+          <a:noFill/>
+        </p:spPr>
+        <p:txBody>
+          <a:bodyPr wrap="square" rtlCol="0">
+            <a:spAutoFit/>
+          </a:bodyPr>
+          <a:lstStyle/>
+          <a:p>
+            <a:pPr marL="0" marR="0" lvl="0" indent="0" algn="l" defTabSz="914400" rtl="0" eaLnBrk="1" fontAlgn="auto" latinLnBrk="0" hangingPunct="1">
+              <a:lnSpc>
+                <a:spcPct val="100000"/>
+              </a:lnSpc>
+              <a:spcBef>
+                <a:spcPts val="0"/>
+              </a:spcBef>
+              <a:spcAft>
+                <a:spcPts val="0"/>
+              </a:spcAft>
+              <a:buClrTx/>
+              <a:buSzTx/>
+              <a:buFontTx/>
+              <a:buNone/>
+              <a:tabLst/>
+              <a:defRPr/>
+            </a:pPr>
+            <a:r>
+              <a:rPr kumimoji="0" lang="en-US" sz="1200" b="1" i="0" u="none" strike="noStrike" kern="1200" cap="none" spc="0" normalizeH="0" baseline="0" noProof="0" dirty="0">
+                <a:ln>
+                  <a:noFill/>
+                </a:ln>
+                <a:solidFill>
+                  <a:srgbClr val="7030A0"/>
+                </a:solidFill>
+                <a:effectLst/>
+                <a:uLnTx/>
+                <a:uFillTx/>
+                <a:latin typeface="Calibri" panose="020F0502020204030204"/>
+                <a:ea typeface="+mn-ea"/>
+                <a:cs typeface="+mn-cs"/>
+              </a:rPr>
+              <a:t>Detect </a:t>
+            </a:r>
+          </a:p>
+          <a:p>
+            <a:pPr marL="0" marR="0" lvl="0" indent="0" algn="l" defTabSz="914400" rtl="0" eaLnBrk="1" fontAlgn="auto" latinLnBrk="0" hangingPunct="1">
+              <a:lnSpc>
+                <a:spcPct val="100000"/>
+              </a:lnSpc>
+              <a:spcBef>
+                <a:spcPts val="0"/>
+              </a:spcBef>
+              <a:spcAft>
+                <a:spcPts val="0"/>
+              </a:spcAft>
+              <a:buClrTx/>
+              <a:buSzTx/>
+              <a:buFontTx/>
+              <a:buNone/>
+              <a:tabLst/>
+              <a:defRPr/>
+            </a:pPr>
+            <a:r>
+              <a:rPr kumimoji="0" lang="en-US" sz="1200" b="1" i="0" u="none" strike="noStrike" kern="1200" cap="none" spc="0" normalizeH="0" baseline="0" noProof="0" dirty="0">
+                <a:ln>
+                  <a:noFill/>
+                </a:ln>
+                <a:solidFill>
+                  <a:srgbClr val="7030A0"/>
+                </a:solidFill>
+                <a:effectLst/>
+                <a:uLnTx/>
+                <a:uFillTx/>
+                <a:latin typeface="Calibri" panose="020F0502020204030204"/>
+                <a:ea typeface="+mn-ea"/>
+                <a:cs typeface="+mn-cs"/>
+              </a:rPr>
+              <a:t>Path</a:t>
+            </a:r>
+            <a:endParaRPr kumimoji="0" lang="en-SG" sz="1200" b="1" i="0" u="none" strike="noStrike" kern="1200" cap="none" spc="0" normalizeH="0" baseline="0" noProof="0" dirty="0">
+              <a:ln>
+                <a:noFill/>
+              </a:ln>
+              <a:solidFill>
+                <a:srgbClr val="7030A0"/>
+              </a:solidFill>
+              <a:effectLst/>
+              <a:uLnTx/>
+              <a:uFillTx/>
+              <a:latin typeface="Calibri" panose="020F0502020204030204"/>
+              <a:ea typeface="+mn-ea"/>
+              <a:cs typeface="+mn-cs"/>
+            </a:endParaRPr>
+          </a:p>
+        </p:txBody>
+      </p:sp>
+      <p:sp>
+        <p:nvSpPr>
+          <p:cNvPr id="143" name="TextBox 142">
+            <a:extLst>
+              <a:ext uri="{FF2B5EF4-FFF2-40B4-BE49-F238E27FC236}">
+                <a16:creationId xmlns:a16="http://schemas.microsoft.com/office/drawing/2014/main" id="{EACD2CC3-D41D-83A4-6BC2-FC40656AF77F}"/>
+              </a:ext>
+            </a:extLst>
+          </p:cNvPr>
+          <p:cNvSpPr txBox="1"/>
+          <p:nvPr/>
+        </p:nvSpPr>
+        <p:spPr>
+          <a:xfrm>
+            <a:off x="1369909" y="670659"/>
+            <a:ext cx="5508777" cy="646331"/>
+          </a:xfrm>
+          <a:prstGeom prst="rect">
+            <a:avLst/>
+          </a:prstGeom>
+          <a:noFill/>
+          <a:ln w="12700">
+            <a:noFill/>
+            <a:prstDash val="sysDash"/>
+          </a:ln>
+        </p:spPr>
+        <p:txBody>
+          <a:bodyPr wrap="square">
+            <a:spAutoFit/>
+          </a:bodyPr>
+          <a:lstStyle/>
+          <a:p>
+            <a:r>
+              <a:rPr lang="en-US" b="1" dirty="0"/>
+              <a:t>Python PLC Honeypot : </a:t>
+            </a:r>
+          </a:p>
+          <a:p>
+            <a:r>
+              <a:rPr lang="en-US" b="1" dirty="0"/>
+              <a:t>Environment Deployment and Attack Detection </a:t>
+            </a:r>
+            <a:endParaRPr lang="en-SG" b="1" dirty="0"/>
+          </a:p>
+        </p:txBody>
+      </p:sp>
+      <p:pic>
+        <p:nvPicPr>
+          <p:cNvPr id="144" name="Picture 143" descr="A close-up of a device&#10;&#10;Description automatically generated">
+            <a:extLst>
+              <a:ext uri="{FF2B5EF4-FFF2-40B4-BE49-F238E27FC236}">
+                <a16:creationId xmlns:a16="http://schemas.microsoft.com/office/drawing/2014/main" id="{5CC65E38-664A-77D5-4AD6-543BAC3B6E01}"/>
+              </a:ext>
+            </a:extLst>
+          </p:cNvPr>
+          <p:cNvPicPr>
+            <a:picLocks noChangeAspect="1"/>
+          </p:cNvPicPr>
+          <p:nvPr/>
+        </p:nvPicPr>
+        <p:blipFill>
+          <a:blip r:embed="rId15">
+            <a:extLst>
+              <a:ext uri="{28A0092B-C50C-407E-A947-70E740481C1C}">
+                <a14:useLocalDpi xmlns:a14="http://schemas.microsoft.com/office/drawing/2010/main" val="0"/>
+              </a:ext>
+            </a:extLst>
+          </a:blip>
+          <a:stretch>
+            <a:fillRect/>
+          </a:stretch>
+        </p:blipFill>
+        <p:spPr>
+          <a:xfrm>
+            <a:off x="10160549" y="651165"/>
+            <a:ext cx="824581" cy="824581"/>
+          </a:xfrm>
+          <a:prstGeom prst="rect">
+            <a:avLst/>
+          </a:prstGeom>
+        </p:spPr>
+      </p:pic>
     </p:spTree>
     <p:extLst>
       <p:ext uri="{BB962C8B-B14F-4D97-AF65-F5344CB8AC3E}">

</xml_diff>